<commit_message>
[WR A] Presentazione aggiornata con le modifiche di Ferdinando
</commit_message>
<xml_diff>
--- a/Presentazione/Atsilo1/[BOZZA] Atsilo_A_PresentazioneFinale copia.pptx
+++ b/Presentazione/Atsilo1/[BOZZA] Atsilo_A_PresentazioneFinale copia.pptx
@@ -5,7 +5,7 @@
     <p:sldMasterId id="2147483684" r:id="rId1"/>
   </p:sldMasterIdLst>
   <p:notesMasterIdLst>
-    <p:notesMasterId r:id="rId101"/>
+    <p:notesMasterId r:id="rId103"/>
   </p:notesMasterIdLst>
   <p:sldIdLst>
     <p:sldId id="256" r:id="rId2"/>
@@ -106,7 +106,9 @@
     <p:sldId id="353" r:id="rId97"/>
     <p:sldId id="354" r:id="rId98"/>
     <p:sldId id="355" r:id="rId99"/>
-    <p:sldId id="373" r:id="rId100"/>
+    <p:sldId id="375" r:id="rId100"/>
+    <p:sldId id="373" r:id="rId101"/>
+    <p:sldId id="374" r:id="rId102"/>
   </p:sldIdLst>
   <p:sldSz cx="9144000" cy="6858000" type="screen4x3"/>
   <p:notesSz cx="6858000" cy="9144000"/>
@@ -1419,10 +1421,6 @@
           </a:bodyPr>
           <a:lstStyle/>
           <a:p>
-            <a:r>
-              <a:rPr lang="it-IT" dirty="0" smtClean="0"/>
-              <a:t>Familiarità: fare tutto ciò che prima era possibile, con maggior velocità ed efficienza. Un bene per tutti gli enti</a:t>
-            </a:r>
             <a:endParaRPr lang="it-IT" dirty="0"/>
           </a:p>
         </p:txBody>
@@ -1445,7 +1443,93 @@
             <a:fld id="{D70604CA-7593-4640-8FA1-5523937B8510}" type="slidenum">
               <a:rPr lang="it-IT" smtClean="0"/>
               <a:pPr/>
-              <a:t>99</a:t>
+              <a:t>100</a:t>
+            </a:fld>
+            <a:endParaRPr lang="it-IT"/>
+          </a:p>
+        </p:txBody>
+      </p:sp>
+    </p:spTree>
+  </p:cSld>
+  <p:clrMapOvr>
+    <a:masterClrMapping/>
+  </p:clrMapOvr>
+</p:notes>
+</file>
+
+<file path=ppt/notesSlides/notesSlide19.xml><?xml version="1.0" encoding="utf-8"?>
+<p:notes xmlns:a="http://schemas.openxmlformats.org/drawingml/2006/main" xmlns:r="http://schemas.openxmlformats.org/officeDocument/2006/relationships" xmlns:p="http://schemas.openxmlformats.org/presentationml/2006/main">
+  <p:cSld>
+    <p:spTree>
+      <p:nvGrpSpPr>
+        <p:cNvPr id="1" name=""/>
+        <p:cNvGrpSpPr/>
+        <p:nvPr/>
+      </p:nvGrpSpPr>
+      <p:grpSpPr>
+        <a:xfrm>
+          <a:off x="0" y="0"/>
+          <a:ext cx="0" cy="0"/>
+          <a:chOff x="0" y="0"/>
+          <a:chExt cx="0" cy="0"/>
+        </a:xfrm>
+      </p:grpSpPr>
+      <p:sp>
+        <p:nvSpPr>
+          <p:cNvPr id="2" name="Segnaposto immagine diapositiva 1"/>
+          <p:cNvSpPr>
+            <a:spLocks noGrp="1" noRot="1" noChangeAspect="1"/>
+          </p:cNvSpPr>
+          <p:nvPr>
+            <p:ph type="sldImg"/>
+          </p:nvPr>
+        </p:nvSpPr>
+        <p:spPr/>
+      </p:sp>
+      <p:sp>
+        <p:nvSpPr>
+          <p:cNvPr id="3" name="Segnaposto note 2"/>
+          <p:cNvSpPr>
+            <a:spLocks noGrp="1"/>
+          </p:cNvSpPr>
+          <p:nvPr>
+            <p:ph type="body" idx="1"/>
+          </p:nvPr>
+        </p:nvSpPr>
+        <p:spPr/>
+        <p:txBody>
+          <a:bodyPr>
+            <a:normAutofit/>
+          </a:bodyPr>
+          <a:lstStyle/>
+          <a:p>
+            <a:r>
+              <a:rPr lang="it-IT" dirty="0" smtClean="0"/>
+              <a:t>Familiarità: fare tutto ciò che prima era possibile, con maggior velocità ed efficienza. Un bene per tutti gli enti</a:t>
+            </a:r>
+            <a:endParaRPr lang="it-IT" dirty="0"/>
+          </a:p>
+        </p:txBody>
+      </p:sp>
+      <p:sp>
+        <p:nvSpPr>
+          <p:cNvPr id="4" name="Segnaposto numero diapositiva 3"/>
+          <p:cNvSpPr>
+            <a:spLocks noGrp="1"/>
+          </p:cNvSpPr>
+          <p:nvPr>
+            <p:ph type="sldNum" sz="quarter" idx="10"/>
+          </p:nvPr>
+        </p:nvSpPr>
+        <p:spPr/>
+        <p:txBody>
+          <a:bodyPr/>
+          <a:lstStyle/>
+          <a:p>
+            <a:fld id="{D70604CA-7593-4640-8FA1-5523937B8510}" type="slidenum">
+              <a:rPr lang="it-IT" smtClean="0"/>
+              <a:pPr/>
+              <a:t>101</a:t>
             </a:fld>
             <a:endParaRPr lang="it-IT"/>
           </a:p>
@@ -6889,6 +6973,765 @@
     <p:extLst>
       <p:ext uri="{BB962C8B-B14F-4D97-AF65-F5344CB8AC3E}">
         <p14:creationId xmlns:p14="http://schemas.microsoft.com/office/powerpoint/2010/main" val="4143007013"/>
+      </p:ext>
+    </p:extLst>
+  </p:cSld>
+  <p:clrMapOvr>
+    <a:masterClrMapping/>
+  </p:clrMapOvr>
+  <mc:AlternateContent xmlns:mc="http://schemas.openxmlformats.org/markup-compatibility/2006" xmlns:p14="http://schemas.microsoft.com/office/powerpoint/2010/main">
+    <mc:Choice Requires="p14">
+      <p:transition spd="slow" p14:dur="2000"/>
+    </mc:Choice>
+    <mc:Fallback xmlns="">
+      <p:transition spd="slow"/>
+    </mc:Fallback>
+  </mc:AlternateContent>
+  <p:timing>
+    <p:tnLst>
+      <p:par>
+        <p:cTn xmlns:p14="http://schemas.microsoft.com/office/powerpoint/2010/main" id="1" dur="indefinite" restart="never" nodeType="tmRoot"/>
+      </p:par>
+    </p:tnLst>
+  </p:timing>
+</p:sld>
+</file>
+
+<file path=ppt/slides/slide100.xml><?xml version="1.0" encoding="utf-8"?>
+<p:sld xmlns:a="http://schemas.openxmlformats.org/drawingml/2006/main" xmlns:r="http://schemas.openxmlformats.org/officeDocument/2006/relationships" xmlns:p="http://schemas.openxmlformats.org/presentationml/2006/main">
+  <p:cSld>
+    <p:spTree>
+      <p:nvGrpSpPr>
+        <p:cNvPr id="1" name=""/>
+        <p:cNvGrpSpPr/>
+        <p:nvPr/>
+      </p:nvGrpSpPr>
+      <p:grpSpPr>
+        <a:xfrm>
+          <a:off x="0" y="0"/>
+          <a:ext cx="0" cy="0"/>
+          <a:chOff x="0" y="0"/>
+          <a:chExt cx="0" cy="0"/>
+        </a:xfrm>
+      </p:grpSpPr>
+      <p:sp>
+        <p:nvSpPr>
+          <p:cNvPr id="2" name="CasellaDiTesto 1"/>
+          <p:cNvSpPr txBox="1"/>
+          <p:nvPr/>
+        </p:nvSpPr>
+        <p:spPr>
+          <a:xfrm>
+            <a:off x="2339752" y="1"/>
+            <a:ext cx="4096442" cy="1538883"/>
+          </a:xfrm>
+          <a:prstGeom prst="rect">
+            <a:avLst/>
+          </a:prstGeom>
+          <a:noFill/>
+        </p:spPr>
+        <p:txBody>
+          <a:bodyPr wrap="square" rtlCol="0">
+            <a:spAutoFit/>
+          </a:bodyPr>
+          <a:lstStyle/>
+          <a:p>
+            <a:pPr algn="ctr"/>
+            <a:r>
+              <a:rPr lang="it-IT" sz="4800" b="1" dirty="0" smtClean="0">
+                <a:latin typeface="+mj-lt"/>
+              </a:rPr>
+              <a:t>Problemi? </a:t>
+            </a:r>
+          </a:p>
+          <a:p>
+            <a:pPr algn="ctr"/>
+            <a:r>
+              <a:rPr lang="it-IT" sz="2800" b="1" dirty="0" smtClean="0">
+                <a:latin typeface="+mj-lt"/>
+              </a:rPr>
+              <a:t>Perché?</a:t>
+            </a:r>
+          </a:p>
+          <a:p>
+            <a:pPr algn="ctr"/>
+            <a:endParaRPr lang="it-IT" dirty="0">
+              <a:latin typeface="+mj-lt"/>
+            </a:endParaRPr>
+          </a:p>
+        </p:txBody>
+      </p:sp>
+      <p:sp>
+        <p:nvSpPr>
+          <p:cNvPr id="5" name="Content Placeholder 3"/>
+          <p:cNvSpPr txBox="1">
+            <a:spLocks/>
+          </p:cNvSpPr>
+          <p:nvPr/>
+        </p:nvSpPr>
+        <p:spPr>
+          <a:xfrm>
+            <a:off x="539552" y="1124744"/>
+            <a:ext cx="8280920" cy="5733256"/>
+          </a:xfrm>
+          <a:prstGeom prst="rect">
+            <a:avLst/>
+          </a:prstGeom>
+        </p:spPr>
+        <p:txBody>
+          <a:bodyPr tIns="0"/>
+          <a:lstStyle>
+            <a:lvl1pPr marL="274320" indent="-274320" algn="l" rtl="0" eaLnBrk="1" latinLnBrk="0" hangingPunct="1">
+              <a:spcBef>
+                <a:spcPct val="20000"/>
+              </a:spcBef>
+              <a:buClrTx/>
+              <a:buSzPct val="95000"/>
+              <a:buFont typeface="Wingdings" pitchFamily="2" charset="2"/>
+              <a:buChar char="v"/>
+              <a:defRPr kumimoji="0" sz="2800" kern="1200">
+                <a:solidFill>
+                  <a:schemeClr val="tx1"/>
+                </a:solidFill>
+                <a:latin typeface="+mn-lt"/>
+                <a:ea typeface="+mn-ea"/>
+                <a:cs typeface="+mn-cs"/>
+              </a:defRPr>
+            </a:lvl1pPr>
+            <a:lvl2pPr marL="640080" indent="-246888" algn="l" rtl="0" eaLnBrk="1" latinLnBrk="0" hangingPunct="1">
+              <a:spcBef>
+                <a:spcPct val="20000"/>
+              </a:spcBef>
+              <a:buClrTx/>
+              <a:buSzPct val="85000"/>
+              <a:buFont typeface="Courier New" pitchFamily="49" charset="0"/>
+              <a:buChar char="o"/>
+              <a:defRPr kumimoji="0" sz="2600" kern="1200">
+                <a:solidFill>
+                  <a:schemeClr val="tx1"/>
+                </a:solidFill>
+                <a:latin typeface="+mn-lt"/>
+                <a:ea typeface="+mn-ea"/>
+                <a:cs typeface="+mn-cs"/>
+              </a:defRPr>
+            </a:lvl2pPr>
+            <a:lvl3pPr marL="914400" indent="-246888" algn="l" rtl="0" eaLnBrk="1" latinLnBrk="0" hangingPunct="1">
+              <a:spcBef>
+                <a:spcPct val="20000"/>
+              </a:spcBef>
+              <a:buClrTx/>
+              <a:buSzPct val="70000"/>
+              <a:buFont typeface="Wingdings 2"/>
+              <a:buChar char=""/>
+              <a:defRPr kumimoji="0" sz="2400" kern="1200">
+                <a:solidFill>
+                  <a:schemeClr val="tx1"/>
+                </a:solidFill>
+                <a:latin typeface="+mn-lt"/>
+                <a:ea typeface="+mn-ea"/>
+                <a:cs typeface="+mn-cs"/>
+              </a:defRPr>
+            </a:lvl3pPr>
+            <a:lvl4pPr marL="1188720" indent="-210312" algn="l" rtl="0" eaLnBrk="1" latinLnBrk="0" hangingPunct="1">
+              <a:spcBef>
+                <a:spcPct val="20000"/>
+              </a:spcBef>
+              <a:buClrTx/>
+              <a:buSzPct val="65000"/>
+              <a:buFont typeface="Wingdings 2"/>
+              <a:buChar char=""/>
+              <a:defRPr kumimoji="0" sz="2000" kern="1200">
+                <a:solidFill>
+                  <a:schemeClr val="tx1"/>
+                </a:solidFill>
+                <a:latin typeface="+mn-lt"/>
+                <a:ea typeface="+mn-ea"/>
+                <a:cs typeface="+mn-cs"/>
+              </a:defRPr>
+            </a:lvl4pPr>
+            <a:lvl5pPr marL="1463040" indent="-210312" algn="l" rtl="0" eaLnBrk="1" latinLnBrk="0" hangingPunct="1">
+              <a:spcBef>
+                <a:spcPct val="20000"/>
+              </a:spcBef>
+              <a:buClrTx/>
+              <a:buSzPct val="65000"/>
+              <a:buFont typeface="Wingdings 2"/>
+              <a:buChar char=""/>
+              <a:defRPr kumimoji="0" sz="1800" kern="1200">
+                <a:solidFill>
+                  <a:schemeClr val="tx1"/>
+                </a:solidFill>
+                <a:latin typeface="+mn-lt"/>
+                <a:ea typeface="+mn-ea"/>
+                <a:cs typeface="+mn-cs"/>
+              </a:defRPr>
+            </a:lvl5pPr>
+            <a:lvl6pPr marL="1737360" indent="-210312" algn="l" rtl="0" eaLnBrk="1" latinLnBrk="0" hangingPunct="1">
+              <a:spcBef>
+                <a:spcPct val="20000"/>
+              </a:spcBef>
+              <a:buClr>
+                <a:schemeClr val="accent5"/>
+              </a:buClr>
+              <a:buSzPct val="80000"/>
+              <a:buFont typeface="Wingdings 2"/>
+              <a:buChar char=""/>
+              <a:defRPr kumimoji="0" sz="1800" kern="1200">
+                <a:solidFill>
+                  <a:schemeClr val="tx1"/>
+                </a:solidFill>
+                <a:latin typeface="+mn-lt"/>
+                <a:ea typeface="+mn-ea"/>
+                <a:cs typeface="+mn-cs"/>
+              </a:defRPr>
+            </a:lvl6pPr>
+            <a:lvl7pPr marL="1920240" indent="-182880" algn="l" rtl="0" eaLnBrk="1" latinLnBrk="0" hangingPunct="1">
+              <a:spcBef>
+                <a:spcPct val="20000"/>
+              </a:spcBef>
+              <a:buClr>
+                <a:schemeClr val="accent6"/>
+              </a:buClr>
+              <a:buSzPct val="80000"/>
+              <a:buFont typeface="Wingdings 2"/>
+              <a:buChar char=""/>
+              <a:defRPr kumimoji="0" sz="1600" kern="1200" baseline="0">
+                <a:solidFill>
+                  <a:schemeClr val="tx1"/>
+                </a:solidFill>
+                <a:latin typeface="+mn-lt"/>
+                <a:ea typeface="+mn-ea"/>
+                <a:cs typeface="+mn-cs"/>
+              </a:defRPr>
+            </a:lvl7pPr>
+            <a:lvl8pPr marL="2194560" indent="-182880" algn="l" rtl="0" eaLnBrk="1" latinLnBrk="0" hangingPunct="1">
+              <a:spcBef>
+                <a:spcPct val="20000"/>
+              </a:spcBef>
+              <a:buClr>
+                <a:schemeClr val="tx2"/>
+              </a:buClr>
+              <a:buChar char="•"/>
+              <a:defRPr kumimoji="0" sz="1600" kern="1200">
+                <a:solidFill>
+                  <a:schemeClr val="tx1"/>
+                </a:solidFill>
+                <a:latin typeface="+mn-lt"/>
+                <a:ea typeface="+mn-ea"/>
+                <a:cs typeface="+mn-cs"/>
+              </a:defRPr>
+            </a:lvl8pPr>
+            <a:lvl9pPr marL="2468880" indent="-182880" algn="l" rtl="0" eaLnBrk="1" latinLnBrk="0" hangingPunct="1">
+              <a:spcBef>
+                <a:spcPct val="20000"/>
+              </a:spcBef>
+              <a:buClr>
+                <a:schemeClr val="tx2"/>
+              </a:buClr>
+              <a:buFontTx/>
+              <a:buChar char="•"/>
+              <a:defRPr kumimoji="0" sz="1400" kern="1200" baseline="0">
+                <a:solidFill>
+                  <a:schemeClr val="tx1"/>
+                </a:solidFill>
+                <a:latin typeface="+mn-lt"/>
+                <a:ea typeface="+mn-ea"/>
+                <a:cs typeface="+mn-cs"/>
+              </a:defRPr>
+            </a:lvl9pPr>
+          </a:lstStyle>
+          <a:p>
+            <a:r>
+              <a:rPr lang="it-IT" dirty="0" smtClean="0"/>
+              <a:t>Difficoltà iniziali </a:t>
+            </a:r>
+          </a:p>
+          <a:p>
+            <a:pPr lvl="1"/>
+            <a:r>
+              <a:rPr lang="it-IT" dirty="0" smtClean="0"/>
+              <a:t>Inesperienza </a:t>
+            </a:r>
+          </a:p>
+          <a:p>
+            <a:pPr lvl="1"/>
+            <a:r>
+              <a:rPr lang="it-IT" dirty="0" smtClean="0"/>
+              <a:t>Approccio </a:t>
+            </a:r>
+            <a:r>
+              <a:rPr lang="it-IT" dirty="0" err="1" smtClean="0"/>
+              <a:t>Tools</a:t>
+            </a:r>
+            <a:r>
+              <a:rPr lang="it-IT" dirty="0" smtClean="0"/>
+              <a:t>  (</a:t>
+            </a:r>
+            <a:r>
+              <a:rPr lang="it-IT" dirty="0" err="1" smtClean="0"/>
+              <a:t>JUnit</a:t>
+            </a:r>
+            <a:r>
+              <a:rPr lang="it-IT" dirty="0" smtClean="0"/>
+              <a:t>)</a:t>
+            </a:r>
+          </a:p>
+          <a:p>
+            <a:r>
+              <a:rPr lang="it-IT" dirty="0" smtClean="0"/>
+              <a:t>Fattore Tempo</a:t>
+            </a:r>
+          </a:p>
+          <a:p>
+            <a:pPr lvl="1"/>
+            <a:r>
+              <a:rPr lang="it-IT" dirty="0" smtClean="0"/>
+              <a:t>Consegne imperfette (</a:t>
+            </a:r>
+            <a:r>
+              <a:rPr lang="it-IT" dirty="0" err="1" smtClean="0"/>
+              <a:t>succesivamente</a:t>
+            </a:r>
+            <a:r>
+              <a:rPr lang="it-IT" dirty="0" smtClean="0"/>
+              <a:t> revisionate)</a:t>
+            </a:r>
+          </a:p>
+          <a:p>
+            <a:pPr lvl="1"/>
+            <a:r>
+              <a:rPr lang="it-IT" dirty="0" smtClean="0"/>
+              <a:t>Errori (Database)</a:t>
+            </a:r>
+          </a:p>
+          <a:p>
+            <a:r>
+              <a:rPr lang="it-IT" dirty="0" smtClean="0"/>
+              <a:t>Aggiunte e Perdite in corsa</a:t>
+            </a:r>
+          </a:p>
+          <a:p>
+            <a:pPr lvl="1"/>
+            <a:r>
+              <a:rPr lang="it-IT" dirty="0" smtClean="0"/>
+              <a:t>Modifiche Costanti al sistema</a:t>
+            </a:r>
+          </a:p>
+          <a:p>
+            <a:pPr lvl="1"/>
+            <a:r>
+              <a:rPr lang="it-IT" dirty="0" smtClean="0"/>
+              <a:t>Motivazione ed interpretazione</a:t>
+            </a:r>
+          </a:p>
+          <a:p>
+            <a:r>
+              <a:rPr lang="it-IT" dirty="0" err="1" smtClean="0"/>
+              <a:t>Problemi=Difficoltà</a:t>
+            </a:r>
+            <a:endParaRPr lang="it-IT" dirty="0" smtClean="0"/>
+          </a:p>
+          <a:p>
+            <a:pPr lvl="1"/>
+            <a:r>
+              <a:rPr lang="it-IT" dirty="0" smtClean="0"/>
+              <a:t>Naturale processo di progettazione</a:t>
+            </a:r>
+          </a:p>
+          <a:p>
+            <a:pPr lvl="1">
+              <a:buNone/>
+            </a:pPr>
+            <a:endParaRPr lang="it-IT" dirty="0" smtClean="0"/>
+          </a:p>
+          <a:p>
+            <a:pPr lvl="1">
+              <a:buNone/>
+            </a:pPr>
+            <a:endParaRPr lang="it-IT" dirty="0" smtClean="0"/>
+          </a:p>
+        </p:txBody>
+      </p:sp>
+    </p:spTree>
+    <p:extLst>
+      <p:ext uri="{BB962C8B-B14F-4D97-AF65-F5344CB8AC3E}">
+        <p14:creationId xmlns:p14="http://schemas.microsoft.com/office/powerpoint/2010/main" val="3564990699"/>
+      </p:ext>
+    </p:extLst>
+  </p:cSld>
+  <p:clrMapOvr>
+    <a:masterClrMapping/>
+  </p:clrMapOvr>
+  <mc:AlternateContent xmlns:mc="http://schemas.openxmlformats.org/markup-compatibility/2006" xmlns:p14="http://schemas.microsoft.com/office/powerpoint/2010/main">
+    <mc:Choice Requires="p14">
+      <p:transition spd="slow" p14:dur="2000"/>
+    </mc:Choice>
+    <mc:Fallback xmlns="">
+      <p:transition spd="slow"/>
+    </mc:Fallback>
+  </mc:AlternateContent>
+  <p:timing>
+    <p:tnLst>
+      <p:par>
+        <p:cTn xmlns:p14="http://schemas.microsoft.com/office/powerpoint/2010/main" id="1" dur="indefinite" restart="never" nodeType="tmRoot"/>
+      </p:par>
+    </p:tnLst>
+  </p:timing>
+</p:sld>
+</file>
+
+<file path=ppt/slides/slide101.xml><?xml version="1.0" encoding="utf-8"?>
+<p:sld xmlns:a="http://schemas.openxmlformats.org/drawingml/2006/main" xmlns:r="http://schemas.openxmlformats.org/officeDocument/2006/relationships" xmlns:p="http://schemas.openxmlformats.org/presentationml/2006/main">
+  <p:cSld>
+    <p:spTree>
+      <p:nvGrpSpPr>
+        <p:cNvPr id="1" name=""/>
+        <p:cNvGrpSpPr/>
+        <p:nvPr/>
+      </p:nvGrpSpPr>
+      <p:grpSpPr>
+        <a:xfrm>
+          <a:off x="0" y="0"/>
+          <a:ext cx="0" cy="0"/>
+          <a:chOff x="0" y="0"/>
+          <a:chExt cx="0" cy="0"/>
+        </a:xfrm>
+      </p:grpSpPr>
+      <p:sp>
+        <p:nvSpPr>
+          <p:cNvPr id="2" name="CasellaDiTesto 1"/>
+          <p:cNvSpPr txBox="1"/>
+          <p:nvPr/>
+        </p:nvSpPr>
+        <p:spPr>
+          <a:xfrm>
+            <a:off x="1835696" y="0"/>
+            <a:ext cx="5400600" cy="1538883"/>
+          </a:xfrm>
+          <a:prstGeom prst="rect">
+            <a:avLst/>
+          </a:prstGeom>
+          <a:noFill/>
+        </p:spPr>
+        <p:txBody>
+          <a:bodyPr wrap="square" rtlCol="0">
+            <a:spAutoFit/>
+          </a:bodyPr>
+          <a:lstStyle/>
+          <a:p>
+            <a:pPr algn="ctr"/>
+            <a:r>
+              <a:rPr lang="it-IT" sz="4800" b="1" dirty="0" smtClean="0">
+                <a:latin typeface="+mj-lt"/>
+              </a:rPr>
+              <a:t>Progetto </a:t>
+            </a:r>
+            <a:r>
+              <a:rPr lang="it-IT" sz="4800" b="1" dirty="0" err="1" smtClean="0">
+                <a:latin typeface="+mj-lt"/>
+              </a:rPr>
+              <a:t>@silo</a:t>
+            </a:r>
+            <a:r>
+              <a:rPr lang="it-IT" sz="4800" b="1" dirty="0" smtClean="0">
+                <a:latin typeface="+mj-lt"/>
+              </a:rPr>
+              <a:t> </a:t>
+            </a:r>
+          </a:p>
+          <a:p>
+            <a:pPr algn="ctr"/>
+            <a:r>
+              <a:rPr lang="it-IT" sz="2800" b="1" dirty="0" smtClean="0">
+                <a:latin typeface="+mj-lt"/>
+              </a:rPr>
+              <a:t>Obiettivo Raggiunto? Perché?</a:t>
+            </a:r>
+          </a:p>
+          <a:p>
+            <a:pPr algn="ctr"/>
+            <a:endParaRPr lang="it-IT" dirty="0">
+              <a:latin typeface="+mj-lt"/>
+            </a:endParaRPr>
+          </a:p>
+        </p:txBody>
+      </p:sp>
+      <p:sp>
+        <p:nvSpPr>
+          <p:cNvPr id="5" name="Content Placeholder 3"/>
+          <p:cNvSpPr txBox="1">
+            <a:spLocks/>
+          </p:cNvSpPr>
+          <p:nvPr/>
+        </p:nvSpPr>
+        <p:spPr>
+          <a:xfrm>
+            <a:off x="539552" y="1268760"/>
+            <a:ext cx="8280920" cy="5400600"/>
+          </a:xfrm>
+          <a:prstGeom prst="rect">
+            <a:avLst/>
+          </a:prstGeom>
+        </p:spPr>
+        <p:txBody>
+          <a:bodyPr tIns="0"/>
+          <a:lstStyle>
+            <a:lvl1pPr marL="274320" indent="-274320" algn="l" rtl="0" eaLnBrk="1" latinLnBrk="0" hangingPunct="1">
+              <a:spcBef>
+                <a:spcPct val="20000"/>
+              </a:spcBef>
+              <a:buClrTx/>
+              <a:buSzPct val="95000"/>
+              <a:buFont typeface="Wingdings" pitchFamily="2" charset="2"/>
+              <a:buChar char="v"/>
+              <a:defRPr kumimoji="0" sz="2800" kern="1200">
+                <a:solidFill>
+                  <a:schemeClr val="tx1"/>
+                </a:solidFill>
+                <a:latin typeface="+mn-lt"/>
+                <a:ea typeface="+mn-ea"/>
+                <a:cs typeface="+mn-cs"/>
+              </a:defRPr>
+            </a:lvl1pPr>
+            <a:lvl2pPr marL="640080" indent="-246888" algn="l" rtl="0" eaLnBrk="1" latinLnBrk="0" hangingPunct="1">
+              <a:spcBef>
+                <a:spcPct val="20000"/>
+              </a:spcBef>
+              <a:buClrTx/>
+              <a:buSzPct val="85000"/>
+              <a:buFont typeface="Courier New" pitchFamily="49" charset="0"/>
+              <a:buChar char="o"/>
+              <a:defRPr kumimoji="0" sz="2600" kern="1200">
+                <a:solidFill>
+                  <a:schemeClr val="tx1"/>
+                </a:solidFill>
+                <a:latin typeface="+mn-lt"/>
+                <a:ea typeface="+mn-ea"/>
+                <a:cs typeface="+mn-cs"/>
+              </a:defRPr>
+            </a:lvl2pPr>
+            <a:lvl3pPr marL="914400" indent="-246888" algn="l" rtl="0" eaLnBrk="1" latinLnBrk="0" hangingPunct="1">
+              <a:spcBef>
+                <a:spcPct val="20000"/>
+              </a:spcBef>
+              <a:buClrTx/>
+              <a:buSzPct val="70000"/>
+              <a:buFont typeface="Wingdings 2"/>
+              <a:buChar char=""/>
+              <a:defRPr kumimoji="0" sz="2400" kern="1200">
+                <a:solidFill>
+                  <a:schemeClr val="tx1"/>
+                </a:solidFill>
+                <a:latin typeface="+mn-lt"/>
+                <a:ea typeface="+mn-ea"/>
+                <a:cs typeface="+mn-cs"/>
+              </a:defRPr>
+            </a:lvl3pPr>
+            <a:lvl4pPr marL="1188720" indent="-210312" algn="l" rtl="0" eaLnBrk="1" latinLnBrk="0" hangingPunct="1">
+              <a:spcBef>
+                <a:spcPct val="20000"/>
+              </a:spcBef>
+              <a:buClrTx/>
+              <a:buSzPct val="65000"/>
+              <a:buFont typeface="Wingdings 2"/>
+              <a:buChar char=""/>
+              <a:defRPr kumimoji="0" sz="2000" kern="1200">
+                <a:solidFill>
+                  <a:schemeClr val="tx1"/>
+                </a:solidFill>
+                <a:latin typeface="+mn-lt"/>
+                <a:ea typeface="+mn-ea"/>
+                <a:cs typeface="+mn-cs"/>
+              </a:defRPr>
+            </a:lvl4pPr>
+            <a:lvl5pPr marL="1463040" indent="-210312" algn="l" rtl="0" eaLnBrk="1" latinLnBrk="0" hangingPunct="1">
+              <a:spcBef>
+                <a:spcPct val="20000"/>
+              </a:spcBef>
+              <a:buClrTx/>
+              <a:buSzPct val="65000"/>
+              <a:buFont typeface="Wingdings 2"/>
+              <a:buChar char=""/>
+              <a:defRPr kumimoji="0" sz="1800" kern="1200">
+                <a:solidFill>
+                  <a:schemeClr val="tx1"/>
+                </a:solidFill>
+                <a:latin typeface="+mn-lt"/>
+                <a:ea typeface="+mn-ea"/>
+                <a:cs typeface="+mn-cs"/>
+              </a:defRPr>
+            </a:lvl5pPr>
+            <a:lvl6pPr marL="1737360" indent="-210312" algn="l" rtl="0" eaLnBrk="1" latinLnBrk="0" hangingPunct="1">
+              <a:spcBef>
+                <a:spcPct val="20000"/>
+              </a:spcBef>
+              <a:buClr>
+                <a:schemeClr val="accent5"/>
+              </a:buClr>
+              <a:buSzPct val="80000"/>
+              <a:buFont typeface="Wingdings 2"/>
+              <a:buChar char=""/>
+              <a:defRPr kumimoji="0" sz="1800" kern="1200">
+                <a:solidFill>
+                  <a:schemeClr val="tx1"/>
+                </a:solidFill>
+                <a:latin typeface="+mn-lt"/>
+                <a:ea typeface="+mn-ea"/>
+                <a:cs typeface="+mn-cs"/>
+              </a:defRPr>
+            </a:lvl6pPr>
+            <a:lvl7pPr marL="1920240" indent="-182880" algn="l" rtl="0" eaLnBrk="1" latinLnBrk="0" hangingPunct="1">
+              <a:spcBef>
+                <a:spcPct val="20000"/>
+              </a:spcBef>
+              <a:buClr>
+                <a:schemeClr val="accent6"/>
+              </a:buClr>
+              <a:buSzPct val="80000"/>
+              <a:buFont typeface="Wingdings 2"/>
+              <a:buChar char=""/>
+              <a:defRPr kumimoji="0" sz="1600" kern="1200" baseline="0">
+                <a:solidFill>
+                  <a:schemeClr val="tx1"/>
+                </a:solidFill>
+                <a:latin typeface="+mn-lt"/>
+                <a:ea typeface="+mn-ea"/>
+                <a:cs typeface="+mn-cs"/>
+              </a:defRPr>
+            </a:lvl7pPr>
+            <a:lvl8pPr marL="2194560" indent="-182880" algn="l" rtl="0" eaLnBrk="1" latinLnBrk="0" hangingPunct="1">
+              <a:spcBef>
+                <a:spcPct val="20000"/>
+              </a:spcBef>
+              <a:buClr>
+                <a:schemeClr val="tx2"/>
+              </a:buClr>
+              <a:buChar char="•"/>
+              <a:defRPr kumimoji="0" sz="1600" kern="1200">
+                <a:solidFill>
+                  <a:schemeClr val="tx1"/>
+                </a:solidFill>
+                <a:latin typeface="+mn-lt"/>
+                <a:ea typeface="+mn-ea"/>
+                <a:cs typeface="+mn-cs"/>
+              </a:defRPr>
+            </a:lvl8pPr>
+            <a:lvl9pPr marL="2468880" indent="-182880" algn="l" rtl="0" eaLnBrk="1" latinLnBrk="0" hangingPunct="1">
+              <a:spcBef>
+                <a:spcPct val="20000"/>
+              </a:spcBef>
+              <a:buClr>
+                <a:schemeClr val="tx2"/>
+              </a:buClr>
+              <a:buFontTx/>
+              <a:buChar char="•"/>
+              <a:defRPr kumimoji="0" sz="1400" kern="1200" baseline="0">
+                <a:solidFill>
+                  <a:schemeClr val="tx1"/>
+                </a:solidFill>
+                <a:latin typeface="+mn-lt"/>
+                <a:ea typeface="+mn-ea"/>
+                <a:cs typeface="+mn-cs"/>
+              </a:defRPr>
+            </a:lvl9pPr>
+          </a:lstStyle>
+          <a:p>
+            <a:r>
+              <a:rPr lang="it-IT" dirty="0" smtClean="0"/>
+              <a:t>Aderente alle aspettative </a:t>
+            </a:r>
+          </a:p>
+          <a:p>
+            <a:pPr lvl="1"/>
+            <a:r>
+              <a:rPr lang="it-IT" dirty="0" smtClean="0"/>
+              <a:t>Familiarità</a:t>
+            </a:r>
+          </a:p>
+          <a:p>
+            <a:r>
+              <a:rPr lang="it-IT" dirty="0" smtClean="0"/>
+              <a:t>Struttura aziendale</a:t>
+            </a:r>
+          </a:p>
+          <a:p>
+            <a:pPr lvl="1"/>
+            <a:r>
+              <a:rPr lang="it-IT" dirty="0" smtClean="0"/>
+              <a:t>Nessuna Variazione</a:t>
+            </a:r>
+          </a:p>
+          <a:p>
+            <a:pPr lvl="1"/>
+            <a:r>
+              <a:rPr lang="it-IT" dirty="0" smtClean="0"/>
+              <a:t>Ingrato ai processi già noti</a:t>
+            </a:r>
+          </a:p>
+          <a:p>
+            <a:r>
+              <a:rPr lang="it-IT" dirty="0" smtClean="0"/>
+              <a:t>Documentazione Solida</a:t>
+            </a:r>
+          </a:p>
+          <a:p>
+            <a:pPr lvl="1"/>
+            <a:r>
+              <a:rPr lang="it-IT" dirty="0" smtClean="0"/>
+              <a:t>Raffinata (revisionata)</a:t>
+            </a:r>
+          </a:p>
+          <a:p>
+            <a:pPr lvl="1"/>
+            <a:r>
+              <a:rPr lang="it-IT" dirty="0" smtClean="0"/>
+              <a:t>Crescita costante</a:t>
+            </a:r>
+          </a:p>
+          <a:p>
+            <a:pPr lvl="1"/>
+            <a:r>
+              <a:rPr lang="it-IT" dirty="0" smtClean="0"/>
+              <a:t>Ottima Tracciabilità</a:t>
+            </a:r>
+          </a:p>
+          <a:p>
+            <a:r>
+              <a:rPr lang="it-IT" dirty="0" smtClean="0"/>
+              <a:t>Usare </a:t>
+            </a:r>
+            <a:r>
+              <a:rPr lang="it-IT" dirty="0" err="1" smtClean="0"/>
+              <a:t>@silo</a:t>
+            </a:r>
+            <a:r>
+              <a:rPr lang="it-IT" dirty="0" smtClean="0"/>
+              <a:t> senza accorgersene</a:t>
+            </a:r>
+          </a:p>
+          <a:p>
+            <a:pPr lvl="1"/>
+            <a:r>
+              <a:rPr lang="it-IT" dirty="0" smtClean="0"/>
+              <a:t>Stessi processi, con maggiore velocità ed efficienza </a:t>
+            </a:r>
+          </a:p>
+          <a:p>
+            <a:pPr lvl="1"/>
+            <a:endParaRPr lang="it-IT" dirty="0" smtClean="0"/>
+          </a:p>
+          <a:p>
+            <a:pPr lvl="1">
+              <a:buNone/>
+            </a:pPr>
+            <a:endParaRPr lang="it-IT" dirty="0" smtClean="0"/>
+          </a:p>
+        </p:txBody>
+      </p:sp>
+    </p:spTree>
+    <p:extLst>
+      <p:ext uri="{BB962C8B-B14F-4D97-AF65-F5344CB8AC3E}">
+        <p14:creationId xmlns:p14="http://schemas.microsoft.com/office/powerpoint/2010/main" val="3748041918"/>
       </p:ext>
     </p:extLst>
   </p:cSld>
@@ -34102,16 +34945,57 @@
           <a:chExt cx="0" cy="0"/>
         </a:xfrm>
       </p:grpSpPr>
+      <p:pic>
+        <p:nvPicPr>
+          <p:cNvPr id="3" name="Picture 3" descr="C:\linda\uni\esami_da_svolgere\gps\progetto_gps\Atsilo\documenti_comuni\loghi\logo.png"/>
+          <p:cNvPicPr>
+            <a:picLocks noChangeAspect="1" noChangeArrowheads="1"/>
+          </p:cNvPicPr>
+          <p:nvPr/>
+        </p:nvPicPr>
+        <p:blipFill>
+          <a:blip r:embed="rId2">
+            <a:extLst>
+              <a:ext uri="{28A0092B-C50C-407E-A947-70E740481C1C}">
+                <a14:useLocalDpi xmlns:a14="http://schemas.microsoft.com/office/drawing/2010/main" val="0"/>
+              </a:ext>
+            </a:extLst>
+          </a:blip>
+          <a:srcRect/>
+          <a:stretch>
+            <a:fillRect/>
+          </a:stretch>
+        </p:blipFill>
+        <p:spPr bwMode="auto">
+          <a:xfrm>
+            <a:off x="2188244" y="764704"/>
+            <a:ext cx="4163346" cy="2592288"/>
+          </a:xfrm>
+          <a:prstGeom prst="rect">
+            <a:avLst/>
+          </a:prstGeom>
+          <a:noFill/>
+          <a:extLst>
+            <a:ext uri="{909E8E84-426E-40dd-AFC4-6F175D3DCCD1}">
+              <a14:hiddenFill xmlns:a14="http://schemas.microsoft.com/office/drawing/2010/main">
+                <a:solidFill>
+                  <a:srgbClr val="FFFFFF"/>
+                </a:solidFill>
+              </a14:hiddenFill>
+            </a:ext>
+          </a:extLst>
+        </p:spPr>
+      </p:pic>
       <p:sp>
         <p:nvSpPr>
-          <p:cNvPr id="2" name="CasellaDiTesto 1"/>
+          <p:cNvPr id="4" name="CasellaDiTesto 3"/>
           <p:cNvSpPr txBox="1"/>
           <p:nvPr/>
         </p:nvSpPr>
         <p:spPr>
           <a:xfrm>
-            <a:off x="2339752" y="0"/>
-            <a:ext cx="4096442" cy="1538883"/>
+            <a:off x="2077031" y="3212976"/>
+            <a:ext cx="4856317" cy="1754327"/>
           </a:xfrm>
           <a:prstGeom prst="rect">
             <a:avLst/>
@@ -34119,324 +35003,74 @@
           <a:noFill/>
         </p:spPr>
         <p:txBody>
-          <a:bodyPr wrap="square" rtlCol="0">
+          <a:bodyPr wrap="none" rtlCol="0">
             <a:spAutoFit/>
           </a:bodyPr>
           <a:lstStyle/>
           <a:p>
             <a:pPr algn="ctr"/>
             <a:r>
-              <a:rPr lang="it-IT" sz="4800" b="1" dirty="0" smtClean="0">
+              <a:rPr lang="it-IT" sz="5400" b="1" smtClean="0">
+                <a:effectLst>
+                  <a:outerShdw blurRad="38100" dist="38100" dir="2700000" algn="tl">
+                    <a:srgbClr val="000000">
+                      <a:alpha val="43137"/>
+                    </a:srgbClr>
+                  </a:outerShdw>
+                </a:effectLst>
                 <a:latin typeface="+mj-lt"/>
               </a:rPr>
-              <a:t>Progetto </a:t>
-            </a:r>
-            <a:r>
-              <a:rPr lang="it-IT" sz="4800" b="1" dirty="0" err="1" smtClean="0">
+              <a:t>Progetto @silo</a:t>
+            </a:r>
+            <a:r>
+              <a:rPr lang="it-IT" sz="5400" b="1" dirty="0" smtClean="0">
+                <a:effectLst>
+                  <a:outerShdw blurRad="38100" dist="38100" dir="2700000" algn="tl">
+                    <a:srgbClr val="000000">
+                      <a:alpha val="43137"/>
+                    </a:srgbClr>
+                  </a:outerShdw>
+                </a:effectLst>
                 <a:latin typeface="+mj-lt"/>
               </a:rPr>
-              <a:t>@silo</a:t>
-            </a:r>
-            <a:r>
-              <a:rPr lang="it-IT" sz="4800" b="1" dirty="0" smtClean="0">
+              <a:t>:</a:t>
+            </a:r>
+            <a:endParaRPr lang="it-IT" sz="5400" b="1" dirty="0" smtClean="0">
+              <a:effectLst>
+                <a:outerShdw blurRad="38100" dist="38100" dir="2700000" algn="tl">
+                  <a:srgbClr val="000000">
+                    <a:alpha val="43137"/>
+                  </a:srgbClr>
+                </a:outerShdw>
+              </a:effectLst>
+              <a:latin typeface="+mj-lt"/>
+            </a:endParaRPr>
+          </a:p>
+          <a:p>
+            <a:pPr algn="ctr"/>
+            <a:r>
+              <a:rPr lang="it-IT" sz="5400" b="1" dirty="0" smtClean="0">
+                <a:effectLst>
+                  <a:outerShdw blurRad="38100" dist="38100" dir="2700000" algn="tl">
+                    <a:srgbClr val="000000">
+                      <a:alpha val="43137"/>
+                    </a:srgbClr>
+                  </a:outerShdw>
+                </a:effectLst>
                 <a:latin typeface="+mj-lt"/>
               </a:rPr>
-              <a:t> </a:t>
-            </a:r>
-          </a:p>
-          <a:p>
-            <a:pPr algn="ctr"/>
-            <a:r>
-              <a:rPr lang="it-IT" sz="2800" b="1" dirty="0" smtClean="0">
-                <a:latin typeface="+mj-lt"/>
-              </a:rPr>
-              <a:t>Perché?</a:t>
-            </a:r>
-          </a:p>
-          <a:p>
-            <a:pPr algn="ctr"/>
-            <a:endParaRPr lang="it-IT" dirty="0">
+              <a:t>In conclusione…</a:t>
+            </a:r>
+            <a:endParaRPr lang="it-IT" sz="2000" b="1" dirty="0">
               <a:latin typeface="+mj-lt"/>
             </a:endParaRPr>
-          </a:p>
-        </p:txBody>
-      </p:sp>
-      <p:sp>
-        <p:nvSpPr>
-          <p:cNvPr id="5" name="Content Placeholder 3"/>
-          <p:cNvSpPr txBox="1">
-            <a:spLocks/>
-          </p:cNvSpPr>
-          <p:nvPr/>
-        </p:nvSpPr>
-        <p:spPr>
-          <a:xfrm>
-            <a:off x="539552" y="1268760"/>
-            <a:ext cx="8280920" cy="5400600"/>
-          </a:xfrm>
-          <a:prstGeom prst="rect">
-            <a:avLst/>
-          </a:prstGeom>
-        </p:spPr>
-        <p:txBody>
-          <a:bodyPr tIns="0"/>
-          <a:lstStyle>
-            <a:lvl1pPr marL="274320" indent="-274320" algn="l" rtl="0" eaLnBrk="1" latinLnBrk="0" hangingPunct="1">
-              <a:spcBef>
-                <a:spcPct val="20000"/>
-              </a:spcBef>
-              <a:buClrTx/>
-              <a:buSzPct val="95000"/>
-              <a:buFont typeface="Wingdings" pitchFamily="2" charset="2"/>
-              <a:buChar char="v"/>
-              <a:defRPr kumimoji="0" sz="2800" kern="1200">
-                <a:solidFill>
-                  <a:schemeClr val="tx1"/>
-                </a:solidFill>
-                <a:latin typeface="+mn-lt"/>
-                <a:ea typeface="+mn-ea"/>
-                <a:cs typeface="+mn-cs"/>
-              </a:defRPr>
-            </a:lvl1pPr>
-            <a:lvl2pPr marL="640080" indent="-246888" algn="l" rtl="0" eaLnBrk="1" latinLnBrk="0" hangingPunct="1">
-              <a:spcBef>
-                <a:spcPct val="20000"/>
-              </a:spcBef>
-              <a:buClrTx/>
-              <a:buSzPct val="85000"/>
-              <a:buFont typeface="Courier New" pitchFamily="49" charset="0"/>
-              <a:buChar char="o"/>
-              <a:defRPr kumimoji="0" sz="2600" kern="1200">
-                <a:solidFill>
-                  <a:schemeClr val="tx1"/>
-                </a:solidFill>
-                <a:latin typeface="+mn-lt"/>
-                <a:ea typeface="+mn-ea"/>
-                <a:cs typeface="+mn-cs"/>
-              </a:defRPr>
-            </a:lvl2pPr>
-            <a:lvl3pPr marL="914400" indent="-246888" algn="l" rtl="0" eaLnBrk="1" latinLnBrk="0" hangingPunct="1">
-              <a:spcBef>
-                <a:spcPct val="20000"/>
-              </a:spcBef>
-              <a:buClrTx/>
-              <a:buSzPct val="70000"/>
-              <a:buFont typeface="Wingdings 2"/>
-              <a:buChar char=""/>
-              <a:defRPr kumimoji="0" sz="2400" kern="1200">
-                <a:solidFill>
-                  <a:schemeClr val="tx1"/>
-                </a:solidFill>
-                <a:latin typeface="+mn-lt"/>
-                <a:ea typeface="+mn-ea"/>
-                <a:cs typeface="+mn-cs"/>
-              </a:defRPr>
-            </a:lvl3pPr>
-            <a:lvl4pPr marL="1188720" indent="-210312" algn="l" rtl="0" eaLnBrk="1" latinLnBrk="0" hangingPunct="1">
-              <a:spcBef>
-                <a:spcPct val="20000"/>
-              </a:spcBef>
-              <a:buClrTx/>
-              <a:buSzPct val="65000"/>
-              <a:buFont typeface="Wingdings 2"/>
-              <a:buChar char=""/>
-              <a:defRPr kumimoji="0" sz="2000" kern="1200">
-                <a:solidFill>
-                  <a:schemeClr val="tx1"/>
-                </a:solidFill>
-                <a:latin typeface="+mn-lt"/>
-                <a:ea typeface="+mn-ea"/>
-                <a:cs typeface="+mn-cs"/>
-              </a:defRPr>
-            </a:lvl4pPr>
-            <a:lvl5pPr marL="1463040" indent="-210312" algn="l" rtl="0" eaLnBrk="1" latinLnBrk="0" hangingPunct="1">
-              <a:spcBef>
-                <a:spcPct val="20000"/>
-              </a:spcBef>
-              <a:buClrTx/>
-              <a:buSzPct val="65000"/>
-              <a:buFont typeface="Wingdings 2"/>
-              <a:buChar char=""/>
-              <a:defRPr kumimoji="0" sz="1800" kern="1200">
-                <a:solidFill>
-                  <a:schemeClr val="tx1"/>
-                </a:solidFill>
-                <a:latin typeface="+mn-lt"/>
-                <a:ea typeface="+mn-ea"/>
-                <a:cs typeface="+mn-cs"/>
-              </a:defRPr>
-            </a:lvl5pPr>
-            <a:lvl6pPr marL="1737360" indent="-210312" algn="l" rtl="0" eaLnBrk="1" latinLnBrk="0" hangingPunct="1">
-              <a:spcBef>
-                <a:spcPct val="20000"/>
-              </a:spcBef>
-              <a:buClr>
-                <a:schemeClr val="accent5"/>
-              </a:buClr>
-              <a:buSzPct val="80000"/>
-              <a:buFont typeface="Wingdings 2"/>
-              <a:buChar char=""/>
-              <a:defRPr kumimoji="0" sz="1800" kern="1200">
-                <a:solidFill>
-                  <a:schemeClr val="tx1"/>
-                </a:solidFill>
-                <a:latin typeface="+mn-lt"/>
-                <a:ea typeface="+mn-ea"/>
-                <a:cs typeface="+mn-cs"/>
-              </a:defRPr>
-            </a:lvl6pPr>
-            <a:lvl7pPr marL="1920240" indent="-182880" algn="l" rtl="0" eaLnBrk="1" latinLnBrk="0" hangingPunct="1">
-              <a:spcBef>
-                <a:spcPct val="20000"/>
-              </a:spcBef>
-              <a:buClr>
-                <a:schemeClr val="accent6"/>
-              </a:buClr>
-              <a:buSzPct val="80000"/>
-              <a:buFont typeface="Wingdings 2"/>
-              <a:buChar char=""/>
-              <a:defRPr kumimoji="0" sz="1600" kern="1200" baseline="0">
-                <a:solidFill>
-                  <a:schemeClr val="tx1"/>
-                </a:solidFill>
-                <a:latin typeface="+mn-lt"/>
-                <a:ea typeface="+mn-ea"/>
-                <a:cs typeface="+mn-cs"/>
-              </a:defRPr>
-            </a:lvl7pPr>
-            <a:lvl8pPr marL="2194560" indent="-182880" algn="l" rtl="0" eaLnBrk="1" latinLnBrk="0" hangingPunct="1">
-              <a:spcBef>
-                <a:spcPct val="20000"/>
-              </a:spcBef>
-              <a:buClr>
-                <a:schemeClr val="tx2"/>
-              </a:buClr>
-              <a:buChar char="•"/>
-              <a:defRPr kumimoji="0" sz="1600" kern="1200">
-                <a:solidFill>
-                  <a:schemeClr val="tx1"/>
-                </a:solidFill>
-                <a:latin typeface="+mn-lt"/>
-                <a:ea typeface="+mn-ea"/>
-                <a:cs typeface="+mn-cs"/>
-              </a:defRPr>
-            </a:lvl8pPr>
-            <a:lvl9pPr marL="2468880" indent="-182880" algn="l" rtl="0" eaLnBrk="1" latinLnBrk="0" hangingPunct="1">
-              <a:spcBef>
-                <a:spcPct val="20000"/>
-              </a:spcBef>
-              <a:buClr>
-                <a:schemeClr val="tx2"/>
-              </a:buClr>
-              <a:buFontTx/>
-              <a:buChar char="•"/>
-              <a:defRPr kumimoji="0" sz="1400" kern="1200" baseline="0">
-                <a:solidFill>
-                  <a:schemeClr val="tx1"/>
-                </a:solidFill>
-                <a:latin typeface="+mn-lt"/>
-                <a:ea typeface="+mn-ea"/>
-                <a:cs typeface="+mn-cs"/>
-              </a:defRPr>
-            </a:lvl9pPr>
-          </a:lstStyle>
-          <a:p>
-            <a:r>
-              <a:rPr lang="it-IT" dirty="0" smtClean="0"/>
-              <a:t>Aderente alle aspettative </a:t>
-            </a:r>
-          </a:p>
-          <a:p>
-            <a:pPr lvl="1"/>
-            <a:r>
-              <a:rPr lang="it-IT" dirty="0" smtClean="0"/>
-              <a:t>Familiarità</a:t>
-            </a:r>
-          </a:p>
-          <a:p>
-            <a:r>
-              <a:rPr lang="it-IT" dirty="0" smtClean="0"/>
-              <a:t>Struttura aziendale</a:t>
-            </a:r>
-          </a:p>
-          <a:p>
-            <a:pPr lvl="1"/>
-            <a:r>
-              <a:rPr lang="it-IT" dirty="0" smtClean="0"/>
-              <a:t>Nessuna Variazione</a:t>
-            </a:r>
-          </a:p>
-          <a:p>
-            <a:pPr lvl="1"/>
-            <a:r>
-              <a:rPr lang="it-IT" dirty="0" smtClean="0"/>
-              <a:t>Ingrato ai processi già noti</a:t>
-            </a:r>
-          </a:p>
-          <a:p>
-            <a:r>
-              <a:rPr lang="it-IT" dirty="0" smtClean="0"/>
-              <a:t>Documentazione Solida</a:t>
-            </a:r>
-          </a:p>
-          <a:p>
-            <a:pPr lvl="1"/>
-            <a:r>
-              <a:rPr lang="it-IT" dirty="0" smtClean="0"/>
-              <a:t>Raffinata (revisionata)</a:t>
-            </a:r>
-          </a:p>
-          <a:p>
-            <a:pPr lvl="1"/>
-            <a:r>
-              <a:rPr lang="it-IT" dirty="0" smtClean="0"/>
-              <a:t>Crescita costante</a:t>
-            </a:r>
-          </a:p>
-          <a:p>
-            <a:pPr lvl="1"/>
-            <a:r>
-              <a:rPr lang="it-IT" dirty="0" smtClean="0"/>
-              <a:t>Ottima Tracciabilità</a:t>
-            </a:r>
-          </a:p>
-          <a:p>
-            <a:r>
-              <a:rPr lang="it-IT" dirty="0" smtClean="0"/>
-              <a:t>Usare </a:t>
-            </a:r>
-            <a:r>
-              <a:rPr lang="it-IT" dirty="0" err="1" smtClean="0"/>
-              <a:t>@silo</a:t>
-            </a:r>
-            <a:r>
-              <a:rPr lang="it-IT" dirty="0" smtClean="0"/>
-              <a:t> senza accorgersene</a:t>
-            </a:r>
-          </a:p>
-          <a:p>
-            <a:pPr lvl="1"/>
-            <a:r>
-              <a:rPr lang="it-IT" dirty="0" smtClean="0"/>
-              <a:t>Stessi processi, con maggiore velocità ed efficienza </a:t>
-            </a:r>
-          </a:p>
-          <a:p>
-            <a:pPr lvl="1"/>
-            <a:endParaRPr lang="it-IT" dirty="0" smtClean="0"/>
-          </a:p>
-          <a:p>
-            <a:pPr lvl="1">
-              <a:buNone/>
-            </a:pPr>
-            <a:endParaRPr lang="it-IT" dirty="0" smtClean="0"/>
           </a:p>
         </p:txBody>
       </p:sp>
     </p:spTree>
     <p:extLst>
       <p:ext uri="{BB962C8B-B14F-4D97-AF65-F5344CB8AC3E}">
-        <p14:creationId xmlns:p14="http://schemas.microsoft.com/office/powerpoint/2010/main" val="3887633143"/>
+        <p14:creationId xmlns:p14="http://schemas.microsoft.com/office/powerpoint/2010/main" val="2252746867"/>
       </p:ext>
     </p:extLst>
   </p:cSld>

</xml_diff>

<commit_message>
[WR] Corretto errore ortografico
</commit_message>
<xml_diff>
--- a/Presentazione/Atsilo1/[BOZZA] Atsilo_A_PresentazioneFinale copia.pptx
+++ b/Presentazione/Atsilo1/[BOZZA] Atsilo_A_PresentazioneFinale copia.pptx
@@ -19694,7 +19694,19 @@
             </a:r>
             <a:r>
               <a:rPr lang="it-IT" dirty="0" smtClean="0"/>
-              <a:t> che farà da ponte tra il mondo </a:t>
+              <a:t> </a:t>
+            </a:r>
+            <a:r>
+              <a:rPr lang="it-IT" smtClean="0"/>
+              <a:t>che </a:t>
+            </a:r>
+            <a:r>
+              <a:rPr lang="it-IT" smtClean="0"/>
+              <a:t>fa </a:t>
+            </a:r>
+            <a:r>
+              <a:rPr lang="it-IT" dirty="0" smtClean="0"/>
+              <a:t>da ponte tra il mondo </a:t>
             </a:r>
             <a:r>
               <a:rPr lang="it-IT" dirty="0" err="1" smtClean="0"/>

</xml_diff>

<commit_message>
[WR] Corretto errore ortografico presentazione framework
</commit_message>
<xml_diff>
--- a/Presentazione/Atsilo1/[BOZZA] Atsilo_A_PresentazioneFinale copia.pptx
+++ b/Presentazione/Atsilo1/[BOZZA] Atsilo_A_PresentazioneFinale copia.pptx
@@ -19694,15 +19694,11 @@
             </a:r>
             <a:r>
               <a:rPr lang="it-IT" dirty="0" smtClean="0"/>
-              <a:t> </a:t>
-            </a:r>
-            <a:r>
-              <a:rPr lang="it-IT" smtClean="0"/>
-              <a:t>che </a:t>
-            </a:r>
-            <a:r>
-              <a:rPr lang="it-IT" smtClean="0"/>
-              <a:t>fa </a:t>
+              <a:t> che </a:t>
+            </a:r>
+            <a:r>
+              <a:rPr lang="it-IT" dirty="0" smtClean="0"/>
+              <a:t>faccia </a:t>
             </a:r>
             <a:r>
               <a:rPr lang="it-IT" dirty="0" smtClean="0"/>

</xml_diff>

<commit_message>
[WR A] Revisione presentazione
</commit_message>
<xml_diff>
--- a/Presentazione/Atsilo1/[BOZZA] Atsilo_A_PresentazioneFinale copia.pptx
+++ b/Presentazione/Atsilo1/[BOZZA] Atsilo_A_PresentazioneFinale copia.pptx
@@ -289,7 +289,7 @@
             <a:fld id="{38D78F4D-402C-46E0-A4BB-DF91EA86B14C}" type="datetimeFigureOut">
               <a:rPr lang="it-IT" smtClean="0"/>
               <a:pPr/>
-              <a:t>02/01/2013</a:t>
+              <a:t>02/01/13</a:t>
             </a:fld>
             <a:endParaRPr lang="it-IT"/>
           </a:p>
@@ -449,7 +449,7 @@
             <a:fld id="{D70604CA-7593-4640-8FA1-5523937B8510}" type="slidenum">
               <a:rPr lang="it-IT" smtClean="0"/>
               <a:pPr/>
-              <a:t>‹N›</a:t>
+              <a:t>‹n.›</a:t>
             </a:fld>
             <a:endParaRPr lang="it-IT"/>
           </a:p>
@@ -458,7 +458,7 @@
     </p:spTree>
     <p:extLst>
       <p:ext uri="{BB962C8B-B14F-4D97-AF65-F5344CB8AC3E}">
-        <p14:creationId xmlns="" xmlns:p14="http://schemas.microsoft.com/office/powerpoint/2010/main" val="2126419590"/>
+        <p14:creationId xmlns:p14="http://schemas.microsoft.com/office/powerpoint/2010/main" val="2126419590"/>
       </p:ext>
     </p:extLst>
   </p:cSld>
@@ -2559,7 +2559,7 @@
             <a:fld id="{63CABBC0-75E4-43BB-A6A6-84C2A96BDB82}" type="datetimeFigureOut">
               <a:rPr lang="it-IT" smtClean="0"/>
               <a:pPr/>
-              <a:t>02/01/2013</a:t>
+              <a:t>02/01/13</a:t>
             </a:fld>
             <a:endParaRPr lang="it-IT"/>
           </a:p>
@@ -2602,7 +2602,7 @@
             <a:fld id="{F89AEA99-3E91-4C58-9AD4-045DB5619AC3}" type="slidenum">
               <a:rPr lang="it-IT" smtClean="0"/>
               <a:pPr/>
-              <a:t>‹N›</a:t>
+              <a:t>‹n.›</a:t>
             </a:fld>
             <a:endParaRPr lang="it-IT"/>
           </a:p>
@@ -2616,7 +2616,7 @@
   <p:timing>
     <p:tnLst>
       <p:par>
-        <p:cTn id="1" dur="indefinite" restart="never" nodeType="tmRoot"/>
+        <p:cTn xmlns:p14="http://schemas.microsoft.com/office/powerpoint/2010/main" id="1" dur="indefinite" restart="never" nodeType="tmRoot"/>
       </p:par>
     </p:tnLst>
   </p:timing>
@@ -2741,7 +2741,7 @@
             <a:fld id="{63CABBC0-75E4-43BB-A6A6-84C2A96BDB82}" type="datetimeFigureOut">
               <a:rPr lang="it-IT" smtClean="0"/>
               <a:pPr/>
-              <a:t>02/01/2013</a:t>
+              <a:t>02/01/13</a:t>
             </a:fld>
             <a:endParaRPr lang="it-IT"/>
           </a:p>
@@ -2784,7 +2784,7 @@
             <a:fld id="{F89AEA99-3E91-4C58-9AD4-045DB5619AC3}" type="slidenum">
               <a:rPr lang="it-IT" smtClean="0"/>
               <a:pPr/>
-              <a:t>‹N›</a:t>
+              <a:t>‹n.›</a:t>
             </a:fld>
             <a:endParaRPr lang="it-IT"/>
           </a:p>
@@ -2798,7 +2798,7 @@
   <p:timing>
     <p:tnLst>
       <p:par>
-        <p:cTn id="1" dur="indefinite" restart="never" nodeType="tmRoot"/>
+        <p:cTn xmlns:p14="http://schemas.microsoft.com/office/powerpoint/2010/main" id="1" dur="indefinite" restart="never" nodeType="tmRoot"/>
       </p:par>
     </p:tnLst>
   </p:timing>
@@ -2933,7 +2933,7 @@
             <a:fld id="{63CABBC0-75E4-43BB-A6A6-84C2A96BDB82}" type="datetimeFigureOut">
               <a:rPr lang="it-IT" smtClean="0"/>
               <a:pPr/>
-              <a:t>02/01/2013</a:t>
+              <a:t>02/01/13</a:t>
             </a:fld>
             <a:endParaRPr lang="it-IT"/>
           </a:p>
@@ -2976,7 +2976,7 @@
             <a:fld id="{F89AEA99-3E91-4C58-9AD4-045DB5619AC3}" type="slidenum">
               <a:rPr lang="it-IT" smtClean="0"/>
               <a:pPr/>
-              <a:t>‹N›</a:t>
+              <a:t>‹n.›</a:t>
             </a:fld>
             <a:endParaRPr lang="it-IT"/>
           </a:p>
@@ -2990,7 +2990,7 @@
   <p:timing>
     <p:tnLst>
       <p:par>
-        <p:cTn id="1" dur="indefinite" restart="never" nodeType="tmRoot"/>
+        <p:cTn xmlns:p14="http://schemas.microsoft.com/office/powerpoint/2010/main" id="1" dur="indefinite" restart="never" nodeType="tmRoot"/>
       </p:par>
     </p:tnLst>
   </p:timing>
@@ -3115,7 +3115,7 @@
             <a:fld id="{63CABBC0-75E4-43BB-A6A6-84C2A96BDB82}" type="datetimeFigureOut">
               <a:rPr lang="it-IT" smtClean="0"/>
               <a:pPr/>
-              <a:t>02/01/2013</a:t>
+              <a:t>02/01/13</a:t>
             </a:fld>
             <a:endParaRPr lang="it-IT"/>
           </a:p>
@@ -3158,7 +3158,7 @@
             <a:fld id="{F89AEA99-3E91-4C58-9AD4-045DB5619AC3}" type="slidenum">
               <a:rPr lang="it-IT" smtClean="0"/>
               <a:pPr/>
-              <a:t>‹N›</a:t>
+              <a:t>‹n.›</a:t>
             </a:fld>
             <a:endParaRPr lang="it-IT"/>
           </a:p>
@@ -3172,7 +3172,7 @@
   <p:timing>
     <p:tnLst>
       <p:par>
-        <p:cTn id="1" dur="indefinite" restart="never" nodeType="tmRoot"/>
+        <p:cTn xmlns:p14="http://schemas.microsoft.com/office/powerpoint/2010/main" id="1" dur="indefinite" restart="never" nodeType="tmRoot"/>
       </p:par>
     </p:tnLst>
   </p:timing>
@@ -3358,7 +3358,7 @@
             <a:fld id="{63CABBC0-75E4-43BB-A6A6-84C2A96BDB82}" type="datetimeFigureOut">
               <a:rPr lang="it-IT" smtClean="0"/>
               <a:pPr/>
-              <a:t>02/01/2013</a:t>
+              <a:t>02/01/13</a:t>
             </a:fld>
             <a:endParaRPr lang="it-IT"/>
           </a:p>
@@ -3401,7 +3401,7 @@
             <a:fld id="{F89AEA99-3E91-4C58-9AD4-045DB5619AC3}" type="slidenum">
               <a:rPr lang="it-IT" smtClean="0"/>
               <a:pPr/>
-              <a:t>‹N›</a:t>
+              <a:t>‹n.›</a:t>
             </a:fld>
             <a:endParaRPr lang="it-IT"/>
           </a:p>
@@ -3415,7 +3415,7 @@
   <p:timing>
     <p:tnLst>
       <p:par>
-        <p:cTn id="1" dur="indefinite" restart="never" nodeType="tmRoot"/>
+        <p:cTn xmlns:p14="http://schemas.microsoft.com/office/powerpoint/2010/main" id="1" dur="indefinite" restart="never" nodeType="tmRoot"/>
       </p:par>
     </p:tnLst>
   </p:timing>
@@ -3639,7 +3639,7 @@
             <a:fld id="{63CABBC0-75E4-43BB-A6A6-84C2A96BDB82}" type="datetimeFigureOut">
               <a:rPr lang="it-IT" smtClean="0"/>
               <a:pPr/>
-              <a:t>02/01/2013</a:t>
+              <a:t>02/01/13</a:t>
             </a:fld>
             <a:endParaRPr lang="it-IT"/>
           </a:p>
@@ -3682,7 +3682,7 @@
             <a:fld id="{F89AEA99-3E91-4C58-9AD4-045DB5619AC3}" type="slidenum">
               <a:rPr lang="it-IT" smtClean="0"/>
               <a:pPr/>
-              <a:t>‹N›</a:t>
+              <a:t>‹n.›</a:t>
             </a:fld>
             <a:endParaRPr lang="it-IT"/>
           </a:p>
@@ -3696,7 +3696,7 @@
   <p:timing>
     <p:tnLst>
       <p:par>
-        <p:cTn id="1" dur="indefinite" restart="never" nodeType="tmRoot"/>
+        <p:cTn xmlns:p14="http://schemas.microsoft.com/office/powerpoint/2010/main" id="1" dur="indefinite" restart="never" nodeType="tmRoot"/>
       </p:par>
     </p:tnLst>
   </p:timing>
@@ -4030,7 +4030,7 @@
             <a:fld id="{63CABBC0-75E4-43BB-A6A6-84C2A96BDB82}" type="datetimeFigureOut">
               <a:rPr lang="it-IT" smtClean="0"/>
               <a:pPr/>
-              <a:t>02/01/2013</a:t>
+              <a:t>02/01/13</a:t>
             </a:fld>
             <a:endParaRPr lang="it-IT"/>
           </a:p>
@@ -4073,7 +4073,7 @@
             <a:fld id="{F89AEA99-3E91-4C58-9AD4-045DB5619AC3}" type="slidenum">
               <a:rPr lang="it-IT" smtClean="0"/>
               <a:pPr/>
-              <a:t>‹N›</a:t>
+              <a:t>‹n.›</a:t>
             </a:fld>
             <a:endParaRPr lang="it-IT"/>
           </a:p>
@@ -4087,7 +4087,7 @@
   <p:timing>
     <p:tnLst>
       <p:par>
-        <p:cTn id="1" dur="indefinite" restart="never" nodeType="tmRoot"/>
+        <p:cTn xmlns:p14="http://schemas.microsoft.com/office/powerpoint/2010/main" id="1" dur="indefinite" restart="never" nodeType="tmRoot"/>
       </p:par>
     </p:tnLst>
   </p:timing>
@@ -4189,7 +4189,7 @@
             <a:fld id="{63CABBC0-75E4-43BB-A6A6-84C2A96BDB82}" type="datetimeFigureOut">
               <a:rPr lang="it-IT" smtClean="0"/>
               <a:pPr/>
-              <a:t>02/01/2013</a:t>
+              <a:t>02/01/13</a:t>
             </a:fld>
             <a:endParaRPr lang="it-IT"/>
           </a:p>
@@ -4232,7 +4232,7 @@
             <a:fld id="{F89AEA99-3E91-4C58-9AD4-045DB5619AC3}" type="slidenum">
               <a:rPr lang="it-IT" smtClean="0"/>
               <a:pPr/>
-              <a:t>‹N›</a:t>
+              <a:t>‹n.›</a:t>
             </a:fld>
             <a:endParaRPr lang="it-IT"/>
           </a:p>
@@ -4246,7 +4246,7 @@
   <p:timing>
     <p:tnLst>
       <p:par>
-        <p:cTn id="1" dur="indefinite" restart="never" nodeType="tmRoot"/>
+        <p:cTn xmlns:p14="http://schemas.microsoft.com/office/powerpoint/2010/main" id="1" dur="indefinite" restart="never" nodeType="tmRoot"/>
       </p:par>
     </p:tnLst>
   </p:timing>
@@ -4288,7 +4288,7 @@
             <a:fld id="{63CABBC0-75E4-43BB-A6A6-84C2A96BDB82}" type="datetimeFigureOut">
               <a:rPr lang="it-IT" smtClean="0"/>
               <a:pPr/>
-              <a:t>02/01/2013</a:t>
+              <a:t>02/01/13</a:t>
             </a:fld>
             <a:endParaRPr lang="it-IT"/>
           </a:p>
@@ -4331,7 +4331,7 @@
             <a:fld id="{F89AEA99-3E91-4C58-9AD4-045DB5619AC3}" type="slidenum">
               <a:rPr lang="it-IT" smtClean="0"/>
               <a:pPr/>
-              <a:t>‹N›</a:t>
+              <a:t>‹n.›</a:t>
             </a:fld>
             <a:endParaRPr lang="it-IT"/>
           </a:p>
@@ -4345,7 +4345,7 @@
   <p:timing>
     <p:tnLst>
       <p:par>
-        <p:cTn id="1" dur="indefinite" restart="never" nodeType="tmRoot"/>
+        <p:cTn xmlns:p14="http://schemas.microsoft.com/office/powerpoint/2010/main" id="1" dur="indefinite" restart="never" nodeType="tmRoot"/>
       </p:par>
     </p:tnLst>
   </p:timing>
@@ -4558,7 +4558,7 @@
             <a:fld id="{63CABBC0-75E4-43BB-A6A6-84C2A96BDB82}" type="datetimeFigureOut">
               <a:rPr lang="it-IT" smtClean="0"/>
               <a:pPr/>
-              <a:t>02/01/2013</a:t>
+              <a:t>02/01/13</a:t>
             </a:fld>
             <a:endParaRPr lang="it-IT"/>
           </a:p>
@@ -4601,7 +4601,7 @@
             <a:fld id="{F89AEA99-3E91-4C58-9AD4-045DB5619AC3}" type="slidenum">
               <a:rPr lang="it-IT" smtClean="0"/>
               <a:pPr/>
-              <a:t>‹N›</a:t>
+              <a:t>‹n.›</a:t>
             </a:fld>
             <a:endParaRPr lang="it-IT"/>
           </a:p>
@@ -4615,7 +4615,7 @@
   <p:timing>
     <p:tnLst>
       <p:par>
-        <p:cTn id="1" dur="indefinite" restart="never" nodeType="tmRoot"/>
+        <p:cTn xmlns:p14="http://schemas.microsoft.com/office/powerpoint/2010/main" id="1" dur="indefinite" restart="never" nodeType="tmRoot"/>
       </p:par>
     </p:tnLst>
   </p:timing>
@@ -4855,7 +4855,7 @@
             <a:fld id="{63CABBC0-75E4-43BB-A6A6-84C2A96BDB82}" type="datetimeFigureOut">
               <a:rPr lang="it-IT" smtClean="0"/>
               <a:pPr/>
-              <a:t>02/01/2013</a:t>
+              <a:t>02/01/13</a:t>
             </a:fld>
             <a:endParaRPr lang="it-IT"/>
           </a:p>
@@ -4903,7 +4903,7 @@
             <a:fld id="{F89AEA99-3E91-4C58-9AD4-045DB5619AC3}" type="slidenum">
               <a:rPr lang="it-IT" smtClean="0"/>
               <a:pPr/>
-              <a:t>‹N›</a:t>
+              <a:t>‹n.›</a:t>
             </a:fld>
             <a:endParaRPr lang="it-IT"/>
           </a:p>
@@ -5219,7 +5219,7 @@
   <p:timing>
     <p:tnLst>
       <p:par>
-        <p:cTn id="1" dur="indefinite" restart="never" nodeType="tmRoot"/>
+        <p:cTn xmlns:p14="http://schemas.microsoft.com/office/powerpoint/2010/main" id="1" dur="indefinite" restart="never" nodeType="tmRoot"/>
       </p:par>
     </p:tnLst>
   </p:timing>
@@ -5635,7 +5635,7 @@
             <a:fld id="{63CABBC0-75E4-43BB-A6A6-84C2A96BDB82}" type="datetimeFigureOut">
               <a:rPr lang="it-IT" smtClean="0"/>
               <a:pPr/>
-              <a:t>02/01/2013</a:t>
+              <a:t>02/01/13</a:t>
             </a:fld>
             <a:endParaRPr lang="it-IT"/>
           </a:p>
@@ -5714,7 +5714,7 @@
             <a:fld id="{F89AEA99-3E91-4C58-9AD4-045DB5619AC3}" type="slidenum">
               <a:rPr lang="it-IT" smtClean="0"/>
               <a:pPr/>
-              <a:t>‹N›</a:t>
+              <a:t>‹n.›</a:t>
             </a:fld>
             <a:endParaRPr lang="it-IT"/>
           </a:p>
@@ -5953,7 +5953,7 @@
   <p:timing>
     <p:tnLst>
       <p:par>
-        <p:cTn id="1" dur="indefinite" restart="never" nodeType="tmRoot"/>
+        <p:cTn xmlns:p14="http://schemas.microsoft.com/office/powerpoint/2010/main" id="1" dur="indefinite" restart="never" nodeType="tmRoot"/>
       </p:par>
     </p:tnLst>
   </p:timing>
@@ -6318,7 +6318,7 @@
           <p:nvPr>
             <p:extLst>
               <p:ext uri="{D42A27DB-BD31-4B8C-83A1-F6EECF244321}">
-                <p14:modId xmlns="" xmlns:p14="http://schemas.microsoft.com/office/powerpoint/2010/main" val="1430840817"/>
+                <p14:modId xmlns:p14="http://schemas.microsoft.com/office/powerpoint/2010/main" val="1430840817"/>
               </p:ext>
             </p:extLst>
           </p:nvPr>
@@ -6566,7 +6566,7 @@
           <p:nvPr>
             <p:extLst>
               <p:ext uri="{D42A27DB-BD31-4B8C-83A1-F6EECF244321}">
-                <p14:modId xmlns="" xmlns:p14="http://schemas.microsoft.com/office/powerpoint/2010/main" val="956586736"/>
+                <p14:modId xmlns:p14="http://schemas.microsoft.com/office/powerpoint/2010/main" val="956586736"/>
               </p:ext>
             </p:extLst>
           </p:nvPr>
@@ -6656,7 +6656,7 @@
           <a:blip r:embed="rId2">
             <a:extLst>
               <a:ext uri="{28A0092B-C50C-407E-A947-70E740481C1C}">
-                <a14:useLocalDpi xmlns="" xmlns:a14="http://schemas.microsoft.com/office/drawing/2010/main" val="0"/>
+                <a14:useLocalDpi xmlns:a14="http://schemas.microsoft.com/office/drawing/2010/main" val="0"/>
               </a:ext>
             </a:extLst>
           </a:blip>
@@ -6676,7 +6676,7 @@
           <a:noFill/>
           <a:extLst>
             <a:ext uri="{909E8E84-426E-40dd-AFC4-6F175D3DCCD1}">
-              <a14:hiddenFill xmlns="" xmlns:a14="http://schemas.microsoft.com/office/drawing/2010/main">
+              <a14:hiddenFill xmlns:a14="http://schemas.microsoft.com/office/drawing/2010/main">
                 <a:solidFill>
                   <a:srgbClr val="FFFFFF"/>
                 </a:solidFill>
@@ -6688,7 +6688,7 @@
     </p:spTree>
     <p:extLst>
       <p:ext uri="{BB962C8B-B14F-4D97-AF65-F5344CB8AC3E}">
-        <p14:creationId xmlns="" xmlns:p14="http://schemas.microsoft.com/office/powerpoint/2010/main" val="4165334171"/>
+        <p14:creationId xmlns:p14="http://schemas.microsoft.com/office/powerpoint/2010/main" val="4165334171"/>
       </p:ext>
     </p:extLst>
   </p:cSld>
@@ -6698,7 +6698,7 @@
   <p:timing>
     <p:tnLst>
       <p:par>
-        <p:cTn id="1" dur="indefinite" restart="never" nodeType="tmRoot"/>
+        <p:cTn xmlns:p14="http://schemas.microsoft.com/office/powerpoint/2010/main" id="1" dur="indefinite" restart="never" nodeType="tmRoot"/>
       </p:par>
     </p:tnLst>
   </p:timing>
@@ -6994,25 +6994,25 @@
     </p:spTree>
     <p:extLst>
       <p:ext uri="{BB962C8B-B14F-4D97-AF65-F5344CB8AC3E}">
-        <p14:creationId xmlns="" xmlns:p14="http://schemas.microsoft.com/office/powerpoint/2010/main" val="4143007013"/>
+        <p14:creationId xmlns:p14="http://schemas.microsoft.com/office/powerpoint/2010/main" val="4143007013"/>
       </p:ext>
     </p:extLst>
   </p:cSld>
   <p:clrMapOvr>
     <a:masterClrMapping/>
   </p:clrMapOvr>
-  <mc:AlternateContent xmlns:mc="http://schemas.openxmlformats.org/markup-compatibility/2006">
-    <mc:Choice xmlns="" xmlns:p14="http://schemas.microsoft.com/office/powerpoint/2010/main" Requires="p14">
+  <mc:AlternateContent xmlns:mc="http://schemas.openxmlformats.org/markup-compatibility/2006" xmlns:p14="http://schemas.microsoft.com/office/powerpoint/2010/main">
+    <mc:Choice Requires="p14">
       <p:transition spd="slow" p14:dur="2000"/>
     </mc:Choice>
-    <mc:Fallback>
+    <mc:Fallback xmlns="">
       <p:transition spd="slow"/>
     </mc:Fallback>
   </mc:AlternateContent>
   <p:timing>
     <p:tnLst>
       <p:par>
-        <p:cTn id="1" dur="indefinite" restart="never" nodeType="tmRoot"/>
+        <p:cTn xmlns:p14="http://schemas.microsoft.com/office/powerpoint/2010/main" id="1" dur="indefinite" restart="never" nodeType="tmRoot"/>
       </p:par>
     </p:tnLst>
   </p:timing>
@@ -7103,7 +7103,7 @@
     </p:spTree>
     <p:extLst>
       <p:ext uri="{BB962C8B-B14F-4D97-AF65-F5344CB8AC3E}">
-        <p14:creationId xmlns="" xmlns:p14="http://schemas.microsoft.com/office/powerpoint/2010/main" val="3695870384"/>
+        <p14:creationId xmlns:p14="http://schemas.microsoft.com/office/powerpoint/2010/main" val="3695870384"/>
       </p:ext>
     </p:extLst>
   </p:cSld>
@@ -7113,7 +7113,7 @@
   <p:timing>
     <p:tnLst>
       <p:par>
-        <p:cTn id="1" dur="indefinite" restart="never" nodeType="tmRoot"/>
+        <p:cTn xmlns:p14="http://schemas.microsoft.com/office/powerpoint/2010/main" id="1" dur="indefinite" restart="never" nodeType="tmRoot"/>
       </p:par>
     </p:tnLst>
   </p:timing>
@@ -7204,7 +7204,7 @@
     </p:spTree>
     <p:extLst>
       <p:ext uri="{BB962C8B-B14F-4D97-AF65-F5344CB8AC3E}">
-        <p14:creationId xmlns="" xmlns:p14="http://schemas.microsoft.com/office/powerpoint/2010/main" val="3987928837"/>
+        <p14:creationId xmlns:p14="http://schemas.microsoft.com/office/powerpoint/2010/main" val="3987928837"/>
       </p:ext>
     </p:extLst>
   </p:cSld>
@@ -7214,7 +7214,7 @@
   <p:timing>
     <p:tnLst>
       <p:par>
-        <p:cTn id="1" dur="indefinite" restart="never" nodeType="tmRoot"/>
+        <p:cTn xmlns:p14="http://schemas.microsoft.com/office/powerpoint/2010/main" id="1" dur="indefinite" restart="never" nodeType="tmRoot"/>
       </p:par>
     </p:tnLst>
   </p:timing>
@@ -7529,7 +7529,7 @@
     </p:spTree>
     <p:extLst>
       <p:ext uri="{BB962C8B-B14F-4D97-AF65-F5344CB8AC3E}">
-        <p14:creationId xmlns="" xmlns:p14="http://schemas.microsoft.com/office/powerpoint/2010/main" val="1367578552"/>
+        <p14:creationId xmlns:p14="http://schemas.microsoft.com/office/powerpoint/2010/main" val="1367578552"/>
       </p:ext>
     </p:extLst>
   </p:cSld>
@@ -7539,7 +7539,7 @@
   <p:timing>
     <p:tnLst>
       <p:par>
-        <p:cTn id="1" dur="indefinite" restart="never" nodeType="tmRoot"/>
+        <p:cTn xmlns:p14="http://schemas.microsoft.com/office/powerpoint/2010/main" id="1" dur="indefinite" restart="never" nodeType="tmRoot"/>
       </p:par>
     </p:tnLst>
   </p:timing>
@@ -7657,7 +7657,7 @@
     </p:spTree>
     <p:extLst>
       <p:ext uri="{BB962C8B-B14F-4D97-AF65-F5344CB8AC3E}">
-        <p14:creationId xmlns="" xmlns:p14="http://schemas.microsoft.com/office/powerpoint/2010/main" val="1554749062"/>
+        <p14:creationId xmlns:p14="http://schemas.microsoft.com/office/powerpoint/2010/main" val="1554749062"/>
       </p:ext>
     </p:extLst>
   </p:cSld>
@@ -7667,7 +7667,7 @@
   <p:timing>
     <p:tnLst>
       <p:par>
-        <p:cTn id="1" dur="indefinite" restart="never" nodeType="tmRoot"/>
+        <p:cTn xmlns:p14="http://schemas.microsoft.com/office/powerpoint/2010/main" id="1" dur="indefinite" restart="never" nodeType="tmRoot"/>
       </p:par>
     </p:tnLst>
   </p:timing>
@@ -7785,7 +7785,7 @@
     </p:spTree>
     <p:extLst>
       <p:ext uri="{BB962C8B-B14F-4D97-AF65-F5344CB8AC3E}">
-        <p14:creationId xmlns="" xmlns:p14="http://schemas.microsoft.com/office/powerpoint/2010/main" val="1028530279"/>
+        <p14:creationId xmlns:p14="http://schemas.microsoft.com/office/powerpoint/2010/main" val="1028530279"/>
       </p:ext>
     </p:extLst>
   </p:cSld>
@@ -7795,7 +7795,7 @@
   <p:timing>
     <p:tnLst>
       <p:par>
-        <p:cTn id="1" dur="indefinite" restart="never" nodeType="tmRoot"/>
+        <p:cTn xmlns:p14="http://schemas.microsoft.com/office/powerpoint/2010/main" id="1" dur="indefinite" restart="never" nodeType="tmRoot"/>
       </p:par>
     </p:tnLst>
   </p:timing>
@@ -7913,7 +7913,7 @@
     </p:spTree>
     <p:extLst>
       <p:ext uri="{BB962C8B-B14F-4D97-AF65-F5344CB8AC3E}">
-        <p14:creationId xmlns="" xmlns:p14="http://schemas.microsoft.com/office/powerpoint/2010/main" val="2120081776"/>
+        <p14:creationId xmlns:p14="http://schemas.microsoft.com/office/powerpoint/2010/main" val="2120081776"/>
       </p:ext>
     </p:extLst>
   </p:cSld>
@@ -7923,7 +7923,7 @@
   <p:timing>
     <p:tnLst>
       <p:par>
-        <p:cTn id="1" dur="indefinite" restart="never" nodeType="tmRoot"/>
+        <p:cTn xmlns:p14="http://schemas.microsoft.com/office/powerpoint/2010/main" id="1" dur="indefinite" restart="never" nodeType="tmRoot"/>
       </p:par>
     </p:tnLst>
   </p:timing>
@@ -8053,7 +8053,7 @@
     </p:spTree>
     <p:extLst>
       <p:ext uri="{BB962C8B-B14F-4D97-AF65-F5344CB8AC3E}">
-        <p14:creationId xmlns="" xmlns:p14="http://schemas.microsoft.com/office/powerpoint/2010/main" val="3320352623"/>
+        <p14:creationId xmlns:p14="http://schemas.microsoft.com/office/powerpoint/2010/main" val="3320352623"/>
       </p:ext>
     </p:extLst>
   </p:cSld>
@@ -8063,7 +8063,7 @@
   <p:timing>
     <p:tnLst>
       <p:par>
-        <p:cTn id="1" dur="indefinite" restart="never" nodeType="tmRoot"/>
+        <p:cTn xmlns:p14="http://schemas.microsoft.com/office/powerpoint/2010/main" id="1" dur="indefinite" restart="never" nodeType="tmRoot"/>
       </p:par>
     </p:tnLst>
   </p:timing>
@@ -8193,7 +8193,7 @@
     </p:spTree>
     <p:extLst>
       <p:ext uri="{BB962C8B-B14F-4D97-AF65-F5344CB8AC3E}">
-        <p14:creationId xmlns="" xmlns:p14="http://schemas.microsoft.com/office/powerpoint/2010/main" val="4011022122"/>
+        <p14:creationId xmlns:p14="http://schemas.microsoft.com/office/powerpoint/2010/main" val="4011022122"/>
       </p:ext>
     </p:extLst>
   </p:cSld>
@@ -8203,7 +8203,7 @@
   <p:timing>
     <p:tnLst>
       <p:par>
-        <p:cTn id="1" dur="indefinite" restart="never" nodeType="tmRoot"/>
+        <p:cTn xmlns:p14="http://schemas.microsoft.com/office/powerpoint/2010/main" id="1" dur="indefinite" restart="never" nodeType="tmRoot"/>
       </p:par>
     </p:tnLst>
   </p:timing>
@@ -8498,18 +8498,18 @@
     </p:spTree>
     <p:extLst>
       <p:ext uri="{BB962C8B-B14F-4D97-AF65-F5344CB8AC3E}">
-        <p14:creationId xmlns="" xmlns:p14="http://schemas.microsoft.com/office/powerpoint/2010/main" val="2927506779"/>
+        <p14:creationId xmlns:p14="http://schemas.microsoft.com/office/powerpoint/2010/main" val="2927506779"/>
       </p:ext>
     </p:extLst>
   </p:cSld>
   <p:clrMapOvr>
     <a:masterClrMapping/>
   </p:clrMapOvr>
-  <p:transition spd="med"/>
+  <p:transition xmlns:p14="http://schemas.microsoft.com/office/powerpoint/2010/main" spd="med"/>
   <p:timing>
     <p:tnLst>
       <p:par>
-        <p:cTn id="1" dur="indefinite" restart="never" nodeType="tmRoot"/>
+        <p:cTn xmlns:p14="http://schemas.microsoft.com/office/powerpoint/2010/main" id="1" dur="indefinite" restart="never" nodeType="tmRoot"/>
       </p:par>
     </p:tnLst>
   </p:timing>
@@ -9165,25 +9165,25 @@
     </p:spTree>
     <p:extLst>
       <p:ext uri="{BB962C8B-B14F-4D97-AF65-F5344CB8AC3E}">
-        <p14:creationId xmlns="" xmlns:p14="http://schemas.microsoft.com/office/powerpoint/2010/main" val="1720938352"/>
+        <p14:creationId xmlns:p14="http://schemas.microsoft.com/office/powerpoint/2010/main" val="1720938352"/>
       </p:ext>
     </p:extLst>
   </p:cSld>
   <p:clrMapOvr>
     <a:masterClrMapping/>
   </p:clrMapOvr>
-  <mc:AlternateContent xmlns:mc="http://schemas.openxmlformats.org/markup-compatibility/2006">
-    <mc:Choice xmlns="" xmlns:p14="http://schemas.microsoft.com/office/powerpoint/2010/main" Requires="p14">
+  <mc:AlternateContent xmlns:mc="http://schemas.openxmlformats.org/markup-compatibility/2006" xmlns:p14="http://schemas.microsoft.com/office/powerpoint/2010/main">
+    <mc:Choice Requires="p14">
       <p:transition spd="slow" p14:dur="2000"/>
     </mc:Choice>
-    <mc:Fallback>
+    <mc:Fallback xmlns="">
       <p:transition spd="slow"/>
     </mc:Fallback>
   </mc:AlternateContent>
   <p:timing>
     <p:tnLst>
       <p:par>
-        <p:cTn id="1" dur="indefinite" restart="never" nodeType="tmRoot"/>
+        <p:cTn xmlns:p14="http://schemas.microsoft.com/office/powerpoint/2010/main" id="1" dur="indefinite" restart="never" nodeType="tmRoot"/>
       </p:par>
     </p:tnLst>
   </p:timing>
@@ -9467,7 +9467,7 @@
     </p:spTree>
     <p:extLst>
       <p:ext uri="{BB962C8B-B14F-4D97-AF65-F5344CB8AC3E}">
-        <p14:creationId xmlns="" xmlns:p14="http://schemas.microsoft.com/office/powerpoint/2010/main" val="3389076463"/>
+        <p14:creationId xmlns:p14="http://schemas.microsoft.com/office/powerpoint/2010/main" val="3389076463"/>
       </p:ext>
     </p:extLst>
   </p:cSld>
@@ -9477,7 +9477,7 @@
   <p:timing>
     <p:tnLst>
       <p:par>
-        <p:cTn id="1" dur="indefinite" restart="never" nodeType="tmRoot"/>
+        <p:cTn xmlns:p14="http://schemas.microsoft.com/office/powerpoint/2010/main" id="1" dur="indefinite" restart="never" nodeType="tmRoot"/>
       </p:par>
     </p:tnLst>
   </p:timing>
@@ -9590,7 +9590,7 @@
     </p:spTree>
     <p:extLst>
       <p:ext uri="{BB962C8B-B14F-4D97-AF65-F5344CB8AC3E}">
-        <p14:creationId xmlns="" xmlns:p14="http://schemas.microsoft.com/office/powerpoint/2010/main" val="3781125707"/>
+        <p14:creationId xmlns:p14="http://schemas.microsoft.com/office/powerpoint/2010/main" val="3781125707"/>
       </p:ext>
     </p:extLst>
   </p:cSld>
@@ -9600,7 +9600,7 @@
   <p:timing>
     <p:tnLst>
       <p:par>
-        <p:cTn id="1" dur="indefinite" restart="never" nodeType="tmRoot"/>
+        <p:cTn xmlns:p14="http://schemas.microsoft.com/office/powerpoint/2010/main" id="1" dur="indefinite" restart="never" nodeType="tmRoot"/>
       </p:par>
     </p:tnLst>
   </p:timing>
@@ -9714,7 +9714,7 @@
     </p:spTree>
     <p:extLst>
       <p:ext uri="{BB962C8B-B14F-4D97-AF65-F5344CB8AC3E}">
-        <p14:creationId xmlns="" xmlns:p14="http://schemas.microsoft.com/office/powerpoint/2010/main" val="3113757335"/>
+        <p14:creationId xmlns:p14="http://schemas.microsoft.com/office/powerpoint/2010/main" val="3113757335"/>
       </p:ext>
     </p:extLst>
   </p:cSld>
@@ -9724,7 +9724,7 @@
   <p:timing>
     <p:tnLst>
       <p:par>
-        <p:cTn id="1" dur="indefinite" restart="never" nodeType="tmRoot"/>
+        <p:cTn xmlns:p14="http://schemas.microsoft.com/office/powerpoint/2010/main" id="1" dur="indefinite" restart="never" nodeType="tmRoot"/>
       </p:par>
     </p:tnLst>
   </p:timing>
@@ -9798,7 +9798,7 @@
     </p:spTree>
     <p:extLst>
       <p:ext uri="{BB962C8B-B14F-4D97-AF65-F5344CB8AC3E}">
-        <p14:creationId xmlns="" xmlns:p14="http://schemas.microsoft.com/office/powerpoint/2010/main" val="3128220547"/>
+        <p14:creationId xmlns:p14="http://schemas.microsoft.com/office/powerpoint/2010/main" val="3128220547"/>
       </p:ext>
     </p:extLst>
   </p:cSld>
@@ -9808,7 +9808,7 @@
   <p:timing>
     <p:tnLst>
       <p:par>
-        <p:cTn id="1" dur="indefinite" restart="never" nodeType="tmRoot"/>
+        <p:cTn xmlns:p14="http://schemas.microsoft.com/office/powerpoint/2010/main" id="1" dur="indefinite" restart="never" nodeType="tmRoot"/>
       </p:par>
     </p:tnLst>
   </p:timing>
@@ -9924,7 +9924,7 @@
     </p:spTree>
     <p:extLst>
       <p:ext uri="{BB962C8B-B14F-4D97-AF65-F5344CB8AC3E}">
-        <p14:creationId xmlns="" xmlns:p14="http://schemas.microsoft.com/office/powerpoint/2010/main" val="3526463055"/>
+        <p14:creationId xmlns:p14="http://schemas.microsoft.com/office/powerpoint/2010/main" val="3526463055"/>
       </p:ext>
     </p:extLst>
   </p:cSld>
@@ -9934,7 +9934,7 @@
   <p:timing>
     <p:tnLst>
       <p:par>
-        <p:cTn id="1" dur="indefinite" restart="never" nodeType="tmRoot"/>
+        <p:cTn xmlns:p14="http://schemas.microsoft.com/office/powerpoint/2010/main" id="1" dur="indefinite" restart="never" nodeType="tmRoot"/>
       </p:par>
     </p:tnLst>
   </p:timing>
@@ -10047,7 +10047,7 @@
     </p:spTree>
     <p:extLst>
       <p:ext uri="{BB962C8B-B14F-4D97-AF65-F5344CB8AC3E}">
-        <p14:creationId xmlns="" xmlns:p14="http://schemas.microsoft.com/office/powerpoint/2010/main" val="4153735844"/>
+        <p14:creationId xmlns:p14="http://schemas.microsoft.com/office/powerpoint/2010/main" val="4153735844"/>
       </p:ext>
     </p:extLst>
   </p:cSld>
@@ -10057,7 +10057,7 @@
   <p:timing>
     <p:tnLst>
       <p:par>
-        <p:cTn id="1" dur="indefinite" restart="never" nodeType="tmRoot"/>
+        <p:cTn xmlns:p14="http://schemas.microsoft.com/office/powerpoint/2010/main" id="1" dur="indefinite" restart="never" nodeType="tmRoot"/>
       </p:par>
     </p:tnLst>
   </p:timing>
@@ -10140,7 +10140,7 @@
     </p:spTree>
     <p:extLst>
       <p:ext uri="{BB962C8B-B14F-4D97-AF65-F5344CB8AC3E}">
-        <p14:creationId xmlns="" xmlns:p14="http://schemas.microsoft.com/office/powerpoint/2010/main" val="3584613944"/>
+        <p14:creationId xmlns:p14="http://schemas.microsoft.com/office/powerpoint/2010/main" val="3584613944"/>
       </p:ext>
     </p:extLst>
   </p:cSld>
@@ -10150,7 +10150,7 @@
   <p:timing>
     <p:tnLst>
       <p:par>
-        <p:cTn id="1" dur="indefinite" restart="never" nodeType="tmRoot"/>
+        <p:cTn xmlns:p14="http://schemas.microsoft.com/office/powerpoint/2010/main" id="1" dur="indefinite" restart="never" nodeType="tmRoot"/>
       </p:par>
     </p:tnLst>
   </p:timing>
@@ -10329,18 +10329,18 @@
     </p:spTree>
     <p:extLst>
       <p:ext uri="{BB962C8B-B14F-4D97-AF65-F5344CB8AC3E}">
-        <p14:creationId xmlns="" xmlns:p14="http://schemas.microsoft.com/office/powerpoint/2010/main" val="1309712431"/>
+        <p14:creationId xmlns:p14="http://schemas.microsoft.com/office/powerpoint/2010/main" val="1309712431"/>
       </p:ext>
     </p:extLst>
   </p:cSld>
   <p:clrMapOvr>
     <a:masterClrMapping/>
   </p:clrMapOvr>
-  <p:transition/>
+  <p:transition xmlns:p14="http://schemas.microsoft.com/office/powerpoint/2010/main"/>
   <p:timing>
     <p:tnLst>
       <p:par>
-        <p:cTn id="1" dur="indefinite" restart="never" nodeType="tmRoot"/>
+        <p:cTn xmlns:p14="http://schemas.microsoft.com/office/powerpoint/2010/main" id="1" dur="indefinite" restart="never" nodeType="tmRoot"/>
       </p:par>
     </p:tnLst>
   </p:timing>
@@ -10546,18 +10546,18 @@
     </p:spTree>
     <p:extLst>
       <p:ext uri="{BB962C8B-B14F-4D97-AF65-F5344CB8AC3E}">
-        <p14:creationId xmlns="" xmlns:p14="http://schemas.microsoft.com/office/powerpoint/2010/main" val="3902446084"/>
+        <p14:creationId xmlns:p14="http://schemas.microsoft.com/office/powerpoint/2010/main" val="3902446084"/>
       </p:ext>
     </p:extLst>
   </p:cSld>
   <p:clrMapOvr>
     <a:masterClrMapping/>
   </p:clrMapOvr>
-  <p:transition/>
+  <p:transition xmlns:p14="http://schemas.microsoft.com/office/powerpoint/2010/main"/>
   <p:timing>
     <p:tnLst>
       <p:par>
-        <p:cTn id="1" dur="indefinite" restart="never" nodeType="tmRoot"/>
+        <p:cTn xmlns:p14="http://schemas.microsoft.com/office/powerpoint/2010/main" id="1" dur="indefinite" restart="never" nodeType="tmRoot"/>
       </p:par>
     </p:tnLst>
   </p:timing>
@@ -10738,7 +10738,7 @@
     </p:spTree>
     <p:extLst>
       <p:ext uri="{BB962C8B-B14F-4D97-AF65-F5344CB8AC3E}">
-        <p14:creationId xmlns="" xmlns:p14="http://schemas.microsoft.com/office/powerpoint/2010/main" val="3677979436"/>
+        <p14:creationId xmlns:p14="http://schemas.microsoft.com/office/powerpoint/2010/main" val="3677979436"/>
       </p:ext>
     </p:extLst>
   </p:cSld>
@@ -10748,7 +10748,7 @@
   <p:timing>
     <p:tnLst>
       <p:par>
-        <p:cTn id="1" dur="indefinite" restart="never" nodeType="tmRoot"/>
+        <p:cTn xmlns:p14="http://schemas.microsoft.com/office/powerpoint/2010/main" id="1" dur="indefinite" restart="never" nodeType="tmRoot"/>
       </p:par>
     </p:tnLst>
   </p:timing>
@@ -11255,25 +11255,25 @@
     </p:spTree>
     <p:extLst>
       <p:ext uri="{BB962C8B-B14F-4D97-AF65-F5344CB8AC3E}">
-        <p14:creationId xmlns="" xmlns:p14="http://schemas.microsoft.com/office/powerpoint/2010/main" val="3436514102"/>
+        <p14:creationId xmlns:p14="http://schemas.microsoft.com/office/powerpoint/2010/main" val="3436514102"/>
       </p:ext>
     </p:extLst>
   </p:cSld>
   <p:clrMapOvr>
     <a:masterClrMapping/>
   </p:clrMapOvr>
-  <mc:AlternateContent xmlns:mc="http://schemas.openxmlformats.org/markup-compatibility/2006">
-    <mc:Choice xmlns="" xmlns:p14="http://schemas.microsoft.com/office/powerpoint/2010/main" Requires="p14">
+  <mc:AlternateContent xmlns:mc="http://schemas.openxmlformats.org/markup-compatibility/2006" xmlns:p14="http://schemas.microsoft.com/office/powerpoint/2010/main">
+    <mc:Choice Requires="p14">
       <p:transition spd="slow" p14:dur="2000"/>
     </mc:Choice>
-    <mc:Fallback>
+    <mc:Fallback xmlns="">
       <p:transition spd="slow"/>
     </mc:Fallback>
   </mc:AlternateContent>
   <p:timing>
     <p:tnLst>
       <p:par>
-        <p:cTn id="1" dur="indefinite" restart="never" nodeType="tmRoot"/>
+        <p:cTn xmlns:p14="http://schemas.microsoft.com/office/powerpoint/2010/main" id="1" dur="indefinite" restart="never" nodeType="tmRoot"/>
       </p:par>
     </p:tnLst>
   </p:timing>
@@ -11356,7 +11356,7 @@
     </p:spTree>
     <p:extLst>
       <p:ext uri="{BB962C8B-B14F-4D97-AF65-F5344CB8AC3E}">
-        <p14:creationId xmlns="" xmlns:p14="http://schemas.microsoft.com/office/powerpoint/2010/main" val="2777952497"/>
+        <p14:creationId xmlns:p14="http://schemas.microsoft.com/office/powerpoint/2010/main" val="2777952497"/>
       </p:ext>
     </p:extLst>
   </p:cSld>
@@ -11366,7 +11366,7 @@
   <p:timing>
     <p:tnLst>
       <p:par>
-        <p:cTn id="1" dur="indefinite" restart="never" nodeType="tmRoot"/>
+        <p:cTn xmlns:p14="http://schemas.microsoft.com/office/powerpoint/2010/main" id="1" dur="indefinite" restart="never" nodeType="tmRoot"/>
       </p:par>
     </p:tnLst>
   </p:timing>
@@ -11544,7 +11544,7 @@
     </p:spTree>
     <p:extLst>
       <p:ext uri="{BB962C8B-B14F-4D97-AF65-F5344CB8AC3E}">
-        <p14:creationId xmlns="" xmlns:p14="http://schemas.microsoft.com/office/powerpoint/2010/main" val="2574674066"/>
+        <p14:creationId xmlns:p14="http://schemas.microsoft.com/office/powerpoint/2010/main" val="2574674066"/>
       </p:ext>
     </p:extLst>
   </p:cSld>
@@ -11554,7 +11554,7 @@
   <p:timing>
     <p:tnLst>
       <p:par>
-        <p:cTn id="1" dur="indefinite" restart="never" nodeType="tmRoot"/>
+        <p:cTn xmlns:p14="http://schemas.microsoft.com/office/powerpoint/2010/main" id="1" dur="indefinite" restart="never" nodeType="tmRoot"/>
       </p:par>
     </p:tnLst>
   </p:timing>
@@ -11637,7 +11637,7 @@
     </p:spTree>
     <p:extLst>
       <p:ext uri="{BB962C8B-B14F-4D97-AF65-F5344CB8AC3E}">
-        <p14:creationId xmlns="" xmlns:p14="http://schemas.microsoft.com/office/powerpoint/2010/main" val="763878143"/>
+        <p14:creationId xmlns:p14="http://schemas.microsoft.com/office/powerpoint/2010/main" val="763878143"/>
       </p:ext>
     </p:extLst>
   </p:cSld>
@@ -11647,7 +11647,7 @@
   <p:timing>
     <p:tnLst>
       <p:par>
-        <p:cTn id="1" dur="indefinite" restart="never" nodeType="tmRoot"/>
+        <p:cTn xmlns:p14="http://schemas.microsoft.com/office/powerpoint/2010/main" id="1" dur="indefinite" restart="never" nodeType="tmRoot"/>
       </p:par>
     </p:tnLst>
   </p:timing>
@@ -11933,25 +11933,25 @@
     </p:spTree>
     <p:extLst>
       <p:ext uri="{BB962C8B-B14F-4D97-AF65-F5344CB8AC3E}">
-        <p14:creationId xmlns="" xmlns:p14="http://schemas.microsoft.com/office/powerpoint/2010/main" val="42533803"/>
+        <p14:creationId xmlns:p14="http://schemas.microsoft.com/office/powerpoint/2010/main" val="42533803"/>
       </p:ext>
     </p:extLst>
   </p:cSld>
   <p:clrMapOvr>
     <a:masterClrMapping/>
   </p:clrMapOvr>
-  <mc:AlternateContent xmlns:mc="http://schemas.openxmlformats.org/markup-compatibility/2006">
-    <mc:Choice xmlns="" xmlns:p14="http://schemas.microsoft.com/office/powerpoint/2010/main" Requires="p14">
+  <mc:AlternateContent xmlns:mc="http://schemas.openxmlformats.org/markup-compatibility/2006" xmlns:p14="http://schemas.microsoft.com/office/powerpoint/2010/main">
+    <mc:Choice Requires="p14">
       <p:transition spd="slow" p14:dur="2000"/>
     </mc:Choice>
-    <mc:Fallback>
+    <mc:Fallback xmlns="">
       <p:transition spd="slow"/>
     </mc:Fallback>
   </mc:AlternateContent>
   <p:timing>
     <p:tnLst>
       <p:par>
-        <p:cTn id="1" dur="indefinite" restart="never" nodeType="tmRoot"/>
+        <p:cTn xmlns:p14="http://schemas.microsoft.com/office/powerpoint/2010/main" id="1" dur="indefinite" restart="never" nodeType="tmRoot"/>
       </p:par>
     </p:tnLst>
   </p:timing>
@@ -12245,25 +12245,25 @@
     </p:spTree>
     <p:extLst>
       <p:ext uri="{BB962C8B-B14F-4D97-AF65-F5344CB8AC3E}">
-        <p14:creationId xmlns="" xmlns:p14="http://schemas.microsoft.com/office/powerpoint/2010/main" val="719158636"/>
+        <p14:creationId xmlns:p14="http://schemas.microsoft.com/office/powerpoint/2010/main" val="719158636"/>
       </p:ext>
     </p:extLst>
   </p:cSld>
   <p:clrMapOvr>
     <a:masterClrMapping/>
   </p:clrMapOvr>
-  <mc:AlternateContent xmlns:mc="http://schemas.openxmlformats.org/markup-compatibility/2006">
-    <mc:Choice xmlns="" xmlns:p14="http://schemas.microsoft.com/office/powerpoint/2010/main" Requires="p14">
+  <mc:AlternateContent xmlns:mc="http://schemas.openxmlformats.org/markup-compatibility/2006" xmlns:p14="http://schemas.microsoft.com/office/powerpoint/2010/main">
+    <mc:Choice Requires="p14">
       <p:transition spd="slow" p14:dur="2000"/>
     </mc:Choice>
-    <mc:Fallback>
+    <mc:Fallback xmlns="">
       <p:transition spd="slow"/>
     </mc:Fallback>
   </mc:AlternateContent>
   <p:timing>
     <p:tnLst>
       <p:par>
-        <p:cTn id="1" dur="indefinite" restart="never" nodeType="tmRoot"/>
+        <p:cTn xmlns:p14="http://schemas.microsoft.com/office/powerpoint/2010/main" id="1" dur="indefinite" restart="never" nodeType="tmRoot"/>
       </p:par>
     </p:tnLst>
   </p:timing>
@@ -12554,25 +12554,25 @@
     </p:spTree>
     <p:extLst>
       <p:ext uri="{BB962C8B-B14F-4D97-AF65-F5344CB8AC3E}">
-        <p14:creationId xmlns="" xmlns:p14="http://schemas.microsoft.com/office/powerpoint/2010/main" val="3790159258"/>
+        <p14:creationId xmlns:p14="http://schemas.microsoft.com/office/powerpoint/2010/main" val="3790159258"/>
       </p:ext>
     </p:extLst>
   </p:cSld>
   <p:clrMapOvr>
     <a:masterClrMapping/>
   </p:clrMapOvr>
-  <mc:AlternateContent xmlns:mc="http://schemas.openxmlformats.org/markup-compatibility/2006">
-    <mc:Choice xmlns="" xmlns:p14="http://schemas.microsoft.com/office/powerpoint/2010/main" Requires="p14">
+  <mc:AlternateContent xmlns:mc="http://schemas.openxmlformats.org/markup-compatibility/2006" xmlns:p14="http://schemas.microsoft.com/office/powerpoint/2010/main">
+    <mc:Choice Requires="p14">
       <p:transition spd="slow" p14:dur="2000"/>
     </mc:Choice>
-    <mc:Fallback>
+    <mc:Fallback xmlns="">
       <p:transition spd="slow"/>
     </mc:Fallback>
   </mc:AlternateContent>
   <p:timing>
     <p:tnLst>
       <p:par>
-        <p:cTn id="1" dur="indefinite" restart="never" nodeType="tmRoot"/>
+        <p:cTn xmlns:p14="http://schemas.microsoft.com/office/powerpoint/2010/main" id="1" dur="indefinite" restart="never" nodeType="tmRoot"/>
       </p:par>
     </p:tnLst>
   </p:timing>
@@ -12863,25 +12863,25 @@
     </p:spTree>
     <p:extLst>
       <p:ext uri="{BB962C8B-B14F-4D97-AF65-F5344CB8AC3E}">
-        <p14:creationId xmlns="" xmlns:p14="http://schemas.microsoft.com/office/powerpoint/2010/main" val="560870364"/>
+        <p14:creationId xmlns:p14="http://schemas.microsoft.com/office/powerpoint/2010/main" val="560870364"/>
       </p:ext>
     </p:extLst>
   </p:cSld>
   <p:clrMapOvr>
     <a:masterClrMapping/>
   </p:clrMapOvr>
-  <mc:AlternateContent xmlns:mc="http://schemas.openxmlformats.org/markup-compatibility/2006">
-    <mc:Choice xmlns="" xmlns:p14="http://schemas.microsoft.com/office/powerpoint/2010/main" Requires="p14">
+  <mc:AlternateContent xmlns:mc="http://schemas.openxmlformats.org/markup-compatibility/2006" xmlns:p14="http://schemas.microsoft.com/office/powerpoint/2010/main">
+    <mc:Choice Requires="p14">
       <p:transition spd="slow" p14:dur="2000"/>
     </mc:Choice>
-    <mc:Fallback>
+    <mc:Fallback xmlns="">
       <p:transition spd="slow"/>
     </mc:Fallback>
   </mc:AlternateContent>
   <p:timing>
     <p:tnLst>
       <p:par>
-        <p:cTn id="1" dur="indefinite" restart="never" nodeType="tmRoot"/>
+        <p:cTn xmlns:p14="http://schemas.microsoft.com/office/powerpoint/2010/main" id="1" dur="indefinite" restart="never" nodeType="tmRoot"/>
       </p:par>
     </p:tnLst>
   </p:timing>
@@ -13172,25 +13172,25 @@
     </p:spTree>
     <p:extLst>
       <p:ext uri="{BB962C8B-B14F-4D97-AF65-F5344CB8AC3E}">
-        <p14:creationId xmlns="" xmlns:p14="http://schemas.microsoft.com/office/powerpoint/2010/main" val="518406238"/>
+        <p14:creationId xmlns:p14="http://schemas.microsoft.com/office/powerpoint/2010/main" val="518406238"/>
       </p:ext>
     </p:extLst>
   </p:cSld>
   <p:clrMapOvr>
     <a:masterClrMapping/>
   </p:clrMapOvr>
-  <mc:AlternateContent xmlns:mc="http://schemas.openxmlformats.org/markup-compatibility/2006">
-    <mc:Choice xmlns="" xmlns:p14="http://schemas.microsoft.com/office/powerpoint/2010/main" Requires="p14">
+  <mc:AlternateContent xmlns:mc="http://schemas.openxmlformats.org/markup-compatibility/2006" xmlns:p14="http://schemas.microsoft.com/office/powerpoint/2010/main">
+    <mc:Choice Requires="p14">
       <p:transition spd="slow" p14:dur="2000"/>
     </mc:Choice>
-    <mc:Fallback>
+    <mc:Fallback xmlns="">
       <p:transition spd="slow"/>
     </mc:Fallback>
   </mc:AlternateContent>
   <p:timing>
     <p:tnLst>
       <p:par>
-        <p:cTn id="1" dur="indefinite" restart="never" nodeType="tmRoot"/>
+        <p:cTn xmlns:p14="http://schemas.microsoft.com/office/powerpoint/2010/main" id="1" dur="indefinite" restart="never" nodeType="tmRoot"/>
       </p:par>
     </p:tnLst>
   </p:timing>
@@ -13481,25 +13481,25 @@
     </p:spTree>
     <p:extLst>
       <p:ext uri="{BB962C8B-B14F-4D97-AF65-F5344CB8AC3E}">
-        <p14:creationId xmlns="" xmlns:p14="http://schemas.microsoft.com/office/powerpoint/2010/main" val="3089945963"/>
+        <p14:creationId xmlns:p14="http://schemas.microsoft.com/office/powerpoint/2010/main" val="3089945963"/>
       </p:ext>
     </p:extLst>
   </p:cSld>
   <p:clrMapOvr>
     <a:masterClrMapping/>
   </p:clrMapOvr>
-  <mc:AlternateContent xmlns:mc="http://schemas.openxmlformats.org/markup-compatibility/2006">
-    <mc:Choice xmlns="" xmlns:p14="http://schemas.microsoft.com/office/powerpoint/2010/main" Requires="p14">
+  <mc:AlternateContent xmlns:mc="http://schemas.openxmlformats.org/markup-compatibility/2006" xmlns:p14="http://schemas.microsoft.com/office/powerpoint/2010/main">
+    <mc:Choice Requires="p14">
       <p:transition spd="slow" p14:dur="2000"/>
     </mc:Choice>
-    <mc:Fallback>
+    <mc:Fallback xmlns="">
       <p:transition spd="slow"/>
     </mc:Fallback>
   </mc:AlternateContent>
   <p:timing>
     <p:tnLst>
       <p:par>
-        <p:cTn id="1" dur="indefinite" restart="never" nodeType="tmRoot"/>
+        <p:cTn xmlns:p14="http://schemas.microsoft.com/office/powerpoint/2010/main" id="1" dur="indefinite" restart="never" nodeType="tmRoot"/>
       </p:par>
     </p:tnLst>
   </p:timing>
@@ -13795,25 +13795,25 @@
     </p:spTree>
     <p:extLst>
       <p:ext uri="{BB962C8B-B14F-4D97-AF65-F5344CB8AC3E}">
-        <p14:creationId xmlns="" xmlns:p14="http://schemas.microsoft.com/office/powerpoint/2010/main" val="3273476610"/>
+        <p14:creationId xmlns:p14="http://schemas.microsoft.com/office/powerpoint/2010/main" val="3273476610"/>
       </p:ext>
     </p:extLst>
   </p:cSld>
   <p:clrMapOvr>
     <a:masterClrMapping/>
   </p:clrMapOvr>
-  <mc:AlternateContent xmlns:mc="http://schemas.openxmlformats.org/markup-compatibility/2006">
-    <mc:Choice xmlns="" xmlns:p14="http://schemas.microsoft.com/office/powerpoint/2010/main" Requires="p14">
+  <mc:AlternateContent xmlns:mc="http://schemas.openxmlformats.org/markup-compatibility/2006" xmlns:p14="http://schemas.microsoft.com/office/powerpoint/2010/main">
+    <mc:Choice Requires="p14">
       <p:transition spd="slow" p14:dur="2000"/>
     </mc:Choice>
-    <mc:Fallback>
+    <mc:Fallback xmlns="">
       <p:transition spd="slow"/>
     </mc:Fallback>
   </mc:AlternateContent>
   <p:timing>
     <p:tnLst>
       <p:par>
-        <p:cTn id="1" dur="indefinite" restart="never" nodeType="tmRoot"/>
+        <p:cTn xmlns:p14="http://schemas.microsoft.com/office/powerpoint/2010/main" id="1" dur="indefinite" restart="never" nodeType="tmRoot"/>
       </p:par>
     </p:tnLst>
   </p:timing>
@@ -14150,25 +14150,25 @@
     </p:spTree>
     <p:extLst>
       <p:ext uri="{BB962C8B-B14F-4D97-AF65-F5344CB8AC3E}">
-        <p14:creationId xmlns="" xmlns:p14="http://schemas.microsoft.com/office/powerpoint/2010/main" val="3735783036"/>
+        <p14:creationId xmlns:p14="http://schemas.microsoft.com/office/powerpoint/2010/main" val="3735783036"/>
       </p:ext>
     </p:extLst>
   </p:cSld>
   <p:clrMapOvr>
     <a:masterClrMapping/>
   </p:clrMapOvr>
-  <mc:AlternateContent xmlns:mc="http://schemas.openxmlformats.org/markup-compatibility/2006">
-    <mc:Choice xmlns="" xmlns:p14="http://schemas.microsoft.com/office/powerpoint/2010/main" Requires="p14">
+  <mc:AlternateContent xmlns:mc="http://schemas.openxmlformats.org/markup-compatibility/2006" xmlns:p14="http://schemas.microsoft.com/office/powerpoint/2010/main">
+    <mc:Choice Requires="p14">
       <p:transition spd="slow" p14:dur="2000"/>
     </mc:Choice>
-    <mc:Fallback>
+    <mc:Fallback xmlns="">
       <p:transition spd="slow"/>
     </mc:Fallback>
   </mc:AlternateContent>
   <p:timing>
     <p:tnLst>
       <p:par>
-        <p:cTn id="1" dur="indefinite" restart="never" nodeType="tmRoot"/>
+        <p:cTn xmlns:p14="http://schemas.microsoft.com/office/powerpoint/2010/main" id="1" dur="indefinite" restart="never" nodeType="tmRoot"/>
       </p:par>
     </p:tnLst>
   </p:timing>
@@ -14452,25 +14452,25 @@
     </p:spTree>
     <p:extLst>
       <p:ext uri="{BB962C8B-B14F-4D97-AF65-F5344CB8AC3E}">
-        <p14:creationId xmlns="" xmlns:p14="http://schemas.microsoft.com/office/powerpoint/2010/main" val="195274415"/>
+        <p14:creationId xmlns:p14="http://schemas.microsoft.com/office/powerpoint/2010/main" val="195274415"/>
       </p:ext>
     </p:extLst>
   </p:cSld>
   <p:clrMapOvr>
     <a:masterClrMapping/>
   </p:clrMapOvr>
-  <mc:AlternateContent xmlns:mc="http://schemas.openxmlformats.org/markup-compatibility/2006">
-    <mc:Choice xmlns="" xmlns:p14="http://schemas.microsoft.com/office/powerpoint/2010/main" Requires="p14">
+  <mc:AlternateContent xmlns:mc="http://schemas.openxmlformats.org/markup-compatibility/2006" xmlns:p14="http://schemas.microsoft.com/office/powerpoint/2010/main">
+    <mc:Choice Requires="p14">
       <p:transition spd="slow" p14:dur="2000"/>
     </mc:Choice>
-    <mc:Fallback>
+    <mc:Fallback xmlns="">
       <p:transition spd="slow"/>
     </mc:Fallback>
   </mc:AlternateContent>
   <p:timing>
     <p:tnLst>
       <p:par>
-        <p:cTn id="1" dur="indefinite" restart="never" nodeType="tmRoot"/>
+        <p:cTn xmlns:p14="http://schemas.microsoft.com/office/powerpoint/2010/main" id="1" dur="indefinite" restart="never" nodeType="tmRoot"/>
       </p:par>
     </p:tnLst>
   </p:timing>
@@ -14773,25 +14773,25 @@
     </p:spTree>
     <p:extLst>
       <p:ext uri="{BB962C8B-B14F-4D97-AF65-F5344CB8AC3E}">
-        <p14:creationId xmlns="" xmlns:p14="http://schemas.microsoft.com/office/powerpoint/2010/main" val="820318166"/>
+        <p14:creationId xmlns:p14="http://schemas.microsoft.com/office/powerpoint/2010/main" val="820318166"/>
       </p:ext>
     </p:extLst>
   </p:cSld>
   <p:clrMapOvr>
     <a:masterClrMapping/>
   </p:clrMapOvr>
-  <mc:AlternateContent xmlns:mc="http://schemas.openxmlformats.org/markup-compatibility/2006">
-    <mc:Choice xmlns="" xmlns:p14="http://schemas.microsoft.com/office/powerpoint/2010/main" Requires="p14">
+  <mc:AlternateContent xmlns:mc="http://schemas.openxmlformats.org/markup-compatibility/2006" xmlns:p14="http://schemas.microsoft.com/office/powerpoint/2010/main">
+    <mc:Choice Requires="p14">
       <p:transition spd="slow" p14:dur="2000"/>
     </mc:Choice>
-    <mc:Fallback>
+    <mc:Fallback xmlns="">
       <p:transition spd="slow"/>
     </mc:Fallback>
   </mc:AlternateContent>
   <p:timing>
     <p:tnLst>
       <p:par>
-        <p:cTn id="1" dur="indefinite" restart="never" nodeType="tmRoot"/>
+        <p:cTn xmlns:p14="http://schemas.microsoft.com/office/powerpoint/2010/main" id="1" dur="indefinite" restart="never" nodeType="tmRoot"/>
       </p:par>
     </p:tnLst>
   </p:timing>
@@ -15079,25 +15079,25 @@
     </p:spTree>
     <p:extLst>
       <p:ext uri="{BB962C8B-B14F-4D97-AF65-F5344CB8AC3E}">
-        <p14:creationId xmlns="" xmlns:p14="http://schemas.microsoft.com/office/powerpoint/2010/main" val="827783283"/>
+        <p14:creationId xmlns:p14="http://schemas.microsoft.com/office/powerpoint/2010/main" val="827783283"/>
       </p:ext>
     </p:extLst>
   </p:cSld>
   <p:clrMapOvr>
     <a:masterClrMapping/>
   </p:clrMapOvr>
-  <mc:AlternateContent xmlns:mc="http://schemas.openxmlformats.org/markup-compatibility/2006">
-    <mc:Choice xmlns="" xmlns:p14="http://schemas.microsoft.com/office/powerpoint/2010/main" Requires="p14">
+  <mc:AlternateContent xmlns:mc="http://schemas.openxmlformats.org/markup-compatibility/2006" xmlns:p14="http://schemas.microsoft.com/office/powerpoint/2010/main">
+    <mc:Choice Requires="p14">
       <p:transition spd="slow" p14:dur="2000"/>
     </mc:Choice>
-    <mc:Fallback>
+    <mc:Fallback xmlns="">
       <p:transition spd="slow"/>
     </mc:Fallback>
   </mc:AlternateContent>
   <p:timing>
     <p:tnLst>
       <p:par>
-        <p:cTn id="1" dur="indefinite" restart="never" nodeType="tmRoot"/>
+        <p:cTn xmlns:p14="http://schemas.microsoft.com/office/powerpoint/2010/main" id="1" dur="indefinite" restart="never" nodeType="tmRoot"/>
       </p:par>
     </p:tnLst>
   </p:timing>
@@ -15361,25 +15361,25 @@
     </p:spTree>
     <p:extLst>
       <p:ext uri="{BB962C8B-B14F-4D97-AF65-F5344CB8AC3E}">
-        <p14:creationId xmlns="" xmlns:p14="http://schemas.microsoft.com/office/powerpoint/2010/main" val="2112585717"/>
+        <p14:creationId xmlns:p14="http://schemas.microsoft.com/office/powerpoint/2010/main" val="2112585717"/>
       </p:ext>
     </p:extLst>
   </p:cSld>
   <p:clrMapOvr>
     <a:masterClrMapping/>
   </p:clrMapOvr>
-  <mc:AlternateContent xmlns:mc="http://schemas.openxmlformats.org/markup-compatibility/2006">
-    <mc:Choice xmlns="" xmlns:p14="http://schemas.microsoft.com/office/powerpoint/2010/main" Requires="p14">
+  <mc:AlternateContent xmlns:mc="http://schemas.openxmlformats.org/markup-compatibility/2006" xmlns:p14="http://schemas.microsoft.com/office/powerpoint/2010/main">
+    <mc:Choice Requires="p14">
       <p:transition spd="slow" p14:dur="2000"/>
     </mc:Choice>
-    <mc:Fallback>
+    <mc:Fallback xmlns="">
       <p:transition spd="slow"/>
     </mc:Fallback>
   </mc:AlternateContent>
   <p:timing>
     <p:tnLst>
       <p:par>
-        <p:cTn id="1" dur="indefinite" restart="never" nodeType="tmRoot"/>
+        <p:cTn xmlns:p14="http://schemas.microsoft.com/office/powerpoint/2010/main" id="1" dur="indefinite" restart="never" nodeType="tmRoot"/>
       </p:par>
     </p:tnLst>
   </p:timing>
@@ -15654,25 +15654,25 @@
     </p:spTree>
     <p:extLst>
       <p:ext uri="{BB962C8B-B14F-4D97-AF65-F5344CB8AC3E}">
-        <p14:creationId xmlns="" xmlns:p14="http://schemas.microsoft.com/office/powerpoint/2010/main" val="2498309309"/>
+        <p14:creationId xmlns:p14="http://schemas.microsoft.com/office/powerpoint/2010/main" val="2498309309"/>
       </p:ext>
     </p:extLst>
   </p:cSld>
   <p:clrMapOvr>
     <a:masterClrMapping/>
   </p:clrMapOvr>
-  <mc:AlternateContent xmlns:mc="http://schemas.openxmlformats.org/markup-compatibility/2006">
-    <mc:Choice xmlns="" xmlns:p14="http://schemas.microsoft.com/office/powerpoint/2010/main" Requires="p14">
+  <mc:AlternateContent xmlns:mc="http://schemas.openxmlformats.org/markup-compatibility/2006" xmlns:p14="http://schemas.microsoft.com/office/powerpoint/2010/main">
+    <mc:Choice Requires="p14">
       <p:transition spd="slow" p14:dur="2000"/>
     </mc:Choice>
-    <mc:Fallback>
+    <mc:Fallback xmlns="">
       <p:transition spd="slow"/>
     </mc:Fallback>
   </mc:AlternateContent>
   <p:timing>
     <p:tnLst>
       <p:par>
-        <p:cTn id="1" dur="indefinite" restart="never" nodeType="tmRoot"/>
+        <p:cTn xmlns:p14="http://schemas.microsoft.com/office/powerpoint/2010/main" id="1" dur="indefinite" restart="never" nodeType="tmRoot"/>
       </p:par>
     </p:tnLst>
   </p:timing>
@@ -15959,25 +15959,25 @@
     </p:spTree>
     <p:extLst>
       <p:ext uri="{BB962C8B-B14F-4D97-AF65-F5344CB8AC3E}">
-        <p14:creationId xmlns="" xmlns:p14="http://schemas.microsoft.com/office/powerpoint/2010/main" val="490993421"/>
+        <p14:creationId xmlns:p14="http://schemas.microsoft.com/office/powerpoint/2010/main" val="490993421"/>
       </p:ext>
     </p:extLst>
   </p:cSld>
   <p:clrMapOvr>
     <a:masterClrMapping/>
   </p:clrMapOvr>
-  <mc:AlternateContent xmlns:mc="http://schemas.openxmlformats.org/markup-compatibility/2006">
-    <mc:Choice xmlns="" xmlns:p14="http://schemas.microsoft.com/office/powerpoint/2010/main" Requires="p14">
+  <mc:AlternateContent xmlns:mc="http://schemas.openxmlformats.org/markup-compatibility/2006" xmlns:p14="http://schemas.microsoft.com/office/powerpoint/2010/main">
+    <mc:Choice Requires="p14">
       <p:transition spd="slow" p14:dur="2000"/>
     </mc:Choice>
-    <mc:Fallback>
+    <mc:Fallback xmlns="">
       <p:transition spd="slow"/>
     </mc:Fallback>
   </mc:AlternateContent>
   <p:timing>
     <p:tnLst>
       <p:par>
-        <p:cTn id="1" dur="indefinite" restart="never" nodeType="tmRoot"/>
+        <p:cTn xmlns:p14="http://schemas.microsoft.com/office/powerpoint/2010/main" id="1" dur="indefinite" restart="never" nodeType="tmRoot"/>
       </p:par>
     </p:tnLst>
   </p:timing>
@@ -16236,25 +16236,25 @@
     </p:spTree>
     <p:extLst>
       <p:ext uri="{BB962C8B-B14F-4D97-AF65-F5344CB8AC3E}">
-        <p14:creationId xmlns="" xmlns:p14="http://schemas.microsoft.com/office/powerpoint/2010/main" val="1982603412"/>
+        <p14:creationId xmlns:p14="http://schemas.microsoft.com/office/powerpoint/2010/main" val="1982603412"/>
       </p:ext>
     </p:extLst>
   </p:cSld>
   <p:clrMapOvr>
     <a:masterClrMapping/>
   </p:clrMapOvr>
-  <mc:AlternateContent xmlns:mc="http://schemas.openxmlformats.org/markup-compatibility/2006">
-    <mc:Choice xmlns="" xmlns:p14="http://schemas.microsoft.com/office/powerpoint/2010/main" Requires="p14">
+  <mc:AlternateContent xmlns:mc="http://schemas.openxmlformats.org/markup-compatibility/2006" xmlns:p14="http://schemas.microsoft.com/office/powerpoint/2010/main">
+    <mc:Choice Requires="p14">
       <p:transition spd="slow" p14:dur="2000"/>
     </mc:Choice>
-    <mc:Fallback>
+    <mc:Fallback xmlns="">
       <p:transition spd="slow"/>
     </mc:Fallback>
   </mc:AlternateContent>
   <p:timing>
     <p:tnLst>
       <p:par>
-        <p:cTn id="1" dur="indefinite" restart="never" nodeType="tmRoot"/>
+        <p:cTn xmlns:p14="http://schemas.microsoft.com/office/powerpoint/2010/main" id="1" dur="indefinite" restart="never" nodeType="tmRoot"/>
       </p:par>
     </p:tnLst>
   </p:timing>
@@ -16337,25 +16337,25 @@
     </p:spTree>
     <p:extLst>
       <p:ext uri="{BB962C8B-B14F-4D97-AF65-F5344CB8AC3E}">
-        <p14:creationId xmlns="" xmlns:p14="http://schemas.microsoft.com/office/powerpoint/2010/main" val="3486681628"/>
+        <p14:creationId xmlns:p14="http://schemas.microsoft.com/office/powerpoint/2010/main" val="3486681628"/>
       </p:ext>
     </p:extLst>
   </p:cSld>
   <p:clrMapOvr>
     <a:masterClrMapping/>
   </p:clrMapOvr>
-  <mc:AlternateContent xmlns:mc="http://schemas.openxmlformats.org/markup-compatibility/2006">
-    <mc:Choice xmlns="" xmlns:p14="http://schemas.microsoft.com/office/powerpoint/2010/main" Requires="p14">
+  <mc:AlternateContent xmlns:mc="http://schemas.openxmlformats.org/markup-compatibility/2006" xmlns:p14="http://schemas.microsoft.com/office/powerpoint/2010/main">
+    <mc:Choice Requires="p14">
       <p:transition spd="slow" p14:dur="2000"/>
     </mc:Choice>
-    <mc:Fallback>
+    <mc:Fallback xmlns="">
       <p:transition spd="slow"/>
     </mc:Fallback>
   </mc:AlternateContent>
   <p:timing>
     <p:tnLst>
       <p:par>
-        <p:cTn id="1" dur="indefinite" restart="never" nodeType="tmRoot"/>
+        <p:cTn xmlns:p14="http://schemas.microsoft.com/office/powerpoint/2010/main" id="1" dur="indefinite" restart="never" nodeType="tmRoot"/>
       </p:par>
     </p:tnLst>
   </p:timing>
@@ -16655,25 +16655,25 @@
     </p:spTree>
     <p:extLst>
       <p:ext uri="{BB962C8B-B14F-4D97-AF65-F5344CB8AC3E}">
-        <p14:creationId xmlns="" xmlns:p14="http://schemas.microsoft.com/office/powerpoint/2010/main" val="2167458548"/>
+        <p14:creationId xmlns:p14="http://schemas.microsoft.com/office/powerpoint/2010/main" val="2167458548"/>
       </p:ext>
     </p:extLst>
   </p:cSld>
   <p:clrMapOvr>
     <a:masterClrMapping/>
   </p:clrMapOvr>
-  <mc:AlternateContent xmlns:mc="http://schemas.openxmlformats.org/markup-compatibility/2006">
-    <mc:Choice xmlns="" xmlns:p14="http://schemas.microsoft.com/office/powerpoint/2010/main" Requires="p14">
+  <mc:AlternateContent xmlns:mc="http://schemas.openxmlformats.org/markup-compatibility/2006" xmlns:p14="http://schemas.microsoft.com/office/powerpoint/2010/main">
+    <mc:Choice Requires="p14">
       <p:transition spd="slow" p14:dur="2000"/>
     </mc:Choice>
-    <mc:Fallback>
+    <mc:Fallback xmlns="">
       <p:transition spd="slow"/>
     </mc:Fallback>
   </mc:AlternateContent>
   <p:timing>
     <p:tnLst>
       <p:par>
-        <p:cTn id="1" dur="indefinite" restart="never" nodeType="tmRoot"/>
+        <p:cTn xmlns:p14="http://schemas.microsoft.com/office/powerpoint/2010/main" id="1" dur="indefinite" restart="never" nodeType="tmRoot"/>
       </p:par>
     </p:tnLst>
   </p:timing>
@@ -16762,25 +16762,25 @@
     </p:spTree>
     <p:extLst>
       <p:ext uri="{BB962C8B-B14F-4D97-AF65-F5344CB8AC3E}">
-        <p14:creationId xmlns="" xmlns:p14="http://schemas.microsoft.com/office/powerpoint/2010/main" val="77984983"/>
+        <p14:creationId xmlns:p14="http://schemas.microsoft.com/office/powerpoint/2010/main" val="77984983"/>
       </p:ext>
     </p:extLst>
   </p:cSld>
   <p:clrMapOvr>
     <a:masterClrMapping/>
   </p:clrMapOvr>
-  <mc:AlternateContent xmlns:mc="http://schemas.openxmlformats.org/markup-compatibility/2006">
-    <mc:Choice xmlns="" xmlns:p14="http://schemas.microsoft.com/office/powerpoint/2010/main" Requires="p14">
+  <mc:AlternateContent xmlns:mc="http://schemas.openxmlformats.org/markup-compatibility/2006" xmlns:p14="http://schemas.microsoft.com/office/powerpoint/2010/main">
+    <mc:Choice Requires="p14">
       <p:transition spd="slow" p14:dur="2000"/>
     </mc:Choice>
-    <mc:Fallback>
+    <mc:Fallback xmlns="">
       <p:transition spd="slow"/>
     </mc:Fallback>
   </mc:AlternateContent>
   <p:timing>
     <p:tnLst>
       <p:par>
-        <p:cTn id="1" dur="indefinite" restart="never" nodeType="tmRoot"/>
+        <p:cTn xmlns:p14="http://schemas.microsoft.com/office/powerpoint/2010/main" id="1" dur="indefinite" restart="never" nodeType="tmRoot"/>
       </p:par>
     </p:tnLst>
   </p:timing>
@@ -17121,25 +17121,25 @@
     </p:spTree>
     <p:extLst>
       <p:ext uri="{BB962C8B-B14F-4D97-AF65-F5344CB8AC3E}">
-        <p14:creationId xmlns="" xmlns:p14="http://schemas.microsoft.com/office/powerpoint/2010/main" val="1766382090"/>
+        <p14:creationId xmlns:p14="http://schemas.microsoft.com/office/powerpoint/2010/main" val="1766382090"/>
       </p:ext>
     </p:extLst>
   </p:cSld>
   <p:clrMapOvr>
     <a:masterClrMapping/>
   </p:clrMapOvr>
-  <mc:AlternateContent xmlns:mc="http://schemas.openxmlformats.org/markup-compatibility/2006">
-    <mc:Choice xmlns="" xmlns:p14="http://schemas.microsoft.com/office/powerpoint/2010/main" Requires="p14">
+  <mc:AlternateContent xmlns:mc="http://schemas.openxmlformats.org/markup-compatibility/2006" xmlns:p14="http://schemas.microsoft.com/office/powerpoint/2010/main">
+    <mc:Choice Requires="p14">
       <p:transition spd="slow" p14:dur="2000"/>
     </mc:Choice>
-    <mc:Fallback>
+    <mc:Fallback xmlns="">
       <p:transition spd="slow"/>
     </mc:Fallback>
   </mc:AlternateContent>
   <p:timing>
     <p:tnLst>
       <p:par>
-        <p:cTn id="1" dur="indefinite" restart="never" nodeType="tmRoot"/>
+        <p:cTn xmlns:p14="http://schemas.microsoft.com/office/powerpoint/2010/main" id="1" dur="indefinite" restart="never" nodeType="tmRoot"/>
       </p:par>
     </p:tnLst>
   </p:timing>
@@ -17228,25 +17228,25 @@
     </p:spTree>
     <p:extLst>
       <p:ext uri="{BB962C8B-B14F-4D97-AF65-F5344CB8AC3E}">
-        <p14:creationId xmlns="" xmlns:p14="http://schemas.microsoft.com/office/powerpoint/2010/main" val="3690446741"/>
+        <p14:creationId xmlns:p14="http://schemas.microsoft.com/office/powerpoint/2010/main" val="3690446741"/>
       </p:ext>
     </p:extLst>
   </p:cSld>
   <p:clrMapOvr>
     <a:masterClrMapping/>
   </p:clrMapOvr>
-  <mc:AlternateContent xmlns:mc="http://schemas.openxmlformats.org/markup-compatibility/2006">
-    <mc:Choice xmlns="" xmlns:p14="http://schemas.microsoft.com/office/powerpoint/2010/main" Requires="p14">
+  <mc:AlternateContent xmlns:mc="http://schemas.openxmlformats.org/markup-compatibility/2006" xmlns:p14="http://schemas.microsoft.com/office/powerpoint/2010/main">
+    <mc:Choice Requires="p14">
       <p:transition spd="slow" p14:dur="2000"/>
     </mc:Choice>
-    <mc:Fallback>
+    <mc:Fallback xmlns="">
       <p:transition spd="slow"/>
     </mc:Fallback>
   </mc:AlternateContent>
   <p:timing>
     <p:tnLst>
       <p:par>
-        <p:cTn id="1" dur="indefinite" restart="never" nodeType="tmRoot"/>
+        <p:cTn xmlns:p14="http://schemas.microsoft.com/office/powerpoint/2010/main" id="1" dur="indefinite" restart="never" nodeType="tmRoot"/>
       </p:par>
     </p:tnLst>
   </p:timing>
@@ -17467,25 +17467,25 @@
     </p:spTree>
     <p:extLst>
       <p:ext uri="{BB962C8B-B14F-4D97-AF65-F5344CB8AC3E}">
-        <p14:creationId xmlns="" xmlns:p14="http://schemas.microsoft.com/office/powerpoint/2010/main" val="1921668123"/>
+        <p14:creationId xmlns:p14="http://schemas.microsoft.com/office/powerpoint/2010/main" val="1921668123"/>
       </p:ext>
     </p:extLst>
   </p:cSld>
   <p:clrMapOvr>
     <a:masterClrMapping/>
   </p:clrMapOvr>
-  <mc:AlternateContent xmlns:mc="http://schemas.openxmlformats.org/markup-compatibility/2006">
-    <mc:Choice xmlns="" xmlns:p14="http://schemas.microsoft.com/office/powerpoint/2010/main" Requires="p14">
+  <mc:AlternateContent xmlns:mc="http://schemas.openxmlformats.org/markup-compatibility/2006" xmlns:p14="http://schemas.microsoft.com/office/powerpoint/2010/main">
+    <mc:Choice Requires="p14">
       <p:transition spd="slow" p14:dur="2000"/>
     </mc:Choice>
-    <mc:Fallback>
+    <mc:Fallback xmlns="">
       <p:transition spd="slow"/>
     </mc:Fallback>
   </mc:AlternateContent>
   <p:timing>
     <p:tnLst>
       <p:par>
-        <p:cTn id="1" dur="indefinite" restart="never" nodeType="tmRoot"/>
+        <p:cTn xmlns:p14="http://schemas.microsoft.com/office/powerpoint/2010/main" id="1" dur="indefinite" restart="never" nodeType="tmRoot"/>
       </p:par>
     </p:tnLst>
   </p:timing>
@@ -17767,25 +17767,25 @@
     </p:spTree>
     <p:extLst>
       <p:ext uri="{BB962C8B-B14F-4D97-AF65-F5344CB8AC3E}">
-        <p14:creationId xmlns="" xmlns:p14="http://schemas.microsoft.com/office/powerpoint/2010/main" val="2809531644"/>
+        <p14:creationId xmlns:p14="http://schemas.microsoft.com/office/powerpoint/2010/main" val="2809531644"/>
       </p:ext>
     </p:extLst>
   </p:cSld>
   <p:clrMapOvr>
     <a:masterClrMapping/>
   </p:clrMapOvr>
-  <mc:AlternateContent xmlns:mc="http://schemas.openxmlformats.org/markup-compatibility/2006">
-    <mc:Choice xmlns="" xmlns:p14="http://schemas.microsoft.com/office/powerpoint/2010/main" Requires="p14">
+  <mc:AlternateContent xmlns:mc="http://schemas.openxmlformats.org/markup-compatibility/2006" xmlns:p14="http://schemas.microsoft.com/office/powerpoint/2010/main">
+    <mc:Choice Requires="p14">
       <p:transition spd="slow" p14:dur="2000"/>
     </mc:Choice>
-    <mc:Fallback>
+    <mc:Fallback xmlns="">
       <p:transition spd="slow"/>
     </mc:Fallback>
   </mc:AlternateContent>
   <p:timing>
     <p:tnLst>
       <p:par>
-        <p:cTn id="1" dur="indefinite" restart="never" nodeType="tmRoot"/>
+        <p:cTn xmlns:p14="http://schemas.microsoft.com/office/powerpoint/2010/main" id="1" dur="indefinite" restart="never" nodeType="tmRoot"/>
       </p:par>
     </p:tnLst>
   </p:timing>
@@ -17929,25 +17929,25 @@
     </p:spTree>
     <p:extLst>
       <p:ext uri="{BB962C8B-B14F-4D97-AF65-F5344CB8AC3E}">
-        <p14:creationId xmlns="" xmlns:p14="http://schemas.microsoft.com/office/powerpoint/2010/main" val="2052235477"/>
+        <p14:creationId xmlns:p14="http://schemas.microsoft.com/office/powerpoint/2010/main" val="2052235477"/>
       </p:ext>
     </p:extLst>
   </p:cSld>
   <p:clrMapOvr>
     <a:masterClrMapping/>
   </p:clrMapOvr>
-  <mc:AlternateContent xmlns:mc="http://schemas.openxmlformats.org/markup-compatibility/2006">
-    <mc:Choice xmlns="" xmlns:p14="http://schemas.microsoft.com/office/powerpoint/2010/main" Requires="p14">
+  <mc:AlternateContent xmlns:mc="http://schemas.openxmlformats.org/markup-compatibility/2006" xmlns:p14="http://schemas.microsoft.com/office/powerpoint/2010/main">
+    <mc:Choice Requires="p14">
       <p:transition spd="slow" p14:dur="2000"/>
     </mc:Choice>
-    <mc:Fallback>
+    <mc:Fallback xmlns="">
       <p:transition spd="slow"/>
     </mc:Fallback>
   </mc:AlternateContent>
   <p:timing>
     <p:tnLst>
       <p:par>
-        <p:cTn id="1" dur="indefinite" restart="never" nodeType="tmRoot"/>
+        <p:cTn xmlns:p14="http://schemas.microsoft.com/office/powerpoint/2010/main" id="1" dur="indefinite" restart="never" nodeType="tmRoot"/>
       </p:par>
     </p:tnLst>
   </p:timing>
@@ -18003,7 +18003,7 @@
     </p:spTree>
     <p:extLst>
       <p:ext uri="{BB962C8B-B14F-4D97-AF65-F5344CB8AC3E}">
-        <p14:creationId xmlns="" xmlns:p14="http://schemas.microsoft.com/office/powerpoint/2010/main" val="1378357901"/>
+        <p14:creationId xmlns:p14="http://schemas.microsoft.com/office/powerpoint/2010/main" val="1378357901"/>
       </p:ext>
     </p:extLst>
   </p:cSld>
@@ -18013,7 +18013,7 @@
   <p:timing>
     <p:tnLst>
       <p:par>
-        <p:cTn id="1" dur="indefinite" restart="never" nodeType="tmRoot"/>
+        <p:cTn xmlns:p14="http://schemas.microsoft.com/office/powerpoint/2010/main" id="1" dur="indefinite" restart="never" nodeType="tmRoot"/>
       </p:par>
     </p:tnLst>
   </p:timing>
@@ -18093,7 +18093,7 @@
           <p:nvPr>
             <p:extLst>
               <p:ext uri="{D42A27DB-BD31-4B8C-83A1-F6EECF244321}">
-                <p14:modId xmlns="" xmlns:p14="http://schemas.microsoft.com/office/powerpoint/2010/main" val="2256308220"/>
+                <p14:modId xmlns:p14="http://schemas.microsoft.com/office/powerpoint/2010/main" val="2256308220"/>
               </p:ext>
             </p:extLst>
           </p:nvPr>
@@ -18678,25 +18678,25 @@
     </p:spTree>
     <p:extLst>
       <p:ext uri="{BB962C8B-B14F-4D97-AF65-F5344CB8AC3E}">
-        <p14:creationId xmlns="" xmlns:p14="http://schemas.microsoft.com/office/powerpoint/2010/main" val="1730443546"/>
+        <p14:creationId xmlns:p14="http://schemas.microsoft.com/office/powerpoint/2010/main" val="1730443546"/>
       </p:ext>
     </p:extLst>
   </p:cSld>
   <p:clrMapOvr>
     <a:masterClrMapping/>
   </p:clrMapOvr>
-  <mc:AlternateContent xmlns:mc="http://schemas.openxmlformats.org/markup-compatibility/2006">
-    <mc:Choice xmlns="" xmlns:p14="http://schemas.microsoft.com/office/powerpoint/2010/main" Requires="p14">
+  <mc:AlternateContent xmlns:mc="http://schemas.openxmlformats.org/markup-compatibility/2006" xmlns:p14="http://schemas.microsoft.com/office/powerpoint/2010/main">
+    <mc:Choice Requires="p14">
       <p:transition spd="slow" p14:dur="2000"/>
     </mc:Choice>
-    <mc:Fallback>
+    <mc:Fallback xmlns="">
       <p:transition spd="slow"/>
     </mc:Fallback>
   </mc:AlternateContent>
   <p:timing>
     <p:tnLst>
       <p:par>
-        <p:cTn id="1" dur="indefinite" restart="never" nodeType="tmRoot"/>
+        <p:cTn xmlns:p14="http://schemas.microsoft.com/office/powerpoint/2010/main" id="1" dur="indefinite" restart="never" nodeType="tmRoot"/>
       </p:par>
     </p:tnLst>
   </p:timing>
@@ -19166,25 +19166,25 @@
     </p:spTree>
     <p:extLst>
       <p:ext uri="{BB962C8B-B14F-4D97-AF65-F5344CB8AC3E}">
-        <p14:creationId xmlns="" xmlns:p14="http://schemas.microsoft.com/office/powerpoint/2010/main" val="1629831378"/>
+        <p14:creationId xmlns:p14="http://schemas.microsoft.com/office/powerpoint/2010/main" val="1629831378"/>
       </p:ext>
     </p:extLst>
   </p:cSld>
   <p:clrMapOvr>
     <a:masterClrMapping/>
   </p:clrMapOvr>
-  <mc:AlternateContent xmlns:mc="http://schemas.openxmlformats.org/markup-compatibility/2006">
-    <mc:Choice xmlns="" xmlns:p14="http://schemas.microsoft.com/office/powerpoint/2010/main" Requires="p14">
+  <mc:AlternateContent xmlns:mc="http://schemas.openxmlformats.org/markup-compatibility/2006" xmlns:p14="http://schemas.microsoft.com/office/powerpoint/2010/main">
+    <mc:Choice Requires="p14">
       <p:transition spd="slow" p14:dur="2000"/>
     </mc:Choice>
-    <mc:Fallback>
+    <mc:Fallback xmlns="">
       <p:transition spd="slow"/>
     </mc:Fallback>
   </mc:AlternateContent>
   <p:timing>
     <p:tnLst>
       <p:par>
-        <p:cTn id="1" dur="indefinite" restart="never" nodeType="tmRoot"/>
+        <p:cTn xmlns:p14="http://schemas.microsoft.com/office/powerpoint/2010/main" id="1" dur="indefinite" restart="never" nodeType="tmRoot"/>
       </p:par>
     </p:tnLst>
   </p:timing>
@@ -19220,7 +19220,7 @@
           <a:blip r:embed="rId2">
             <a:extLst>
               <a:ext uri="{28A0092B-C50C-407E-A947-70E740481C1C}">
-                <a14:useLocalDpi xmlns="" xmlns:a14="http://schemas.microsoft.com/office/drawing/2010/main" val="0"/>
+                <a14:useLocalDpi xmlns:a14="http://schemas.microsoft.com/office/drawing/2010/main" val="0"/>
               </a:ext>
             </a:extLst>
           </a:blip>
@@ -19240,7 +19240,7 @@
           <a:noFill/>
           <a:extLst>
             <a:ext uri="{909E8E84-426E-40dd-AFC4-6F175D3DCCD1}">
-              <a14:hiddenFill xmlns="" xmlns:a14="http://schemas.microsoft.com/office/drawing/2010/main">
+              <a14:hiddenFill xmlns:a14="http://schemas.microsoft.com/office/drawing/2010/main">
                 <a:solidFill>
                   <a:srgbClr val="FFFFFF"/>
                 </a:solidFill>
@@ -19323,25 +19323,25 @@
     </p:spTree>
     <p:extLst>
       <p:ext uri="{BB962C8B-B14F-4D97-AF65-F5344CB8AC3E}">
-        <p14:creationId xmlns="" xmlns:p14="http://schemas.microsoft.com/office/powerpoint/2010/main" val="2367797895"/>
+        <p14:creationId xmlns:p14="http://schemas.microsoft.com/office/powerpoint/2010/main" val="2367797895"/>
       </p:ext>
     </p:extLst>
   </p:cSld>
   <p:clrMapOvr>
     <a:masterClrMapping/>
   </p:clrMapOvr>
-  <mc:AlternateContent xmlns:mc="http://schemas.openxmlformats.org/markup-compatibility/2006">
-    <mc:Choice xmlns="" xmlns:p14="http://schemas.microsoft.com/office/powerpoint/2010/main" Requires="p14">
+  <mc:AlternateContent xmlns:mc="http://schemas.openxmlformats.org/markup-compatibility/2006" xmlns:p14="http://schemas.microsoft.com/office/powerpoint/2010/main">
+    <mc:Choice Requires="p14">
       <p:transition spd="slow" p14:dur="2000"/>
     </mc:Choice>
-    <mc:Fallback>
+    <mc:Fallback xmlns="">
       <p:transition spd="slow"/>
     </mc:Fallback>
   </mc:AlternateContent>
   <p:timing>
     <p:tnLst>
       <p:par>
-        <p:cTn id="1" dur="indefinite" restart="never" nodeType="tmRoot"/>
+        <p:cTn xmlns:p14="http://schemas.microsoft.com/office/powerpoint/2010/main" id="1" dur="indefinite" restart="never" nodeType="tmRoot"/>
       </p:par>
     </p:tnLst>
   </p:timing>
@@ -19694,15 +19694,7 @@
             </a:r>
             <a:r>
               <a:rPr lang="it-IT" dirty="0" smtClean="0"/>
-              <a:t> che </a:t>
-            </a:r>
-            <a:r>
-              <a:rPr lang="it-IT" dirty="0" smtClean="0"/>
-              <a:t>faccia </a:t>
-            </a:r>
-            <a:r>
-              <a:rPr lang="it-IT" dirty="0" smtClean="0"/>
-              <a:t>da ponte tra il mondo </a:t>
+              <a:t> che faccia da ponte tra il mondo </a:t>
             </a:r>
             <a:r>
               <a:rPr lang="it-IT" dirty="0" err="1" smtClean="0"/>
@@ -19719,18 +19711,18 @@
     </p:spTree>
     <p:extLst>
       <p:ext uri="{BB962C8B-B14F-4D97-AF65-F5344CB8AC3E}">
-        <p14:creationId xmlns="" xmlns:p14="http://schemas.microsoft.com/office/powerpoint/2010/main" val="2781102722"/>
+        <p14:creationId xmlns:p14="http://schemas.microsoft.com/office/powerpoint/2010/main" val="2781102722"/>
       </p:ext>
     </p:extLst>
   </p:cSld>
   <p:clrMapOvr>
     <a:masterClrMapping/>
   </p:clrMapOvr>
-  <p:transition spd="slow"/>
+  <p:transition xmlns:p14="http://schemas.microsoft.com/office/powerpoint/2010/main" spd="slow"/>
   <p:timing>
     <p:tnLst>
       <p:par>
-        <p:cTn id="1" dur="indefinite" restart="never" nodeType="tmRoot">
+        <p:cTn xmlns:p14="http://schemas.microsoft.com/office/powerpoint/2010/main" id="1" dur="indefinite" restart="never" nodeType="tmRoot">
           <p:childTnLst>
             <p:seq concurrent="1" nextAc="seek">
               <p:cTn id="2" dur="indefinite" nodeType="mainSeq">
@@ -20306,25 +20298,25 @@
     </p:spTree>
     <p:extLst>
       <p:ext uri="{BB962C8B-B14F-4D97-AF65-F5344CB8AC3E}">
-        <p14:creationId xmlns="" xmlns:p14="http://schemas.microsoft.com/office/powerpoint/2010/main" val="3452883339"/>
+        <p14:creationId xmlns:p14="http://schemas.microsoft.com/office/powerpoint/2010/main" val="3452883339"/>
       </p:ext>
     </p:extLst>
   </p:cSld>
   <p:clrMapOvr>
     <a:masterClrMapping/>
   </p:clrMapOvr>
-  <mc:AlternateContent xmlns:mc="http://schemas.openxmlformats.org/markup-compatibility/2006">
-    <mc:Choice xmlns="" xmlns:p14="http://schemas.microsoft.com/office/powerpoint/2010/main" Requires="p14">
+  <mc:AlternateContent xmlns:mc="http://schemas.openxmlformats.org/markup-compatibility/2006" xmlns:p14="http://schemas.microsoft.com/office/powerpoint/2010/main">
+    <mc:Choice Requires="p14">
       <p:transition spd="slow" p14:dur="2000"/>
     </mc:Choice>
-    <mc:Fallback>
+    <mc:Fallback xmlns="">
       <p:transition spd="slow"/>
     </mc:Fallback>
   </mc:AlternateContent>
   <p:timing>
     <p:tnLst>
       <p:par>
-        <p:cTn id="1" dur="indefinite" restart="never" nodeType="tmRoot">
+        <p:cTn xmlns:p14="http://schemas.microsoft.com/office/powerpoint/2010/main" id="1" dur="indefinite" restart="never" nodeType="tmRoot">
           <p:childTnLst>
             <p:seq concurrent="1" nextAc="seek">
               <p:cTn id="2" dur="indefinite" nodeType="mainSeq">
@@ -21065,25 +21057,25 @@
     </p:spTree>
     <p:extLst>
       <p:ext uri="{BB962C8B-B14F-4D97-AF65-F5344CB8AC3E}">
-        <p14:creationId xmlns="" xmlns:p14="http://schemas.microsoft.com/office/powerpoint/2010/main" val="1358147143"/>
+        <p14:creationId xmlns:p14="http://schemas.microsoft.com/office/powerpoint/2010/main" val="1358147143"/>
       </p:ext>
     </p:extLst>
   </p:cSld>
   <p:clrMapOvr>
     <a:masterClrMapping/>
   </p:clrMapOvr>
-  <mc:AlternateContent xmlns:mc="http://schemas.openxmlformats.org/markup-compatibility/2006">
-    <mc:Choice xmlns="" xmlns:p14="http://schemas.microsoft.com/office/powerpoint/2010/main" Requires="p14">
+  <mc:AlternateContent xmlns:mc="http://schemas.openxmlformats.org/markup-compatibility/2006" xmlns:p14="http://schemas.microsoft.com/office/powerpoint/2010/main">
+    <mc:Choice Requires="p14">
       <p:transition spd="slow" p14:dur="2000"/>
     </mc:Choice>
-    <mc:Fallback>
+    <mc:Fallback xmlns="">
       <p:transition spd="slow"/>
     </mc:Fallback>
   </mc:AlternateContent>
   <p:timing>
     <p:tnLst>
       <p:par>
-        <p:cTn id="1" dur="indefinite" restart="never" nodeType="tmRoot"/>
+        <p:cTn xmlns:p14="http://schemas.microsoft.com/office/powerpoint/2010/main" id="1" dur="indefinite" restart="never" nodeType="tmRoot"/>
       </p:par>
     </p:tnLst>
   </p:timing>
@@ -21404,25 +21396,25 @@
     </p:spTree>
     <p:extLst>
       <p:ext uri="{BB962C8B-B14F-4D97-AF65-F5344CB8AC3E}">
-        <p14:creationId xmlns="" xmlns:p14="http://schemas.microsoft.com/office/powerpoint/2010/main" val="1827848310"/>
+        <p14:creationId xmlns:p14="http://schemas.microsoft.com/office/powerpoint/2010/main" val="1827848310"/>
       </p:ext>
     </p:extLst>
   </p:cSld>
   <p:clrMapOvr>
     <a:masterClrMapping/>
   </p:clrMapOvr>
-  <mc:AlternateContent xmlns:mc="http://schemas.openxmlformats.org/markup-compatibility/2006">
-    <mc:Choice xmlns="" xmlns:p14="http://schemas.microsoft.com/office/powerpoint/2010/main" Requires="p14">
+  <mc:AlternateContent xmlns:mc="http://schemas.openxmlformats.org/markup-compatibility/2006" xmlns:p14="http://schemas.microsoft.com/office/powerpoint/2010/main">
+    <mc:Choice Requires="p14">
       <p:transition spd="slow" p14:dur="2000"/>
     </mc:Choice>
-    <mc:Fallback>
+    <mc:Fallback xmlns="">
       <p:transition spd="slow"/>
     </mc:Fallback>
   </mc:AlternateContent>
   <p:timing>
     <p:tnLst>
       <p:par>
-        <p:cTn id="1" dur="indefinite" restart="never" nodeType="tmRoot">
+        <p:cTn xmlns:p14="http://schemas.microsoft.com/office/powerpoint/2010/main" id="1" dur="indefinite" restart="never" nodeType="tmRoot">
           <p:childTnLst>
             <p:seq concurrent="1" nextAc="seek">
               <p:cTn id="2" dur="indefinite" nodeType="mainSeq">
@@ -22147,25 +22139,25 @@
     </p:spTree>
     <p:extLst>
       <p:ext uri="{BB962C8B-B14F-4D97-AF65-F5344CB8AC3E}">
-        <p14:creationId xmlns="" xmlns:p14="http://schemas.microsoft.com/office/powerpoint/2010/main" val="2616731691"/>
+        <p14:creationId xmlns:p14="http://schemas.microsoft.com/office/powerpoint/2010/main" val="2616731691"/>
       </p:ext>
     </p:extLst>
   </p:cSld>
   <p:clrMapOvr>
     <a:masterClrMapping/>
   </p:clrMapOvr>
-  <mc:AlternateContent xmlns:mc="http://schemas.openxmlformats.org/markup-compatibility/2006">
-    <mc:Choice xmlns="" xmlns:p14="http://schemas.microsoft.com/office/powerpoint/2010/main" Requires="p14">
+  <mc:AlternateContent xmlns:mc="http://schemas.openxmlformats.org/markup-compatibility/2006" xmlns:p14="http://schemas.microsoft.com/office/powerpoint/2010/main">
+    <mc:Choice Requires="p14">
       <p:transition spd="slow" p14:dur="2000"/>
     </mc:Choice>
-    <mc:Fallback>
+    <mc:Fallback xmlns="">
       <p:transition spd="slow"/>
     </mc:Fallback>
   </mc:AlternateContent>
   <p:timing>
     <p:tnLst>
       <p:par>
-        <p:cTn id="1" dur="indefinite" restart="never" nodeType="tmRoot">
+        <p:cTn xmlns:p14="http://schemas.microsoft.com/office/powerpoint/2010/main" id="1" dur="indefinite" restart="never" nodeType="tmRoot">
           <p:childTnLst>
             <p:seq concurrent="1" nextAc="seek">
               <p:cTn id="2" dur="indefinite" nodeType="mainSeq">
@@ -22421,25 +22413,25 @@
     </p:spTree>
     <p:extLst>
       <p:ext uri="{BB962C8B-B14F-4D97-AF65-F5344CB8AC3E}">
-        <p14:creationId xmlns="" xmlns:p14="http://schemas.microsoft.com/office/powerpoint/2010/main" val="2912892320"/>
+        <p14:creationId xmlns:p14="http://schemas.microsoft.com/office/powerpoint/2010/main" val="2912892320"/>
       </p:ext>
     </p:extLst>
   </p:cSld>
   <p:clrMapOvr>
     <a:masterClrMapping/>
   </p:clrMapOvr>
-  <mc:AlternateContent xmlns:mc="http://schemas.openxmlformats.org/markup-compatibility/2006">
-    <mc:Choice xmlns="" xmlns:p14="http://schemas.microsoft.com/office/powerpoint/2010/main" Requires="p14">
+  <mc:AlternateContent xmlns:mc="http://schemas.openxmlformats.org/markup-compatibility/2006" xmlns:p14="http://schemas.microsoft.com/office/powerpoint/2010/main">
+    <mc:Choice Requires="p14">
       <p:transition spd="slow" p14:dur="2000"/>
     </mc:Choice>
-    <mc:Fallback>
+    <mc:Fallback xmlns="">
       <p:transition spd="slow"/>
     </mc:Fallback>
   </mc:AlternateContent>
   <p:timing>
     <p:tnLst>
       <p:par>
-        <p:cTn id="1" dur="indefinite" restart="never" nodeType="tmRoot">
+        <p:cTn xmlns:p14="http://schemas.microsoft.com/office/powerpoint/2010/main" id="1" dur="indefinite" restart="never" nodeType="tmRoot">
           <p:childTnLst>
             <p:seq concurrent="1" nextAc="seek">
               <p:cTn id="2" dur="indefinite" nodeType="mainSeq">
@@ -22839,25 +22831,25 @@
     </p:spTree>
     <p:extLst>
       <p:ext uri="{BB962C8B-B14F-4D97-AF65-F5344CB8AC3E}">
-        <p14:creationId xmlns="" xmlns:p14="http://schemas.microsoft.com/office/powerpoint/2010/main" val="462729233"/>
+        <p14:creationId xmlns:p14="http://schemas.microsoft.com/office/powerpoint/2010/main" val="462729233"/>
       </p:ext>
     </p:extLst>
   </p:cSld>
   <p:clrMapOvr>
     <a:masterClrMapping/>
   </p:clrMapOvr>
-  <mc:AlternateContent xmlns:mc="http://schemas.openxmlformats.org/markup-compatibility/2006">
-    <mc:Choice xmlns="" xmlns:p14="http://schemas.microsoft.com/office/powerpoint/2010/main" Requires="p14">
+  <mc:AlternateContent xmlns:mc="http://schemas.openxmlformats.org/markup-compatibility/2006" xmlns:p14="http://schemas.microsoft.com/office/powerpoint/2010/main">
+    <mc:Choice Requires="p14">
       <p:transition spd="slow" p14:dur="2000"/>
     </mc:Choice>
-    <mc:Fallback>
+    <mc:Fallback xmlns="">
       <p:transition spd="slow"/>
     </mc:Fallback>
   </mc:AlternateContent>
   <p:timing>
     <p:tnLst>
       <p:par>
-        <p:cTn id="1" dur="indefinite" restart="never" nodeType="tmRoot">
+        <p:cTn xmlns:p14="http://schemas.microsoft.com/office/powerpoint/2010/main" id="1" dur="indefinite" restart="never" nodeType="tmRoot">
           <p:childTnLst>
             <p:seq concurrent="1" nextAc="seek">
               <p:cTn id="2" dur="indefinite" nodeType="mainSeq">
@@ -23469,25 +23461,25 @@
     </p:spTree>
     <p:extLst>
       <p:ext uri="{BB962C8B-B14F-4D97-AF65-F5344CB8AC3E}">
-        <p14:creationId xmlns="" xmlns:p14="http://schemas.microsoft.com/office/powerpoint/2010/main" val="1717101950"/>
+        <p14:creationId xmlns:p14="http://schemas.microsoft.com/office/powerpoint/2010/main" val="1717101950"/>
       </p:ext>
     </p:extLst>
   </p:cSld>
   <p:clrMapOvr>
     <a:masterClrMapping/>
   </p:clrMapOvr>
-  <mc:AlternateContent xmlns:mc="http://schemas.openxmlformats.org/markup-compatibility/2006">
-    <mc:Choice xmlns="" xmlns:p14="http://schemas.microsoft.com/office/powerpoint/2010/main" Requires="p14">
+  <mc:AlternateContent xmlns:mc="http://schemas.openxmlformats.org/markup-compatibility/2006" xmlns:p14="http://schemas.microsoft.com/office/powerpoint/2010/main">
+    <mc:Choice Requires="p14">
       <p:transition spd="slow" p14:dur="2000"/>
     </mc:Choice>
-    <mc:Fallback>
+    <mc:Fallback xmlns="">
       <p:transition spd="slow"/>
     </mc:Fallback>
   </mc:AlternateContent>
   <p:timing>
     <p:tnLst>
       <p:par>
-        <p:cTn id="1" dur="indefinite" restart="never" nodeType="tmRoot">
+        <p:cTn xmlns:p14="http://schemas.microsoft.com/office/powerpoint/2010/main" id="1" dur="indefinite" restart="never" nodeType="tmRoot">
           <p:childTnLst>
             <p:seq concurrent="1" nextAc="seek">
               <p:cTn id="2" dur="indefinite" nodeType="mainSeq">
@@ -23895,25 +23887,25 @@
     </p:spTree>
     <p:extLst>
       <p:ext uri="{BB962C8B-B14F-4D97-AF65-F5344CB8AC3E}">
-        <p14:creationId xmlns="" xmlns:p14="http://schemas.microsoft.com/office/powerpoint/2010/main" val="309719199"/>
+        <p14:creationId xmlns:p14="http://schemas.microsoft.com/office/powerpoint/2010/main" val="309719199"/>
       </p:ext>
     </p:extLst>
   </p:cSld>
   <p:clrMapOvr>
     <a:masterClrMapping/>
   </p:clrMapOvr>
-  <mc:AlternateContent xmlns:mc="http://schemas.openxmlformats.org/markup-compatibility/2006">
-    <mc:Choice xmlns="" xmlns:p14="http://schemas.microsoft.com/office/powerpoint/2010/main" Requires="p14">
+  <mc:AlternateContent xmlns:mc="http://schemas.openxmlformats.org/markup-compatibility/2006" xmlns:p14="http://schemas.microsoft.com/office/powerpoint/2010/main">
+    <mc:Choice Requires="p14">
       <p:transition spd="slow" p14:dur="2000"/>
     </mc:Choice>
-    <mc:Fallback>
+    <mc:Fallback xmlns="">
       <p:transition spd="slow"/>
     </mc:Fallback>
   </mc:AlternateContent>
   <p:timing>
     <p:tnLst>
       <p:par>
-        <p:cTn id="1" dur="indefinite" restart="never" nodeType="tmRoot">
+        <p:cTn xmlns:p14="http://schemas.microsoft.com/office/powerpoint/2010/main" id="1" dur="indefinite" restart="never" nodeType="tmRoot">
           <p:childTnLst>
             <p:seq concurrent="1" nextAc="seek">
               <p:cTn id="2" dur="indefinite" nodeType="mainSeq">
@@ -24455,25 +24447,25 @@
     </p:spTree>
     <p:extLst>
       <p:ext uri="{BB962C8B-B14F-4D97-AF65-F5344CB8AC3E}">
-        <p14:creationId xmlns="" xmlns:p14="http://schemas.microsoft.com/office/powerpoint/2010/main" val="955904447"/>
+        <p14:creationId xmlns:p14="http://schemas.microsoft.com/office/powerpoint/2010/main" val="955904447"/>
       </p:ext>
     </p:extLst>
   </p:cSld>
   <p:clrMapOvr>
     <a:masterClrMapping/>
   </p:clrMapOvr>
-  <mc:AlternateContent xmlns:mc="http://schemas.openxmlformats.org/markup-compatibility/2006">
-    <mc:Choice xmlns="" xmlns:p14="http://schemas.microsoft.com/office/powerpoint/2010/main" Requires="p14">
+  <mc:AlternateContent xmlns:mc="http://schemas.openxmlformats.org/markup-compatibility/2006" xmlns:p14="http://schemas.microsoft.com/office/powerpoint/2010/main">
+    <mc:Choice Requires="p14">
       <p:transition spd="slow" p14:dur="2000"/>
     </mc:Choice>
-    <mc:Fallback>
+    <mc:Fallback xmlns="">
       <p:transition spd="slow"/>
     </mc:Fallback>
   </mc:AlternateContent>
   <p:timing>
     <p:tnLst>
       <p:par>
-        <p:cTn id="1" dur="indefinite" restart="never" nodeType="tmRoot">
+        <p:cTn xmlns:p14="http://schemas.microsoft.com/office/powerpoint/2010/main" id="1" dur="indefinite" restart="never" nodeType="tmRoot">
           <p:childTnLst>
             <p:seq concurrent="1" nextAc="seek">
               <p:cTn id="2" dur="indefinite" nodeType="mainSeq">
@@ -25076,25 +25068,25 @@
     </p:spTree>
     <p:extLst>
       <p:ext uri="{BB962C8B-B14F-4D97-AF65-F5344CB8AC3E}">
-        <p14:creationId xmlns="" xmlns:p14="http://schemas.microsoft.com/office/powerpoint/2010/main" val="1140837011"/>
+        <p14:creationId xmlns:p14="http://schemas.microsoft.com/office/powerpoint/2010/main" val="1140837011"/>
       </p:ext>
     </p:extLst>
   </p:cSld>
   <p:clrMapOvr>
     <a:masterClrMapping/>
   </p:clrMapOvr>
-  <mc:AlternateContent xmlns:mc="http://schemas.openxmlformats.org/markup-compatibility/2006">
-    <mc:Choice xmlns="" xmlns:p14="http://schemas.microsoft.com/office/powerpoint/2010/main" Requires="p14">
+  <mc:AlternateContent xmlns:mc="http://schemas.openxmlformats.org/markup-compatibility/2006" xmlns:p14="http://schemas.microsoft.com/office/powerpoint/2010/main">
+    <mc:Choice Requires="p14">
       <p:transition spd="slow" p14:dur="2000"/>
     </mc:Choice>
-    <mc:Fallback>
+    <mc:Fallback xmlns="">
       <p:transition spd="slow"/>
     </mc:Fallback>
   </mc:AlternateContent>
   <p:timing>
     <p:tnLst>
       <p:par>
-        <p:cTn id="1" dur="indefinite" restart="never" nodeType="tmRoot">
+        <p:cTn xmlns:p14="http://schemas.microsoft.com/office/powerpoint/2010/main" id="1" dur="indefinite" restart="never" nodeType="tmRoot">
           <p:childTnLst>
             <p:seq concurrent="1" nextAc="seek">
               <p:cTn id="2" dur="indefinite" nodeType="mainSeq">
@@ -25668,25 +25660,25 @@
     </p:spTree>
     <p:extLst>
       <p:ext uri="{BB962C8B-B14F-4D97-AF65-F5344CB8AC3E}">
-        <p14:creationId xmlns="" xmlns:p14="http://schemas.microsoft.com/office/powerpoint/2010/main" val="247747513"/>
+        <p14:creationId xmlns:p14="http://schemas.microsoft.com/office/powerpoint/2010/main" val="247747513"/>
       </p:ext>
     </p:extLst>
   </p:cSld>
   <p:clrMapOvr>
     <a:masterClrMapping/>
   </p:clrMapOvr>
-  <mc:AlternateContent xmlns:mc="http://schemas.openxmlformats.org/markup-compatibility/2006">
-    <mc:Choice xmlns="" xmlns:p14="http://schemas.microsoft.com/office/powerpoint/2010/main" Requires="p14">
+  <mc:AlternateContent xmlns:mc="http://schemas.openxmlformats.org/markup-compatibility/2006" xmlns:p14="http://schemas.microsoft.com/office/powerpoint/2010/main">
+    <mc:Choice Requires="p14">
       <p:transition spd="slow" p14:dur="2000"/>
     </mc:Choice>
-    <mc:Fallback>
+    <mc:Fallback xmlns="">
       <p:transition spd="slow"/>
     </mc:Fallback>
   </mc:AlternateContent>
   <p:timing>
     <p:tnLst>
       <p:par>
-        <p:cTn id="1" dur="indefinite" restart="never" nodeType="tmRoot">
+        <p:cTn xmlns:p14="http://schemas.microsoft.com/office/powerpoint/2010/main" id="1" dur="indefinite" restart="never" nodeType="tmRoot">
           <p:childTnLst>
             <p:seq concurrent="1" nextAc="seek">
               <p:cTn id="2" dur="indefinite" nodeType="mainSeq">
@@ -26366,25 +26358,25 @@
     </p:spTree>
     <p:extLst>
       <p:ext uri="{BB962C8B-B14F-4D97-AF65-F5344CB8AC3E}">
-        <p14:creationId xmlns="" xmlns:p14="http://schemas.microsoft.com/office/powerpoint/2010/main" val="1776831606"/>
+        <p14:creationId xmlns:p14="http://schemas.microsoft.com/office/powerpoint/2010/main" val="1776831606"/>
       </p:ext>
     </p:extLst>
   </p:cSld>
   <p:clrMapOvr>
     <a:masterClrMapping/>
   </p:clrMapOvr>
-  <mc:AlternateContent xmlns:mc="http://schemas.openxmlformats.org/markup-compatibility/2006">
-    <mc:Choice xmlns="" xmlns:p14="http://schemas.microsoft.com/office/powerpoint/2010/main" Requires="p14">
+  <mc:AlternateContent xmlns:mc="http://schemas.openxmlformats.org/markup-compatibility/2006" xmlns:p14="http://schemas.microsoft.com/office/powerpoint/2010/main">
+    <mc:Choice Requires="p14">
       <p:transition spd="slow" p14:dur="2000"/>
     </mc:Choice>
-    <mc:Fallback>
+    <mc:Fallback xmlns="">
       <p:transition spd="slow"/>
     </mc:Fallback>
   </mc:AlternateContent>
   <p:timing>
     <p:tnLst>
       <p:par>
-        <p:cTn id="1" dur="indefinite" restart="never" nodeType="tmRoot">
+        <p:cTn xmlns:p14="http://schemas.microsoft.com/office/powerpoint/2010/main" id="1" dur="indefinite" restart="never" nodeType="tmRoot">
           <p:childTnLst>
             <p:seq concurrent="1" nextAc="seek">
               <p:cTn id="2" dur="indefinite" nodeType="mainSeq">
@@ -27029,25 +27021,25 @@
     </p:spTree>
     <p:extLst>
       <p:ext uri="{BB962C8B-B14F-4D97-AF65-F5344CB8AC3E}">
-        <p14:creationId xmlns="" xmlns:p14="http://schemas.microsoft.com/office/powerpoint/2010/main" val="396334508"/>
+        <p14:creationId xmlns:p14="http://schemas.microsoft.com/office/powerpoint/2010/main" val="396334508"/>
       </p:ext>
     </p:extLst>
   </p:cSld>
   <p:clrMapOvr>
     <a:masterClrMapping/>
   </p:clrMapOvr>
-  <mc:AlternateContent xmlns:mc="http://schemas.openxmlformats.org/markup-compatibility/2006">
-    <mc:Choice xmlns="" xmlns:p14="http://schemas.microsoft.com/office/powerpoint/2010/main" Requires="p14">
+  <mc:AlternateContent xmlns:mc="http://schemas.openxmlformats.org/markup-compatibility/2006" xmlns:p14="http://schemas.microsoft.com/office/powerpoint/2010/main">
+    <mc:Choice Requires="p14">
       <p:transition spd="slow" p14:dur="2000"/>
     </mc:Choice>
-    <mc:Fallback>
+    <mc:Fallback xmlns="">
       <p:transition spd="slow"/>
     </mc:Fallback>
   </mc:AlternateContent>
   <p:timing>
     <p:tnLst>
       <p:par>
-        <p:cTn id="1" dur="indefinite" restart="never" nodeType="tmRoot"/>
+        <p:cTn xmlns:p14="http://schemas.microsoft.com/office/powerpoint/2010/main" id="1" dur="indefinite" restart="never" nodeType="tmRoot"/>
       </p:par>
     </p:tnLst>
   </p:timing>
@@ -27083,7 +27075,7 @@
           <a:blip r:embed="rId2">
             <a:extLst>
               <a:ext uri="{28A0092B-C50C-407E-A947-70E740481C1C}">
-                <a14:useLocalDpi xmlns="" xmlns:a14="http://schemas.microsoft.com/office/drawing/2010/main" val="0"/>
+                <a14:useLocalDpi xmlns:a14="http://schemas.microsoft.com/office/drawing/2010/main" val="0"/>
               </a:ext>
             </a:extLst>
           </a:blip>
@@ -27103,7 +27095,7 @@
           <a:noFill/>
           <a:extLst>
             <a:ext uri="{909E8E84-426E-40dd-AFC4-6F175D3DCCD1}">
-              <a14:hiddenFill xmlns="" xmlns:a14="http://schemas.microsoft.com/office/drawing/2010/main">
+              <a14:hiddenFill xmlns:a14="http://schemas.microsoft.com/office/drawing/2010/main">
                 <a:solidFill>
                   <a:srgbClr val="FFFFFF"/>
                 </a:solidFill>
@@ -27186,25 +27178,25 @@
     </p:spTree>
     <p:extLst>
       <p:ext uri="{BB962C8B-B14F-4D97-AF65-F5344CB8AC3E}">
-        <p14:creationId xmlns="" xmlns:p14="http://schemas.microsoft.com/office/powerpoint/2010/main" val="2717568001"/>
+        <p14:creationId xmlns:p14="http://schemas.microsoft.com/office/powerpoint/2010/main" val="2717568001"/>
       </p:ext>
     </p:extLst>
   </p:cSld>
   <p:clrMapOvr>
     <a:masterClrMapping/>
   </p:clrMapOvr>
-  <mc:AlternateContent xmlns:mc="http://schemas.openxmlformats.org/markup-compatibility/2006">
-    <mc:Choice xmlns="" xmlns:p14="http://schemas.microsoft.com/office/powerpoint/2010/main" Requires="p14">
+  <mc:AlternateContent xmlns:mc="http://schemas.openxmlformats.org/markup-compatibility/2006" xmlns:p14="http://schemas.microsoft.com/office/powerpoint/2010/main">
+    <mc:Choice Requires="p14">
       <p:transition spd="slow" p14:dur="2000"/>
     </mc:Choice>
-    <mc:Fallback>
+    <mc:Fallback xmlns="">
       <p:transition spd="slow"/>
     </mc:Fallback>
   </mc:AlternateContent>
   <p:timing>
     <p:tnLst>
       <p:par>
-        <p:cTn id="1" dur="indefinite" restart="never" nodeType="tmRoot"/>
+        <p:cTn xmlns:p14="http://schemas.microsoft.com/office/powerpoint/2010/main" id="1" dur="indefinite" restart="never" nodeType="tmRoot"/>
       </p:par>
     </p:tnLst>
   </p:timing>
@@ -27489,25 +27481,25 @@
     </p:spTree>
     <p:extLst>
       <p:ext uri="{BB962C8B-B14F-4D97-AF65-F5344CB8AC3E}">
-        <p14:creationId xmlns="" xmlns:p14="http://schemas.microsoft.com/office/powerpoint/2010/main" val="3266999169"/>
+        <p14:creationId xmlns:p14="http://schemas.microsoft.com/office/powerpoint/2010/main" val="3266999169"/>
       </p:ext>
     </p:extLst>
   </p:cSld>
   <p:clrMapOvr>
     <a:masterClrMapping/>
   </p:clrMapOvr>
-  <mc:AlternateContent xmlns:mc="http://schemas.openxmlformats.org/markup-compatibility/2006">
-    <mc:Choice xmlns="" xmlns:p14="http://schemas.microsoft.com/office/powerpoint/2010/main" Requires="p14">
+  <mc:AlternateContent xmlns:mc="http://schemas.openxmlformats.org/markup-compatibility/2006" xmlns:p14="http://schemas.microsoft.com/office/powerpoint/2010/main">
+    <mc:Choice Requires="p14">
       <p:transition spd="slow" p14:dur="2000"/>
     </mc:Choice>
-    <mc:Fallback>
+    <mc:Fallback xmlns="">
       <p:transition spd="slow"/>
     </mc:Fallback>
   </mc:AlternateContent>
   <p:timing>
     <p:tnLst>
       <p:par>
-        <p:cTn id="1" dur="indefinite" restart="never" nodeType="tmRoot"/>
+        <p:cTn xmlns:p14="http://schemas.microsoft.com/office/powerpoint/2010/main" id="1" dur="indefinite" restart="never" nodeType="tmRoot"/>
       </p:par>
     </p:tnLst>
   </p:timing>
@@ -27842,25 +27834,25 @@
     </p:spTree>
     <p:extLst>
       <p:ext uri="{BB962C8B-B14F-4D97-AF65-F5344CB8AC3E}">
-        <p14:creationId xmlns="" xmlns:p14="http://schemas.microsoft.com/office/powerpoint/2010/main" val="1737882227"/>
+        <p14:creationId xmlns:p14="http://schemas.microsoft.com/office/powerpoint/2010/main" val="1737882227"/>
       </p:ext>
     </p:extLst>
   </p:cSld>
   <p:clrMapOvr>
     <a:masterClrMapping/>
   </p:clrMapOvr>
-  <mc:AlternateContent xmlns:mc="http://schemas.openxmlformats.org/markup-compatibility/2006">
-    <mc:Choice xmlns="" xmlns:p14="http://schemas.microsoft.com/office/powerpoint/2010/main" Requires="p14">
+  <mc:AlternateContent xmlns:mc="http://schemas.openxmlformats.org/markup-compatibility/2006" xmlns:p14="http://schemas.microsoft.com/office/powerpoint/2010/main">
+    <mc:Choice Requires="p14">
       <p:transition spd="slow" p14:dur="2000"/>
     </mc:Choice>
-    <mc:Fallback>
+    <mc:Fallback xmlns="">
       <p:transition spd="slow"/>
     </mc:Fallback>
   </mc:AlternateContent>
   <p:timing>
     <p:tnLst>
       <p:par>
-        <p:cTn id="1" dur="indefinite" restart="never" nodeType="tmRoot"/>
+        <p:cTn xmlns:p14="http://schemas.microsoft.com/office/powerpoint/2010/main" id="1" dur="indefinite" restart="never" nodeType="tmRoot"/>
       </p:par>
     </p:tnLst>
   </p:timing>
@@ -28208,25 +28200,25 @@
     </p:spTree>
     <p:extLst>
       <p:ext uri="{BB962C8B-B14F-4D97-AF65-F5344CB8AC3E}">
-        <p14:creationId xmlns="" xmlns:p14="http://schemas.microsoft.com/office/powerpoint/2010/main" val="3034068148"/>
+        <p14:creationId xmlns:p14="http://schemas.microsoft.com/office/powerpoint/2010/main" val="3034068148"/>
       </p:ext>
     </p:extLst>
   </p:cSld>
   <p:clrMapOvr>
     <a:masterClrMapping/>
   </p:clrMapOvr>
-  <mc:AlternateContent xmlns:mc="http://schemas.openxmlformats.org/markup-compatibility/2006">
-    <mc:Choice xmlns="" xmlns:p14="http://schemas.microsoft.com/office/powerpoint/2010/main" Requires="p14">
+  <mc:AlternateContent xmlns:mc="http://schemas.openxmlformats.org/markup-compatibility/2006" xmlns:p14="http://schemas.microsoft.com/office/powerpoint/2010/main">
+    <mc:Choice Requires="p14">
       <p:transition spd="slow" p14:dur="2000"/>
     </mc:Choice>
-    <mc:Fallback>
+    <mc:Fallback xmlns="">
       <p:transition spd="slow"/>
     </mc:Fallback>
   </mc:AlternateContent>
   <p:timing>
     <p:tnLst>
       <p:par>
-        <p:cTn id="1" dur="indefinite" restart="never" nodeType="tmRoot"/>
+        <p:cTn xmlns:p14="http://schemas.microsoft.com/office/powerpoint/2010/main" id="1" dur="indefinite" restart="never" nodeType="tmRoot"/>
       </p:par>
     </p:tnLst>
   </p:timing>
@@ -28546,25 +28538,25 @@
     </p:spTree>
     <p:extLst>
       <p:ext uri="{BB962C8B-B14F-4D97-AF65-F5344CB8AC3E}">
-        <p14:creationId xmlns="" xmlns:p14="http://schemas.microsoft.com/office/powerpoint/2010/main" val="3646886653"/>
+        <p14:creationId xmlns:p14="http://schemas.microsoft.com/office/powerpoint/2010/main" val="3646886653"/>
       </p:ext>
     </p:extLst>
   </p:cSld>
   <p:clrMapOvr>
     <a:masterClrMapping/>
   </p:clrMapOvr>
-  <mc:AlternateContent xmlns:mc="http://schemas.openxmlformats.org/markup-compatibility/2006">
-    <mc:Choice xmlns="" xmlns:p14="http://schemas.microsoft.com/office/powerpoint/2010/main" Requires="p14">
+  <mc:AlternateContent xmlns:mc="http://schemas.openxmlformats.org/markup-compatibility/2006" xmlns:p14="http://schemas.microsoft.com/office/powerpoint/2010/main">
+    <mc:Choice Requires="p14">
       <p:transition spd="slow" p14:dur="2000"/>
     </mc:Choice>
-    <mc:Fallback>
+    <mc:Fallback xmlns="">
       <p:transition spd="slow"/>
     </mc:Fallback>
   </mc:AlternateContent>
   <p:timing>
     <p:tnLst>
       <p:par>
-        <p:cTn id="1" dur="indefinite" restart="never" nodeType="tmRoot"/>
+        <p:cTn xmlns:p14="http://schemas.microsoft.com/office/powerpoint/2010/main" id="1" dur="indefinite" restart="never" nodeType="tmRoot"/>
       </p:par>
     </p:tnLst>
   </p:timing>
@@ -28596,8 +28588,8 @@
         </p:nvSpPr>
         <p:spPr>
           <a:xfrm>
-            <a:off x="3058022" y="476672"/>
-            <a:ext cx="3342903" cy="1538883"/>
+            <a:off x="3177606" y="476672"/>
+            <a:ext cx="3103734" cy="1538883"/>
           </a:xfrm>
           <a:prstGeom prst="rect">
             <a:avLst/>
@@ -28612,10 +28604,10 @@
           <a:p>
             <a:pPr algn="ctr"/>
             <a:r>
-              <a:rPr lang="it-IT" sz="4800" b="1" dirty="0" err="1" smtClean="0">
+              <a:rPr lang="it-IT" sz="4800" b="1" dirty="0" smtClean="0">
                 <a:latin typeface="+mj-lt"/>
               </a:rPr>
-              <a:t>Applications</a:t>
+              <a:t>Application</a:t>
             </a:r>
             <a:endParaRPr lang="it-IT" sz="4800" b="1" dirty="0" smtClean="0">
               <a:latin typeface="+mj-lt"/>
@@ -28932,25 +28924,25 @@
     </p:spTree>
     <p:extLst>
       <p:ext uri="{BB962C8B-B14F-4D97-AF65-F5344CB8AC3E}">
-        <p14:creationId xmlns="" xmlns:p14="http://schemas.microsoft.com/office/powerpoint/2010/main" val="520298717"/>
+        <p14:creationId xmlns:p14="http://schemas.microsoft.com/office/powerpoint/2010/main" val="520298717"/>
       </p:ext>
     </p:extLst>
   </p:cSld>
   <p:clrMapOvr>
     <a:masterClrMapping/>
   </p:clrMapOvr>
-  <mc:AlternateContent xmlns:mc="http://schemas.openxmlformats.org/markup-compatibility/2006">
-    <mc:Choice xmlns="" xmlns:p14="http://schemas.microsoft.com/office/powerpoint/2010/main" Requires="p14">
+  <mc:AlternateContent xmlns:mc="http://schemas.openxmlformats.org/markup-compatibility/2006" xmlns:p14="http://schemas.microsoft.com/office/powerpoint/2010/main">
+    <mc:Choice Requires="p14">
       <p:transition spd="slow" p14:dur="2000"/>
     </mc:Choice>
-    <mc:Fallback>
+    <mc:Fallback xmlns="">
       <p:transition spd="slow"/>
     </mc:Fallback>
   </mc:AlternateContent>
   <p:timing>
     <p:tnLst>
       <p:par>
-        <p:cTn id="1" dur="indefinite" restart="never" nodeType="tmRoot"/>
+        <p:cTn xmlns:p14="http://schemas.microsoft.com/office/powerpoint/2010/main" id="1" dur="indefinite" restart="never" nodeType="tmRoot"/>
       </p:par>
     </p:tnLst>
   </p:timing>
@@ -29242,25 +29234,25 @@
     </p:spTree>
     <p:extLst>
       <p:ext uri="{BB962C8B-B14F-4D97-AF65-F5344CB8AC3E}">
-        <p14:creationId xmlns="" xmlns:p14="http://schemas.microsoft.com/office/powerpoint/2010/main" val="2203748189"/>
+        <p14:creationId xmlns:p14="http://schemas.microsoft.com/office/powerpoint/2010/main" val="2203748189"/>
       </p:ext>
     </p:extLst>
   </p:cSld>
   <p:clrMapOvr>
     <a:masterClrMapping/>
   </p:clrMapOvr>
-  <mc:AlternateContent xmlns:mc="http://schemas.openxmlformats.org/markup-compatibility/2006">
-    <mc:Choice xmlns="" xmlns:p14="http://schemas.microsoft.com/office/powerpoint/2010/main" Requires="p14">
+  <mc:AlternateContent xmlns:mc="http://schemas.openxmlformats.org/markup-compatibility/2006" xmlns:p14="http://schemas.microsoft.com/office/powerpoint/2010/main">
+    <mc:Choice Requires="p14">
       <p:transition spd="slow" p14:dur="2000"/>
     </mc:Choice>
-    <mc:Fallback>
+    <mc:Fallback xmlns="">
       <p:transition spd="slow"/>
     </mc:Fallback>
   </mc:AlternateContent>
   <p:timing>
     <p:tnLst>
       <p:par>
-        <p:cTn id="1" dur="indefinite" restart="never" nodeType="tmRoot"/>
+        <p:cTn xmlns:p14="http://schemas.microsoft.com/office/powerpoint/2010/main" id="1" dur="indefinite" restart="never" nodeType="tmRoot"/>
       </p:par>
     </p:tnLst>
   </p:timing>
@@ -29292,8 +29284,8 @@
         </p:nvSpPr>
         <p:spPr>
           <a:xfrm>
-            <a:off x="3058022" y="476672"/>
-            <a:ext cx="3342903" cy="1538883"/>
+            <a:off x="3177606" y="476672"/>
+            <a:ext cx="3103734" cy="1538883"/>
           </a:xfrm>
           <a:prstGeom prst="rect">
             <a:avLst/>
@@ -29308,10 +29300,10 @@
           <a:p>
             <a:pPr algn="ctr"/>
             <a:r>
-              <a:rPr lang="it-IT" sz="4800" b="1" dirty="0" err="1" smtClean="0">
+              <a:rPr lang="it-IT" sz="4800" b="1" dirty="0" smtClean="0">
                 <a:latin typeface="+mj-lt"/>
               </a:rPr>
-              <a:t>Applications</a:t>
+              <a:t>Application</a:t>
             </a:r>
             <a:endParaRPr lang="it-IT" sz="4800" b="1" dirty="0" smtClean="0">
               <a:latin typeface="+mj-lt"/>
@@ -29576,25 +29568,25 @@
     </p:spTree>
     <p:extLst>
       <p:ext uri="{BB962C8B-B14F-4D97-AF65-F5344CB8AC3E}">
-        <p14:creationId xmlns="" xmlns:p14="http://schemas.microsoft.com/office/powerpoint/2010/main" val="1130254901"/>
+        <p14:creationId xmlns:p14="http://schemas.microsoft.com/office/powerpoint/2010/main" val="1130254901"/>
       </p:ext>
     </p:extLst>
   </p:cSld>
   <p:clrMapOvr>
     <a:masterClrMapping/>
   </p:clrMapOvr>
-  <mc:AlternateContent xmlns:mc="http://schemas.openxmlformats.org/markup-compatibility/2006">
-    <mc:Choice xmlns="" xmlns:p14="http://schemas.microsoft.com/office/powerpoint/2010/main" Requires="p14">
+  <mc:AlternateContent xmlns:mc="http://schemas.openxmlformats.org/markup-compatibility/2006" xmlns:p14="http://schemas.microsoft.com/office/powerpoint/2010/main">
+    <mc:Choice Requires="p14">
       <p:transition spd="slow" p14:dur="2000"/>
     </mc:Choice>
-    <mc:Fallback>
+    <mc:Fallback xmlns="">
       <p:transition spd="slow"/>
     </mc:Fallback>
   </mc:AlternateContent>
   <p:timing>
     <p:tnLst>
       <p:par>
-        <p:cTn id="1" dur="indefinite" restart="never" nodeType="tmRoot"/>
+        <p:cTn xmlns:p14="http://schemas.microsoft.com/office/powerpoint/2010/main" id="1" dur="indefinite" restart="never" nodeType="tmRoot"/>
       </p:par>
     </p:tnLst>
   </p:timing>
@@ -29922,25 +29914,25 @@
     </p:spTree>
     <p:extLst>
       <p:ext uri="{BB962C8B-B14F-4D97-AF65-F5344CB8AC3E}">
-        <p14:creationId xmlns="" xmlns:p14="http://schemas.microsoft.com/office/powerpoint/2010/main" val="3734576715"/>
+        <p14:creationId xmlns:p14="http://schemas.microsoft.com/office/powerpoint/2010/main" val="3734576715"/>
       </p:ext>
     </p:extLst>
   </p:cSld>
   <p:clrMapOvr>
     <a:masterClrMapping/>
   </p:clrMapOvr>
-  <mc:AlternateContent xmlns:mc="http://schemas.openxmlformats.org/markup-compatibility/2006">
-    <mc:Choice xmlns="" xmlns:p14="http://schemas.microsoft.com/office/powerpoint/2010/main" Requires="p14">
+  <mc:AlternateContent xmlns:mc="http://schemas.openxmlformats.org/markup-compatibility/2006" xmlns:p14="http://schemas.microsoft.com/office/powerpoint/2010/main">
+    <mc:Choice Requires="p14">
       <p:transition spd="slow" p14:dur="2000"/>
     </mc:Choice>
-    <mc:Fallback>
+    <mc:Fallback xmlns="">
       <p:transition spd="slow"/>
     </mc:Fallback>
   </mc:AlternateContent>
   <p:timing>
     <p:tnLst>
       <p:par>
-        <p:cTn id="1" dur="indefinite" restart="never" nodeType="tmRoot"/>
+        <p:cTn xmlns:p14="http://schemas.microsoft.com/office/powerpoint/2010/main" id="1" dur="indefinite" restart="never" nodeType="tmRoot"/>
       </p:par>
     </p:tnLst>
   </p:timing>
@@ -30235,25 +30227,25 @@
     </p:spTree>
     <p:extLst>
       <p:ext uri="{BB962C8B-B14F-4D97-AF65-F5344CB8AC3E}">
-        <p14:creationId xmlns="" xmlns:p14="http://schemas.microsoft.com/office/powerpoint/2010/main" val="2632131054"/>
+        <p14:creationId xmlns:p14="http://schemas.microsoft.com/office/powerpoint/2010/main" val="2632131054"/>
       </p:ext>
     </p:extLst>
   </p:cSld>
   <p:clrMapOvr>
     <a:masterClrMapping/>
   </p:clrMapOvr>
-  <mc:AlternateContent xmlns:mc="http://schemas.openxmlformats.org/markup-compatibility/2006">
-    <mc:Choice xmlns="" xmlns:p14="http://schemas.microsoft.com/office/powerpoint/2010/main" Requires="p14">
+  <mc:AlternateContent xmlns:mc="http://schemas.openxmlformats.org/markup-compatibility/2006" xmlns:p14="http://schemas.microsoft.com/office/powerpoint/2010/main">
+    <mc:Choice Requires="p14">
       <p:transition spd="slow" p14:dur="2000"/>
     </mc:Choice>
-    <mc:Fallback>
+    <mc:Fallback xmlns="">
       <p:transition spd="slow"/>
     </mc:Fallback>
   </mc:AlternateContent>
   <p:timing>
     <p:tnLst>
       <p:par>
-        <p:cTn id="1" dur="indefinite" restart="never" nodeType="tmRoot"/>
+        <p:cTn xmlns:p14="http://schemas.microsoft.com/office/powerpoint/2010/main" id="1" dur="indefinite" restart="never" nodeType="tmRoot"/>
       </p:par>
     </p:tnLst>
   </p:timing>
@@ -30604,25 +30596,25 @@
     </p:spTree>
     <p:extLst>
       <p:ext uri="{BB962C8B-B14F-4D97-AF65-F5344CB8AC3E}">
-        <p14:creationId xmlns="" xmlns:p14="http://schemas.microsoft.com/office/powerpoint/2010/main" val="3678400164"/>
+        <p14:creationId xmlns:p14="http://schemas.microsoft.com/office/powerpoint/2010/main" val="3678400164"/>
       </p:ext>
     </p:extLst>
   </p:cSld>
   <p:clrMapOvr>
     <a:masterClrMapping/>
   </p:clrMapOvr>
-  <mc:AlternateContent xmlns:mc="http://schemas.openxmlformats.org/markup-compatibility/2006">
-    <mc:Choice xmlns="" xmlns:p14="http://schemas.microsoft.com/office/powerpoint/2010/main" Requires="p14">
+  <mc:AlternateContent xmlns:mc="http://schemas.openxmlformats.org/markup-compatibility/2006" xmlns:p14="http://schemas.microsoft.com/office/powerpoint/2010/main">
+    <mc:Choice Requires="p14">
       <p:transition spd="slow" p14:dur="2000"/>
     </mc:Choice>
-    <mc:Fallback>
+    <mc:Fallback xmlns="">
       <p:transition spd="slow"/>
     </mc:Fallback>
   </mc:AlternateContent>
   <p:timing>
     <p:tnLst>
       <p:par>
-        <p:cTn id="1" dur="indefinite" restart="never" nodeType="tmRoot"/>
+        <p:cTn xmlns:p14="http://schemas.microsoft.com/office/powerpoint/2010/main" id="1" dur="indefinite" restart="never" nodeType="tmRoot"/>
       </p:par>
     </p:tnLst>
   </p:timing>
@@ -30933,25 +30925,25 @@
     </p:spTree>
     <p:extLst>
       <p:ext uri="{BB962C8B-B14F-4D97-AF65-F5344CB8AC3E}">
-        <p14:creationId xmlns="" xmlns:p14="http://schemas.microsoft.com/office/powerpoint/2010/main" val="2983282113"/>
+        <p14:creationId xmlns:p14="http://schemas.microsoft.com/office/powerpoint/2010/main" val="2983282113"/>
       </p:ext>
     </p:extLst>
   </p:cSld>
   <p:clrMapOvr>
     <a:masterClrMapping/>
   </p:clrMapOvr>
-  <mc:AlternateContent xmlns:mc="http://schemas.openxmlformats.org/markup-compatibility/2006">
-    <mc:Choice xmlns="" xmlns:p14="http://schemas.microsoft.com/office/powerpoint/2010/main" Requires="p14">
+  <mc:AlternateContent xmlns:mc="http://schemas.openxmlformats.org/markup-compatibility/2006" xmlns:p14="http://schemas.microsoft.com/office/powerpoint/2010/main">
+    <mc:Choice Requires="p14">
       <p:transition spd="slow" p14:dur="2000"/>
     </mc:Choice>
-    <mc:Fallback>
+    <mc:Fallback xmlns="">
       <p:transition spd="slow"/>
     </mc:Fallback>
   </mc:AlternateContent>
   <p:timing>
     <p:tnLst>
       <p:par>
-        <p:cTn id="1" dur="indefinite" restart="never" nodeType="tmRoot"/>
+        <p:cTn xmlns:p14="http://schemas.microsoft.com/office/powerpoint/2010/main" id="1" dur="indefinite" restart="never" nodeType="tmRoot"/>
       </p:par>
     </p:tnLst>
   </p:timing>
@@ -31308,25 +31300,25 @@
     </p:spTree>
     <p:extLst>
       <p:ext uri="{BB962C8B-B14F-4D97-AF65-F5344CB8AC3E}">
-        <p14:creationId xmlns="" xmlns:p14="http://schemas.microsoft.com/office/powerpoint/2010/main" val="4266361740"/>
+        <p14:creationId xmlns:p14="http://schemas.microsoft.com/office/powerpoint/2010/main" val="4266361740"/>
       </p:ext>
     </p:extLst>
   </p:cSld>
   <p:clrMapOvr>
     <a:masterClrMapping/>
   </p:clrMapOvr>
-  <mc:AlternateContent xmlns:mc="http://schemas.openxmlformats.org/markup-compatibility/2006">
-    <mc:Choice xmlns="" xmlns:p14="http://schemas.microsoft.com/office/powerpoint/2010/main" Requires="p14">
+  <mc:AlternateContent xmlns:mc="http://schemas.openxmlformats.org/markup-compatibility/2006" xmlns:p14="http://schemas.microsoft.com/office/powerpoint/2010/main">
+    <mc:Choice Requires="p14">
       <p:transition spd="slow" p14:dur="2000"/>
     </mc:Choice>
-    <mc:Fallback>
+    <mc:Fallback xmlns="">
       <p:transition spd="slow"/>
     </mc:Fallback>
   </mc:AlternateContent>
   <p:timing>
     <p:tnLst>
       <p:par>
-        <p:cTn id="1" dur="indefinite" restart="never" nodeType="tmRoot"/>
+        <p:cTn xmlns:p14="http://schemas.microsoft.com/office/powerpoint/2010/main" id="1" dur="indefinite" restart="never" nodeType="tmRoot"/>
       </p:par>
     </p:tnLst>
   </p:timing>
@@ -31646,25 +31638,25 @@
     </p:spTree>
     <p:extLst>
       <p:ext uri="{BB962C8B-B14F-4D97-AF65-F5344CB8AC3E}">
-        <p14:creationId xmlns="" xmlns:p14="http://schemas.microsoft.com/office/powerpoint/2010/main" val="3326293041"/>
+        <p14:creationId xmlns:p14="http://schemas.microsoft.com/office/powerpoint/2010/main" val="3326293041"/>
       </p:ext>
     </p:extLst>
   </p:cSld>
   <p:clrMapOvr>
     <a:masterClrMapping/>
   </p:clrMapOvr>
-  <mc:AlternateContent xmlns:mc="http://schemas.openxmlformats.org/markup-compatibility/2006">
-    <mc:Choice xmlns="" xmlns:p14="http://schemas.microsoft.com/office/powerpoint/2010/main" Requires="p14">
+  <mc:AlternateContent xmlns:mc="http://schemas.openxmlformats.org/markup-compatibility/2006" xmlns:p14="http://schemas.microsoft.com/office/powerpoint/2010/main">
+    <mc:Choice Requires="p14">
       <p:transition spd="slow" p14:dur="2000"/>
     </mc:Choice>
-    <mc:Fallback>
+    <mc:Fallback xmlns="">
       <p:transition spd="slow"/>
     </mc:Fallback>
   </mc:AlternateContent>
   <p:timing>
     <p:tnLst>
       <p:par>
-        <p:cTn id="1" dur="indefinite" restart="never" nodeType="tmRoot"/>
+        <p:cTn xmlns:p14="http://schemas.microsoft.com/office/powerpoint/2010/main" id="1" dur="indefinite" restart="never" nodeType="tmRoot"/>
       </p:par>
     </p:tnLst>
   </p:timing>
@@ -31992,25 +31984,25 @@
     </p:spTree>
     <p:extLst>
       <p:ext uri="{BB962C8B-B14F-4D97-AF65-F5344CB8AC3E}">
-        <p14:creationId xmlns="" xmlns:p14="http://schemas.microsoft.com/office/powerpoint/2010/main" val="3052723909"/>
+        <p14:creationId xmlns:p14="http://schemas.microsoft.com/office/powerpoint/2010/main" val="3052723909"/>
       </p:ext>
     </p:extLst>
   </p:cSld>
   <p:clrMapOvr>
     <a:masterClrMapping/>
   </p:clrMapOvr>
-  <mc:AlternateContent xmlns:mc="http://schemas.openxmlformats.org/markup-compatibility/2006">
-    <mc:Choice xmlns="" xmlns:p14="http://schemas.microsoft.com/office/powerpoint/2010/main" Requires="p14">
+  <mc:AlternateContent xmlns:mc="http://schemas.openxmlformats.org/markup-compatibility/2006" xmlns:p14="http://schemas.microsoft.com/office/powerpoint/2010/main">
+    <mc:Choice Requires="p14">
       <p:transition spd="slow" p14:dur="2000"/>
     </mc:Choice>
-    <mc:Fallback>
+    <mc:Fallback xmlns="">
       <p:transition spd="slow"/>
     </mc:Fallback>
   </mc:AlternateContent>
   <p:timing>
     <p:tnLst>
       <p:par>
-        <p:cTn id="1" dur="indefinite" restart="never" nodeType="tmRoot"/>
+        <p:cTn xmlns:p14="http://schemas.microsoft.com/office/powerpoint/2010/main" id="1" dur="indefinite" restart="never" nodeType="tmRoot"/>
       </p:par>
     </p:tnLst>
   </p:timing>
@@ -32128,25 +32120,25 @@
     </p:spTree>
     <p:extLst>
       <p:ext uri="{BB962C8B-B14F-4D97-AF65-F5344CB8AC3E}">
-        <p14:creationId xmlns="" xmlns:p14="http://schemas.microsoft.com/office/powerpoint/2010/main" val="1576574823"/>
+        <p14:creationId xmlns:p14="http://schemas.microsoft.com/office/powerpoint/2010/main" val="1576574823"/>
       </p:ext>
     </p:extLst>
   </p:cSld>
   <p:clrMapOvr>
     <a:masterClrMapping/>
   </p:clrMapOvr>
-  <mc:AlternateContent xmlns:mc="http://schemas.openxmlformats.org/markup-compatibility/2006">
-    <mc:Choice xmlns="" xmlns:p14="http://schemas.microsoft.com/office/powerpoint/2010/main" Requires="p14">
+  <mc:AlternateContent xmlns:mc="http://schemas.openxmlformats.org/markup-compatibility/2006" xmlns:p14="http://schemas.microsoft.com/office/powerpoint/2010/main">
+    <mc:Choice Requires="p14">
       <p:transition spd="slow" p14:dur="2000"/>
     </mc:Choice>
-    <mc:Fallback>
+    <mc:Fallback xmlns="">
       <p:transition spd="slow"/>
     </mc:Fallback>
   </mc:AlternateContent>
   <p:timing>
     <p:tnLst>
       <p:par>
-        <p:cTn id="1" dur="indefinite" restart="never" nodeType="tmRoot"/>
+        <p:cTn xmlns:p14="http://schemas.microsoft.com/office/powerpoint/2010/main" id="1" dur="indefinite" restart="never" nodeType="tmRoot"/>
       </p:par>
     </p:tnLst>
   </p:timing>
@@ -32194,10 +32186,10 @@
           <a:p>
             <a:pPr algn="ctr"/>
             <a:r>
-              <a:rPr lang="it-IT" sz="4800" b="1" dirty="0" err="1" smtClean="0">
+              <a:rPr lang="it-IT" sz="4800" b="1" dirty="0" smtClean="0">
                 <a:latin typeface="+mj-lt"/>
               </a:rPr>
-              <a:t>Applications</a:t>
+              <a:t>Application</a:t>
             </a:r>
             <a:endParaRPr lang="it-IT" sz="4800" b="1" dirty="0" smtClean="0">
               <a:latin typeface="+mj-lt"/>
@@ -32450,25 +32442,25 @@
     </p:spTree>
     <p:extLst>
       <p:ext uri="{BB962C8B-B14F-4D97-AF65-F5344CB8AC3E}">
-        <p14:creationId xmlns="" xmlns:p14="http://schemas.microsoft.com/office/powerpoint/2010/main" val="3303920882"/>
+        <p14:creationId xmlns:p14="http://schemas.microsoft.com/office/powerpoint/2010/main" val="3303920882"/>
       </p:ext>
     </p:extLst>
   </p:cSld>
   <p:clrMapOvr>
     <a:masterClrMapping/>
   </p:clrMapOvr>
-  <mc:AlternateContent xmlns:mc="http://schemas.openxmlformats.org/markup-compatibility/2006">
-    <mc:Choice xmlns="" xmlns:p14="http://schemas.microsoft.com/office/powerpoint/2010/main" Requires="p14">
+  <mc:AlternateContent xmlns:mc="http://schemas.openxmlformats.org/markup-compatibility/2006" xmlns:p14="http://schemas.microsoft.com/office/powerpoint/2010/main">
+    <mc:Choice Requires="p14">
       <p:transition spd="slow" p14:dur="2000"/>
     </mc:Choice>
-    <mc:Fallback>
+    <mc:Fallback xmlns="">
       <p:transition spd="slow"/>
     </mc:Fallback>
   </mc:AlternateContent>
   <p:timing>
     <p:tnLst>
       <p:par>
-        <p:cTn id="1" dur="indefinite" restart="never" nodeType="tmRoot"/>
+        <p:cTn xmlns:p14="http://schemas.microsoft.com/office/powerpoint/2010/main" id="1" dur="indefinite" restart="never" nodeType="tmRoot"/>
       </p:par>
     </p:tnLst>
   </p:timing>
@@ -32679,7 +32671,7 @@
     </p:spTree>
     <p:extLst>
       <p:ext uri="{BB962C8B-B14F-4D97-AF65-F5344CB8AC3E}">
-        <p14:creationId xmlns="" xmlns:p14="http://schemas.microsoft.com/office/powerpoint/2010/main" val="4257297520"/>
+        <p14:creationId xmlns:p14="http://schemas.microsoft.com/office/powerpoint/2010/main" val="4257297520"/>
       </p:ext>
     </p:extLst>
   </p:cSld>
@@ -32689,7 +32681,7 @@
   <p:timing>
     <p:tnLst>
       <p:par>
-        <p:cTn id="1" dur="indefinite" restart="never" nodeType="tmRoot">
+        <p:cTn xmlns:p14="http://schemas.microsoft.com/office/powerpoint/2010/main" id="1" dur="indefinite" restart="never" nodeType="tmRoot">
           <p:childTnLst>
             <p:seq>
               <p:cTn id="2" nodeType="mainSeq"/>
@@ -32976,7 +32968,7 @@
     </p:spTree>
     <p:extLst>
       <p:ext uri="{BB962C8B-B14F-4D97-AF65-F5344CB8AC3E}">
-        <p14:creationId xmlns="" xmlns:p14="http://schemas.microsoft.com/office/powerpoint/2010/main" val="1516952845"/>
+        <p14:creationId xmlns:p14="http://schemas.microsoft.com/office/powerpoint/2010/main" val="1516952845"/>
       </p:ext>
     </p:extLst>
   </p:cSld>
@@ -32986,7 +32978,7 @@
   <p:timing>
     <p:tnLst>
       <p:par>
-        <p:cTn id="1" dur="indefinite" restart="never" nodeType="tmRoot">
+        <p:cTn xmlns:p14="http://schemas.microsoft.com/office/powerpoint/2010/main" id="1" dur="indefinite" restart="never" nodeType="tmRoot">
           <p:childTnLst>
             <p:seq>
               <p:cTn id="2" nodeType="mainSeq"/>
@@ -33272,7 +33264,7 @@
     </p:spTree>
     <p:extLst>
       <p:ext uri="{BB962C8B-B14F-4D97-AF65-F5344CB8AC3E}">
-        <p14:creationId xmlns="" xmlns:p14="http://schemas.microsoft.com/office/powerpoint/2010/main" val="903666282"/>
+        <p14:creationId xmlns:p14="http://schemas.microsoft.com/office/powerpoint/2010/main" val="903666282"/>
       </p:ext>
     </p:extLst>
   </p:cSld>
@@ -33282,7 +33274,7 @@
   <p:timing>
     <p:tnLst>
       <p:par>
-        <p:cTn id="1" dur="indefinite" restart="never" nodeType="tmRoot">
+        <p:cTn xmlns:p14="http://schemas.microsoft.com/office/powerpoint/2010/main" id="1" dur="indefinite" restart="never" nodeType="tmRoot">
           <p:childTnLst>
             <p:seq>
               <p:cTn id="2" nodeType="mainSeq"/>
@@ -33579,7 +33571,7 @@
     </p:spTree>
     <p:extLst>
       <p:ext uri="{BB962C8B-B14F-4D97-AF65-F5344CB8AC3E}">
-        <p14:creationId xmlns="" xmlns:p14="http://schemas.microsoft.com/office/powerpoint/2010/main" val="3790160763"/>
+        <p14:creationId xmlns:p14="http://schemas.microsoft.com/office/powerpoint/2010/main" val="3790160763"/>
       </p:ext>
     </p:extLst>
   </p:cSld>
@@ -33589,7 +33581,7 @@
   <p:timing>
     <p:tnLst>
       <p:par>
-        <p:cTn id="1" dur="indefinite" restart="never" nodeType="tmRoot">
+        <p:cTn xmlns:p14="http://schemas.microsoft.com/office/powerpoint/2010/main" id="1" dur="indefinite" restart="never" nodeType="tmRoot">
           <p:childTnLst>
             <p:seq>
               <p:cTn id="2" nodeType="mainSeq"/>
@@ -33954,25 +33946,25 @@
     </p:spTree>
     <p:extLst>
       <p:ext uri="{BB962C8B-B14F-4D97-AF65-F5344CB8AC3E}">
-        <p14:creationId xmlns="" xmlns:p14="http://schemas.microsoft.com/office/powerpoint/2010/main" val="2978215168"/>
+        <p14:creationId xmlns:p14="http://schemas.microsoft.com/office/powerpoint/2010/main" val="2978215168"/>
       </p:ext>
     </p:extLst>
   </p:cSld>
   <p:clrMapOvr>
     <a:masterClrMapping/>
   </p:clrMapOvr>
-  <mc:AlternateContent xmlns:mc="http://schemas.openxmlformats.org/markup-compatibility/2006">
-    <mc:Choice xmlns="" xmlns:p14="http://schemas.microsoft.com/office/powerpoint/2010/main" Requires="p14">
+  <mc:AlternateContent xmlns:mc="http://schemas.openxmlformats.org/markup-compatibility/2006" xmlns:p14="http://schemas.microsoft.com/office/powerpoint/2010/main">
+    <mc:Choice Requires="p14">
       <p:transition spd="slow" p14:dur="2000"/>
     </mc:Choice>
-    <mc:Fallback>
+    <mc:Fallback xmlns="">
       <p:transition spd="slow"/>
     </mc:Fallback>
   </mc:AlternateContent>
   <p:timing>
     <p:tnLst>
       <p:par>
-        <p:cTn id="1" dur="indefinite" restart="never" nodeType="tmRoot"/>
+        <p:cTn xmlns:p14="http://schemas.microsoft.com/office/powerpoint/2010/main" id="1" dur="indefinite" restart="never" nodeType="tmRoot"/>
       </p:par>
     </p:tnLst>
   </p:timing>
@@ -34187,7 +34179,7 @@
     </p:spTree>
     <p:extLst>
       <p:ext uri="{BB962C8B-B14F-4D97-AF65-F5344CB8AC3E}">
-        <p14:creationId xmlns="" xmlns:p14="http://schemas.microsoft.com/office/powerpoint/2010/main" val="1889567349"/>
+        <p14:creationId xmlns:p14="http://schemas.microsoft.com/office/powerpoint/2010/main" val="1889567349"/>
       </p:ext>
     </p:extLst>
   </p:cSld>
@@ -34197,7 +34189,7 @@
   <p:timing>
     <p:tnLst>
       <p:par>
-        <p:cTn id="1" dur="indefinite" restart="never" nodeType="tmRoot">
+        <p:cTn xmlns:p14="http://schemas.microsoft.com/office/powerpoint/2010/main" id="1" dur="indefinite" restart="never" nodeType="tmRoot">
           <p:childTnLst>
             <p:seq>
               <p:cTn id="2" nodeType="mainSeq"/>
@@ -34442,7 +34434,7 @@
     </p:spTree>
     <p:extLst>
       <p:ext uri="{BB962C8B-B14F-4D97-AF65-F5344CB8AC3E}">
-        <p14:creationId xmlns="" xmlns:p14="http://schemas.microsoft.com/office/powerpoint/2010/main" val="2938595398"/>
+        <p14:creationId xmlns:p14="http://schemas.microsoft.com/office/powerpoint/2010/main" val="2938595398"/>
       </p:ext>
     </p:extLst>
   </p:cSld>
@@ -34452,7 +34444,7 @@
   <p:timing>
     <p:tnLst>
       <p:par>
-        <p:cTn id="1" dur="indefinite" restart="never" nodeType="tmRoot">
+        <p:cTn xmlns:p14="http://schemas.microsoft.com/office/powerpoint/2010/main" id="1" dur="indefinite" restart="never" nodeType="tmRoot">
           <p:childTnLst>
             <p:seq>
               <p:cTn id="2" nodeType="mainSeq"/>
@@ -34742,7 +34734,7 @@
     </p:spTree>
     <p:extLst>
       <p:ext uri="{BB962C8B-B14F-4D97-AF65-F5344CB8AC3E}">
-        <p14:creationId xmlns="" xmlns:p14="http://schemas.microsoft.com/office/powerpoint/2010/main" val="3382536623"/>
+        <p14:creationId xmlns:p14="http://schemas.microsoft.com/office/powerpoint/2010/main" val="3382536623"/>
       </p:ext>
     </p:extLst>
   </p:cSld>
@@ -34752,7 +34744,7 @@
   <p:timing>
     <p:tnLst>
       <p:par>
-        <p:cTn id="1" dur="indefinite" restart="never" nodeType="tmRoot">
+        <p:cTn xmlns:p14="http://schemas.microsoft.com/office/powerpoint/2010/main" id="1" dur="indefinite" restart="never" nodeType="tmRoot">
           <p:childTnLst>
             <p:seq>
               <p:cTn id="2" nodeType="mainSeq"/>
@@ -34962,7 +34954,7 @@
     </p:spTree>
     <p:extLst>
       <p:ext uri="{BB962C8B-B14F-4D97-AF65-F5344CB8AC3E}">
-        <p14:creationId xmlns="" xmlns:p14="http://schemas.microsoft.com/office/powerpoint/2010/main" val="945142828"/>
+        <p14:creationId xmlns:p14="http://schemas.microsoft.com/office/powerpoint/2010/main" val="945142828"/>
       </p:ext>
     </p:extLst>
   </p:cSld>
@@ -34972,7 +34964,7 @@
   <p:timing>
     <p:tnLst>
       <p:par>
-        <p:cTn id="1" dur="indefinite" restart="never" nodeType="tmRoot">
+        <p:cTn xmlns:p14="http://schemas.microsoft.com/office/powerpoint/2010/main" id="1" dur="indefinite" restart="never" nodeType="tmRoot">
           <p:childTnLst>
             <p:seq>
               <p:cTn id="2" nodeType="mainSeq"/>
@@ -35193,7 +35185,7 @@
     </p:spTree>
     <p:extLst>
       <p:ext uri="{BB962C8B-B14F-4D97-AF65-F5344CB8AC3E}">
-        <p14:creationId xmlns="" xmlns:p14="http://schemas.microsoft.com/office/powerpoint/2010/main" val="3313297802"/>
+        <p14:creationId xmlns:p14="http://schemas.microsoft.com/office/powerpoint/2010/main" val="3313297802"/>
       </p:ext>
     </p:extLst>
   </p:cSld>
@@ -35203,7 +35195,7 @@
   <p:timing>
     <p:tnLst>
       <p:par>
-        <p:cTn id="1" dur="indefinite" restart="never" nodeType="tmRoot">
+        <p:cTn xmlns:p14="http://schemas.microsoft.com/office/powerpoint/2010/main" id="1" dur="indefinite" restart="never" nodeType="tmRoot">
           <p:childTnLst>
             <p:seq>
               <p:cTn id="2" nodeType="mainSeq"/>
@@ -35259,7 +35251,7 @@
           <a:blip r:embed="rId2">
             <a:extLst>
               <a:ext uri="{28A0092B-C50C-407E-A947-70E740481C1C}">
-                <a14:useLocalDpi xmlns="" xmlns:a14="http://schemas.microsoft.com/office/drawing/2010/main" val="0"/>
+                <a14:useLocalDpi xmlns:a14="http://schemas.microsoft.com/office/drawing/2010/main" val="0"/>
               </a:ext>
             </a:extLst>
           </a:blip>
@@ -35279,7 +35271,7 @@
           <a:noFill/>
           <a:extLst>
             <a:ext uri="{909E8E84-426E-40dd-AFC4-6F175D3DCCD1}">
-              <a14:hiddenFill xmlns="" xmlns:a14="http://schemas.microsoft.com/office/drawing/2010/main">
+              <a14:hiddenFill xmlns:a14="http://schemas.microsoft.com/office/drawing/2010/main">
                 <a:solidFill>
                   <a:srgbClr val="FFFFFF"/>
                 </a:solidFill>
@@ -35362,25 +35354,25 @@
     </p:spTree>
     <p:extLst>
       <p:ext uri="{BB962C8B-B14F-4D97-AF65-F5344CB8AC3E}">
-        <p14:creationId xmlns="" xmlns:p14="http://schemas.microsoft.com/office/powerpoint/2010/main" val="2252746867"/>
+        <p14:creationId xmlns:p14="http://schemas.microsoft.com/office/powerpoint/2010/main" val="2252746867"/>
       </p:ext>
     </p:extLst>
   </p:cSld>
   <p:clrMapOvr>
     <a:masterClrMapping/>
   </p:clrMapOvr>
-  <mc:AlternateContent xmlns:mc="http://schemas.openxmlformats.org/markup-compatibility/2006">
-    <mc:Choice xmlns="" xmlns:p14="http://schemas.microsoft.com/office/powerpoint/2010/main" Requires="p14">
+  <mc:AlternateContent xmlns:mc="http://schemas.openxmlformats.org/markup-compatibility/2006" xmlns:p14="http://schemas.microsoft.com/office/powerpoint/2010/main">
+    <mc:Choice Requires="p14">
       <p:transition spd="slow" p14:dur="2000"/>
     </mc:Choice>
-    <mc:Fallback>
+    <mc:Fallback xmlns="">
       <p:transition spd="slow"/>
     </mc:Fallback>
   </mc:AlternateContent>
   <p:timing>
     <p:tnLst>
       <p:par>
-        <p:cTn id="1" dur="indefinite" restart="never" nodeType="tmRoot"/>
+        <p:cTn xmlns:p14="http://schemas.microsoft.com/office/powerpoint/2010/main" id="1" dur="indefinite" restart="never" nodeType="tmRoot"/>
       </p:par>
     </p:tnLst>
   </p:timing>
@@ -35737,25 +35729,25 @@
     </p:spTree>
     <p:extLst>
       <p:ext uri="{BB962C8B-B14F-4D97-AF65-F5344CB8AC3E}">
-        <p14:creationId xmlns="" xmlns:p14="http://schemas.microsoft.com/office/powerpoint/2010/main" val="3564990699"/>
+        <p14:creationId xmlns:p14="http://schemas.microsoft.com/office/powerpoint/2010/main" val="3564990699"/>
       </p:ext>
     </p:extLst>
   </p:cSld>
   <p:clrMapOvr>
     <a:masterClrMapping/>
   </p:clrMapOvr>
-  <mc:AlternateContent xmlns:mc="http://schemas.openxmlformats.org/markup-compatibility/2006">
-    <mc:Choice xmlns="" xmlns:p14="http://schemas.microsoft.com/office/powerpoint/2010/main" Requires="p14">
+  <mc:AlternateContent xmlns:mc="http://schemas.openxmlformats.org/markup-compatibility/2006" xmlns:p14="http://schemas.microsoft.com/office/powerpoint/2010/main">
+    <mc:Choice Requires="p14">
       <p:transition spd="slow" p14:dur="2000"/>
     </mc:Choice>
-    <mc:Fallback>
+    <mc:Fallback xmlns="">
       <p:transition spd="slow"/>
     </mc:Fallback>
   </mc:AlternateContent>
   <p:timing>
     <p:tnLst>
       <p:par>
-        <p:cTn id="1" dur="indefinite" restart="never" nodeType="tmRoot"/>
+        <p:cTn xmlns:p14="http://schemas.microsoft.com/office/powerpoint/2010/main" id="1" dur="indefinite" restart="never" nodeType="tmRoot"/>
       </p:par>
     </p:tnLst>
   </p:timing>
@@ -36113,25 +36105,25 @@
     </p:spTree>
     <p:extLst>
       <p:ext uri="{BB962C8B-B14F-4D97-AF65-F5344CB8AC3E}">
-        <p14:creationId xmlns="" xmlns:p14="http://schemas.microsoft.com/office/powerpoint/2010/main" val="3748041918"/>
+        <p14:creationId xmlns:p14="http://schemas.microsoft.com/office/powerpoint/2010/main" val="3748041918"/>
       </p:ext>
     </p:extLst>
   </p:cSld>
   <p:clrMapOvr>
     <a:masterClrMapping/>
   </p:clrMapOvr>
-  <mc:AlternateContent xmlns:mc="http://schemas.openxmlformats.org/markup-compatibility/2006">
-    <mc:Choice xmlns="" xmlns:p14="http://schemas.microsoft.com/office/powerpoint/2010/main" Requires="p14">
+  <mc:AlternateContent xmlns:mc="http://schemas.openxmlformats.org/markup-compatibility/2006" xmlns:p14="http://schemas.microsoft.com/office/powerpoint/2010/main">
+    <mc:Choice Requires="p14">
       <p:transition spd="slow" p14:dur="2000"/>
     </mc:Choice>
-    <mc:Fallback>
+    <mc:Fallback xmlns="">
       <p:transition spd="slow"/>
     </mc:Fallback>
   </mc:AlternateContent>
   <p:timing>
     <p:tnLst>
       <p:par>
-        <p:cTn id="1" dur="indefinite" restart="never" nodeType="tmRoot"/>
+        <p:cTn xmlns:p14="http://schemas.microsoft.com/office/powerpoint/2010/main" id="1" dur="indefinite" restart="never" nodeType="tmRoot"/>
       </p:par>
     </p:tnLst>
   </p:timing>

</xml_diff>

<commit_message>
[WR]Corrette alcune parti della presentazione
</commit_message>
<xml_diff>
--- a/Presentazione/Atsilo1/[BOZZA] Atsilo_A_PresentazioneFinale copia.pptx
+++ b/Presentazione/Atsilo1/[BOZZA] Atsilo_A_PresentazioneFinale copia.pptx
@@ -64,7 +64,7 @@
     <p:sldId id="391" r:id="rId55"/>
     <p:sldId id="392" r:id="rId56"/>
     <p:sldId id="393" r:id="rId57"/>
-    <p:sldId id="394" r:id="rId58"/>
+    <p:sldId id="404" r:id="rId58"/>
     <p:sldId id="395" r:id="rId59"/>
     <p:sldId id="396" r:id="rId60"/>
     <p:sldId id="397" r:id="rId61"/>
@@ -20142,7 +20142,11 @@
             <a:pPr marL="342900" indent="-342900" algn="just"/>
             <a:r>
               <a:rPr lang="it-IT" dirty="0" smtClean="0"/>
-              <a:t>I metodi così non verranno scritti per ogni classe, conseguendo un risparmio notevole.</a:t>
+              <a:t>I metodi così non verranno scritti per ogni classe, conseguendo un risparmio notevole</a:t>
+            </a:r>
+            <a:r>
+              <a:rPr lang="it-IT" dirty="0" smtClean="0"/>
+              <a:t>.</a:t>
             </a:r>
           </a:p>
           <a:p>
@@ -20152,9 +20156,7 @@
             <a:endParaRPr lang="it-IT" dirty="0" smtClean="0"/>
           </a:p>
           <a:p>
-            <a:pPr marL="342900" indent="-342900">
-              <a:buNone/>
-            </a:pPr>
+            <a:pPr marL="342900" indent="-342900"/>
             <a:r>
               <a:rPr lang="it-IT" sz="3200" i="1" dirty="0" smtClean="0">
                 <a:effectLst>
@@ -20165,10 +20167,10 @@
                   </a:outerShdw>
                 </a:effectLst>
               </a:rPr>
-              <a:t>Gli sviluppatori  scriveranno </a:t>
-            </a:r>
-            <a:r>
-              <a:rPr lang="it-IT" sz="3200" i="1" u="sng" dirty="0" smtClean="0">
+              <a:t>Si scriveranno </a:t>
+            </a:r>
+            <a:r>
+              <a:rPr lang="it-IT" sz="3600" i="1" u="sng" dirty="0" smtClean="0">
                 <a:effectLst>
                   <a:outerShdw blurRad="38100" dist="38100" dir="2700000" algn="tl">
                     <a:srgbClr val="000000">
@@ -20177,8 +20179,125 @@
                   </a:outerShdw>
                 </a:effectLst>
               </a:rPr>
-              <a:t>165 metodi in meno </a:t>
-            </a:r>
+              <a:t>165 metodi in </a:t>
+            </a:r>
+            <a:r>
+              <a:rPr lang="it-IT" sz="3600" i="1" u="sng" dirty="0" smtClean="0">
+                <a:effectLst>
+                  <a:outerShdw blurRad="38100" dist="38100" dir="2700000" algn="tl">
+                    <a:srgbClr val="000000">
+                      <a:alpha val="43137"/>
+                    </a:srgbClr>
+                  </a:outerShdw>
+                </a:effectLst>
+              </a:rPr>
+              <a:t>meno</a:t>
+            </a:r>
+          </a:p>
+          <a:p>
+            <a:pPr marL="708660" lvl="1" indent="-342900"/>
+            <a:r>
+              <a:rPr lang="it-IT" sz="2800" i="1" dirty="0" err="1" smtClean="0">
+                <a:effectLst>
+                  <a:outerShdw blurRad="38100" dist="38100" dir="2700000" algn="tl">
+                    <a:srgbClr val="000000">
+                      <a:alpha val="43137"/>
+                    </a:srgbClr>
+                  </a:outerShdw>
+                </a:effectLst>
+              </a:rPr>
+              <a:t>Testing</a:t>
+            </a:r>
+            <a:r>
+              <a:rPr lang="it-IT" sz="2800" i="1" dirty="0" smtClean="0">
+                <a:effectLst>
+                  <a:outerShdw blurRad="38100" dist="38100" dir="2700000" algn="tl">
+                    <a:srgbClr val="000000">
+                      <a:alpha val="43137"/>
+                    </a:srgbClr>
+                  </a:outerShdw>
+                </a:effectLst>
+              </a:rPr>
+              <a:t> ridotto</a:t>
+            </a:r>
+          </a:p>
+          <a:p>
+            <a:pPr marL="708660" lvl="1" indent="-342900"/>
+            <a:r>
+              <a:rPr lang="it-IT" sz="2800" i="1" dirty="0" smtClean="0">
+                <a:effectLst>
+                  <a:outerShdw blurRad="38100" dist="38100" dir="2700000" algn="tl">
+                    <a:srgbClr val="000000">
+                      <a:alpha val="43137"/>
+                    </a:srgbClr>
+                  </a:outerShdw>
+                </a:effectLst>
+              </a:rPr>
+              <a:t>Leggibilità aumentata</a:t>
+            </a:r>
+          </a:p>
+          <a:p>
+            <a:pPr marL="708660" lvl="1" indent="-342900"/>
+            <a:r>
+              <a:rPr lang="it-IT" sz="2800" i="1" dirty="0" err="1" smtClean="0">
+                <a:effectLst>
+                  <a:outerShdw blurRad="38100" dist="38100" dir="2700000" algn="tl">
+                    <a:srgbClr val="000000">
+                      <a:alpha val="43137"/>
+                    </a:srgbClr>
+                  </a:outerShdw>
+                </a:effectLst>
+              </a:rPr>
+              <a:t>Manutenibilità</a:t>
+            </a:r>
+            <a:r>
+              <a:rPr lang="it-IT" sz="2800" i="1" dirty="0" smtClean="0">
+                <a:effectLst>
+                  <a:outerShdw blurRad="38100" dist="38100" dir="2700000" algn="tl">
+                    <a:srgbClr val="000000">
+                      <a:alpha val="43137"/>
+                    </a:srgbClr>
+                  </a:outerShdw>
+                </a:effectLst>
+              </a:rPr>
+              <a:t> aumentata</a:t>
+            </a:r>
+          </a:p>
+          <a:p>
+            <a:pPr marL="342900" indent="-342900"/>
+            <a:endParaRPr lang="it-IT" sz="3200" i="1" u="sng" dirty="0" smtClean="0">
+              <a:effectLst>
+                <a:outerShdw blurRad="38100" dist="38100" dir="2700000" algn="tl">
+                  <a:srgbClr val="000000">
+                    <a:alpha val="43137"/>
+                  </a:srgbClr>
+                </a:outerShdw>
+              </a:effectLst>
+            </a:endParaRPr>
+          </a:p>
+          <a:p>
+            <a:pPr marL="342900" indent="-342900"/>
+            <a:endParaRPr lang="it-IT" sz="3200" i="1" u="sng" dirty="0" smtClean="0">
+              <a:effectLst>
+                <a:outerShdw blurRad="38100" dist="38100" dir="2700000" algn="tl">
+                  <a:srgbClr val="000000">
+                    <a:alpha val="43137"/>
+                  </a:srgbClr>
+                </a:outerShdw>
+              </a:effectLst>
+            </a:endParaRPr>
+          </a:p>
+          <a:p>
+            <a:pPr marL="342900" indent="-342900"/>
+            <a:endParaRPr lang="it-IT" sz="3200" i="1" u="sng" dirty="0" smtClean="0">
+              <a:effectLst>
+                <a:outerShdw blurRad="38100" dist="38100" dir="2700000" algn="tl">
+                  <a:srgbClr val="000000">
+                    <a:alpha val="43137"/>
+                  </a:srgbClr>
+                </a:outerShdw>
+              </a:effectLst>
+            </a:endParaRPr>
           </a:p>
         </p:txBody>
       </p:sp>
@@ -20321,21 +20440,30 @@
                             </p:childTnLst>
                           </p:cTn>
                         </p:par>
+                      </p:childTnLst>
+                    </p:cTn>
+                  </p:par>
+                  <p:par>
+                    <p:cTn id="12" fill="hold">
+                      <p:stCondLst>
+                        <p:cond delay="indefinite"/>
+                      </p:stCondLst>
+                      <p:childTnLst>
                         <p:par>
-                          <p:cTn id="12" fill="hold">
+                          <p:cTn id="13" fill="hold">
                             <p:stCondLst>
-                              <p:cond delay="6000"/>
+                              <p:cond delay="0"/>
                             </p:stCondLst>
                             <p:childTnLst>
                               <p:par>
-                                <p:cTn id="13" presetID="10" presetClass="entr" presetSubtype="0" fill="hold" grpId="0" nodeType="afterEffect">
+                                <p:cTn id="14" presetID="10" presetClass="entr" presetSubtype="0" fill="hold" grpId="0" nodeType="clickEffect">
                                   <p:stCondLst>
                                     <p:cond delay="0"/>
                                   </p:stCondLst>
                                   <p:childTnLst>
                                     <p:set>
                                       <p:cBhvr>
-                                        <p:cTn id="14" dur="1" fill="hold">
+                                        <p:cTn id="15" dur="1" fill="hold">
                                           <p:stCondLst>
                                             <p:cond delay="0"/>
                                           </p:stCondLst>
@@ -20357,11 +20485,167 @@
                                     </p:set>
                                     <p:animEffect transition="in" filter="fade">
                                       <p:cBhvr>
-                                        <p:cTn id="15" dur="2000"/>
+                                        <p:cTn id="16" dur="2000"/>
                                         <p:tgtEl>
                                           <p:spTgt spid="10">
                                             <p:txEl>
                                               <p:pRg st="3" end="3"/>
+                                            </p:txEl>
+                                          </p:spTgt>
+                                        </p:tgtEl>
+                                      </p:cBhvr>
+                                    </p:animEffect>
+                                  </p:childTnLst>
+                                </p:cTn>
+                              </p:par>
+                            </p:childTnLst>
+                          </p:cTn>
+                        </p:par>
+                        <p:par>
+                          <p:cTn id="17" fill="hold">
+                            <p:stCondLst>
+                              <p:cond delay="2000"/>
+                            </p:stCondLst>
+                            <p:childTnLst>
+                              <p:par>
+                                <p:cTn id="18" presetID="10" presetClass="entr" presetSubtype="0" fill="hold" grpId="0" nodeType="afterEffect">
+                                  <p:stCondLst>
+                                    <p:cond delay="0"/>
+                                  </p:stCondLst>
+                                  <p:childTnLst>
+                                    <p:set>
+                                      <p:cBhvr>
+                                        <p:cTn id="19" dur="1" fill="hold">
+                                          <p:stCondLst>
+                                            <p:cond delay="0"/>
+                                          </p:stCondLst>
+                                        </p:cTn>
+                                        <p:tgtEl>
+                                          <p:spTgt spid="10">
+                                            <p:txEl>
+                                              <p:pRg st="4" end="4"/>
+                                            </p:txEl>
+                                          </p:spTgt>
+                                        </p:tgtEl>
+                                        <p:attrNameLst>
+                                          <p:attrName>style.visibility</p:attrName>
+                                        </p:attrNameLst>
+                                      </p:cBhvr>
+                                      <p:to>
+                                        <p:strVal val="visible"/>
+                                      </p:to>
+                                    </p:set>
+                                    <p:animEffect transition="in" filter="fade">
+                                      <p:cBhvr>
+                                        <p:cTn id="20" dur="1000"/>
+                                        <p:tgtEl>
+                                          <p:spTgt spid="10">
+                                            <p:txEl>
+                                              <p:pRg st="4" end="4"/>
+                                            </p:txEl>
+                                          </p:spTgt>
+                                        </p:tgtEl>
+                                      </p:cBhvr>
+                                    </p:animEffect>
+                                  </p:childTnLst>
+                                </p:cTn>
+                              </p:par>
+                            </p:childTnLst>
+                          </p:cTn>
+                        </p:par>
+                        <p:par>
+                          <p:cTn id="21" fill="hold">
+                            <p:stCondLst>
+                              <p:cond delay="3000"/>
+                            </p:stCondLst>
+                            <p:childTnLst>
+                              <p:par>
+                                <p:cTn id="22" presetID="10" presetClass="entr" presetSubtype="0" fill="hold" grpId="0" nodeType="afterEffect">
+                                  <p:stCondLst>
+                                    <p:cond delay="0"/>
+                                  </p:stCondLst>
+                                  <p:childTnLst>
+                                    <p:set>
+                                      <p:cBhvr>
+                                        <p:cTn id="23" dur="1" fill="hold">
+                                          <p:stCondLst>
+                                            <p:cond delay="0"/>
+                                          </p:stCondLst>
+                                        </p:cTn>
+                                        <p:tgtEl>
+                                          <p:spTgt spid="10">
+                                            <p:txEl>
+                                              <p:pRg st="5" end="5"/>
+                                            </p:txEl>
+                                          </p:spTgt>
+                                        </p:tgtEl>
+                                        <p:attrNameLst>
+                                          <p:attrName>style.visibility</p:attrName>
+                                        </p:attrNameLst>
+                                      </p:cBhvr>
+                                      <p:to>
+                                        <p:strVal val="visible"/>
+                                      </p:to>
+                                    </p:set>
+                                    <p:animEffect transition="in" filter="fade">
+                                      <p:cBhvr>
+                                        <p:cTn id="24" dur="1000"/>
+                                        <p:tgtEl>
+                                          <p:spTgt spid="10">
+                                            <p:txEl>
+                                              <p:pRg st="5" end="5"/>
+                                            </p:txEl>
+                                          </p:spTgt>
+                                        </p:tgtEl>
+                                      </p:cBhvr>
+                                    </p:animEffect>
+                                  </p:childTnLst>
+                                </p:cTn>
+                              </p:par>
+                            </p:childTnLst>
+                          </p:cTn>
+                        </p:par>
+                        <p:par>
+                          <p:cTn id="25" fill="hold">
+                            <p:stCondLst>
+                              <p:cond delay="4000"/>
+                            </p:stCondLst>
+                            <p:childTnLst>
+                              <p:par>
+                                <p:cTn id="26" presetID="10" presetClass="entr" presetSubtype="0" fill="hold" grpId="0" nodeType="afterEffect">
+                                  <p:stCondLst>
+                                    <p:cond delay="0"/>
+                                  </p:stCondLst>
+                                  <p:childTnLst>
+                                    <p:set>
+                                      <p:cBhvr>
+                                        <p:cTn id="27" dur="1" fill="hold">
+                                          <p:stCondLst>
+                                            <p:cond delay="0"/>
+                                          </p:stCondLst>
+                                        </p:cTn>
+                                        <p:tgtEl>
+                                          <p:spTgt spid="10">
+                                            <p:txEl>
+                                              <p:pRg st="6" end="6"/>
+                                            </p:txEl>
+                                          </p:spTgt>
+                                        </p:tgtEl>
+                                        <p:attrNameLst>
+                                          <p:attrName>style.visibility</p:attrName>
+                                        </p:attrNameLst>
+                                      </p:cBhvr>
+                                      <p:to>
+                                        <p:strVal val="visible"/>
+                                      </p:to>
+                                    </p:set>
+                                    <p:animEffect transition="in" filter="fade">
+                                      <p:cBhvr>
+                                        <p:cTn id="28" dur="1000"/>
+                                        <p:tgtEl>
+                                          <p:spTgt spid="10">
+                                            <p:txEl>
+                                              <p:pRg st="6" end="6"/>
                                             </p:txEl>
                                           </p:spTgt>
                                         </p:tgtEl>
@@ -20398,7 +20682,7 @@
       </p:par>
     </p:tnLst>
     <p:bldLst>
-      <p:bldP spid="10" grpId="0" build="p"/>
+      <p:bldP spid="10" grpId="0" uiExpand="1" build="p"/>
     </p:bldLst>
   </p:timing>
 </p:sld>
@@ -35190,11 +35474,7 @@
             </a:r>
             <a:r>
               <a:rPr lang="it-IT" dirty="0" smtClean="0"/>
-              <a:t>revisionata</a:t>
-            </a:r>
-            <a:r>
-              <a:rPr lang="it-IT" smtClean="0"/>
-              <a:t>, incrocio)</a:t>
+              <a:t>revisionata, incrocio)</a:t>
             </a:r>
             <a:endParaRPr lang="it-IT" dirty="0" smtClean="0"/>
           </a:p>

</xml_diff>

<commit_message>
[WR]Corretta immagine nella parte del framework
</commit_message>
<xml_diff>
--- a/Presentazione/Atsilo1/[BOZZA] Atsilo_A_PresentazioneFinale copia.pptx
+++ b/Presentazione/Atsilo1/[BOZZA] Atsilo_A_PresentazioneFinale copia.pptx
@@ -467,7 +467,7 @@
     </p:spTree>
     <p:extLst>
       <p:ext uri="{BB962C8B-B14F-4D97-AF65-F5344CB8AC3E}">
-        <p14:creationId xmlns:p14="http://schemas.microsoft.com/office/powerpoint/2010/main" xmlns="" val="2126419590"/>
+        <p14:creationId xmlns="" xmlns:p14="http://schemas.microsoft.com/office/powerpoint/2010/main" val="2126419590"/>
       </p:ext>
     </p:extLst>
   </p:cSld>
@@ -6327,14 +6327,14 @@
           <p:nvPr>
             <p:extLst>
               <p:ext uri="{D42A27DB-BD31-4B8C-83A1-F6EECF244321}">
-                <p14:modId xmlns:p14="http://schemas.microsoft.com/office/powerpoint/2010/main" xmlns="" val="1430840817"/>
+                <p14:modId xmlns="" xmlns:p14="http://schemas.microsoft.com/office/powerpoint/2010/main" val="1430840817"/>
               </p:ext>
             </p:extLst>
           </p:nvPr>
         </p:nvGraphicFramePr>
         <p:xfrm>
           <a:off x="0" y="4077072"/>
-          <a:ext cx="2051720" cy="2773680"/>
+          <a:ext cx="2051720" cy="2575182"/>
         </p:xfrm>
         <a:graphic>
           <a:graphicData uri="http://schemas.openxmlformats.org/drawingml/2006/table">
@@ -6575,14 +6575,14 @@
           <p:nvPr>
             <p:extLst>
               <p:ext uri="{D42A27DB-BD31-4B8C-83A1-F6EECF244321}">
-                <p14:modId xmlns:p14="http://schemas.microsoft.com/office/powerpoint/2010/main" xmlns="" val="956586736"/>
+                <p14:modId xmlns="" xmlns:p14="http://schemas.microsoft.com/office/powerpoint/2010/main" val="956586736"/>
               </p:ext>
             </p:extLst>
           </p:nvPr>
         </p:nvGraphicFramePr>
         <p:xfrm>
           <a:off x="7092280" y="6060793"/>
-          <a:ext cx="2051720" cy="792480"/>
+          <a:ext cx="2051720" cy="726314"/>
         </p:xfrm>
         <a:graphic>
           <a:graphicData uri="http://schemas.openxmlformats.org/drawingml/2006/table">
@@ -6665,7 +6665,7 @@
           <a:blip r:embed="rId2" cstate="print">
             <a:extLst>
               <a:ext uri="{28A0092B-C50C-407E-A947-70E740481C1C}">
-                <a14:useLocalDpi xmlns:a14="http://schemas.microsoft.com/office/drawing/2010/main" xmlns="" val="0"/>
+                <a14:useLocalDpi xmlns="" xmlns:a14="http://schemas.microsoft.com/office/drawing/2010/main" val="0"/>
               </a:ext>
             </a:extLst>
           </a:blip>
@@ -6685,7 +6685,7 @@
           <a:noFill/>
           <a:extLst>
             <a:ext uri="{909E8E84-426E-40dd-AFC4-6F175D3DCCD1}">
-              <a14:hiddenFill xmlns:a14="http://schemas.microsoft.com/office/drawing/2010/main" xmlns="">
+              <a14:hiddenFill xmlns="" xmlns:a14="http://schemas.microsoft.com/office/drawing/2010/main">
                 <a:solidFill>
                   <a:srgbClr val="FFFFFF"/>
                 </a:solidFill>
@@ -6697,7 +6697,7 @@
     </p:spTree>
     <p:extLst>
       <p:ext uri="{BB962C8B-B14F-4D97-AF65-F5344CB8AC3E}">
-        <p14:creationId xmlns:p14="http://schemas.microsoft.com/office/powerpoint/2010/main" xmlns="" val="4165334171"/>
+        <p14:creationId xmlns="" xmlns:p14="http://schemas.microsoft.com/office/powerpoint/2010/main" val="4165334171"/>
       </p:ext>
     </p:extLst>
   </p:cSld>
@@ -7003,7 +7003,7 @@
     </p:spTree>
     <p:extLst>
       <p:ext uri="{BB962C8B-B14F-4D97-AF65-F5344CB8AC3E}">
-        <p14:creationId xmlns:p14="http://schemas.microsoft.com/office/powerpoint/2010/main" xmlns="" val="4143007013"/>
+        <p14:creationId xmlns="" xmlns:p14="http://schemas.microsoft.com/office/powerpoint/2010/main" val="4143007013"/>
       </p:ext>
     </p:extLst>
   </p:cSld>
@@ -7011,7 +7011,7 @@
     <a:masterClrMapping/>
   </p:clrMapOvr>
   <mc:AlternateContent xmlns:mc="http://schemas.openxmlformats.org/markup-compatibility/2006">
-    <mc:Choice xmlns:p14="http://schemas.microsoft.com/office/powerpoint/2010/main" xmlns="" Requires="p14">
+    <mc:Choice xmlns="" xmlns:p14="http://schemas.microsoft.com/office/powerpoint/2010/main" Requires="p14">
       <p:transition spd="slow" p14:dur="2000"/>
     </mc:Choice>
     <mc:Fallback>
@@ -7379,7 +7379,7 @@
     </p:spTree>
     <p:extLst>
       <p:ext uri="{BB962C8B-B14F-4D97-AF65-F5344CB8AC3E}">
-        <p14:creationId xmlns:p14="http://schemas.microsoft.com/office/powerpoint/2010/main" xmlns="" val="3748041918"/>
+        <p14:creationId xmlns="" xmlns:p14="http://schemas.microsoft.com/office/powerpoint/2010/main" val="3748041918"/>
       </p:ext>
     </p:extLst>
   </p:cSld>
@@ -7387,7 +7387,7 @@
     <a:masterClrMapping/>
   </p:clrMapOvr>
   <mc:AlternateContent xmlns:mc="http://schemas.openxmlformats.org/markup-compatibility/2006">
-    <mc:Choice xmlns:p14="http://schemas.microsoft.com/office/powerpoint/2010/main" xmlns="" Requires="p14">
+    <mc:Choice xmlns="" xmlns:p14="http://schemas.microsoft.com/office/powerpoint/2010/main" Requires="p14">
       <p:transition spd="slow" p14:dur="2000"/>
     </mc:Choice>
     <mc:Fallback>
@@ -7488,7 +7488,7 @@
     </p:spTree>
     <p:extLst>
       <p:ext uri="{BB962C8B-B14F-4D97-AF65-F5344CB8AC3E}">
-        <p14:creationId xmlns:p14="http://schemas.microsoft.com/office/powerpoint/2010/main" xmlns="" val="3695870384"/>
+        <p14:creationId xmlns="" xmlns:p14="http://schemas.microsoft.com/office/powerpoint/2010/main" val="3695870384"/>
       </p:ext>
     </p:extLst>
   </p:cSld>
@@ -7589,7 +7589,7 @@
     </p:spTree>
     <p:extLst>
       <p:ext uri="{BB962C8B-B14F-4D97-AF65-F5344CB8AC3E}">
-        <p14:creationId xmlns:p14="http://schemas.microsoft.com/office/powerpoint/2010/main" xmlns="" val="3987928837"/>
+        <p14:creationId xmlns="" xmlns:p14="http://schemas.microsoft.com/office/powerpoint/2010/main" val="3987928837"/>
       </p:ext>
     </p:extLst>
   </p:cSld>
@@ -7914,7 +7914,7 @@
     </p:spTree>
     <p:extLst>
       <p:ext uri="{BB962C8B-B14F-4D97-AF65-F5344CB8AC3E}">
-        <p14:creationId xmlns:p14="http://schemas.microsoft.com/office/powerpoint/2010/main" xmlns="" val="1367578552"/>
+        <p14:creationId xmlns="" xmlns:p14="http://schemas.microsoft.com/office/powerpoint/2010/main" val="1367578552"/>
       </p:ext>
     </p:extLst>
   </p:cSld>
@@ -8042,7 +8042,7 @@
     </p:spTree>
     <p:extLst>
       <p:ext uri="{BB962C8B-B14F-4D97-AF65-F5344CB8AC3E}">
-        <p14:creationId xmlns:p14="http://schemas.microsoft.com/office/powerpoint/2010/main" xmlns="" val="1554749062"/>
+        <p14:creationId xmlns="" xmlns:p14="http://schemas.microsoft.com/office/powerpoint/2010/main" val="1554749062"/>
       </p:ext>
     </p:extLst>
   </p:cSld>
@@ -8170,7 +8170,7 @@
     </p:spTree>
     <p:extLst>
       <p:ext uri="{BB962C8B-B14F-4D97-AF65-F5344CB8AC3E}">
-        <p14:creationId xmlns:p14="http://schemas.microsoft.com/office/powerpoint/2010/main" xmlns="" val="1028530279"/>
+        <p14:creationId xmlns="" xmlns:p14="http://schemas.microsoft.com/office/powerpoint/2010/main" val="1028530279"/>
       </p:ext>
     </p:extLst>
   </p:cSld>
@@ -8298,7 +8298,7 @@
     </p:spTree>
     <p:extLst>
       <p:ext uri="{BB962C8B-B14F-4D97-AF65-F5344CB8AC3E}">
-        <p14:creationId xmlns:p14="http://schemas.microsoft.com/office/powerpoint/2010/main" xmlns="" val="2120081776"/>
+        <p14:creationId xmlns="" xmlns:p14="http://schemas.microsoft.com/office/powerpoint/2010/main" val="2120081776"/>
       </p:ext>
     </p:extLst>
   </p:cSld>
@@ -8438,7 +8438,7 @@
     </p:spTree>
     <p:extLst>
       <p:ext uri="{BB962C8B-B14F-4D97-AF65-F5344CB8AC3E}">
-        <p14:creationId xmlns:p14="http://schemas.microsoft.com/office/powerpoint/2010/main" xmlns="" val="3320352623"/>
+        <p14:creationId xmlns="" xmlns:p14="http://schemas.microsoft.com/office/powerpoint/2010/main" val="3320352623"/>
       </p:ext>
     </p:extLst>
   </p:cSld>
@@ -8578,7 +8578,7 @@
     </p:spTree>
     <p:extLst>
       <p:ext uri="{BB962C8B-B14F-4D97-AF65-F5344CB8AC3E}">
-        <p14:creationId xmlns:p14="http://schemas.microsoft.com/office/powerpoint/2010/main" xmlns="" val="4011022122"/>
+        <p14:creationId xmlns="" xmlns:p14="http://schemas.microsoft.com/office/powerpoint/2010/main" val="4011022122"/>
       </p:ext>
     </p:extLst>
   </p:cSld>
@@ -8883,7 +8883,7 @@
     </p:spTree>
     <p:extLst>
       <p:ext uri="{BB962C8B-B14F-4D97-AF65-F5344CB8AC3E}">
-        <p14:creationId xmlns:p14="http://schemas.microsoft.com/office/powerpoint/2010/main" xmlns="" val="2927506779"/>
+        <p14:creationId xmlns="" xmlns:p14="http://schemas.microsoft.com/office/powerpoint/2010/main" val="2927506779"/>
       </p:ext>
     </p:extLst>
   </p:cSld>
@@ -9550,7 +9550,7 @@
     </p:spTree>
     <p:extLst>
       <p:ext uri="{BB962C8B-B14F-4D97-AF65-F5344CB8AC3E}">
-        <p14:creationId xmlns:p14="http://schemas.microsoft.com/office/powerpoint/2010/main" xmlns="" val="1720938352"/>
+        <p14:creationId xmlns="" xmlns:p14="http://schemas.microsoft.com/office/powerpoint/2010/main" val="1720938352"/>
       </p:ext>
     </p:extLst>
   </p:cSld>
@@ -9558,7 +9558,7 @@
     <a:masterClrMapping/>
   </p:clrMapOvr>
   <mc:AlternateContent xmlns:mc="http://schemas.openxmlformats.org/markup-compatibility/2006">
-    <mc:Choice xmlns:p14="http://schemas.microsoft.com/office/powerpoint/2010/main" xmlns="" Requires="p14">
+    <mc:Choice xmlns="" xmlns:p14="http://schemas.microsoft.com/office/powerpoint/2010/main" Requires="p14">
       <p:transition spd="slow" p14:dur="2000"/>
     </mc:Choice>
     <mc:Fallback>
@@ -9852,7 +9852,7 @@
     </p:spTree>
     <p:extLst>
       <p:ext uri="{BB962C8B-B14F-4D97-AF65-F5344CB8AC3E}">
-        <p14:creationId xmlns:p14="http://schemas.microsoft.com/office/powerpoint/2010/main" xmlns="" val="3389076463"/>
+        <p14:creationId xmlns="" xmlns:p14="http://schemas.microsoft.com/office/powerpoint/2010/main" val="3389076463"/>
       </p:ext>
     </p:extLst>
   </p:cSld>
@@ -9975,7 +9975,7 @@
     </p:spTree>
     <p:extLst>
       <p:ext uri="{BB962C8B-B14F-4D97-AF65-F5344CB8AC3E}">
-        <p14:creationId xmlns:p14="http://schemas.microsoft.com/office/powerpoint/2010/main" xmlns="" val="3781125707"/>
+        <p14:creationId xmlns="" xmlns:p14="http://schemas.microsoft.com/office/powerpoint/2010/main" val="3781125707"/>
       </p:ext>
     </p:extLst>
   </p:cSld>
@@ -10099,7 +10099,7 @@
     </p:spTree>
     <p:extLst>
       <p:ext uri="{BB962C8B-B14F-4D97-AF65-F5344CB8AC3E}">
-        <p14:creationId xmlns:p14="http://schemas.microsoft.com/office/powerpoint/2010/main" xmlns="" val="3113757335"/>
+        <p14:creationId xmlns="" xmlns:p14="http://schemas.microsoft.com/office/powerpoint/2010/main" val="3113757335"/>
       </p:ext>
     </p:extLst>
   </p:cSld>
@@ -10183,7 +10183,7 @@
     </p:spTree>
     <p:extLst>
       <p:ext uri="{BB962C8B-B14F-4D97-AF65-F5344CB8AC3E}">
-        <p14:creationId xmlns:p14="http://schemas.microsoft.com/office/powerpoint/2010/main" xmlns="" val="3128220547"/>
+        <p14:creationId xmlns="" xmlns:p14="http://schemas.microsoft.com/office/powerpoint/2010/main" val="3128220547"/>
       </p:ext>
     </p:extLst>
   </p:cSld>
@@ -10309,7 +10309,7 @@
     </p:spTree>
     <p:extLst>
       <p:ext uri="{BB962C8B-B14F-4D97-AF65-F5344CB8AC3E}">
-        <p14:creationId xmlns:p14="http://schemas.microsoft.com/office/powerpoint/2010/main" xmlns="" val="3526463055"/>
+        <p14:creationId xmlns="" xmlns:p14="http://schemas.microsoft.com/office/powerpoint/2010/main" val="3526463055"/>
       </p:ext>
     </p:extLst>
   </p:cSld>
@@ -10432,7 +10432,7 @@
     </p:spTree>
     <p:extLst>
       <p:ext uri="{BB962C8B-B14F-4D97-AF65-F5344CB8AC3E}">
-        <p14:creationId xmlns:p14="http://schemas.microsoft.com/office/powerpoint/2010/main" xmlns="" val="4153735844"/>
+        <p14:creationId xmlns="" xmlns:p14="http://schemas.microsoft.com/office/powerpoint/2010/main" val="4153735844"/>
       </p:ext>
     </p:extLst>
   </p:cSld>
@@ -10525,7 +10525,7 @@
     </p:spTree>
     <p:extLst>
       <p:ext uri="{BB962C8B-B14F-4D97-AF65-F5344CB8AC3E}">
-        <p14:creationId xmlns:p14="http://schemas.microsoft.com/office/powerpoint/2010/main" xmlns="" val="3584613944"/>
+        <p14:creationId xmlns="" xmlns:p14="http://schemas.microsoft.com/office/powerpoint/2010/main" val="3584613944"/>
       </p:ext>
     </p:extLst>
   </p:cSld>
@@ -10714,7 +10714,7 @@
     </p:spTree>
     <p:extLst>
       <p:ext uri="{BB962C8B-B14F-4D97-AF65-F5344CB8AC3E}">
-        <p14:creationId xmlns:p14="http://schemas.microsoft.com/office/powerpoint/2010/main" xmlns="" val="1309712431"/>
+        <p14:creationId xmlns="" xmlns:p14="http://schemas.microsoft.com/office/powerpoint/2010/main" val="1309712431"/>
       </p:ext>
     </p:extLst>
   </p:cSld>
@@ -10931,7 +10931,7 @@
     </p:spTree>
     <p:extLst>
       <p:ext uri="{BB962C8B-B14F-4D97-AF65-F5344CB8AC3E}">
-        <p14:creationId xmlns:p14="http://schemas.microsoft.com/office/powerpoint/2010/main" xmlns="" val="3902446084"/>
+        <p14:creationId xmlns="" xmlns:p14="http://schemas.microsoft.com/office/powerpoint/2010/main" val="3902446084"/>
       </p:ext>
     </p:extLst>
   </p:cSld>
@@ -11123,7 +11123,7 @@
     </p:spTree>
     <p:extLst>
       <p:ext uri="{BB962C8B-B14F-4D97-AF65-F5344CB8AC3E}">
-        <p14:creationId xmlns:p14="http://schemas.microsoft.com/office/powerpoint/2010/main" xmlns="" val="3677979436"/>
+        <p14:creationId xmlns="" xmlns:p14="http://schemas.microsoft.com/office/powerpoint/2010/main" val="3677979436"/>
       </p:ext>
     </p:extLst>
   </p:cSld>
@@ -11640,7 +11640,7 @@
     </p:spTree>
     <p:extLst>
       <p:ext uri="{BB962C8B-B14F-4D97-AF65-F5344CB8AC3E}">
-        <p14:creationId xmlns:p14="http://schemas.microsoft.com/office/powerpoint/2010/main" xmlns="" val="3436514102"/>
+        <p14:creationId xmlns="" xmlns:p14="http://schemas.microsoft.com/office/powerpoint/2010/main" val="3436514102"/>
       </p:ext>
     </p:extLst>
   </p:cSld>
@@ -11648,7 +11648,7 @@
     <a:masterClrMapping/>
   </p:clrMapOvr>
   <mc:AlternateContent xmlns:mc="http://schemas.openxmlformats.org/markup-compatibility/2006">
-    <mc:Choice xmlns:p14="http://schemas.microsoft.com/office/powerpoint/2010/main" xmlns="" Requires="p14">
+    <mc:Choice xmlns="" xmlns:p14="http://schemas.microsoft.com/office/powerpoint/2010/main" Requires="p14">
       <p:transition spd="slow" p14:dur="2000"/>
     </mc:Choice>
     <mc:Fallback>
@@ -11741,7 +11741,7 @@
     </p:spTree>
     <p:extLst>
       <p:ext uri="{BB962C8B-B14F-4D97-AF65-F5344CB8AC3E}">
-        <p14:creationId xmlns:p14="http://schemas.microsoft.com/office/powerpoint/2010/main" xmlns="" val="2777952497"/>
+        <p14:creationId xmlns="" xmlns:p14="http://schemas.microsoft.com/office/powerpoint/2010/main" val="2777952497"/>
       </p:ext>
     </p:extLst>
   </p:cSld>
@@ -11929,7 +11929,7 @@
     </p:spTree>
     <p:extLst>
       <p:ext uri="{BB962C8B-B14F-4D97-AF65-F5344CB8AC3E}">
-        <p14:creationId xmlns:p14="http://schemas.microsoft.com/office/powerpoint/2010/main" xmlns="" val="2574674066"/>
+        <p14:creationId xmlns="" xmlns:p14="http://schemas.microsoft.com/office/powerpoint/2010/main" val="2574674066"/>
       </p:ext>
     </p:extLst>
   </p:cSld>
@@ -12022,7 +12022,7 @@
     </p:spTree>
     <p:extLst>
       <p:ext uri="{BB962C8B-B14F-4D97-AF65-F5344CB8AC3E}">
-        <p14:creationId xmlns:p14="http://schemas.microsoft.com/office/powerpoint/2010/main" xmlns="" val="763878143"/>
+        <p14:creationId xmlns="" xmlns:p14="http://schemas.microsoft.com/office/powerpoint/2010/main" val="763878143"/>
       </p:ext>
     </p:extLst>
   </p:cSld>
@@ -12643,7 +12643,7 @@
     </p:spTree>
     <p:extLst>
       <p:ext uri="{BB962C8B-B14F-4D97-AF65-F5344CB8AC3E}">
-        <p14:creationId xmlns:p14="http://schemas.microsoft.com/office/powerpoint/2010/main" xmlns="" val="42533803"/>
+        <p14:creationId xmlns="" xmlns:p14="http://schemas.microsoft.com/office/powerpoint/2010/main" val="42533803"/>
       </p:ext>
     </p:extLst>
   </p:cSld>
@@ -12651,7 +12651,7 @@
     <a:masterClrMapping/>
   </p:clrMapOvr>
   <mc:AlternateContent xmlns:mc="http://schemas.openxmlformats.org/markup-compatibility/2006">
-    <mc:Choice xmlns:p14="http://schemas.microsoft.com/office/powerpoint/2010/main" xmlns="" Requires="p14">
+    <mc:Choice xmlns="" xmlns:p14="http://schemas.microsoft.com/office/powerpoint/2010/main" Requires="p14">
       <p:transition spd="slow" p14:dur="2000"/>
     </mc:Choice>
     <mc:Fallback>
@@ -12955,7 +12955,7 @@
     </p:spTree>
     <p:extLst>
       <p:ext uri="{BB962C8B-B14F-4D97-AF65-F5344CB8AC3E}">
-        <p14:creationId xmlns:p14="http://schemas.microsoft.com/office/powerpoint/2010/main" xmlns="" val="719158636"/>
+        <p14:creationId xmlns="" xmlns:p14="http://schemas.microsoft.com/office/powerpoint/2010/main" val="719158636"/>
       </p:ext>
     </p:extLst>
   </p:cSld>
@@ -12963,7 +12963,7 @@
     <a:masterClrMapping/>
   </p:clrMapOvr>
   <mc:AlternateContent xmlns:mc="http://schemas.openxmlformats.org/markup-compatibility/2006">
-    <mc:Choice xmlns:p14="http://schemas.microsoft.com/office/powerpoint/2010/main" xmlns="" Requires="p14">
+    <mc:Choice xmlns="" xmlns:p14="http://schemas.microsoft.com/office/powerpoint/2010/main" Requires="p14">
       <p:transition spd="slow" p14:dur="2000"/>
     </mc:Choice>
     <mc:Fallback>
@@ -13264,7 +13264,7 @@
     </p:spTree>
     <p:extLst>
       <p:ext uri="{BB962C8B-B14F-4D97-AF65-F5344CB8AC3E}">
-        <p14:creationId xmlns:p14="http://schemas.microsoft.com/office/powerpoint/2010/main" xmlns="" val="3790159258"/>
+        <p14:creationId xmlns="" xmlns:p14="http://schemas.microsoft.com/office/powerpoint/2010/main" val="3790159258"/>
       </p:ext>
     </p:extLst>
   </p:cSld>
@@ -13272,7 +13272,7 @@
     <a:masterClrMapping/>
   </p:clrMapOvr>
   <mc:AlternateContent xmlns:mc="http://schemas.openxmlformats.org/markup-compatibility/2006">
-    <mc:Choice xmlns:p14="http://schemas.microsoft.com/office/powerpoint/2010/main" xmlns="" Requires="p14">
+    <mc:Choice xmlns="" xmlns:p14="http://schemas.microsoft.com/office/powerpoint/2010/main" Requires="p14">
       <p:transition spd="slow" p14:dur="2000"/>
     </mc:Choice>
     <mc:Fallback>
@@ -13580,7 +13580,7 @@
     </p:spTree>
     <p:extLst>
       <p:ext uri="{BB962C8B-B14F-4D97-AF65-F5344CB8AC3E}">
-        <p14:creationId xmlns:p14="http://schemas.microsoft.com/office/powerpoint/2010/main" xmlns="" val="560870364"/>
+        <p14:creationId xmlns="" xmlns:p14="http://schemas.microsoft.com/office/powerpoint/2010/main" val="560870364"/>
       </p:ext>
     </p:extLst>
   </p:cSld>
@@ -13588,7 +13588,7 @@
     <a:masterClrMapping/>
   </p:clrMapOvr>
   <mc:AlternateContent xmlns:mc="http://schemas.openxmlformats.org/markup-compatibility/2006">
-    <mc:Choice xmlns:p14="http://schemas.microsoft.com/office/powerpoint/2010/main" xmlns="" Requires="p14">
+    <mc:Choice xmlns="" xmlns:p14="http://schemas.microsoft.com/office/powerpoint/2010/main" Requires="p14">
       <p:transition spd="slow" p14:dur="2000"/>
     </mc:Choice>
     <mc:Fallback>
@@ -13889,7 +13889,7 @@
     </p:spTree>
     <p:extLst>
       <p:ext uri="{BB962C8B-B14F-4D97-AF65-F5344CB8AC3E}">
-        <p14:creationId xmlns:p14="http://schemas.microsoft.com/office/powerpoint/2010/main" xmlns="" val="518406238"/>
+        <p14:creationId xmlns="" xmlns:p14="http://schemas.microsoft.com/office/powerpoint/2010/main" val="518406238"/>
       </p:ext>
     </p:extLst>
   </p:cSld>
@@ -13897,7 +13897,7 @@
     <a:masterClrMapping/>
   </p:clrMapOvr>
   <mc:AlternateContent xmlns:mc="http://schemas.openxmlformats.org/markup-compatibility/2006">
-    <mc:Choice xmlns:p14="http://schemas.microsoft.com/office/powerpoint/2010/main" xmlns="" Requires="p14">
+    <mc:Choice xmlns="" xmlns:p14="http://schemas.microsoft.com/office/powerpoint/2010/main" Requires="p14">
       <p:transition spd="slow" p14:dur="2000"/>
     </mc:Choice>
     <mc:Fallback>
@@ -14198,7 +14198,7 @@
     </p:spTree>
     <p:extLst>
       <p:ext uri="{BB962C8B-B14F-4D97-AF65-F5344CB8AC3E}">
-        <p14:creationId xmlns:p14="http://schemas.microsoft.com/office/powerpoint/2010/main" xmlns="" val="3089945963"/>
+        <p14:creationId xmlns="" xmlns:p14="http://schemas.microsoft.com/office/powerpoint/2010/main" val="3089945963"/>
       </p:ext>
     </p:extLst>
   </p:cSld>
@@ -14206,7 +14206,7 @@
     <a:masterClrMapping/>
   </p:clrMapOvr>
   <mc:AlternateContent xmlns:mc="http://schemas.openxmlformats.org/markup-compatibility/2006">
-    <mc:Choice xmlns:p14="http://schemas.microsoft.com/office/powerpoint/2010/main" xmlns="" Requires="p14">
+    <mc:Choice xmlns="" xmlns:p14="http://schemas.microsoft.com/office/powerpoint/2010/main" Requires="p14">
       <p:transition spd="slow" p14:dur="2000"/>
     </mc:Choice>
     <mc:Fallback>
@@ -14553,7 +14553,7 @@
     </p:spTree>
     <p:extLst>
       <p:ext uri="{BB962C8B-B14F-4D97-AF65-F5344CB8AC3E}">
-        <p14:creationId xmlns:p14="http://schemas.microsoft.com/office/powerpoint/2010/main" xmlns="" val="3735783036"/>
+        <p14:creationId xmlns="" xmlns:p14="http://schemas.microsoft.com/office/powerpoint/2010/main" val="3735783036"/>
       </p:ext>
     </p:extLst>
   </p:cSld>
@@ -14561,7 +14561,7 @@
     <a:masterClrMapping/>
   </p:clrMapOvr>
   <mc:AlternateContent xmlns:mc="http://schemas.openxmlformats.org/markup-compatibility/2006">
-    <mc:Choice xmlns:p14="http://schemas.microsoft.com/office/powerpoint/2010/main" xmlns="" Requires="p14">
+    <mc:Choice xmlns="" xmlns:p14="http://schemas.microsoft.com/office/powerpoint/2010/main" Requires="p14">
       <p:transition spd="slow" p14:dur="2000"/>
     </mc:Choice>
     <mc:Fallback>
@@ -14874,7 +14874,7 @@
     </p:spTree>
     <p:extLst>
       <p:ext uri="{BB962C8B-B14F-4D97-AF65-F5344CB8AC3E}">
-        <p14:creationId xmlns:p14="http://schemas.microsoft.com/office/powerpoint/2010/main" xmlns="" val="820318166"/>
+        <p14:creationId xmlns="" xmlns:p14="http://schemas.microsoft.com/office/powerpoint/2010/main" val="820318166"/>
       </p:ext>
     </p:extLst>
   </p:cSld>
@@ -14882,7 +14882,7 @@
     <a:masterClrMapping/>
   </p:clrMapOvr>
   <mc:AlternateContent xmlns:mc="http://schemas.openxmlformats.org/markup-compatibility/2006">
-    <mc:Choice xmlns:p14="http://schemas.microsoft.com/office/powerpoint/2010/main" xmlns="" Requires="p14">
+    <mc:Choice xmlns="" xmlns:p14="http://schemas.microsoft.com/office/powerpoint/2010/main" Requires="p14">
       <p:transition spd="slow" p14:dur="2000"/>
     </mc:Choice>
     <mc:Fallback>
@@ -15202,7 +15202,7 @@
     </p:spTree>
     <p:extLst>
       <p:ext uri="{BB962C8B-B14F-4D97-AF65-F5344CB8AC3E}">
-        <p14:creationId xmlns:p14="http://schemas.microsoft.com/office/powerpoint/2010/main" xmlns="" val="2112585717"/>
+        <p14:creationId xmlns="" xmlns:p14="http://schemas.microsoft.com/office/powerpoint/2010/main" val="2112585717"/>
       </p:ext>
     </p:extLst>
   </p:cSld>
@@ -15210,7 +15210,7 @@
     <a:masterClrMapping/>
   </p:clrMapOvr>
   <mc:AlternateContent xmlns:mc="http://schemas.openxmlformats.org/markup-compatibility/2006">
-    <mc:Choice xmlns:p14="http://schemas.microsoft.com/office/powerpoint/2010/main" xmlns="" Requires="p14">
+    <mc:Choice xmlns="" xmlns:p14="http://schemas.microsoft.com/office/powerpoint/2010/main" Requires="p14">
       <p:transition spd="slow" p14:dur="2000"/>
     </mc:Choice>
     <mc:Fallback>
@@ -15495,7 +15495,7 @@
     </p:spTree>
     <p:extLst>
       <p:ext uri="{BB962C8B-B14F-4D97-AF65-F5344CB8AC3E}">
-        <p14:creationId xmlns:p14="http://schemas.microsoft.com/office/powerpoint/2010/main" xmlns="" val="2498309309"/>
+        <p14:creationId xmlns="" xmlns:p14="http://schemas.microsoft.com/office/powerpoint/2010/main" val="2498309309"/>
       </p:ext>
     </p:extLst>
   </p:cSld>
@@ -15503,7 +15503,7 @@
     <a:masterClrMapping/>
   </p:clrMapOvr>
   <mc:AlternateContent xmlns:mc="http://schemas.openxmlformats.org/markup-compatibility/2006">
-    <mc:Choice xmlns:p14="http://schemas.microsoft.com/office/powerpoint/2010/main" xmlns="" Requires="p14">
+    <mc:Choice xmlns="" xmlns:p14="http://schemas.microsoft.com/office/powerpoint/2010/main" Requires="p14">
       <p:transition spd="slow" p14:dur="2000"/>
     </mc:Choice>
     <mc:Fallback>
@@ -15800,7 +15800,7 @@
     </p:spTree>
     <p:extLst>
       <p:ext uri="{BB962C8B-B14F-4D97-AF65-F5344CB8AC3E}">
-        <p14:creationId xmlns:p14="http://schemas.microsoft.com/office/powerpoint/2010/main" xmlns="" val="490993421"/>
+        <p14:creationId xmlns="" xmlns:p14="http://schemas.microsoft.com/office/powerpoint/2010/main" val="490993421"/>
       </p:ext>
     </p:extLst>
   </p:cSld>
@@ -15808,7 +15808,7 @@
     <a:masterClrMapping/>
   </p:clrMapOvr>
   <mc:AlternateContent xmlns:mc="http://schemas.openxmlformats.org/markup-compatibility/2006">
-    <mc:Choice xmlns:p14="http://schemas.microsoft.com/office/powerpoint/2010/main" xmlns="" Requires="p14">
+    <mc:Choice xmlns="" xmlns:p14="http://schemas.microsoft.com/office/powerpoint/2010/main" Requires="p14">
       <p:transition spd="slow" p14:dur="2000"/>
     </mc:Choice>
     <mc:Fallback>
@@ -16077,7 +16077,7 @@
     </p:spTree>
     <p:extLst>
       <p:ext uri="{BB962C8B-B14F-4D97-AF65-F5344CB8AC3E}">
-        <p14:creationId xmlns:p14="http://schemas.microsoft.com/office/powerpoint/2010/main" xmlns="" val="1982603412"/>
+        <p14:creationId xmlns="" xmlns:p14="http://schemas.microsoft.com/office/powerpoint/2010/main" val="1982603412"/>
       </p:ext>
     </p:extLst>
   </p:cSld>
@@ -16085,7 +16085,7 @@
     <a:masterClrMapping/>
   </p:clrMapOvr>
   <mc:AlternateContent xmlns:mc="http://schemas.openxmlformats.org/markup-compatibility/2006">
-    <mc:Choice xmlns:p14="http://schemas.microsoft.com/office/powerpoint/2010/main" xmlns="" Requires="p14">
+    <mc:Choice xmlns="" xmlns:p14="http://schemas.microsoft.com/office/powerpoint/2010/main" Requires="p14">
       <p:transition spd="slow" p14:dur="2000"/>
     </mc:Choice>
     <mc:Fallback>
@@ -16178,7 +16178,7 @@
     </p:spTree>
     <p:extLst>
       <p:ext uri="{BB962C8B-B14F-4D97-AF65-F5344CB8AC3E}">
-        <p14:creationId xmlns:p14="http://schemas.microsoft.com/office/powerpoint/2010/main" xmlns="" val="3486681628"/>
+        <p14:creationId xmlns="" xmlns:p14="http://schemas.microsoft.com/office/powerpoint/2010/main" val="3486681628"/>
       </p:ext>
     </p:extLst>
   </p:cSld>
@@ -16186,7 +16186,7 @@
     <a:masterClrMapping/>
   </p:clrMapOvr>
   <mc:AlternateContent xmlns:mc="http://schemas.openxmlformats.org/markup-compatibility/2006">
-    <mc:Choice xmlns:p14="http://schemas.microsoft.com/office/powerpoint/2010/main" xmlns="" Requires="p14">
+    <mc:Choice xmlns="" xmlns:p14="http://schemas.microsoft.com/office/powerpoint/2010/main" Requires="p14">
       <p:transition spd="slow" p14:dur="2000"/>
     </mc:Choice>
     <mc:Fallback>
@@ -16496,7 +16496,7 @@
     </p:spTree>
     <p:extLst>
       <p:ext uri="{BB962C8B-B14F-4D97-AF65-F5344CB8AC3E}">
-        <p14:creationId xmlns:p14="http://schemas.microsoft.com/office/powerpoint/2010/main" xmlns="" val="2167458548"/>
+        <p14:creationId xmlns="" xmlns:p14="http://schemas.microsoft.com/office/powerpoint/2010/main" val="2167458548"/>
       </p:ext>
     </p:extLst>
   </p:cSld>
@@ -16504,7 +16504,7 @@
     <a:masterClrMapping/>
   </p:clrMapOvr>
   <mc:AlternateContent xmlns:mc="http://schemas.openxmlformats.org/markup-compatibility/2006">
-    <mc:Choice xmlns:p14="http://schemas.microsoft.com/office/powerpoint/2010/main" xmlns="" Requires="p14">
+    <mc:Choice xmlns="" xmlns:p14="http://schemas.microsoft.com/office/powerpoint/2010/main" Requires="p14">
       <p:transition spd="slow" p14:dur="2000"/>
     </mc:Choice>
     <mc:Fallback>
@@ -16603,7 +16603,7 @@
     </p:spTree>
     <p:extLst>
       <p:ext uri="{BB962C8B-B14F-4D97-AF65-F5344CB8AC3E}">
-        <p14:creationId xmlns:p14="http://schemas.microsoft.com/office/powerpoint/2010/main" xmlns="" val="77984983"/>
+        <p14:creationId xmlns="" xmlns:p14="http://schemas.microsoft.com/office/powerpoint/2010/main" val="77984983"/>
       </p:ext>
     </p:extLst>
   </p:cSld>
@@ -16611,7 +16611,7 @@
     <a:masterClrMapping/>
   </p:clrMapOvr>
   <mc:AlternateContent xmlns:mc="http://schemas.openxmlformats.org/markup-compatibility/2006">
-    <mc:Choice xmlns:p14="http://schemas.microsoft.com/office/powerpoint/2010/main" xmlns="" Requires="p14">
+    <mc:Choice xmlns="" xmlns:p14="http://schemas.microsoft.com/office/powerpoint/2010/main" Requires="p14">
       <p:transition spd="slow" p14:dur="2000"/>
     </mc:Choice>
     <mc:Fallback>
@@ -16710,7 +16710,7 @@
     </p:spTree>
     <p:extLst>
       <p:ext uri="{BB962C8B-B14F-4D97-AF65-F5344CB8AC3E}">
-        <p14:creationId xmlns:p14="http://schemas.microsoft.com/office/powerpoint/2010/main" xmlns="" val="3690446741"/>
+        <p14:creationId xmlns="" xmlns:p14="http://schemas.microsoft.com/office/powerpoint/2010/main" val="3690446741"/>
       </p:ext>
     </p:extLst>
   </p:cSld>
@@ -16718,7 +16718,7 @@
     <a:masterClrMapping/>
   </p:clrMapOvr>
   <mc:AlternateContent xmlns:mc="http://schemas.openxmlformats.org/markup-compatibility/2006">
-    <mc:Choice xmlns:p14="http://schemas.microsoft.com/office/powerpoint/2010/main" xmlns="" Requires="p14">
+    <mc:Choice xmlns="" xmlns:p14="http://schemas.microsoft.com/office/powerpoint/2010/main" Requires="p14">
       <p:transition spd="slow" p14:dur="2000"/>
     </mc:Choice>
     <mc:Fallback>
@@ -16949,7 +16949,7 @@
     </p:spTree>
     <p:extLst>
       <p:ext uri="{BB962C8B-B14F-4D97-AF65-F5344CB8AC3E}">
-        <p14:creationId xmlns:p14="http://schemas.microsoft.com/office/powerpoint/2010/main" xmlns="" val="1921668123"/>
+        <p14:creationId xmlns="" xmlns:p14="http://schemas.microsoft.com/office/powerpoint/2010/main" val="1921668123"/>
       </p:ext>
     </p:extLst>
   </p:cSld>
@@ -16957,7 +16957,7 @@
     <a:masterClrMapping/>
   </p:clrMapOvr>
   <mc:AlternateContent xmlns:mc="http://schemas.openxmlformats.org/markup-compatibility/2006">
-    <mc:Choice xmlns:p14="http://schemas.microsoft.com/office/powerpoint/2010/main" xmlns="" Requires="p14">
+    <mc:Choice xmlns="" xmlns:p14="http://schemas.microsoft.com/office/powerpoint/2010/main" Requires="p14">
       <p:transition spd="slow" p14:dur="2000"/>
     </mc:Choice>
     <mc:Fallback>
@@ -17308,7 +17308,7 @@
     </p:spTree>
     <p:extLst>
       <p:ext uri="{BB962C8B-B14F-4D97-AF65-F5344CB8AC3E}">
-        <p14:creationId xmlns:p14="http://schemas.microsoft.com/office/powerpoint/2010/main" xmlns="" val="1766382090"/>
+        <p14:creationId xmlns="" xmlns:p14="http://schemas.microsoft.com/office/powerpoint/2010/main" val="1766382090"/>
       </p:ext>
     </p:extLst>
   </p:cSld>
@@ -17316,7 +17316,7 @@
     <a:masterClrMapping/>
   </p:clrMapOvr>
   <mc:AlternateContent xmlns:mc="http://schemas.openxmlformats.org/markup-compatibility/2006">
-    <mc:Choice xmlns:p14="http://schemas.microsoft.com/office/powerpoint/2010/main" xmlns="" Requires="p14">
+    <mc:Choice xmlns="" xmlns:p14="http://schemas.microsoft.com/office/powerpoint/2010/main" Requires="p14">
       <p:transition spd="slow" p14:dur="2000"/>
     </mc:Choice>
     <mc:Fallback>
@@ -17608,7 +17608,7 @@
     </p:spTree>
     <p:extLst>
       <p:ext uri="{BB962C8B-B14F-4D97-AF65-F5344CB8AC3E}">
-        <p14:creationId xmlns:p14="http://schemas.microsoft.com/office/powerpoint/2010/main" xmlns="" val="2809531644"/>
+        <p14:creationId xmlns="" xmlns:p14="http://schemas.microsoft.com/office/powerpoint/2010/main" val="2809531644"/>
       </p:ext>
     </p:extLst>
   </p:cSld>
@@ -17616,7 +17616,7 @@
     <a:masterClrMapping/>
   </p:clrMapOvr>
   <mc:AlternateContent xmlns:mc="http://schemas.openxmlformats.org/markup-compatibility/2006">
-    <mc:Choice xmlns:p14="http://schemas.microsoft.com/office/powerpoint/2010/main" xmlns="" Requires="p14">
+    <mc:Choice xmlns="" xmlns:p14="http://schemas.microsoft.com/office/powerpoint/2010/main" Requires="p14">
       <p:transition spd="slow" p14:dur="2000"/>
     </mc:Choice>
     <mc:Fallback>
@@ -17770,7 +17770,7 @@
     </p:spTree>
     <p:extLst>
       <p:ext uri="{BB962C8B-B14F-4D97-AF65-F5344CB8AC3E}">
-        <p14:creationId xmlns:p14="http://schemas.microsoft.com/office/powerpoint/2010/main" xmlns="" val="2052235477"/>
+        <p14:creationId xmlns="" xmlns:p14="http://schemas.microsoft.com/office/powerpoint/2010/main" val="2052235477"/>
       </p:ext>
     </p:extLst>
   </p:cSld>
@@ -17778,7 +17778,7 @@
     <a:masterClrMapping/>
   </p:clrMapOvr>
   <mc:AlternateContent xmlns:mc="http://schemas.openxmlformats.org/markup-compatibility/2006">
-    <mc:Choice xmlns:p14="http://schemas.microsoft.com/office/powerpoint/2010/main" xmlns="" Requires="p14">
+    <mc:Choice xmlns="" xmlns:p14="http://schemas.microsoft.com/office/powerpoint/2010/main" Requires="p14">
       <p:transition spd="slow" p14:dur="2000"/>
     </mc:Choice>
     <mc:Fallback>
@@ -17844,7 +17844,7 @@
     </p:spTree>
     <p:extLst>
       <p:ext uri="{BB962C8B-B14F-4D97-AF65-F5344CB8AC3E}">
-        <p14:creationId xmlns:p14="http://schemas.microsoft.com/office/powerpoint/2010/main" xmlns="" val="1378357901"/>
+        <p14:creationId xmlns="" xmlns:p14="http://schemas.microsoft.com/office/powerpoint/2010/main" val="1378357901"/>
       </p:ext>
     </p:extLst>
   </p:cSld>
@@ -17934,7 +17934,7 @@
           <p:nvPr>
             <p:extLst>
               <p:ext uri="{D42A27DB-BD31-4B8C-83A1-F6EECF244321}">
-                <p14:modId xmlns:p14="http://schemas.microsoft.com/office/powerpoint/2010/main" xmlns="" val="2256308220"/>
+                <p14:modId xmlns="" xmlns:p14="http://schemas.microsoft.com/office/powerpoint/2010/main" val="2256308220"/>
               </p:ext>
             </p:extLst>
           </p:nvPr>
@@ -18519,7 +18519,7 @@
     </p:spTree>
     <p:extLst>
       <p:ext uri="{BB962C8B-B14F-4D97-AF65-F5344CB8AC3E}">
-        <p14:creationId xmlns:p14="http://schemas.microsoft.com/office/powerpoint/2010/main" xmlns="" val="1730443546"/>
+        <p14:creationId xmlns="" xmlns:p14="http://schemas.microsoft.com/office/powerpoint/2010/main" val="1730443546"/>
       </p:ext>
     </p:extLst>
   </p:cSld>
@@ -18527,7 +18527,7 @@
     <a:masterClrMapping/>
   </p:clrMapOvr>
   <mc:AlternateContent xmlns:mc="http://schemas.openxmlformats.org/markup-compatibility/2006">
-    <mc:Choice xmlns:p14="http://schemas.microsoft.com/office/powerpoint/2010/main" xmlns="" Requires="p14">
+    <mc:Choice xmlns="" xmlns:p14="http://schemas.microsoft.com/office/powerpoint/2010/main" Requires="p14">
       <p:transition spd="slow" p14:dur="2000"/>
     </mc:Choice>
     <mc:Fallback>
@@ -19007,7 +19007,7 @@
     </p:spTree>
     <p:extLst>
       <p:ext uri="{BB962C8B-B14F-4D97-AF65-F5344CB8AC3E}">
-        <p14:creationId xmlns:p14="http://schemas.microsoft.com/office/powerpoint/2010/main" xmlns="" val="1629831378"/>
+        <p14:creationId xmlns="" xmlns:p14="http://schemas.microsoft.com/office/powerpoint/2010/main" val="1629831378"/>
       </p:ext>
     </p:extLst>
   </p:cSld>
@@ -19015,7 +19015,7 @@
     <a:masterClrMapping/>
   </p:clrMapOvr>
   <mc:AlternateContent xmlns:mc="http://schemas.openxmlformats.org/markup-compatibility/2006">
-    <mc:Choice xmlns:p14="http://schemas.microsoft.com/office/powerpoint/2010/main" xmlns="" Requires="p14">
+    <mc:Choice xmlns="" xmlns:p14="http://schemas.microsoft.com/office/powerpoint/2010/main" Requires="p14">
       <p:transition spd="slow" p14:dur="2000"/>
     </mc:Choice>
     <mc:Fallback>
@@ -19061,7 +19061,7 @@
           <a:blip r:embed="rId2" cstate="print">
             <a:extLst>
               <a:ext uri="{28A0092B-C50C-407E-A947-70E740481C1C}">
-                <a14:useLocalDpi xmlns:a14="http://schemas.microsoft.com/office/drawing/2010/main" xmlns="" val="0"/>
+                <a14:useLocalDpi xmlns="" xmlns:a14="http://schemas.microsoft.com/office/drawing/2010/main" val="0"/>
               </a:ext>
             </a:extLst>
           </a:blip>
@@ -19081,7 +19081,7 @@
           <a:noFill/>
           <a:extLst>
             <a:ext uri="{909E8E84-426E-40dd-AFC4-6F175D3DCCD1}">
-              <a14:hiddenFill xmlns:a14="http://schemas.microsoft.com/office/drawing/2010/main" xmlns="">
+              <a14:hiddenFill xmlns="" xmlns:a14="http://schemas.microsoft.com/office/drawing/2010/main">
                 <a:solidFill>
                   <a:srgbClr val="FFFFFF"/>
                 </a:solidFill>
@@ -19164,7 +19164,7 @@
     </p:spTree>
     <p:extLst>
       <p:ext uri="{BB962C8B-B14F-4D97-AF65-F5344CB8AC3E}">
-        <p14:creationId xmlns:p14="http://schemas.microsoft.com/office/powerpoint/2010/main" xmlns="" val="2367797895"/>
+        <p14:creationId xmlns="" xmlns:p14="http://schemas.microsoft.com/office/powerpoint/2010/main" val="2367797895"/>
       </p:ext>
     </p:extLst>
   </p:cSld>
@@ -19172,7 +19172,7 @@
     <a:masterClrMapping/>
   </p:clrMapOvr>
   <mc:AlternateContent xmlns:mc="http://schemas.openxmlformats.org/markup-compatibility/2006">
-    <mc:Choice xmlns:p14="http://schemas.microsoft.com/office/powerpoint/2010/main" xmlns="" Requires="p14">
+    <mc:Choice xmlns="" xmlns:p14="http://schemas.microsoft.com/office/powerpoint/2010/main" Requires="p14">
       <p:transition spd="slow" p14:dur="2000"/>
     </mc:Choice>
     <mc:Fallback>
@@ -19552,7 +19552,7 @@
     </p:spTree>
     <p:extLst>
       <p:ext uri="{BB962C8B-B14F-4D97-AF65-F5344CB8AC3E}">
-        <p14:creationId xmlns:p14="http://schemas.microsoft.com/office/powerpoint/2010/main" xmlns="" val="2781102722"/>
+        <p14:creationId xmlns="" xmlns:p14="http://schemas.microsoft.com/office/powerpoint/2010/main" val="2781102722"/>
       </p:ext>
     </p:extLst>
   </p:cSld>
@@ -20165,7 +20165,7 @@
     </p:spTree>
     <p:extLst>
       <p:ext uri="{BB962C8B-B14F-4D97-AF65-F5344CB8AC3E}">
-        <p14:creationId xmlns:p14="http://schemas.microsoft.com/office/powerpoint/2010/main" xmlns="" val="3452883339"/>
+        <p14:creationId xmlns="" xmlns:p14="http://schemas.microsoft.com/office/powerpoint/2010/main" val="3452883339"/>
       </p:ext>
     </p:extLst>
   </p:cSld>
@@ -20173,7 +20173,7 @@
     <a:masterClrMapping/>
   </p:clrMapOvr>
   <mc:AlternateContent xmlns:mc="http://schemas.openxmlformats.org/markup-compatibility/2006">
-    <mc:Choice xmlns:p14="http://schemas.microsoft.com/office/powerpoint/2010/main" xmlns="" Requires="p14">
+    <mc:Choice xmlns="" xmlns:p14="http://schemas.microsoft.com/office/powerpoint/2010/main" Requires="p14">
       <p:transition spd="slow" p14:dur="2000"/>
     </mc:Choice>
     <mc:Fallback>
@@ -21085,7 +21085,7 @@
     </p:spTree>
     <p:extLst>
       <p:ext uri="{BB962C8B-B14F-4D97-AF65-F5344CB8AC3E}">
-        <p14:creationId xmlns:p14="http://schemas.microsoft.com/office/powerpoint/2010/main" xmlns="" val="1827848310"/>
+        <p14:creationId xmlns="" xmlns:p14="http://schemas.microsoft.com/office/powerpoint/2010/main" val="1827848310"/>
       </p:ext>
     </p:extLst>
   </p:cSld>
@@ -21093,7 +21093,7 @@
     <a:masterClrMapping/>
   </p:clrMapOvr>
   <mc:AlternateContent xmlns:mc="http://schemas.openxmlformats.org/markup-compatibility/2006">
-    <mc:Choice xmlns:p14="http://schemas.microsoft.com/office/powerpoint/2010/main" xmlns="" Requires="p14">
+    <mc:Choice xmlns="" xmlns:p14="http://schemas.microsoft.com/office/powerpoint/2010/main" Requires="p14">
       <p:transition spd="slow" p14:dur="2000"/>
     </mc:Choice>
     <mc:Fallback>
@@ -22027,7 +22027,7 @@
       </p:sp>
       <p:pic>
         <p:nvPicPr>
-          <p:cNvPr id="3074" name="Picture 2" descr="C:\Users\Angelo\Downloads\Fotolia_13977964_XS.jpg"/>
+          <p:cNvPr id="1026" name="Picture 2" descr="C:\Users\Angelo\Desktop\Senza titolo-3.png"/>
           <p:cNvPicPr>
             <a:picLocks noChangeAspect="1" noChangeArrowheads="1"/>
           </p:cNvPicPr>
@@ -22042,8 +22042,8 @@
         </p:blipFill>
         <p:spPr bwMode="auto">
           <a:xfrm>
-            <a:off x="6230087" y="3959596"/>
-            <a:ext cx="2086329" cy="2781772"/>
+            <a:off x="5940152" y="3626370"/>
+            <a:ext cx="2341546" cy="3114998"/>
           </a:xfrm>
           <a:prstGeom prst="rect">
             <a:avLst/>
@@ -22054,7 +22054,7 @@
     </p:spTree>
     <p:extLst>
       <p:ext uri="{BB962C8B-B14F-4D97-AF65-F5344CB8AC3E}">
-        <p14:creationId xmlns:p14="http://schemas.microsoft.com/office/powerpoint/2010/main" xmlns="" val="2616731691"/>
+        <p14:creationId xmlns="" xmlns:p14="http://schemas.microsoft.com/office/powerpoint/2010/main" val="2616731691"/>
       </p:ext>
     </p:extLst>
   </p:cSld>
@@ -22062,7 +22062,7 @@
     <a:masterClrMapping/>
   </p:clrMapOvr>
   <mc:AlternateContent xmlns:mc="http://schemas.openxmlformats.org/markup-compatibility/2006">
-    <mc:Choice xmlns:p14="http://schemas.microsoft.com/office/powerpoint/2010/main" xmlns="" Requires="p14">
+    <mc:Choice xmlns="" xmlns:p14="http://schemas.microsoft.com/office/powerpoint/2010/main" Requires="p14">
       <p:transition spd="slow" p14:dur="2000"/>
     </mc:Choice>
     <mc:Fallback>
@@ -22121,41 +22121,6 @@
                                         <p:cTn id="7" dur="2000"/>
                                         <p:tgtEl>
                                           <p:spTgt spid="6"/>
-                                        </p:tgtEl>
-                                      </p:cBhvr>
-                                    </p:animEffect>
-                                  </p:childTnLst>
-                                </p:cTn>
-                              </p:par>
-                              <p:par>
-                                <p:cTn id="8" presetID="10" presetClass="entr" presetSubtype="0" fill="hold" nodeType="withEffect">
-                                  <p:stCondLst>
-                                    <p:cond delay="0"/>
-                                  </p:stCondLst>
-                                  <p:childTnLst>
-                                    <p:set>
-                                      <p:cBhvr>
-                                        <p:cTn id="9" dur="1" fill="hold">
-                                          <p:stCondLst>
-                                            <p:cond delay="0"/>
-                                          </p:stCondLst>
-                                        </p:cTn>
-                                        <p:tgtEl>
-                                          <p:spTgt spid="3074"/>
-                                        </p:tgtEl>
-                                        <p:attrNameLst>
-                                          <p:attrName>style.visibility</p:attrName>
-                                        </p:attrNameLst>
-                                      </p:cBhvr>
-                                      <p:to>
-                                        <p:strVal val="visible"/>
-                                      </p:to>
-                                    </p:set>
-                                    <p:animEffect transition="in" filter="fade">
-                                      <p:cBhvr>
-                                        <p:cTn id="10" dur="2000"/>
-                                        <p:tgtEl>
-                                          <p:spTgt spid="3074"/>
                                         </p:tgtEl>
                                       </p:cBhvr>
                                     </p:animEffect>
@@ -22531,7 +22496,7 @@
     </p:spTree>
     <p:extLst>
       <p:ext uri="{BB962C8B-B14F-4D97-AF65-F5344CB8AC3E}">
-        <p14:creationId xmlns:p14="http://schemas.microsoft.com/office/powerpoint/2010/main" xmlns="" val="1358147143"/>
+        <p14:creationId xmlns="" xmlns:p14="http://schemas.microsoft.com/office/powerpoint/2010/main" val="1358147143"/>
       </p:ext>
     </p:extLst>
   </p:cSld>
@@ -22539,7 +22504,7 @@
     <a:masterClrMapping/>
   </p:clrMapOvr>
   <mc:AlternateContent xmlns:mc="http://schemas.openxmlformats.org/markup-compatibility/2006">
-    <mc:Choice xmlns:p14="http://schemas.microsoft.com/office/powerpoint/2010/main" xmlns="" Requires="p14">
+    <mc:Choice xmlns="" xmlns:p14="http://schemas.microsoft.com/office/powerpoint/2010/main" Requires="p14">
       <p:transition spd="slow" p14:dur="2000"/>
     </mc:Choice>
     <mc:Fallback>
@@ -22749,7 +22714,7 @@
     </p:spTree>
     <p:extLst>
       <p:ext uri="{BB962C8B-B14F-4D97-AF65-F5344CB8AC3E}">
-        <p14:creationId xmlns:p14="http://schemas.microsoft.com/office/powerpoint/2010/main" xmlns="" val="2912892320"/>
+        <p14:creationId xmlns="" xmlns:p14="http://schemas.microsoft.com/office/powerpoint/2010/main" val="2912892320"/>
       </p:ext>
     </p:extLst>
   </p:cSld>
@@ -22757,7 +22722,7 @@
     <a:masterClrMapping/>
   </p:clrMapOvr>
   <mc:AlternateContent xmlns:mc="http://schemas.openxmlformats.org/markup-compatibility/2006">
-    <mc:Choice xmlns:p14="http://schemas.microsoft.com/office/powerpoint/2010/main" xmlns="" Requires="p14">
+    <mc:Choice xmlns="" xmlns:p14="http://schemas.microsoft.com/office/powerpoint/2010/main" Requires="p14">
       <p:transition spd="slow" p14:dur="2000"/>
     </mc:Choice>
     <mc:Fallback>
@@ -23228,7 +23193,7 @@
     </p:spTree>
     <p:extLst>
       <p:ext uri="{BB962C8B-B14F-4D97-AF65-F5344CB8AC3E}">
-        <p14:creationId xmlns:p14="http://schemas.microsoft.com/office/powerpoint/2010/main" xmlns="" val="462729233"/>
+        <p14:creationId xmlns="" xmlns:p14="http://schemas.microsoft.com/office/powerpoint/2010/main" val="462729233"/>
       </p:ext>
     </p:extLst>
   </p:cSld>
@@ -23236,7 +23201,7 @@
     <a:masterClrMapping/>
   </p:clrMapOvr>
   <mc:AlternateContent xmlns:mc="http://schemas.openxmlformats.org/markup-compatibility/2006">
-    <mc:Choice xmlns:p14="http://schemas.microsoft.com/office/powerpoint/2010/main" xmlns="" Requires="p14">
+    <mc:Choice xmlns="" xmlns:p14="http://schemas.microsoft.com/office/powerpoint/2010/main" Requires="p14">
       <p:transition spd="slow" p14:dur="2000"/>
     </mc:Choice>
     <mc:Fallback>
@@ -23893,7 +23858,7 @@
     </p:spTree>
     <p:extLst>
       <p:ext uri="{BB962C8B-B14F-4D97-AF65-F5344CB8AC3E}">
-        <p14:creationId xmlns:p14="http://schemas.microsoft.com/office/powerpoint/2010/main" xmlns="" val="1717101950"/>
+        <p14:creationId xmlns="" xmlns:p14="http://schemas.microsoft.com/office/powerpoint/2010/main" val="1717101950"/>
       </p:ext>
     </p:extLst>
   </p:cSld>
@@ -23901,7 +23866,7 @@
     <a:masterClrMapping/>
   </p:clrMapOvr>
   <mc:AlternateContent xmlns:mc="http://schemas.openxmlformats.org/markup-compatibility/2006">
-    <mc:Choice xmlns:p14="http://schemas.microsoft.com/office/powerpoint/2010/main" xmlns="" Requires="p14">
+    <mc:Choice xmlns="" xmlns:p14="http://schemas.microsoft.com/office/powerpoint/2010/main" Requires="p14">
       <p:transition spd="slow" p14:dur="2000"/>
     </mc:Choice>
     <mc:Fallback>
@@ -24322,7 +24287,7 @@
     </p:spTree>
     <p:extLst>
       <p:ext uri="{BB962C8B-B14F-4D97-AF65-F5344CB8AC3E}">
-        <p14:creationId xmlns:p14="http://schemas.microsoft.com/office/powerpoint/2010/main" xmlns="" val="309719199"/>
+        <p14:creationId xmlns="" xmlns:p14="http://schemas.microsoft.com/office/powerpoint/2010/main" val="309719199"/>
       </p:ext>
     </p:extLst>
   </p:cSld>
@@ -24330,7 +24295,7 @@
     <a:masterClrMapping/>
   </p:clrMapOvr>
   <mc:AlternateContent xmlns:mc="http://schemas.openxmlformats.org/markup-compatibility/2006">
-    <mc:Choice xmlns:p14="http://schemas.microsoft.com/office/powerpoint/2010/main" xmlns="" Requires="p14">
+    <mc:Choice xmlns="" xmlns:p14="http://schemas.microsoft.com/office/powerpoint/2010/main" Requires="p14">
       <p:transition spd="slow" p14:dur="2000"/>
     </mc:Choice>
     <mc:Fallback>
@@ -24864,7 +24829,7 @@
     </p:spTree>
     <p:extLst>
       <p:ext uri="{BB962C8B-B14F-4D97-AF65-F5344CB8AC3E}">
-        <p14:creationId xmlns:p14="http://schemas.microsoft.com/office/powerpoint/2010/main" xmlns="" val="955904447"/>
+        <p14:creationId xmlns="" xmlns:p14="http://schemas.microsoft.com/office/powerpoint/2010/main" val="955904447"/>
       </p:ext>
     </p:extLst>
   </p:cSld>
@@ -24872,7 +24837,7 @@
     <a:masterClrMapping/>
   </p:clrMapOvr>
   <mc:AlternateContent xmlns:mc="http://schemas.openxmlformats.org/markup-compatibility/2006">
-    <mc:Choice xmlns:p14="http://schemas.microsoft.com/office/powerpoint/2010/main" xmlns="" Requires="p14">
+    <mc:Choice xmlns="" xmlns:p14="http://schemas.microsoft.com/office/powerpoint/2010/main" Requires="p14">
       <p:transition spd="slow" p14:dur="2000"/>
     </mc:Choice>
     <mc:Fallback>
@@ -25366,7 +25331,7 @@
           <p:nvPr/>
         </p:nvPicPr>
         <p:blipFill>
-          <a:blip r:embed="rId3"/>
+          <a:blip r:embed="rId3" cstate="print"/>
           <a:srcRect/>
           <a:stretch>
             <a:fillRect/>
@@ -25386,7 +25351,7 @@
     </p:spTree>
     <p:extLst>
       <p:ext uri="{BB962C8B-B14F-4D97-AF65-F5344CB8AC3E}">
-        <p14:creationId xmlns:p14="http://schemas.microsoft.com/office/powerpoint/2010/main" xmlns="" val="1140837011"/>
+        <p14:creationId xmlns="" xmlns:p14="http://schemas.microsoft.com/office/powerpoint/2010/main" val="1140837011"/>
       </p:ext>
     </p:extLst>
   </p:cSld>
@@ -25394,7 +25359,7 @@
     <a:masterClrMapping/>
   </p:clrMapOvr>
   <mc:AlternateContent xmlns:mc="http://schemas.openxmlformats.org/markup-compatibility/2006">
-    <mc:Choice xmlns:p14="http://schemas.microsoft.com/office/powerpoint/2010/main" xmlns="" Requires="p14">
+    <mc:Choice xmlns="" xmlns:p14="http://schemas.microsoft.com/office/powerpoint/2010/main" Requires="p14">
       <p:transition spd="slow" p14:dur="2000"/>
     </mc:Choice>
     <mc:Fallback>
@@ -26013,7 +25978,7 @@
     </p:spTree>
     <p:extLst>
       <p:ext uri="{BB962C8B-B14F-4D97-AF65-F5344CB8AC3E}">
-        <p14:creationId xmlns:p14="http://schemas.microsoft.com/office/powerpoint/2010/main" xmlns="" val="247747513"/>
+        <p14:creationId xmlns="" xmlns:p14="http://schemas.microsoft.com/office/powerpoint/2010/main" val="247747513"/>
       </p:ext>
     </p:extLst>
   </p:cSld>
@@ -26021,7 +25986,7 @@
     <a:masterClrMapping/>
   </p:clrMapOvr>
   <mc:AlternateContent xmlns:mc="http://schemas.openxmlformats.org/markup-compatibility/2006">
-    <mc:Choice xmlns:p14="http://schemas.microsoft.com/office/powerpoint/2010/main" xmlns="" Requires="p14">
+    <mc:Choice xmlns="" xmlns:p14="http://schemas.microsoft.com/office/powerpoint/2010/main" Requires="p14">
       <p:transition spd="slow" p14:dur="2000"/>
     </mc:Choice>
     <mc:Fallback>
@@ -26711,7 +26676,7 @@
     </p:spTree>
     <p:extLst>
       <p:ext uri="{BB962C8B-B14F-4D97-AF65-F5344CB8AC3E}">
-        <p14:creationId xmlns:p14="http://schemas.microsoft.com/office/powerpoint/2010/main" xmlns="" val="1776831606"/>
+        <p14:creationId xmlns="" xmlns:p14="http://schemas.microsoft.com/office/powerpoint/2010/main" val="1776831606"/>
       </p:ext>
     </p:extLst>
   </p:cSld>
@@ -26719,7 +26684,7 @@
     <a:masterClrMapping/>
   </p:clrMapOvr>
   <mc:AlternateContent xmlns:mc="http://schemas.openxmlformats.org/markup-compatibility/2006">
-    <mc:Choice xmlns:p14="http://schemas.microsoft.com/office/powerpoint/2010/main" xmlns="" Requires="p14">
+    <mc:Choice xmlns="" xmlns:p14="http://schemas.microsoft.com/office/powerpoint/2010/main" Requires="p14">
       <p:transition spd="slow" p14:dur="2000"/>
     </mc:Choice>
     <mc:Fallback>
@@ -27069,7 +27034,7 @@
           <a:blip r:embed="rId2" cstate="print">
             <a:extLst>
               <a:ext uri="{28A0092B-C50C-407E-A947-70E740481C1C}">
-                <a14:useLocalDpi xmlns:a14="http://schemas.microsoft.com/office/drawing/2010/main" xmlns="" val="0"/>
+                <a14:useLocalDpi xmlns="" xmlns:a14="http://schemas.microsoft.com/office/drawing/2010/main" val="0"/>
               </a:ext>
             </a:extLst>
           </a:blip>
@@ -27089,7 +27054,7 @@
           <a:noFill/>
           <a:extLst>
             <a:ext uri="{909E8E84-426E-40dd-AFC4-6F175D3DCCD1}">
-              <a14:hiddenFill xmlns:a14="http://schemas.microsoft.com/office/drawing/2010/main" xmlns="">
+              <a14:hiddenFill xmlns="" xmlns:a14="http://schemas.microsoft.com/office/drawing/2010/main">
                 <a:solidFill>
                   <a:srgbClr val="FFFFFF"/>
                 </a:solidFill>
@@ -27172,7 +27137,7 @@
     </p:spTree>
     <p:extLst>
       <p:ext uri="{BB962C8B-B14F-4D97-AF65-F5344CB8AC3E}">
-        <p14:creationId xmlns:p14="http://schemas.microsoft.com/office/powerpoint/2010/main" xmlns="" val="2717568001"/>
+        <p14:creationId xmlns="" xmlns:p14="http://schemas.microsoft.com/office/powerpoint/2010/main" val="2717568001"/>
       </p:ext>
     </p:extLst>
   </p:cSld>
@@ -27180,7 +27145,7 @@
     <a:masterClrMapping/>
   </p:clrMapOvr>
   <mc:AlternateContent xmlns:mc="http://schemas.openxmlformats.org/markup-compatibility/2006">
-    <mc:Choice xmlns:p14="http://schemas.microsoft.com/office/powerpoint/2010/main" xmlns="" Requires="p14">
+    <mc:Choice xmlns="" xmlns:p14="http://schemas.microsoft.com/office/powerpoint/2010/main" Requires="p14">
       <p:transition spd="slow" p14:dur="2000"/>
     </mc:Choice>
     <mc:Fallback>
@@ -27475,7 +27440,7 @@
     </p:spTree>
     <p:extLst>
       <p:ext uri="{BB962C8B-B14F-4D97-AF65-F5344CB8AC3E}">
-        <p14:creationId xmlns:p14="http://schemas.microsoft.com/office/powerpoint/2010/main" xmlns="" val="3266999169"/>
+        <p14:creationId xmlns="" xmlns:p14="http://schemas.microsoft.com/office/powerpoint/2010/main" val="3266999169"/>
       </p:ext>
     </p:extLst>
   </p:cSld>
@@ -27483,7 +27448,7 @@
     <a:masterClrMapping/>
   </p:clrMapOvr>
   <mc:AlternateContent xmlns:mc="http://schemas.openxmlformats.org/markup-compatibility/2006">
-    <mc:Choice xmlns:p14="http://schemas.microsoft.com/office/powerpoint/2010/main" xmlns="" Requires="p14">
+    <mc:Choice xmlns="" xmlns:p14="http://schemas.microsoft.com/office/powerpoint/2010/main" Requires="p14">
       <p:transition spd="slow" p14:dur="2000"/>
     </mc:Choice>
     <mc:Fallback>
@@ -27834,7 +27799,7 @@
     </p:spTree>
     <p:extLst>
       <p:ext uri="{BB962C8B-B14F-4D97-AF65-F5344CB8AC3E}">
-        <p14:creationId xmlns:p14="http://schemas.microsoft.com/office/powerpoint/2010/main" xmlns="" val="396334508"/>
+        <p14:creationId xmlns="" xmlns:p14="http://schemas.microsoft.com/office/powerpoint/2010/main" val="396334508"/>
       </p:ext>
     </p:extLst>
   </p:cSld>
@@ -27842,7 +27807,7 @@
     <a:masterClrMapping/>
   </p:clrMapOvr>
   <mc:AlternateContent xmlns:mc="http://schemas.openxmlformats.org/markup-compatibility/2006">
-    <mc:Choice xmlns:p14="http://schemas.microsoft.com/office/powerpoint/2010/main" xmlns="" Requires="p14">
+    <mc:Choice xmlns="" xmlns:p14="http://schemas.microsoft.com/office/powerpoint/2010/main" Requires="p14">
       <p:transition spd="slow" p14:dur="2000"/>
     </mc:Choice>
     <mc:Fallback>
@@ -28187,7 +28152,7 @@
     </p:spTree>
     <p:extLst>
       <p:ext uri="{BB962C8B-B14F-4D97-AF65-F5344CB8AC3E}">
-        <p14:creationId xmlns:p14="http://schemas.microsoft.com/office/powerpoint/2010/main" xmlns="" val="1737882227"/>
+        <p14:creationId xmlns="" xmlns:p14="http://schemas.microsoft.com/office/powerpoint/2010/main" val="1737882227"/>
       </p:ext>
     </p:extLst>
   </p:cSld>
@@ -28195,7 +28160,7 @@
     <a:masterClrMapping/>
   </p:clrMapOvr>
   <mc:AlternateContent xmlns:mc="http://schemas.openxmlformats.org/markup-compatibility/2006">
-    <mc:Choice xmlns:p14="http://schemas.microsoft.com/office/powerpoint/2010/main" xmlns="" Requires="p14">
+    <mc:Choice xmlns="" xmlns:p14="http://schemas.microsoft.com/office/powerpoint/2010/main" Requires="p14">
       <p:transition spd="slow" p14:dur="2000"/>
     </mc:Choice>
     <mc:Fallback>
@@ -28553,7 +28518,7 @@
     </p:spTree>
     <p:extLst>
       <p:ext uri="{BB962C8B-B14F-4D97-AF65-F5344CB8AC3E}">
-        <p14:creationId xmlns:p14="http://schemas.microsoft.com/office/powerpoint/2010/main" xmlns="" val="3034068148"/>
+        <p14:creationId xmlns="" xmlns:p14="http://schemas.microsoft.com/office/powerpoint/2010/main" val="3034068148"/>
       </p:ext>
     </p:extLst>
   </p:cSld>
@@ -28561,7 +28526,7 @@
     <a:masterClrMapping/>
   </p:clrMapOvr>
   <mc:AlternateContent xmlns:mc="http://schemas.openxmlformats.org/markup-compatibility/2006">
-    <mc:Choice xmlns:p14="http://schemas.microsoft.com/office/powerpoint/2010/main" xmlns="" Requires="p14">
+    <mc:Choice xmlns="" xmlns:p14="http://schemas.microsoft.com/office/powerpoint/2010/main" Requires="p14">
       <p:transition spd="slow" p14:dur="2000"/>
     </mc:Choice>
     <mc:Fallback>
@@ -28891,7 +28856,7 @@
     </p:spTree>
     <p:extLst>
       <p:ext uri="{BB962C8B-B14F-4D97-AF65-F5344CB8AC3E}">
-        <p14:creationId xmlns:p14="http://schemas.microsoft.com/office/powerpoint/2010/main" xmlns="" val="3646886653"/>
+        <p14:creationId xmlns="" xmlns:p14="http://schemas.microsoft.com/office/powerpoint/2010/main" val="3646886653"/>
       </p:ext>
     </p:extLst>
   </p:cSld>
@@ -28899,7 +28864,7 @@
     <a:masterClrMapping/>
   </p:clrMapOvr>
   <mc:AlternateContent xmlns:mc="http://schemas.openxmlformats.org/markup-compatibility/2006">
-    <mc:Choice xmlns:p14="http://schemas.microsoft.com/office/powerpoint/2010/main" xmlns="" Requires="p14">
+    <mc:Choice xmlns="" xmlns:p14="http://schemas.microsoft.com/office/powerpoint/2010/main" Requires="p14">
       <p:transition spd="slow" p14:dur="2000"/>
     </mc:Choice>
     <mc:Fallback>
@@ -29274,7 +29239,7 @@
     </p:spTree>
     <p:extLst>
       <p:ext uri="{BB962C8B-B14F-4D97-AF65-F5344CB8AC3E}">
-        <p14:creationId xmlns:p14="http://schemas.microsoft.com/office/powerpoint/2010/main" xmlns="" val="520298717"/>
+        <p14:creationId xmlns="" xmlns:p14="http://schemas.microsoft.com/office/powerpoint/2010/main" val="520298717"/>
       </p:ext>
     </p:extLst>
   </p:cSld>
@@ -29282,7 +29247,7 @@
     <a:masterClrMapping/>
   </p:clrMapOvr>
   <mc:AlternateContent xmlns:mc="http://schemas.openxmlformats.org/markup-compatibility/2006">
-    <mc:Choice xmlns:p14="http://schemas.microsoft.com/office/powerpoint/2010/main" xmlns="" Requires="p14">
+    <mc:Choice xmlns="" xmlns:p14="http://schemas.microsoft.com/office/powerpoint/2010/main" Requires="p14">
       <p:transition spd="slow" p14:dur="2000"/>
     </mc:Choice>
     <mc:Fallback>
@@ -29584,7 +29549,7 @@
     </p:spTree>
     <p:extLst>
       <p:ext uri="{BB962C8B-B14F-4D97-AF65-F5344CB8AC3E}">
-        <p14:creationId xmlns:p14="http://schemas.microsoft.com/office/powerpoint/2010/main" xmlns="" val="2203748189"/>
+        <p14:creationId xmlns="" xmlns:p14="http://schemas.microsoft.com/office/powerpoint/2010/main" val="2203748189"/>
       </p:ext>
     </p:extLst>
   </p:cSld>
@@ -29592,7 +29557,7 @@
     <a:masterClrMapping/>
   </p:clrMapOvr>
   <mc:AlternateContent xmlns:mc="http://schemas.openxmlformats.org/markup-compatibility/2006">
-    <mc:Choice xmlns:p14="http://schemas.microsoft.com/office/powerpoint/2010/main" xmlns="" Requires="p14">
+    <mc:Choice xmlns="" xmlns:p14="http://schemas.microsoft.com/office/powerpoint/2010/main" Requires="p14">
       <p:transition spd="slow" p14:dur="2000"/>
     </mc:Choice>
     <mc:Fallback>
@@ -29915,7 +29880,7 @@
     </p:spTree>
     <p:extLst>
       <p:ext uri="{BB962C8B-B14F-4D97-AF65-F5344CB8AC3E}">
-        <p14:creationId xmlns:p14="http://schemas.microsoft.com/office/powerpoint/2010/main" xmlns="" val="1130254901"/>
+        <p14:creationId xmlns="" xmlns:p14="http://schemas.microsoft.com/office/powerpoint/2010/main" val="1130254901"/>
       </p:ext>
     </p:extLst>
   </p:cSld>
@@ -29923,7 +29888,7 @@
     <a:masterClrMapping/>
   </p:clrMapOvr>
   <mc:AlternateContent xmlns:mc="http://schemas.openxmlformats.org/markup-compatibility/2006">
-    <mc:Choice xmlns:p14="http://schemas.microsoft.com/office/powerpoint/2010/main" xmlns="" Requires="p14">
+    <mc:Choice xmlns="" xmlns:p14="http://schemas.microsoft.com/office/powerpoint/2010/main" Requires="p14">
       <p:transition spd="slow" p14:dur="2000"/>
     </mc:Choice>
     <mc:Fallback>
@@ -30261,7 +30226,7 @@
     </p:spTree>
     <p:extLst>
       <p:ext uri="{BB962C8B-B14F-4D97-AF65-F5344CB8AC3E}">
-        <p14:creationId xmlns:p14="http://schemas.microsoft.com/office/powerpoint/2010/main" xmlns="" val="3734576715"/>
+        <p14:creationId xmlns="" xmlns:p14="http://schemas.microsoft.com/office/powerpoint/2010/main" val="3734576715"/>
       </p:ext>
     </p:extLst>
   </p:cSld>
@@ -30269,7 +30234,7 @@
     <a:masterClrMapping/>
   </p:clrMapOvr>
   <mc:AlternateContent xmlns:mc="http://schemas.openxmlformats.org/markup-compatibility/2006">
-    <mc:Choice xmlns:p14="http://schemas.microsoft.com/office/powerpoint/2010/main" xmlns="" Requires="p14">
+    <mc:Choice xmlns="" xmlns:p14="http://schemas.microsoft.com/office/powerpoint/2010/main" Requires="p14">
       <p:transition spd="slow" p14:dur="2000"/>
     </mc:Choice>
     <mc:Fallback>
@@ -30574,7 +30539,7 @@
     </p:spTree>
     <p:extLst>
       <p:ext uri="{BB962C8B-B14F-4D97-AF65-F5344CB8AC3E}">
-        <p14:creationId xmlns:p14="http://schemas.microsoft.com/office/powerpoint/2010/main" xmlns="" val="2632131054"/>
+        <p14:creationId xmlns="" xmlns:p14="http://schemas.microsoft.com/office/powerpoint/2010/main" val="2632131054"/>
       </p:ext>
     </p:extLst>
   </p:cSld>
@@ -30582,7 +30547,7 @@
     <a:masterClrMapping/>
   </p:clrMapOvr>
   <mc:AlternateContent xmlns:mc="http://schemas.openxmlformats.org/markup-compatibility/2006">
-    <mc:Choice xmlns:p14="http://schemas.microsoft.com/office/powerpoint/2010/main" xmlns="" Requires="p14">
+    <mc:Choice xmlns="" xmlns:p14="http://schemas.microsoft.com/office/powerpoint/2010/main" Requires="p14">
       <p:transition spd="slow" p14:dur="2000"/>
     </mc:Choice>
     <mc:Fallback>
@@ -30903,7 +30868,7 @@
     </p:spTree>
     <p:extLst>
       <p:ext uri="{BB962C8B-B14F-4D97-AF65-F5344CB8AC3E}">
-        <p14:creationId xmlns:p14="http://schemas.microsoft.com/office/powerpoint/2010/main" xmlns="" val="2983282113"/>
+        <p14:creationId xmlns="" xmlns:p14="http://schemas.microsoft.com/office/powerpoint/2010/main" val="2983282113"/>
       </p:ext>
     </p:extLst>
   </p:cSld>
@@ -30911,7 +30876,7 @@
     <a:masterClrMapping/>
   </p:clrMapOvr>
   <mc:AlternateContent xmlns:mc="http://schemas.openxmlformats.org/markup-compatibility/2006">
-    <mc:Choice xmlns:p14="http://schemas.microsoft.com/office/powerpoint/2010/main" xmlns="" Requires="p14">
+    <mc:Choice xmlns="" xmlns:p14="http://schemas.microsoft.com/office/powerpoint/2010/main" Requires="p14">
       <p:transition spd="slow" p14:dur="2000"/>
     </mc:Choice>
     <mc:Fallback>
@@ -31278,7 +31243,7 @@
     </p:spTree>
     <p:extLst>
       <p:ext uri="{BB962C8B-B14F-4D97-AF65-F5344CB8AC3E}">
-        <p14:creationId xmlns:p14="http://schemas.microsoft.com/office/powerpoint/2010/main" xmlns="" val="4266361740"/>
+        <p14:creationId xmlns="" xmlns:p14="http://schemas.microsoft.com/office/powerpoint/2010/main" val="4266361740"/>
       </p:ext>
     </p:extLst>
   </p:cSld>
@@ -31286,7 +31251,7 @@
     <a:masterClrMapping/>
   </p:clrMapOvr>
   <mc:AlternateContent xmlns:mc="http://schemas.openxmlformats.org/markup-compatibility/2006">
-    <mc:Choice xmlns:p14="http://schemas.microsoft.com/office/powerpoint/2010/main" xmlns="" Requires="p14">
+    <mc:Choice xmlns="" xmlns:p14="http://schemas.microsoft.com/office/powerpoint/2010/main" Requires="p14">
       <p:transition spd="slow" p14:dur="2000"/>
     </mc:Choice>
     <mc:Fallback>
@@ -31636,7 +31601,7 @@
     </p:spTree>
     <p:extLst>
       <p:ext uri="{BB962C8B-B14F-4D97-AF65-F5344CB8AC3E}">
-        <p14:creationId xmlns:p14="http://schemas.microsoft.com/office/powerpoint/2010/main" xmlns="" val="3678400164"/>
+        <p14:creationId xmlns="" xmlns:p14="http://schemas.microsoft.com/office/powerpoint/2010/main" val="3678400164"/>
       </p:ext>
     </p:extLst>
   </p:cSld>
@@ -31644,7 +31609,7 @@
     <a:masterClrMapping/>
   </p:clrMapOvr>
   <mc:AlternateContent xmlns:mc="http://schemas.openxmlformats.org/markup-compatibility/2006">
-    <mc:Choice xmlns:p14="http://schemas.microsoft.com/office/powerpoint/2010/main" xmlns="" Requires="p14">
+    <mc:Choice xmlns="" xmlns:p14="http://schemas.microsoft.com/office/powerpoint/2010/main" Requires="p14">
       <p:transition spd="slow" p14:dur="2000"/>
     </mc:Choice>
     <mc:Fallback>
@@ -31974,7 +31939,7 @@
     </p:spTree>
     <p:extLst>
       <p:ext uri="{BB962C8B-B14F-4D97-AF65-F5344CB8AC3E}">
-        <p14:creationId xmlns:p14="http://schemas.microsoft.com/office/powerpoint/2010/main" xmlns="" val="3326293041"/>
+        <p14:creationId xmlns="" xmlns:p14="http://schemas.microsoft.com/office/powerpoint/2010/main" val="3326293041"/>
       </p:ext>
     </p:extLst>
   </p:cSld>
@@ -31982,7 +31947,7 @@
     <a:masterClrMapping/>
   </p:clrMapOvr>
   <mc:AlternateContent xmlns:mc="http://schemas.openxmlformats.org/markup-compatibility/2006">
-    <mc:Choice xmlns:p14="http://schemas.microsoft.com/office/powerpoint/2010/main" xmlns="" Requires="p14">
+    <mc:Choice xmlns="" xmlns:p14="http://schemas.microsoft.com/office/powerpoint/2010/main" Requires="p14">
       <p:transition spd="slow" p14:dur="2000"/>
     </mc:Choice>
     <mc:Fallback>
@@ -32320,7 +32285,7 @@
     </p:spTree>
     <p:extLst>
       <p:ext uri="{BB962C8B-B14F-4D97-AF65-F5344CB8AC3E}">
-        <p14:creationId xmlns:p14="http://schemas.microsoft.com/office/powerpoint/2010/main" xmlns="" val="3052723909"/>
+        <p14:creationId xmlns="" xmlns:p14="http://schemas.microsoft.com/office/powerpoint/2010/main" val="3052723909"/>
       </p:ext>
     </p:extLst>
   </p:cSld>
@@ -32328,7 +32293,7 @@
     <a:masterClrMapping/>
   </p:clrMapOvr>
   <mc:AlternateContent xmlns:mc="http://schemas.openxmlformats.org/markup-compatibility/2006">
-    <mc:Choice xmlns:p14="http://schemas.microsoft.com/office/powerpoint/2010/main" xmlns="" Requires="p14">
+    <mc:Choice xmlns="" xmlns:p14="http://schemas.microsoft.com/office/powerpoint/2010/main" Requires="p14">
       <p:transition spd="slow" p14:dur="2000"/>
     </mc:Choice>
     <mc:Fallback>
@@ -32456,7 +32421,7 @@
     </p:spTree>
     <p:extLst>
       <p:ext uri="{BB962C8B-B14F-4D97-AF65-F5344CB8AC3E}">
-        <p14:creationId xmlns:p14="http://schemas.microsoft.com/office/powerpoint/2010/main" xmlns="" val="1576574823"/>
+        <p14:creationId xmlns="" xmlns:p14="http://schemas.microsoft.com/office/powerpoint/2010/main" val="1576574823"/>
       </p:ext>
     </p:extLst>
   </p:cSld>
@@ -32464,7 +32429,7 @@
     <a:masterClrMapping/>
   </p:clrMapOvr>
   <mc:AlternateContent xmlns:mc="http://schemas.openxmlformats.org/markup-compatibility/2006">
-    <mc:Choice xmlns:p14="http://schemas.microsoft.com/office/powerpoint/2010/main" xmlns="" Requires="p14">
+    <mc:Choice xmlns="" xmlns:p14="http://schemas.microsoft.com/office/powerpoint/2010/main" Requires="p14">
       <p:transition spd="slow" p14:dur="2000"/>
     </mc:Choice>
     <mc:Fallback>
@@ -32754,7 +32719,7 @@
     </p:spTree>
     <p:extLst>
       <p:ext uri="{BB962C8B-B14F-4D97-AF65-F5344CB8AC3E}">
-        <p14:creationId xmlns:p14="http://schemas.microsoft.com/office/powerpoint/2010/main" xmlns="" val="3303920882"/>
+        <p14:creationId xmlns="" xmlns:p14="http://schemas.microsoft.com/office/powerpoint/2010/main" val="3303920882"/>
       </p:ext>
     </p:extLst>
   </p:cSld>
@@ -32762,7 +32727,7 @@
     <a:masterClrMapping/>
   </p:clrMapOvr>
   <mc:AlternateContent xmlns:mc="http://schemas.openxmlformats.org/markup-compatibility/2006">
-    <mc:Choice xmlns:p14="http://schemas.microsoft.com/office/powerpoint/2010/main" xmlns="" Requires="p14">
+    <mc:Choice xmlns="" xmlns:p14="http://schemas.microsoft.com/office/powerpoint/2010/main" Requires="p14">
       <p:transition spd="slow" p14:dur="2000"/>
     </mc:Choice>
     <mc:Fallback>
@@ -32999,16 +32964,7 @@
                 </a:solidFill>
                 <a:latin typeface="Calibri"/>
               </a:rPr>
-              <a:t>operazioni </a:t>
-            </a:r>
-            <a:r>
-              <a:rPr lang="it-IT" sz="2800" dirty="0" smtClean="0">
-                <a:solidFill>
-                  <a:srgbClr val="000000"/>
-                </a:solidFill>
-                <a:latin typeface="Calibri"/>
-              </a:rPr>
-              <a:t> </a:t>
+              <a:t>operazioni  </a:t>
             </a:r>
             <a:r>
               <a:rPr lang="it-IT" sz="2800" dirty="0">
@@ -33041,7 +32997,7 @@
           <p:nvPr/>
         </p:nvPicPr>
         <p:blipFill>
-          <a:blip r:embed="rId2"/>
+          <a:blip r:embed="rId2" cstate="print"/>
           <a:srcRect/>
           <a:stretch>
             <a:fillRect/>
@@ -33722,7 +33678,7 @@
           <p:nvPr/>
         </p:nvPicPr>
         <p:blipFill>
-          <a:blip r:embed="rId2"/>
+          <a:blip r:embed="rId2" cstate="print"/>
           <a:srcRect/>
           <a:stretch>
             <a:fillRect/>
@@ -33976,25 +33932,7 @@
                 </a:solidFill>
                 <a:latin typeface="Calibri"/>
               </a:rPr>
-              <a:t>JAVAMAIL  (API di </a:t>
-            </a:r>
-            <a:r>
-              <a:rPr lang="it-IT" sz="3200" b="1" dirty="0" smtClean="0">
-                <a:solidFill>
-                  <a:srgbClr val="000000"/>
-                </a:solidFill>
-                <a:latin typeface="Calibri"/>
-              </a:rPr>
-              <a:t>Oracle</a:t>
-            </a:r>
-            <a:r>
-              <a:rPr lang="it-IT" sz="3200" b="1" dirty="0" smtClean="0">
-                <a:solidFill>
-                  <a:srgbClr val="000000"/>
-                </a:solidFill>
-                <a:latin typeface="Calibri"/>
-              </a:rPr>
-              <a:t>) </a:t>
+              <a:t>JAVAMAIL  (API di Oracle) </a:t>
             </a:r>
             <a:r>
               <a:rPr lang="it-IT" sz="3200" dirty="0">
@@ -34109,7 +34047,7 @@
           <p:nvPr/>
         </p:nvPicPr>
         <p:blipFill>
-          <a:blip r:embed="rId2"/>
+          <a:blip r:embed="rId2" cstate="print"/>
           <a:srcRect/>
           <a:stretch>
             <a:fillRect/>
@@ -34284,7 +34222,7 @@
           <p:nvPr/>
         </p:nvPicPr>
         <p:blipFill>
-          <a:blip r:embed="rId2"/>
+          <a:blip r:embed="rId2" cstate="print"/>
           <a:srcRect/>
           <a:stretch>
             <a:fillRect/>
@@ -34538,7 +34476,7 @@
           <p:nvPr/>
         </p:nvPicPr>
         <p:blipFill>
-          <a:blip r:embed="rId2"/>
+          <a:blip r:embed="rId2" cstate="print"/>
           <a:srcRect/>
           <a:stretch>
             <a:fillRect/>
@@ -34999,7 +34937,7 @@
     </p:spTree>
     <p:extLst>
       <p:ext uri="{BB962C8B-B14F-4D97-AF65-F5344CB8AC3E}">
-        <p14:creationId xmlns:p14="http://schemas.microsoft.com/office/powerpoint/2010/main" xmlns="" val="2978215168"/>
+        <p14:creationId xmlns="" xmlns:p14="http://schemas.microsoft.com/office/powerpoint/2010/main" val="2978215168"/>
       </p:ext>
     </p:extLst>
   </p:cSld>
@@ -35007,7 +34945,7 @@
     <a:masterClrMapping/>
   </p:clrMapOvr>
   <mc:AlternateContent xmlns:mc="http://schemas.openxmlformats.org/markup-compatibility/2006">
-    <mc:Choice xmlns:p14="http://schemas.microsoft.com/office/powerpoint/2010/main" xmlns="" Requires="p14">
+    <mc:Choice xmlns="" xmlns:p14="http://schemas.microsoft.com/office/powerpoint/2010/main" Requires="p14">
       <p:transition spd="slow" p14:dur="2000"/>
     </mc:Choice>
     <mc:Fallback>
@@ -35147,7 +35085,7 @@
           <p:nvPr/>
         </p:nvPicPr>
         <p:blipFill>
-          <a:blip r:embed="rId2"/>
+          <a:blip r:embed="rId2" cstate="print"/>
           <a:srcRect/>
           <a:stretch>
             <a:fillRect/>
@@ -35393,7 +35331,7 @@
           <p:nvPr/>
         </p:nvPicPr>
         <p:blipFill>
-          <a:blip r:embed="rId2"/>
+          <a:blip r:embed="rId2" cstate="print"/>
           <a:srcRect/>
           <a:stretch>
             <a:fillRect/>
@@ -35521,11 +35459,7 @@
           <a:p>
             <a:r>
               <a:rPr lang="it-IT" dirty="0" smtClean="0"/>
-              <a:t>sistema </a:t>
-            </a:r>
-            <a:r>
-              <a:rPr lang="it-IT" dirty="0" smtClean="0"/>
-              <a:t>può inviare</a:t>
+              <a:t>sistema può inviare</a:t>
             </a:r>
             <a:endParaRPr lang="it-IT" dirty="0"/>
           </a:p>
@@ -35773,7 +35707,7 @@
           <p:nvPr/>
         </p:nvPicPr>
         <p:blipFill>
-          <a:blip r:embed="rId2"/>
+          <a:blip r:embed="rId2" cstate="print"/>
           <a:srcRect/>
           <a:stretch>
             <a:fillRect/>
@@ -36429,15 +36363,7 @@
             </a:r>
             <a:r>
               <a:rPr lang="it-IT" sz="2800" dirty="0" smtClean="0"/>
-              <a:t> test non è altro che un insieme di diversi metodi che vanno a verificare gli </a:t>
-            </a:r>
-            <a:r>
-              <a:rPr lang="it-IT" sz="2800" dirty="0" smtClean="0"/>
-              <a:t>output </a:t>
-            </a:r>
-            <a:r>
-              <a:rPr lang="it-IT" sz="2800" dirty="0" smtClean="0"/>
-              <a:t>della classe presa in esame.</a:t>
+              <a:t> test non è altro che un insieme di diversi metodi che vanno a verificare gli output della classe presa in esame.</a:t>
             </a:r>
           </a:p>
         </p:txBody>
@@ -36517,7 +36443,7 @@
           <p:nvPr/>
         </p:nvPicPr>
         <p:blipFill>
-          <a:blip r:embed="rId2"/>
+          <a:blip r:embed="rId2" cstate="print"/>
           <a:srcRect/>
           <a:stretch>
             <a:fillRect/>
@@ -36788,7 +36714,7 @@
           <p:nvPr/>
         </p:nvPicPr>
         <p:blipFill>
-          <a:blip r:embed="rId2"/>
+          <a:blip r:embed="rId2" cstate="print"/>
           <a:srcRect/>
           <a:stretch>
             <a:fillRect/>
@@ -37127,7 +37053,7 @@
           <a:blip r:embed="rId2" cstate="print">
             <a:extLst>
               <a:ext uri="{28A0092B-C50C-407E-A947-70E740481C1C}">
-                <a14:useLocalDpi xmlns:a14="http://schemas.microsoft.com/office/drawing/2010/main" xmlns="" val="0"/>
+                <a14:useLocalDpi xmlns="" xmlns:a14="http://schemas.microsoft.com/office/drawing/2010/main" val="0"/>
               </a:ext>
             </a:extLst>
           </a:blip>
@@ -37147,7 +37073,7 @@
           <a:noFill/>
           <a:extLst>
             <a:ext uri="{909E8E84-426E-40dd-AFC4-6F175D3DCCD1}">
-              <a14:hiddenFill xmlns:a14="http://schemas.microsoft.com/office/drawing/2010/main" xmlns="">
+              <a14:hiddenFill xmlns="" xmlns:a14="http://schemas.microsoft.com/office/drawing/2010/main">
                 <a:solidFill>
                   <a:srgbClr val="FFFFFF"/>
                 </a:solidFill>
@@ -37230,7 +37156,7 @@
     </p:spTree>
     <p:extLst>
       <p:ext uri="{BB962C8B-B14F-4D97-AF65-F5344CB8AC3E}">
-        <p14:creationId xmlns:p14="http://schemas.microsoft.com/office/powerpoint/2010/main" xmlns="" val="2252746867"/>
+        <p14:creationId xmlns="" xmlns:p14="http://schemas.microsoft.com/office/powerpoint/2010/main" val="2252746867"/>
       </p:ext>
     </p:extLst>
   </p:cSld>
@@ -37238,7 +37164,7 @@
     <a:masterClrMapping/>
   </p:clrMapOvr>
   <mc:AlternateContent xmlns:mc="http://schemas.openxmlformats.org/markup-compatibility/2006">
-    <mc:Choice xmlns:p14="http://schemas.microsoft.com/office/powerpoint/2010/main" xmlns="" Requires="p14">
+    <mc:Choice xmlns="" xmlns:p14="http://schemas.microsoft.com/office/powerpoint/2010/main" Requires="p14">
       <p:transition spd="slow" p14:dur="2000"/>
     </mc:Choice>
     <mc:Fallback>
@@ -37605,7 +37531,7 @@
     </p:spTree>
     <p:extLst>
       <p:ext uri="{BB962C8B-B14F-4D97-AF65-F5344CB8AC3E}">
-        <p14:creationId xmlns:p14="http://schemas.microsoft.com/office/powerpoint/2010/main" xmlns="" val="3564990699"/>
+        <p14:creationId xmlns="" xmlns:p14="http://schemas.microsoft.com/office/powerpoint/2010/main" val="3564990699"/>
       </p:ext>
     </p:extLst>
   </p:cSld>
@@ -37613,7 +37539,7 @@
     <a:masterClrMapping/>
   </p:clrMapOvr>
   <mc:AlternateContent xmlns:mc="http://schemas.openxmlformats.org/markup-compatibility/2006">
-    <mc:Choice xmlns:p14="http://schemas.microsoft.com/office/powerpoint/2010/main" xmlns="" Requires="p14">
+    <mc:Choice xmlns="" xmlns:p14="http://schemas.microsoft.com/office/powerpoint/2010/main" Requires="p14">
       <p:transition spd="slow" p14:dur="2000"/>
     </mc:Choice>
     <mc:Fallback>

</xml_diff>

<commit_message>
[WR A] Modifica bozza
</commit_message>
<xml_diff>
--- a/Presentazione/Atsilo1/[BOZZA] Atsilo_A_PresentazioneFinale copia.pptx
+++ b/Presentazione/Atsilo1/[BOZZA] Atsilo_A_PresentazioneFinale copia.pptx
@@ -298,7 +298,7 @@
             <a:fld id="{38D78F4D-402C-46E0-A4BB-DF91EA86B14C}" type="datetimeFigureOut">
               <a:rPr lang="it-IT" smtClean="0"/>
               <a:pPr/>
-              <a:t>06/01/2013</a:t>
+              <a:t>06/01/13</a:t>
             </a:fld>
             <a:endParaRPr lang="it-IT"/>
           </a:p>
@@ -458,7 +458,7 @@
             <a:fld id="{D70604CA-7593-4640-8FA1-5523937B8510}" type="slidenum">
               <a:rPr lang="it-IT" smtClean="0"/>
               <a:pPr/>
-              <a:t>‹N›</a:t>
+              <a:t>‹n.›</a:t>
             </a:fld>
             <a:endParaRPr lang="it-IT"/>
           </a:p>
@@ -467,7 +467,7 @@
     </p:spTree>
     <p:extLst>
       <p:ext uri="{BB962C8B-B14F-4D97-AF65-F5344CB8AC3E}">
-        <p14:creationId xmlns:p14="http://schemas.microsoft.com/office/powerpoint/2010/main" xmlns="" val="2126419590"/>
+        <p14:creationId xmlns:p14="http://schemas.microsoft.com/office/powerpoint/2010/main" val="2126419590"/>
       </p:ext>
     </p:extLst>
   </p:cSld>
@@ -2568,7 +2568,7 @@
             <a:fld id="{63CABBC0-75E4-43BB-A6A6-84C2A96BDB82}" type="datetimeFigureOut">
               <a:rPr lang="it-IT" smtClean="0"/>
               <a:pPr/>
-              <a:t>06/01/2013</a:t>
+              <a:t>06/01/13</a:t>
             </a:fld>
             <a:endParaRPr lang="it-IT"/>
           </a:p>
@@ -2611,7 +2611,7 @@
             <a:fld id="{F89AEA99-3E91-4C58-9AD4-045DB5619AC3}" type="slidenum">
               <a:rPr lang="it-IT" smtClean="0"/>
               <a:pPr/>
-              <a:t>‹N›</a:t>
+              <a:t>‹n.›</a:t>
             </a:fld>
             <a:endParaRPr lang="it-IT"/>
           </a:p>
@@ -2625,7 +2625,7 @@
   <p:timing>
     <p:tnLst>
       <p:par>
-        <p:cTn id="1" dur="indefinite" restart="never" nodeType="tmRoot"/>
+        <p:cTn xmlns:p14="http://schemas.microsoft.com/office/powerpoint/2010/main" id="1" dur="indefinite" restart="never" nodeType="tmRoot"/>
       </p:par>
     </p:tnLst>
   </p:timing>
@@ -2750,7 +2750,7 @@
             <a:fld id="{63CABBC0-75E4-43BB-A6A6-84C2A96BDB82}" type="datetimeFigureOut">
               <a:rPr lang="it-IT" smtClean="0"/>
               <a:pPr/>
-              <a:t>06/01/2013</a:t>
+              <a:t>06/01/13</a:t>
             </a:fld>
             <a:endParaRPr lang="it-IT"/>
           </a:p>
@@ -2793,7 +2793,7 @@
             <a:fld id="{F89AEA99-3E91-4C58-9AD4-045DB5619AC3}" type="slidenum">
               <a:rPr lang="it-IT" smtClean="0"/>
               <a:pPr/>
-              <a:t>‹N›</a:t>
+              <a:t>‹n.›</a:t>
             </a:fld>
             <a:endParaRPr lang="it-IT"/>
           </a:p>
@@ -2807,7 +2807,7 @@
   <p:timing>
     <p:tnLst>
       <p:par>
-        <p:cTn id="1" dur="indefinite" restart="never" nodeType="tmRoot"/>
+        <p:cTn xmlns:p14="http://schemas.microsoft.com/office/powerpoint/2010/main" id="1" dur="indefinite" restart="never" nodeType="tmRoot"/>
       </p:par>
     </p:tnLst>
   </p:timing>
@@ -2942,7 +2942,7 @@
             <a:fld id="{63CABBC0-75E4-43BB-A6A6-84C2A96BDB82}" type="datetimeFigureOut">
               <a:rPr lang="it-IT" smtClean="0"/>
               <a:pPr/>
-              <a:t>06/01/2013</a:t>
+              <a:t>06/01/13</a:t>
             </a:fld>
             <a:endParaRPr lang="it-IT"/>
           </a:p>
@@ -2985,7 +2985,7 @@
             <a:fld id="{F89AEA99-3E91-4C58-9AD4-045DB5619AC3}" type="slidenum">
               <a:rPr lang="it-IT" smtClean="0"/>
               <a:pPr/>
-              <a:t>‹N›</a:t>
+              <a:t>‹n.›</a:t>
             </a:fld>
             <a:endParaRPr lang="it-IT"/>
           </a:p>
@@ -2999,7 +2999,7 @@
   <p:timing>
     <p:tnLst>
       <p:par>
-        <p:cTn id="1" dur="indefinite" restart="never" nodeType="tmRoot"/>
+        <p:cTn xmlns:p14="http://schemas.microsoft.com/office/powerpoint/2010/main" id="1" dur="indefinite" restart="never" nodeType="tmRoot"/>
       </p:par>
     </p:tnLst>
   </p:timing>
@@ -3124,7 +3124,7 @@
             <a:fld id="{63CABBC0-75E4-43BB-A6A6-84C2A96BDB82}" type="datetimeFigureOut">
               <a:rPr lang="it-IT" smtClean="0"/>
               <a:pPr/>
-              <a:t>06/01/2013</a:t>
+              <a:t>06/01/13</a:t>
             </a:fld>
             <a:endParaRPr lang="it-IT"/>
           </a:p>
@@ -3167,7 +3167,7 @@
             <a:fld id="{F89AEA99-3E91-4C58-9AD4-045DB5619AC3}" type="slidenum">
               <a:rPr lang="it-IT" smtClean="0"/>
               <a:pPr/>
-              <a:t>‹N›</a:t>
+              <a:t>‹n.›</a:t>
             </a:fld>
             <a:endParaRPr lang="it-IT"/>
           </a:p>
@@ -3181,7 +3181,7 @@
   <p:timing>
     <p:tnLst>
       <p:par>
-        <p:cTn id="1" dur="indefinite" restart="never" nodeType="tmRoot"/>
+        <p:cTn xmlns:p14="http://schemas.microsoft.com/office/powerpoint/2010/main" id="1" dur="indefinite" restart="never" nodeType="tmRoot"/>
       </p:par>
     </p:tnLst>
   </p:timing>
@@ -3367,7 +3367,7 @@
             <a:fld id="{63CABBC0-75E4-43BB-A6A6-84C2A96BDB82}" type="datetimeFigureOut">
               <a:rPr lang="it-IT" smtClean="0"/>
               <a:pPr/>
-              <a:t>06/01/2013</a:t>
+              <a:t>06/01/13</a:t>
             </a:fld>
             <a:endParaRPr lang="it-IT"/>
           </a:p>
@@ -3410,7 +3410,7 @@
             <a:fld id="{F89AEA99-3E91-4C58-9AD4-045DB5619AC3}" type="slidenum">
               <a:rPr lang="it-IT" smtClean="0"/>
               <a:pPr/>
-              <a:t>‹N›</a:t>
+              <a:t>‹n.›</a:t>
             </a:fld>
             <a:endParaRPr lang="it-IT"/>
           </a:p>
@@ -3424,7 +3424,7 @@
   <p:timing>
     <p:tnLst>
       <p:par>
-        <p:cTn id="1" dur="indefinite" restart="never" nodeType="tmRoot"/>
+        <p:cTn xmlns:p14="http://schemas.microsoft.com/office/powerpoint/2010/main" id="1" dur="indefinite" restart="never" nodeType="tmRoot"/>
       </p:par>
     </p:tnLst>
   </p:timing>
@@ -3648,7 +3648,7 @@
             <a:fld id="{63CABBC0-75E4-43BB-A6A6-84C2A96BDB82}" type="datetimeFigureOut">
               <a:rPr lang="it-IT" smtClean="0"/>
               <a:pPr/>
-              <a:t>06/01/2013</a:t>
+              <a:t>06/01/13</a:t>
             </a:fld>
             <a:endParaRPr lang="it-IT"/>
           </a:p>
@@ -3691,7 +3691,7 @@
             <a:fld id="{F89AEA99-3E91-4C58-9AD4-045DB5619AC3}" type="slidenum">
               <a:rPr lang="it-IT" smtClean="0"/>
               <a:pPr/>
-              <a:t>‹N›</a:t>
+              <a:t>‹n.›</a:t>
             </a:fld>
             <a:endParaRPr lang="it-IT"/>
           </a:p>
@@ -3705,7 +3705,7 @@
   <p:timing>
     <p:tnLst>
       <p:par>
-        <p:cTn id="1" dur="indefinite" restart="never" nodeType="tmRoot"/>
+        <p:cTn xmlns:p14="http://schemas.microsoft.com/office/powerpoint/2010/main" id="1" dur="indefinite" restart="never" nodeType="tmRoot"/>
       </p:par>
     </p:tnLst>
   </p:timing>
@@ -4039,7 +4039,7 @@
             <a:fld id="{63CABBC0-75E4-43BB-A6A6-84C2A96BDB82}" type="datetimeFigureOut">
               <a:rPr lang="it-IT" smtClean="0"/>
               <a:pPr/>
-              <a:t>06/01/2013</a:t>
+              <a:t>06/01/13</a:t>
             </a:fld>
             <a:endParaRPr lang="it-IT"/>
           </a:p>
@@ -4082,7 +4082,7 @@
             <a:fld id="{F89AEA99-3E91-4C58-9AD4-045DB5619AC3}" type="slidenum">
               <a:rPr lang="it-IT" smtClean="0"/>
               <a:pPr/>
-              <a:t>‹N›</a:t>
+              <a:t>‹n.›</a:t>
             </a:fld>
             <a:endParaRPr lang="it-IT"/>
           </a:p>
@@ -4096,7 +4096,7 @@
   <p:timing>
     <p:tnLst>
       <p:par>
-        <p:cTn id="1" dur="indefinite" restart="never" nodeType="tmRoot"/>
+        <p:cTn xmlns:p14="http://schemas.microsoft.com/office/powerpoint/2010/main" id="1" dur="indefinite" restart="never" nodeType="tmRoot"/>
       </p:par>
     </p:tnLst>
   </p:timing>
@@ -4198,7 +4198,7 @@
             <a:fld id="{63CABBC0-75E4-43BB-A6A6-84C2A96BDB82}" type="datetimeFigureOut">
               <a:rPr lang="it-IT" smtClean="0"/>
               <a:pPr/>
-              <a:t>06/01/2013</a:t>
+              <a:t>06/01/13</a:t>
             </a:fld>
             <a:endParaRPr lang="it-IT"/>
           </a:p>
@@ -4241,7 +4241,7 @@
             <a:fld id="{F89AEA99-3E91-4C58-9AD4-045DB5619AC3}" type="slidenum">
               <a:rPr lang="it-IT" smtClean="0"/>
               <a:pPr/>
-              <a:t>‹N›</a:t>
+              <a:t>‹n.›</a:t>
             </a:fld>
             <a:endParaRPr lang="it-IT"/>
           </a:p>
@@ -4255,7 +4255,7 @@
   <p:timing>
     <p:tnLst>
       <p:par>
-        <p:cTn id="1" dur="indefinite" restart="never" nodeType="tmRoot"/>
+        <p:cTn xmlns:p14="http://schemas.microsoft.com/office/powerpoint/2010/main" id="1" dur="indefinite" restart="never" nodeType="tmRoot"/>
       </p:par>
     </p:tnLst>
   </p:timing>
@@ -4297,7 +4297,7 @@
             <a:fld id="{63CABBC0-75E4-43BB-A6A6-84C2A96BDB82}" type="datetimeFigureOut">
               <a:rPr lang="it-IT" smtClean="0"/>
               <a:pPr/>
-              <a:t>06/01/2013</a:t>
+              <a:t>06/01/13</a:t>
             </a:fld>
             <a:endParaRPr lang="it-IT"/>
           </a:p>
@@ -4340,7 +4340,7 @@
             <a:fld id="{F89AEA99-3E91-4C58-9AD4-045DB5619AC3}" type="slidenum">
               <a:rPr lang="it-IT" smtClean="0"/>
               <a:pPr/>
-              <a:t>‹N›</a:t>
+              <a:t>‹n.›</a:t>
             </a:fld>
             <a:endParaRPr lang="it-IT"/>
           </a:p>
@@ -4354,7 +4354,7 @@
   <p:timing>
     <p:tnLst>
       <p:par>
-        <p:cTn id="1" dur="indefinite" restart="never" nodeType="tmRoot"/>
+        <p:cTn xmlns:p14="http://schemas.microsoft.com/office/powerpoint/2010/main" id="1" dur="indefinite" restart="never" nodeType="tmRoot"/>
       </p:par>
     </p:tnLst>
   </p:timing>
@@ -4567,7 +4567,7 @@
             <a:fld id="{63CABBC0-75E4-43BB-A6A6-84C2A96BDB82}" type="datetimeFigureOut">
               <a:rPr lang="it-IT" smtClean="0"/>
               <a:pPr/>
-              <a:t>06/01/2013</a:t>
+              <a:t>06/01/13</a:t>
             </a:fld>
             <a:endParaRPr lang="it-IT"/>
           </a:p>
@@ -4610,7 +4610,7 @@
             <a:fld id="{F89AEA99-3E91-4C58-9AD4-045DB5619AC3}" type="slidenum">
               <a:rPr lang="it-IT" smtClean="0"/>
               <a:pPr/>
-              <a:t>‹N›</a:t>
+              <a:t>‹n.›</a:t>
             </a:fld>
             <a:endParaRPr lang="it-IT"/>
           </a:p>
@@ -4624,7 +4624,7 @@
   <p:timing>
     <p:tnLst>
       <p:par>
-        <p:cTn id="1" dur="indefinite" restart="never" nodeType="tmRoot"/>
+        <p:cTn xmlns:p14="http://schemas.microsoft.com/office/powerpoint/2010/main" id="1" dur="indefinite" restart="never" nodeType="tmRoot"/>
       </p:par>
     </p:tnLst>
   </p:timing>
@@ -4864,7 +4864,7 @@
             <a:fld id="{63CABBC0-75E4-43BB-A6A6-84C2A96BDB82}" type="datetimeFigureOut">
               <a:rPr lang="it-IT" smtClean="0"/>
               <a:pPr/>
-              <a:t>06/01/2013</a:t>
+              <a:t>06/01/13</a:t>
             </a:fld>
             <a:endParaRPr lang="it-IT"/>
           </a:p>
@@ -4912,7 +4912,7 @@
             <a:fld id="{F89AEA99-3E91-4C58-9AD4-045DB5619AC3}" type="slidenum">
               <a:rPr lang="it-IT" smtClean="0"/>
               <a:pPr/>
-              <a:t>‹N›</a:t>
+              <a:t>‹n.›</a:t>
             </a:fld>
             <a:endParaRPr lang="it-IT"/>
           </a:p>
@@ -5228,7 +5228,7 @@
   <p:timing>
     <p:tnLst>
       <p:par>
-        <p:cTn id="1" dur="indefinite" restart="never" nodeType="tmRoot"/>
+        <p:cTn xmlns:p14="http://schemas.microsoft.com/office/powerpoint/2010/main" id="1" dur="indefinite" restart="never" nodeType="tmRoot"/>
       </p:par>
     </p:tnLst>
   </p:timing>
@@ -5644,7 +5644,7 @@
             <a:fld id="{63CABBC0-75E4-43BB-A6A6-84C2A96BDB82}" type="datetimeFigureOut">
               <a:rPr lang="it-IT" smtClean="0"/>
               <a:pPr/>
-              <a:t>06/01/2013</a:t>
+              <a:t>06/01/13</a:t>
             </a:fld>
             <a:endParaRPr lang="it-IT"/>
           </a:p>
@@ -5723,7 +5723,7 @@
             <a:fld id="{F89AEA99-3E91-4C58-9AD4-045DB5619AC3}" type="slidenum">
               <a:rPr lang="it-IT" smtClean="0"/>
               <a:pPr/>
-              <a:t>‹N›</a:t>
+              <a:t>‹n.›</a:t>
             </a:fld>
             <a:endParaRPr lang="it-IT"/>
           </a:p>
@@ -5962,7 +5962,7 @@
   <p:timing>
     <p:tnLst>
       <p:par>
-        <p:cTn id="1" dur="indefinite" restart="never" nodeType="tmRoot"/>
+        <p:cTn xmlns:p14="http://schemas.microsoft.com/office/powerpoint/2010/main" id="1" dur="indefinite" restart="never" nodeType="tmRoot"/>
       </p:par>
     </p:tnLst>
   </p:timing>
@@ -6327,7 +6327,7 @@
           <p:nvPr>
             <p:extLst>
               <p:ext uri="{D42A27DB-BD31-4B8C-83A1-F6EECF244321}">
-                <p14:modId xmlns:p14="http://schemas.microsoft.com/office/powerpoint/2010/main" xmlns="" val="1430840817"/>
+                <p14:modId xmlns:p14="http://schemas.microsoft.com/office/powerpoint/2010/main" val="1430840817"/>
               </p:ext>
             </p:extLst>
           </p:nvPr>
@@ -6575,7 +6575,7 @@
           <p:nvPr>
             <p:extLst>
               <p:ext uri="{D42A27DB-BD31-4B8C-83A1-F6EECF244321}">
-                <p14:modId xmlns:p14="http://schemas.microsoft.com/office/powerpoint/2010/main" xmlns="" val="956586736"/>
+                <p14:modId xmlns:p14="http://schemas.microsoft.com/office/powerpoint/2010/main" val="956586736"/>
               </p:ext>
             </p:extLst>
           </p:nvPr>
@@ -6665,7 +6665,7 @@
           <a:blip r:embed="rId2" cstate="print">
             <a:extLst>
               <a:ext uri="{28A0092B-C50C-407E-A947-70E740481C1C}">
-                <a14:useLocalDpi xmlns:a14="http://schemas.microsoft.com/office/drawing/2010/main" xmlns="" val="0"/>
+                <a14:useLocalDpi xmlns:a14="http://schemas.microsoft.com/office/drawing/2010/main" val="0"/>
               </a:ext>
             </a:extLst>
           </a:blip>
@@ -6685,7 +6685,7 @@
           <a:noFill/>
           <a:extLst>
             <a:ext uri="{909E8E84-426E-40dd-AFC4-6F175D3DCCD1}">
-              <a14:hiddenFill xmlns:a14="http://schemas.microsoft.com/office/drawing/2010/main" xmlns="">
+              <a14:hiddenFill xmlns:a14="http://schemas.microsoft.com/office/drawing/2010/main">
                 <a:solidFill>
                   <a:srgbClr val="FFFFFF"/>
                 </a:solidFill>
@@ -6697,7 +6697,7 @@
     </p:spTree>
     <p:extLst>
       <p:ext uri="{BB962C8B-B14F-4D97-AF65-F5344CB8AC3E}">
-        <p14:creationId xmlns:p14="http://schemas.microsoft.com/office/powerpoint/2010/main" xmlns="" val="4165334171"/>
+        <p14:creationId xmlns:p14="http://schemas.microsoft.com/office/powerpoint/2010/main" val="4165334171"/>
       </p:ext>
     </p:extLst>
   </p:cSld>
@@ -6707,7 +6707,7 @@
   <p:timing>
     <p:tnLst>
       <p:par>
-        <p:cTn id="1" dur="indefinite" restart="never" nodeType="tmRoot"/>
+        <p:cTn xmlns:p14="http://schemas.microsoft.com/office/powerpoint/2010/main" id="1" dur="indefinite" restart="never" nodeType="tmRoot"/>
       </p:par>
     </p:tnLst>
   </p:timing>
@@ -7003,25 +7003,25 @@
     </p:spTree>
     <p:extLst>
       <p:ext uri="{BB962C8B-B14F-4D97-AF65-F5344CB8AC3E}">
-        <p14:creationId xmlns:p14="http://schemas.microsoft.com/office/powerpoint/2010/main" xmlns="" val="4143007013"/>
+        <p14:creationId xmlns:p14="http://schemas.microsoft.com/office/powerpoint/2010/main" val="4143007013"/>
       </p:ext>
     </p:extLst>
   </p:cSld>
   <p:clrMapOvr>
     <a:masterClrMapping/>
   </p:clrMapOvr>
-  <mc:AlternateContent xmlns:mc="http://schemas.openxmlformats.org/markup-compatibility/2006">
-    <mc:Choice xmlns:p14="http://schemas.microsoft.com/office/powerpoint/2010/main" xmlns="" Requires="p14">
+  <mc:AlternateContent xmlns:mc="http://schemas.openxmlformats.org/markup-compatibility/2006" xmlns:p14="http://schemas.microsoft.com/office/powerpoint/2010/main">
+    <mc:Choice Requires="p14">
       <p:transition spd="slow" p14:dur="2000"/>
     </mc:Choice>
-    <mc:Fallback>
+    <mc:Fallback xmlns="">
       <p:transition spd="slow"/>
     </mc:Fallback>
   </mc:AlternateContent>
   <p:timing>
     <p:tnLst>
       <p:par>
-        <p:cTn id="1" dur="indefinite" restart="never" nodeType="tmRoot"/>
+        <p:cTn xmlns:p14="http://schemas.microsoft.com/office/powerpoint/2010/main" id="1" dur="indefinite" restart="never" nodeType="tmRoot"/>
       </p:par>
     </p:tnLst>
   </p:timing>
@@ -7379,25 +7379,25 @@
     </p:spTree>
     <p:extLst>
       <p:ext uri="{BB962C8B-B14F-4D97-AF65-F5344CB8AC3E}">
-        <p14:creationId xmlns:p14="http://schemas.microsoft.com/office/powerpoint/2010/main" xmlns="" val="3748041918"/>
+        <p14:creationId xmlns:p14="http://schemas.microsoft.com/office/powerpoint/2010/main" val="3748041918"/>
       </p:ext>
     </p:extLst>
   </p:cSld>
   <p:clrMapOvr>
     <a:masterClrMapping/>
   </p:clrMapOvr>
-  <mc:AlternateContent xmlns:mc="http://schemas.openxmlformats.org/markup-compatibility/2006">
-    <mc:Choice xmlns:p14="http://schemas.microsoft.com/office/powerpoint/2010/main" xmlns="" Requires="p14">
+  <mc:AlternateContent xmlns:mc="http://schemas.openxmlformats.org/markup-compatibility/2006" xmlns:p14="http://schemas.microsoft.com/office/powerpoint/2010/main">
+    <mc:Choice Requires="p14">
       <p:transition spd="slow" p14:dur="2000"/>
     </mc:Choice>
-    <mc:Fallback>
+    <mc:Fallback xmlns="">
       <p:transition spd="slow"/>
     </mc:Fallback>
   </mc:AlternateContent>
   <p:timing>
     <p:tnLst>
       <p:par>
-        <p:cTn id="1" dur="indefinite" restart="never" nodeType="tmRoot"/>
+        <p:cTn xmlns:p14="http://schemas.microsoft.com/office/powerpoint/2010/main" id="1" dur="indefinite" restart="never" nodeType="tmRoot"/>
       </p:par>
     </p:tnLst>
   </p:timing>
@@ -7488,7 +7488,7 @@
     </p:spTree>
     <p:extLst>
       <p:ext uri="{BB962C8B-B14F-4D97-AF65-F5344CB8AC3E}">
-        <p14:creationId xmlns:p14="http://schemas.microsoft.com/office/powerpoint/2010/main" xmlns="" val="3695870384"/>
+        <p14:creationId xmlns:p14="http://schemas.microsoft.com/office/powerpoint/2010/main" val="3695870384"/>
       </p:ext>
     </p:extLst>
   </p:cSld>
@@ -7498,7 +7498,7 @@
   <p:timing>
     <p:tnLst>
       <p:par>
-        <p:cTn id="1" dur="indefinite" restart="never" nodeType="tmRoot"/>
+        <p:cTn xmlns:p14="http://schemas.microsoft.com/office/powerpoint/2010/main" id="1" dur="indefinite" restart="never" nodeType="tmRoot"/>
       </p:par>
     </p:tnLst>
   </p:timing>
@@ -7589,7 +7589,7 @@
     </p:spTree>
     <p:extLst>
       <p:ext uri="{BB962C8B-B14F-4D97-AF65-F5344CB8AC3E}">
-        <p14:creationId xmlns:p14="http://schemas.microsoft.com/office/powerpoint/2010/main" xmlns="" val="3987928837"/>
+        <p14:creationId xmlns:p14="http://schemas.microsoft.com/office/powerpoint/2010/main" val="3987928837"/>
       </p:ext>
     </p:extLst>
   </p:cSld>
@@ -7599,7 +7599,7 @@
   <p:timing>
     <p:tnLst>
       <p:par>
-        <p:cTn id="1" dur="indefinite" restart="never" nodeType="tmRoot"/>
+        <p:cTn xmlns:p14="http://schemas.microsoft.com/office/powerpoint/2010/main" id="1" dur="indefinite" restart="never" nodeType="tmRoot"/>
       </p:par>
     </p:tnLst>
   </p:timing>
@@ -7914,7 +7914,7 @@
     </p:spTree>
     <p:extLst>
       <p:ext uri="{BB962C8B-B14F-4D97-AF65-F5344CB8AC3E}">
-        <p14:creationId xmlns:p14="http://schemas.microsoft.com/office/powerpoint/2010/main" xmlns="" val="1367578552"/>
+        <p14:creationId xmlns:p14="http://schemas.microsoft.com/office/powerpoint/2010/main" val="1367578552"/>
       </p:ext>
     </p:extLst>
   </p:cSld>
@@ -7924,7 +7924,7 @@
   <p:timing>
     <p:tnLst>
       <p:par>
-        <p:cTn id="1" dur="indefinite" restart="never" nodeType="tmRoot"/>
+        <p:cTn xmlns:p14="http://schemas.microsoft.com/office/powerpoint/2010/main" id="1" dur="indefinite" restart="never" nodeType="tmRoot"/>
       </p:par>
     </p:tnLst>
   </p:timing>
@@ -8042,7 +8042,7 @@
     </p:spTree>
     <p:extLst>
       <p:ext uri="{BB962C8B-B14F-4D97-AF65-F5344CB8AC3E}">
-        <p14:creationId xmlns:p14="http://schemas.microsoft.com/office/powerpoint/2010/main" xmlns="" val="1554749062"/>
+        <p14:creationId xmlns:p14="http://schemas.microsoft.com/office/powerpoint/2010/main" val="1554749062"/>
       </p:ext>
     </p:extLst>
   </p:cSld>
@@ -8052,7 +8052,7 @@
   <p:timing>
     <p:tnLst>
       <p:par>
-        <p:cTn id="1" dur="indefinite" restart="never" nodeType="tmRoot"/>
+        <p:cTn xmlns:p14="http://schemas.microsoft.com/office/powerpoint/2010/main" id="1" dur="indefinite" restart="never" nodeType="tmRoot"/>
       </p:par>
     </p:tnLst>
   </p:timing>
@@ -8170,7 +8170,7 @@
     </p:spTree>
     <p:extLst>
       <p:ext uri="{BB962C8B-B14F-4D97-AF65-F5344CB8AC3E}">
-        <p14:creationId xmlns:p14="http://schemas.microsoft.com/office/powerpoint/2010/main" xmlns="" val="1028530279"/>
+        <p14:creationId xmlns:p14="http://schemas.microsoft.com/office/powerpoint/2010/main" val="1028530279"/>
       </p:ext>
     </p:extLst>
   </p:cSld>
@@ -8180,7 +8180,7 @@
   <p:timing>
     <p:tnLst>
       <p:par>
-        <p:cTn id="1" dur="indefinite" restart="never" nodeType="tmRoot"/>
+        <p:cTn xmlns:p14="http://schemas.microsoft.com/office/powerpoint/2010/main" id="1" dur="indefinite" restart="never" nodeType="tmRoot"/>
       </p:par>
     </p:tnLst>
   </p:timing>
@@ -8298,7 +8298,7 @@
     </p:spTree>
     <p:extLst>
       <p:ext uri="{BB962C8B-B14F-4D97-AF65-F5344CB8AC3E}">
-        <p14:creationId xmlns:p14="http://schemas.microsoft.com/office/powerpoint/2010/main" xmlns="" val="2120081776"/>
+        <p14:creationId xmlns:p14="http://schemas.microsoft.com/office/powerpoint/2010/main" val="2120081776"/>
       </p:ext>
     </p:extLst>
   </p:cSld>
@@ -8308,7 +8308,7 @@
   <p:timing>
     <p:tnLst>
       <p:par>
-        <p:cTn id="1" dur="indefinite" restart="never" nodeType="tmRoot"/>
+        <p:cTn xmlns:p14="http://schemas.microsoft.com/office/powerpoint/2010/main" id="1" dur="indefinite" restart="never" nodeType="tmRoot"/>
       </p:par>
     </p:tnLst>
   </p:timing>
@@ -8438,7 +8438,7 @@
     </p:spTree>
     <p:extLst>
       <p:ext uri="{BB962C8B-B14F-4D97-AF65-F5344CB8AC3E}">
-        <p14:creationId xmlns:p14="http://schemas.microsoft.com/office/powerpoint/2010/main" xmlns="" val="3320352623"/>
+        <p14:creationId xmlns:p14="http://schemas.microsoft.com/office/powerpoint/2010/main" val="3320352623"/>
       </p:ext>
     </p:extLst>
   </p:cSld>
@@ -8448,7 +8448,7 @@
   <p:timing>
     <p:tnLst>
       <p:par>
-        <p:cTn id="1" dur="indefinite" restart="never" nodeType="tmRoot"/>
+        <p:cTn xmlns:p14="http://schemas.microsoft.com/office/powerpoint/2010/main" id="1" dur="indefinite" restart="never" nodeType="tmRoot"/>
       </p:par>
     </p:tnLst>
   </p:timing>
@@ -8578,7 +8578,7 @@
     </p:spTree>
     <p:extLst>
       <p:ext uri="{BB962C8B-B14F-4D97-AF65-F5344CB8AC3E}">
-        <p14:creationId xmlns:p14="http://schemas.microsoft.com/office/powerpoint/2010/main" xmlns="" val="4011022122"/>
+        <p14:creationId xmlns:p14="http://schemas.microsoft.com/office/powerpoint/2010/main" val="4011022122"/>
       </p:ext>
     </p:extLst>
   </p:cSld>
@@ -8588,7 +8588,7 @@
   <p:timing>
     <p:tnLst>
       <p:par>
-        <p:cTn id="1" dur="indefinite" restart="never" nodeType="tmRoot"/>
+        <p:cTn xmlns:p14="http://schemas.microsoft.com/office/powerpoint/2010/main" id="1" dur="indefinite" restart="never" nodeType="tmRoot"/>
       </p:par>
     </p:tnLst>
   </p:timing>
@@ -8883,18 +8883,18 @@
     </p:spTree>
     <p:extLst>
       <p:ext uri="{BB962C8B-B14F-4D97-AF65-F5344CB8AC3E}">
-        <p14:creationId xmlns:p14="http://schemas.microsoft.com/office/powerpoint/2010/main" xmlns="" val="2927506779"/>
+        <p14:creationId xmlns:p14="http://schemas.microsoft.com/office/powerpoint/2010/main" val="2927506779"/>
       </p:ext>
     </p:extLst>
   </p:cSld>
   <p:clrMapOvr>
     <a:masterClrMapping/>
   </p:clrMapOvr>
-  <p:transition spd="med"/>
+  <p:transition xmlns:p14="http://schemas.microsoft.com/office/powerpoint/2010/main" spd="med"/>
   <p:timing>
     <p:tnLst>
       <p:par>
-        <p:cTn id="1" dur="indefinite" restart="never" nodeType="tmRoot"/>
+        <p:cTn xmlns:p14="http://schemas.microsoft.com/office/powerpoint/2010/main" id="1" dur="indefinite" restart="never" nodeType="tmRoot"/>
       </p:par>
     </p:tnLst>
   </p:timing>
@@ -9550,25 +9550,25 @@
     </p:spTree>
     <p:extLst>
       <p:ext uri="{BB962C8B-B14F-4D97-AF65-F5344CB8AC3E}">
-        <p14:creationId xmlns:p14="http://schemas.microsoft.com/office/powerpoint/2010/main" xmlns="" val="1720938352"/>
+        <p14:creationId xmlns:p14="http://schemas.microsoft.com/office/powerpoint/2010/main" val="1720938352"/>
       </p:ext>
     </p:extLst>
   </p:cSld>
   <p:clrMapOvr>
     <a:masterClrMapping/>
   </p:clrMapOvr>
-  <mc:AlternateContent xmlns:mc="http://schemas.openxmlformats.org/markup-compatibility/2006">
-    <mc:Choice xmlns:p14="http://schemas.microsoft.com/office/powerpoint/2010/main" xmlns="" Requires="p14">
+  <mc:AlternateContent xmlns:mc="http://schemas.openxmlformats.org/markup-compatibility/2006" xmlns:p14="http://schemas.microsoft.com/office/powerpoint/2010/main">
+    <mc:Choice Requires="p14">
       <p:transition spd="slow" p14:dur="2000"/>
     </mc:Choice>
-    <mc:Fallback>
+    <mc:Fallback xmlns="">
       <p:transition spd="slow"/>
     </mc:Fallback>
   </mc:AlternateContent>
   <p:timing>
     <p:tnLst>
       <p:par>
-        <p:cTn id="1" dur="indefinite" restart="never" nodeType="tmRoot"/>
+        <p:cTn xmlns:p14="http://schemas.microsoft.com/office/powerpoint/2010/main" id="1" dur="indefinite" restart="never" nodeType="tmRoot"/>
       </p:par>
     </p:tnLst>
   </p:timing>
@@ -9852,7 +9852,7 @@
     </p:spTree>
     <p:extLst>
       <p:ext uri="{BB962C8B-B14F-4D97-AF65-F5344CB8AC3E}">
-        <p14:creationId xmlns:p14="http://schemas.microsoft.com/office/powerpoint/2010/main" xmlns="" val="3389076463"/>
+        <p14:creationId xmlns:p14="http://schemas.microsoft.com/office/powerpoint/2010/main" val="3389076463"/>
       </p:ext>
     </p:extLst>
   </p:cSld>
@@ -9862,7 +9862,7 @@
   <p:timing>
     <p:tnLst>
       <p:par>
-        <p:cTn id="1" dur="indefinite" restart="never" nodeType="tmRoot"/>
+        <p:cTn xmlns:p14="http://schemas.microsoft.com/office/powerpoint/2010/main" id="1" dur="indefinite" restart="never" nodeType="tmRoot"/>
       </p:par>
     </p:tnLst>
   </p:timing>
@@ -9975,7 +9975,7 @@
     </p:spTree>
     <p:extLst>
       <p:ext uri="{BB962C8B-B14F-4D97-AF65-F5344CB8AC3E}">
-        <p14:creationId xmlns:p14="http://schemas.microsoft.com/office/powerpoint/2010/main" xmlns="" val="3781125707"/>
+        <p14:creationId xmlns:p14="http://schemas.microsoft.com/office/powerpoint/2010/main" val="3781125707"/>
       </p:ext>
     </p:extLst>
   </p:cSld>
@@ -9985,7 +9985,7 @@
   <p:timing>
     <p:tnLst>
       <p:par>
-        <p:cTn id="1" dur="indefinite" restart="never" nodeType="tmRoot"/>
+        <p:cTn xmlns:p14="http://schemas.microsoft.com/office/powerpoint/2010/main" id="1" dur="indefinite" restart="never" nodeType="tmRoot"/>
       </p:par>
     </p:tnLst>
   </p:timing>
@@ -10099,7 +10099,7 @@
     </p:spTree>
     <p:extLst>
       <p:ext uri="{BB962C8B-B14F-4D97-AF65-F5344CB8AC3E}">
-        <p14:creationId xmlns:p14="http://schemas.microsoft.com/office/powerpoint/2010/main" xmlns="" val="3113757335"/>
+        <p14:creationId xmlns:p14="http://schemas.microsoft.com/office/powerpoint/2010/main" val="3113757335"/>
       </p:ext>
     </p:extLst>
   </p:cSld>
@@ -10109,7 +10109,7 @@
   <p:timing>
     <p:tnLst>
       <p:par>
-        <p:cTn id="1" dur="indefinite" restart="never" nodeType="tmRoot"/>
+        <p:cTn xmlns:p14="http://schemas.microsoft.com/office/powerpoint/2010/main" id="1" dur="indefinite" restart="never" nodeType="tmRoot"/>
       </p:par>
     </p:tnLst>
   </p:timing>
@@ -10183,7 +10183,7 @@
     </p:spTree>
     <p:extLst>
       <p:ext uri="{BB962C8B-B14F-4D97-AF65-F5344CB8AC3E}">
-        <p14:creationId xmlns:p14="http://schemas.microsoft.com/office/powerpoint/2010/main" xmlns="" val="3128220547"/>
+        <p14:creationId xmlns:p14="http://schemas.microsoft.com/office/powerpoint/2010/main" val="3128220547"/>
       </p:ext>
     </p:extLst>
   </p:cSld>
@@ -10193,7 +10193,7 @@
   <p:timing>
     <p:tnLst>
       <p:par>
-        <p:cTn id="1" dur="indefinite" restart="never" nodeType="tmRoot"/>
+        <p:cTn xmlns:p14="http://schemas.microsoft.com/office/powerpoint/2010/main" id="1" dur="indefinite" restart="never" nodeType="tmRoot"/>
       </p:par>
     </p:tnLst>
   </p:timing>
@@ -10309,7 +10309,7 @@
     </p:spTree>
     <p:extLst>
       <p:ext uri="{BB962C8B-B14F-4D97-AF65-F5344CB8AC3E}">
-        <p14:creationId xmlns:p14="http://schemas.microsoft.com/office/powerpoint/2010/main" xmlns="" val="3526463055"/>
+        <p14:creationId xmlns:p14="http://schemas.microsoft.com/office/powerpoint/2010/main" val="3526463055"/>
       </p:ext>
     </p:extLst>
   </p:cSld>
@@ -10319,7 +10319,7 @@
   <p:timing>
     <p:tnLst>
       <p:par>
-        <p:cTn id="1" dur="indefinite" restart="never" nodeType="tmRoot"/>
+        <p:cTn xmlns:p14="http://schemas.microsoft.com/office/powerpoint/2010/main" id="1" dur="indefinite" restart="never" nodeType="tmRoot"/>
       </p:par>
     </p:tnLst>
   </p:timing>
@@ -10432,7 +10432,7 @@
     </p:spTree>
     <p:extLst>
       <p:ext uri="{BB962C8B-B14F-4D97-AF65-F5344CB8AC3E}">
-        <p14:creationId xmlns:p14="http://schemas.microsoft.com/office/powerpoint/2010/main" xmlns="" val="4153735844"/>
+        <p14:creationId xmlns:p14="http://schemas.microsoft.com/office/powerpoint/2010/main" val="4153735844"/>
       </p:ext>
     </p:extLst>
   </p:cSld>
@@ -10442,7 +10442,7 @@
   <p:timing>
     <p:tnLst>
       <p:par>
-        <p:cTn id="1" dur="indefinite" restart="never" nodeType="tmRoot"/>
+        <p:cTn xmlns:p14="http://schemas.microsoft.com/office/powerpoint/2010/main" id="1" dur="indefinite" restart="never" nodeType="tmRoot"/>
       </p:par>
     </p:tnLst>
   </p:timing>
@@ -10525,7 +10525,7 @@
     </p:spTree>
     <p:extLst>
       <p:ext uri="{BB962C8B-B14F-4D97-AF65-F5344CB8AC3E}">
-        <p14:creationId xmlns:p14="http://schemas.microsoft.com/office/powerpoint/2010/main" xmlns="" val="3584613944"/>
+        <p14:creationId xmlns:p14="http://schemas.microsoft.com/office/powerpoint/2010/main" val="3584613944"/>
       </p:ext>
     </p:extLst>
   </p:cSld>
@@ -10535,7 +10535,7 @@
   <p:timing>
     <p:tnLst>
       <p:par>
-        <p:cTn id="1" dur="indefinite" restart="never" nodeType="tmRoot"/>
+        <p:cTn xmlns:p14="http://schemas.microsoft.com/office/powerpoint/2010/main" id="1" dur="indefinite" restart="never" nodeType="tmRoot"/>
       </p:par>
     </p:tnLst>
   </p:timing>
@@ -10714,18 +10714,18 @@
     </p:spTree>
     <p:extLst>
       <p:ext uri="{BB962C8B-B14F-4D97-AF65-F5344CB8AC3E}">
-        <p14:creationId xmlns:p14="http://schemas.microsoft.com/office/powerpoint/2010/main" xmlns="" val="1309712431"/>
+        <p14:creationId xmlns:p14="http://schemas.microsoft.com/office/powerpoint/2010/main" val="1309712431"/>
       </p:ext>
     </p:extLst>
   </p:cSld>
   <p:clrMapOvr>
     <a:masterClrMapping/>
   </p:clrMapOvr>
-  <p:transition/>
+  <p:transition xmlns:p14="http://schemas.microsoft.com/office/powerpoint/2010/main"/>
   <p:timing>
     <p:tnLst>
       <p:par>
-        <p:cTn id="1" dur="indefinite" restart="never" nodeType="tmRoot"/>
+        <p:cTn xmlns:p14="http://schemas.microsoft.com/office/powerpoint/2010/main" id="1" dur="indefinite" restart="never" nodeType="tmRoot"/>
       </p:par>
     </p:tnLst>
   </p:timing>
@@ -10931,18 +10931,18 @@
     </p:spTree>
     <p:extLst>
       <p:ext uri="{BB962C8B-B14F-4D97-AF65-F5344CB8AC3E}">
-        <p14:creationId xmlns:p14="http://schemas.microsoft.com/office/powerpoint/2010/main" xmlns="" val="3902446084"/>
+        <p14:creationId xmlns:p14="http://schemas.microsoft.com/office/powerpoint/2010/main" val="3902446084"/>
       </p:ext>
     </p:extLst>
   </p:cSld>
   <p:clrMapOvr>
     <a:masterClrMapping/>
   </p:clrMapOvr>
-  <p:transition/>
+  <p:transition xmlns:p14="http://schemas.microsoft.com/office/powerpoint/2010/main"/>
   <p:timing>
     <p:tnLst>
       <p:par>
-        <p:cTn id="1" dur="indefinite" restart="never" nodeType="tmRoot"/>
+        <p:cTn xmlns:p14="http://schemas.microsoft.com/office/powerpoint/2010/main" id="1" dur="indefinite" restart="never" nodeType="tmRoot"/>
       </p:par>
     </p:tnLst>
   </p:timing>
@@ -11123,7 +11123,7 @@
     </p:spTree>
     <p:extLst>
       <p:ext uri="{BB962C8B-B14F-4D97-AF65-F5344CB8AC3E}">
-        <p14:creationId xmlns:p14="http://schemas.microsoft.com/office/powerpoint/2010/main" xmlns="" val="3677979436"/>
+        <p14:creationId xmlns:p14="http://schemas.microsoft.com/office/powerpoint/2010/main" val="3677979436"/>
       </p:ext>
     </p:extLst>
   </p:cSld>
@@ -11133,7 +11133,7 @@
   <p:timing>
     <p:tnLst>
       <p:par>
-        <p:cTn id="1" dur="indefinite" restart="never" nodeType="tmRoot"/>
+        <p:cTn xmlns:p14="http://schemas.microsoft.com/office/powerpoint/2010/main" id="1" dur="indefinite" restart="never" nodeType="tmRoot"/>
       </p:par>
     </p:tnLst>
   </p:timing>
@@ -11640,25 +11640,25 @@
     </p:spTree>
     <p:extLst>
       <p:ext uri="{BB962C8B-B14F-4D97-AF65-F5344CB8AC3E}">
-        <p14:creationId xmlns:p14="http://schemas.microsoft.com/office/powerpoint/2010/main" xmlns="" val="3436514102"/>
+        <p14:creationId xmlns:p14="http://schemas.microsoft.com/office/powerpoint/2010/main" val="3436514102"/>
       </p:ext>
     </p:extLst>
   </p:cSld>
   <p:clrMapOvr>
     <a:masterClrMapping/>
   </p:clrMapOvr>
-  <mc:AlternateContent xmlns:mc="http://schemas.openxmlformats.org/markup-compatibility/2006">
-    <mc:Choice xmlns:p14="http://schemas.microsoft.com/office/powerpoint/2010/main" xmlns="" Requires="p14">
+  <mc:AlternateContent xmlns:mc="http://schemas.openxmlformats.org/markup-compatibility/2006" xmlns:p14="http://schemas.microsoft.com/office/powerpoint/2010/main">
+    <mc:Choice Requires="p14">
       <p:transition spd="slow" p14:dur="2000"/>
     </mc:Choice>
-    <mc:Fallback>
+    <mc:Fallback xmlns="">
       <p:transition spd="slow"/>
     </mc:Fallback>
   </mc:AlternateContent>
   <p:timing>
     <p:tnLst>
       <p:par>
-        <p:cTn id="1" dur="indefinite" restart="never" nodeType="tmRoot"/>
+        <p:cTn xmlns:p14="http://schemas.microsoft.com/office/powerpoint/2010/main" id="1" dur="indefinite" restart="never" nodeType="tmRoot"/>
       </p:par>
     </p:tnLst>
   </p:timing>
@@ -11741,7 +11741,7 @@
     </p:spTree>
     <p:extLst>
       <p:ext uri="{BB962C8B-B14F-4D97-AF65-F5344CB8AC3E}">
-        <p14:creationId xmlns:p14="http://schemas.microsoft.com/office/powerpoint/2010/main" xmlns="" val="2777952497"/>
+        <p14:creationId xmlns:p14="http://schemas.microsoft.com/office/powerpoint/2010/main" val="2777952497"/>
       </p:ext>
     </p:extLst>
   </p:cSld>
@@ -11751,7 +11751,7 @@
   <p:timing>
     <p:tnLst>
       <p:par>
-        <p:cTn id="1" dur="indefinite" restart="never" nodeType="tmRoot"/>
+        <p:cTn xmlns:p14="http://schemas.microsoft.com/office/powerpoint/2010/main" id="1" dur="indefinite" restart="never" nodeType="tmRoot"/>
       </p:par>
     </p:tnLst>
   </p:timing>
@@ -11929,7 +11929,7 @@
     </p:spTree>
     <p:extLst>
       <p:ext uri="{BB962C8B-B14F-4D97-AF65-F5344CB8AC3E}">
-        <p14:creationId xmlns:p14="http://schemas.microsoft.com/office/powerpoint/2010/main" xmlns="" val="2574674066"/>
+        <p14:creationId xmlns:p14="http://schemas.microsoft.com/office/powerpoint/2010/main" val="2574674066"/>
       </p:ext>
     </p:extLst>
   </p:cSld>
@@ -11939,7 +11939,7 @@
   <p:timing>
     <p:tnLst>
       <p:par>
-        <p:cTn id="1" dur="indefinite" restart="never" nodeType="tmRoot"/>
+        <p:cTn xmlns:p14="http://schemas.microsoft.com/office/powerpoint/2010/main" id="1" dur="indefinite" restart="never" nodeType="tmRoot"/>
       </p:par>
     </p:tnLst>
   </p:timing>
@@ -12022,7 +12022,7 @@
     </p:spTree>
     <p:extLst>
       <p:ext uri="{BB962C8B-B14F-4D97-AF65-F5344CB8AC3E}">
-        <p14:creationId xmlns:p14="http://schemas.microsoft.com/office/powerpoint/2010/main" xmlns="" val="763878143"/>
+        <p14:creationId xmlns:p14="http://schemas.microsoft.com/office/powerpoint/2010/main" val="763878143"/>
       </p:ext>
     </p:extLst>
   </p:cSld>
@@ -12032,7 +12032,7 @@
   <p:timing>
     <p:tnLst>
       <p:par>
-        <p:cTn id="1" dur="indefinite" restart="never" nodeType="tmRoot"/>
+        <p:cTn xmlns:p14="http://schemas.microsoft.com/office/powerpoint/2010/main" id="1" dur="indefinite" restart="never" nodeType="tmRoot"/>
       </p:par>
     </p:tnLst>
   </p:timing>
@@ -12643,25 +12643,25 @@
     </p:spTree>
     <p:extLst>
       <p:ext uri="{BB962C8B-B14F-4D97-AF65-F5344CB8AC3E}">
-        <p14:creationId xmlns:p14="http://schemas.microsoft.com/office/powerpoint/2010/main" xmlns="" val="42533803"/>
+        <p14:creationId xmlns:p14="http://schemas.microsoft.com/office/powerpoint/2010/main" val="42533803"/>
       </p:ext>
     </p:extLst>
   </p:cSld>
   <p:clrMapOvr>
     <a:masterClrMapping/>
   </p:clrMapOvr>
-  <mc:AlternateContent xmlns:mc="http://schemas.openxmlformats.org/markup-compatibility/2006">
-    <mc:Choice xmlns:p14="http://schemas.microsoft.com/office/powerpoint/2010/main" xmlns="" Requires="p14">
+  <mc:AlternateContent xmlns:mc="http://schemas.openxmlformats.org/markup-compatibility/2006" xmlns:p14="http://schemas.microsoft.com/office/powerpoint/2010/main">
+    <mc:Choice Requires="p14">
       <p:transition spd="slow" p14:dur="2000"/>
     </mc:Choice>
-    <mc:Fallback>
+    <mc:Fallback xmlns="">
       <p:transition spd="slow"/>
     </mc:Fallback>
   </mc:AlternateContent>
   <p:timing>
     <p:tnLst>
       <p:par>
-        <p:cTn id="1" dur="indefinite" restart="never" nodeType="tmRoot"/>
+        <p:cTn xmlns:p14="http://schemas.microsoft.com/office/powerpoint/2010/main" id="1" dur="indefinite" restart="never" nodeType="tmRoot"/>
       </p:par>
     </p:tnLst>
   </p:timing>
@@ -12955,25 +12955,25 @@
     </p:spTree>
     <p:extLst>
       <p:ext uri="{BB962C8B-B14F-4D97-AF65-F5344CB8AC3E}">
-        <p14:creationId xmlns:p14="http://schemas.microsoft.com/office/powerpoint/2010/main" xmlns="" val="719158636"/>
+        <p14:creationId xmlns:p14="http://schemas.microsoft.com/office/powerpoint/2010/main" val="719158636"/>
       </p:ext>
     </p:extLst>
   </p:cSld>
   <p:clrMapOvr>
     <a:masterClrMapping/>
   </p:clrMapOvr>
-  <mc:AlternateContent xmlns:mc="http://schemas.openxmlformats.org/markup-compatibility/2006">
-    <mc:Choice xmlns:p14="http://schemas.microsoft.com/office/powerpoint/2010/main" xmlns="" Requires="p14">
+  <mc:AlternateContent xmlns:mc="http://schemas.openxmlformats.org/markup-compatibility/2006" xmlns:p14="http://schemas.microsoft.com/office/powerpoint/2010/main">
+    <mc:Choice Requires="p14">
       <p:transition spd="slow" p14:dur="2000"/>
     </mc:Choice>
-    <mc:Fallback>
+    <mc:Fallback xmlns="">
       <p:transition spd="slow"/>
     </mc:Fallback>
   </mc:AlternateContent>
   <p:timing>
     <p:tnLst>
       <p:par>
-        <p:cTn id="1" dur="indefinite" restart="never" nodeType="tmRoot"/>
+        <p:cTn xmlns:p14="http://schemas.microsoft.com/office/powerpoint/2010/main" id="1" dur="indefinite" restart="never" nodeType="tmRoot"/>
       </p:par>
     </p:tnLst>
   </p:timing>
@@ -13264,25 +13264,25 @@
     </p:spTree>
     <p:extLst>
       <p:ext uri="{BB962C8B-B14F-4D97-AF65-F5344CB8AC3E}">
-        <p14:creationId xmlns:p14="http://schemas.microsoft.com/office/powerpoint/2010/main" xmlns="" val="3790159258"/>
+        <p14:creationId xmlns:p14="http://schemas.microsoft.com/office/powerpoint/2010/main" val="3790159258"/>
       </p:ext>
     </p:extLst>
   </p:cSld>
   <p:clrMapOvr>
     <a:masterClrMapping/>
   </p:clrMapOvr>
-  <mc:AlternateContent xmlns:mc="http://schemas.openxmlformats.org/markup-compatibility/2006">
-    <mc:Choice xmlns:p14="http://schemas.microsoft.com/office/powerpoint/2010/main" xmlns="" Requires="p14">
+  <mc:AlternateContent xmlns:mc="http://schemas.openxmlformats.org/markup-compatibility/2006" xmlns:p14="http://schemas.microsoft.com/office/powerpoint/2010/main">
+    <mc:Choice Requires="p14">
       <p:transition spd="slow" p14:dur="2000"/>
     </mc:Choice>
-    <mc:Fallback>
+    <mc:Fallback xmlns="">
       <p:transition spd="slow"/>
     </mc:Fallback>
   </mc:AlternateContent>
   <p:timing>
     <p:tnLst>
       <p:par>
-        <p:cTn id="1" dur="indefinite" restart="never" nodeType="tmRoot"/>
+        <p:cTn xmlns:p14="http://schemas.microsoft.com/office/powerpoint/2010/main" id="1" dur="indefinite" restart="never" nodeType="tmRoot"/>
       </p:par>
     </p:tnLst>
   </p:timing>
@@ -13580,25 +13580,25 @@
     </p:spTree>
     <p:extLst>
       <p:ext uri="{BB962C8B-B14F-4D97-AF65-F5344CB8AC3E}">
-        <p14:creationId xmlns:p14="http://schemas.microsoft.com/office/powerpoint/2010/main" xmlns="" val="560870364"/>
+        <p14:creationId xmlns:p14="http://schemas.microsoft.com/office/powerpoint/2010/main" val="560870364"/>
       </p:ext>
     </p:extLst>
   </p:cSld>
   <p:clrMapOvr>
     <a:masterClrMapping/>
   </p:clrMapOvr>
-  <mc:AlternateContent xmlns:mc="http://schemas.openxmlformats.org/markup-compatibility/2006">
-    <mc:Choice xmlns:p14="http://schemas.microsoft.com/office/powerpoint/2010/main" xmlns="" Requires="p14">
+  <mc:AlternateContent xmlns:mc="http://schemas.openxmlformats.org/markup-compatibility/2006" xmlns:p14="http://schemas.microsoft.com/office/powerpoint/2010/main">
+    <mc:Choice Requires="p14">
       <p:transition spd="slow" p14:dur="2000"/>
     </mc:Choice>
-    <mc:Fallback>
+    <mc:Fallback xmlns="">
       <p:transition spd="slow"/>
     </mc:Fallback>
   </mc:AlternateContent>
   <p:timing>
     <p:tnLst>
       <p:par>
-        <p:cTn id="1" dur="indefinite" restart="never" nodeType="tmRoot"/>
+        <p:cTn xmlns:p14="http://schemas.microsoft.com/office/powerpoint/2010/main" id="1" dur="indefinite" restart="never" nodeType="tmRoot"/>
       </p:par>
     </p:tnLst>
   </p:timing>
@@ -13889,25 +13889,25 @@
     </p:spTree>
     <p:extLst>
       <p:ext uri="{BB962C8B-B14F-4D97-AF65-F5344CB8AC3E}">
-        <p14:creationId xmlns:p14="http://schemas.microsoft.com/office/powerpoint/2010/main" xmlns="" val="518406238"/>
+        <p14:creationId xmlns:p14="http://schemas.microsoft.com/office/powerpoint/2010/main" val="518406238"/>
       </p:ext>
     </p:extLst>
   </p:cSld>
   <p:clrMapOvr>
     <a:masterClrMapping/>
   </p:clrMapOvr>
-  <mc:AlternateContent xmlns:mc="http://schemas.openxmlformats.org/markup-compatibility/2006">
-    <mc:Choice xmlns:p14="http://schemas.microsoft.com/office/powerpoint/2010/main" xmlns="" Requires="p14">
+  <mc:AlternateContent xmlns:mc="http://schemas.openxmlformats.org/markup-compatibility/2006" xmlns:p14="http://schemas.microsoft.com/office/powerpoint/2010/main">
+    <mc:Choice Requires="p14">
       <p:transition spd="slow" p14:dur="2000"/>
     </mc:Choice>
-    <mc:Fallback>
+    <mc:Fallback xmlns="">
       <p:transition spd="slow"/>
     </mc:Fallback>
   </mc:AlternateContent>
   <p:timing>
     <p:tnLst>
       <p:par>
-        <p:cTn id="1" dur="indefinite" restart="never" nodeType="tmRoot"/>
+        <p:cTn xmlns:p14="http://schemas.microsoft.com/office/powerpoint/2010/main" id="1" dur="indefinite" restart="never" nodeType="tmRoot"/>
       </p:par>
     </p:tnLst>
   </p:timing>
@@ -14198,25 +14198,25 @@
     </p:spTree>
     <p:extLst>
       <p:ext uri="{BB962C8B-B14F-4D97-AF65-F5344CB8AC3E}">
-        <p14:creationId xmlns:p14="http://schemas.microsoft.com/office/powerpoint/2010/main" xmlns="" val="3089945963"/>
+        <p14:creationId xmlns:p14="http://schemas.microsoft.com/office/powerpoint/2010/main" val="3089945963"/>
       </p:ext>
     </p:extLst>
   </p:cSld>
   <p:clrMapOvr>
     <a:masterClrMapping/>
   </p:clrMapOvr>
-  <mc:AlternateContent xmlns:mc="http://schemas.openxmlformats.org/markup-compatibility/2006">
-    <mc:Choice xmlns:p14="http://schemas.microsoft.com/office/powerpoint/2010/main" xmlns="" Requires="p14">
+  <mc:AlternateContent xmlns:mc="http://schemas.openxmlformats.org/markup-compatibility/2006" xmlns:p14="http://schemas.microsoft.com/office/powerpoint/2010/main">
+    <mc:Choice Requires="p14">
       <p:transition spd="slow" p14:dur="2000"/>
     </mc:Choice>
-    <mc:Fallback>
+    <mc:Fallback xmlns="">
       <p:transition spd="slow"/>
     </mc:Fallback>
   </mc:AlternateContent>
   <p:timing>
     <p:tnLst>
       <p:par>
-        <p:cTn id="1" dur="indefinite" restart="never" nodeType="tmRoot"/>
+        <p:cTn xmlns:p14="http://schemas.microsoft.com/office/powerpoint/2010/main" id="1" dur="indefinite" restart="never" nodeType="tmRoot"/>
       </p:par>
     </p:tnLst>
   </p:timing>
@@ -14553,25 +14553,25 @@
     </p:spTree>
     <p:extLst>
       <p:ext uri="{BB962C8B-B14F-4D97-AF65-F5344CB8AC3E}">
-        <p14:creationId xmlns:p14="http://schemas.microsoft.com/office/powerpoint/2010/main" xmlns="" val="3735783036"/>
+        <p14:creationId xmlns:p14="http://schemas.microsoft.com/office/powerpoint/2010/main" val="3735783036"/>
       </p:ext>
     </p:extLst>
   </p:cSld>
   <p:clrMapOvr>
     <a:masterClrMapping/>
   </p:clrMapOvr>
-  <mc:AlternateContent xmlns:mc="http://schemas.openxmlformats.org/markup-compatibility/2006">
-    <mc:Choice xmlns:p14="http://schemas.microsoft.com/office/powerpoint/2010/main" xmlns="" Requires="p14">
+  <mc:AlternateContent xmlns:mc="http://schemas.openxmlformats.org/markup-compatibility/2006" xmlns:p14="http://schemas.microsoft.com/office/powerpoint/2010/main">
+    <mc:Choice Requires="p14">
       <p:transition spd="slow" p14:dur="2000"/>
     </mc:Choice>
-    <mc:Fallback>
+    <mc:Fallback xmlns="">
       <p:transition spd="slow"/>
     </mc:Fallback>
   </mc:AlternateContent>
   <p:timing>
     <p:tnLst>
       <p:par>
-        <p:cTn id="1" dur="indefinite" restart="never" nodeType="tmRoot"/>
+        <p:cTn xmlns:p14="http://schemas.microsoft.com/office/powerpoint/2010/main" id="1" dur="indefinite" restart="never" nodeType="tmRoot"/>
       </p:par>
     </p:tnLst>
   </p:timing>
@@ -14874,25 +14874,25 @@
     </p:spTree>
     <p:extLst>
       <p:ext uri="{BB962C8B-B14F-4D97-AF65-F5344CB8AC3E}">
-        <p14:creationId xmlns:p14="http://schemas.microsoft.com/office/powerpoint/2010/main" xmlns="" val="820318166"/>
+        <p14:creationId xmlns:p14="http://schemas.microsoft.com/office/powerpoint/2010/main" val="820318166"/>
       </p:ext>
     </p:extLst>
   </p:cSld>
   <p:clrMapOvr>
     <a:masterClrMapping/>
   </p:clrMapOvr>
-  <mc:AlternateContent xmlns:mc="http://schemas.openxmlformats.org/markup-compatibility/2006">
-    <mc:Choice xmlns:p14="http://schemas.microsoft.com/office/powerpoint/2010/main" xmlns="" Requires="p14">
+  <mc:AlternateContent xmlns:mc="http://schemas.openxmlformats.org/markup-compatibility/2006" xmlns:p14="http://schemas.microsoft.com/office/powerpoint/2010/main">
+    <mc:Choice Requires="p14">
       <p:transition spd="slow" p14:dur="2000"/>
     </mc:Choice>
-    <mc:Fallback>
+    <mc:Fallback xmlns="">
       <p:transition spd="slow"/>
     </mc:Fallback>
   </mc:AlternateContent>
   <p:timing>
     <p:tnLst>
       <p:par>
-        <p:cTn id="1" dur="indefinite" restart="never" nodeType="tmRoot"/>
+        <p:cTn xmlns:p14="http://schemas.microsoft.com/office/powerpoint/2010/main" id="1" dur="indefinite" restart="never" nodeType="tmRoot"/>
       </p:par>
     </p:tnLst>
   </p:timing>
@@ -15153,74 +15153,28 @@
           </a:p>
         </p:txBody>
       </p:sp>
-      <p:sp>
-        <p:nvSpPr>
-          <p:cNvPr id="4" name="Ovale 3"/>
-          <p:cNvSpPr/>
-          <p:nvPr/>
-        </p:nvSpPr>
-        <p:spPr>
-          <a:xfrm>
-            <a:off x="2987824" y="2204864"/>
-            <a:ext cx="1656184" cy="720080"/>
-          </a:xfrm>
-          <a:prstGeom prst="ellipse">
-            <a:avLst/>
-          </a:prstGeom>
-          <a:noFill/>
-          <a:ln>
-            <a:solidFill>
-              <a:srgbClr val="FF0000"/>
-            </a:solidFill>
-          </a:ln>
-        </p:spPr>
-        <p:style>
-          <a:lnRef idx="2">
-            <a:schemeClr val="accent1">
-              <a:shade val="50000"/>
-            </a:schemeClr>
-          </a:lnRef>
-          <a:fillRef idx="1">
-            <a:schemeClr val="accent1"/>
-          </a:fillRef>
-          <a:effectRef idx="0">
-            <a:schemeClr val="accent1"/>
-          </a:effectRef>
-          <a:fontRef idx="minor">
-            <a:schemeClr val="lt1"/>
-          </a:fontRef>
-        </p:style>
-        <p:txBody>
-          <a:bodyPr rtlCol="0" anchor="ctr"/>
-          <a:lstStyle/>
-          <a:p>
-            <a:pPr algn="ctr"/>
-            <a:endParaRPr lang="it-IT"/>
-          </a:p>
-        </p:txBody>
-      </p:sp>
     </p:spTree>
     <p:extLst>
       <p:ext uri="{BB962C8B-B14F-4D97-AF65-F5344CB8AC3E}">
-        <p14:creationId xmlns:p14="http://schemas.microsoft.com/office/powerpoint/2010/main" xmlns="" val="2112585717"/>
+        <p14:creationId xmlns:p14="http://schemas.microsoft.com/office/powerpoint/2010/main" val="2112585717"/>
       </p:ext>
     </p:extLst>
   </p:cSld>
   <p:clrMapOvr>
     <a:masterClrMapping/>
   </p:clrMapOvr>
-  <mc:AlternateContent xmlns:mc="http://schemas.openxmlformats.org/markup-compatibility/2006">
-    <mc:Choice xmlns:p14="http://schemas.microsoft.com/office/powerpoint/2010/main" xmlns="" Requires="p14">
+  <mc:AlternateContent xmlns:mc="http://schemas.openxmlformats.org/markup-compatibility/2006" xmlns:p14="http://schemas.microsoft.com/office/powerpoint/2010/main">
+    <mc:Choice Requires="p14">
       <p:transition spd="slow" p14:dur="2000"/>
     </mc:Choice>
-    <mc:Fallback>
+    <mc:Fallback xmlns="">
       <p:transition spd="slow"/>
     </mc:Fallback>
   </mc:AlternateContent>
   <p:timing>
     <p:tnLst>
       <p:par>
-        <p:cTn id="1" dur="indefinite" restart="never" nodeType="tmRoot"/>
+        <p:cTn xmlns:p14="http://schemas.microsoft.com/office/powerpoint/2010/main" id="1" dur="indefinite" restart="never" nodeType="tmRoot"/>
       </p:par>
     </p:tnLst>
   </p:timing>
@@ -15495,25 +15449,25 @@
     </p:spTree>
     <p:extLst>
       <p:ext uri="{BB962C8B-B14F-4D97-AF65-F5344CB8AC3E}">
-        <p14:creationId xmlns:p14="http://schemas.microsoft.com/office/powerpoint/2010/main" xmlns="" val="2498309309"/>
+        <p14:creationId xmlns:p14="http://schemas.microsoft.com/office/powerpoint/2010/main" val="2498309309"/>
       </p:ext>
     </p:extLst>
   </p:cSld>
   <p:clrMapOvr>
     <a:masterClrMapping/>
   </p:clrMapOvr>
-  <mc:AlternateContent xmlns:mc="http://schemas.openxmlformats.org/markup-compatibility/2006">
-    <mc:Choice xmlns:p14="http://schemas.microsoft.com/office/powerpoint/2010/main" xmlns="" Requires="p14">
+  <mc:AlternateContent xmlns:mc="http://schemas.openxmlformats.org/markup-compatibility/2006" xmlns:p14="http://schemas.microsoft.com/office/powerpoint/2010/main">
+    <mc:Choice Requires="p14">
       <p:transition spd="slow" p14:dur="2000"/>
     </mc:Choice>
-    <mc:Fallback>
+    <mc:Fallback xmlns="">
       <p:transition spd="slow"/>
     </mc:Fallback>
   </mc:AlternateContent>
   <p:timing>
     <p:tnLst>
       <p:par>
-        <p:cTn id="1" dur="indefinite" restart="never" nodeType="tmRoot"/>
+        <p:cTn xmlns:p14="http://schemas.microsoft.com/office/powerpoint/2010/main" id="1" dur="indefinite" restart="never" nodeType="tmRoot"/>
       </p:par>
     </p:tnLst>
   </p:timing>
@@ -15800,25 +15754,25 @@
     </p:spTree>
     <p:extLst>
       <p:ext uri="{BB962C8B-B14F-4D97-AF65-F5344CB8AC3E}">
-        <p14:creationId xmlns:p14="http://schemas.microsoft.com/office/powerpoint/2010/main" xmlns="" val="490993421"/>
+        <p14:creationId xmlns:p14="http://schemas.microsoft.com/office/powerpoint/2010/main" val="490993421"/>
       </p:ext>
     </p:extLst>
   </p:cSld>
   <p:clrMapOvr>
     <a:masterClrMapping/>
   </p:clrMapOvr>
-  <mc:AlternateContent xmlns:mc="http://schemas.openxmlformats.org/markup-compatibility/2006">
-    <mc:Choice xmlns:p14="http://schemas.microsoft.com/office/powerpoint/2010/main" xmlns="" Requires="p14">
+  <mc:AlternateContent xmlns:mc="http://schemas.openxmlformats.org/markup-compatibility/2006" xmlns:p14="http://schemas.microsoft.com/office/powerpoint/2010/main">
+    <mc:Choice Requires="p14">
       <p:transition spd="slow" p14:dur="2000"/>
     </mc:Choice>
-    <mc:Fallback>
+    <mc:Fallback xmlns="">
       <p:transition spd="slow"/>
     </mc:Fallback>
   </mc:AlternateContent>
   <p:timing>
     <p:tnLst>
       <p:par>
-        <p:cTn id="1" dur="indefinite" restart="never" nodeType="tmRoot"/>
+        <p:cTn xmlns:p14="http://schemas.microsoft.com/office/powerpoint/2010/main" id="1" dur="indefinite" restart="never" nodeType="tmRoot"/>
       </p:par>
     </p:tnLst>
   </p:timing>
@@ -16077,25 +16031,25 @@
     </p:spTree>
     <p:extLst>
       <p:ext uri="{BB962C8B-B14F-4D97-AF65-F5344CB8AC3E}">
-        <p14:creationId xmlns:p14="http://schemas.microsoft.com/office/powerpoint/2010/main" xmlns="" val="1982603412"/>
+        <p14:creationId xmlns:p14="http://schemas.microsoft.com/office/powerpoint/2010/main" val="1982603412"/>
       </p:ext>
     </p:extLst>
   </p:cSld>
   <p:clrMapOvr>
     <a:masterClrMapping/>
   </p:clrMapOvr>
-  <mc:AlternateContent xmlns:mc="http://schemas.openxmlformats.org/markup-compatibility/2006">
-    <mc:Choice xmlns:p14="http://schemas.microsoft.com/office/powerpoint/2010/main" xmlns="" Requires="p14">
+  <mc:AlternateContent xmlns:mc="http://schemas.openxmlformats.org/markup-compatibility/2006" xmlns:p14="http://schemas.microsoft.com/office/powerpoint/2010/main">
+    <mc:Choice Requires="p14">
       <p:transition spd="slow" p14:dur="2000"/>
     </mc:Choice>
-    <mc:Fallback>
+    <mc:Fallback xmlns="">
       <p:transition spd="slow"/>
     </mc:Fallback>
   </mc:AlternateContent>
   <p:timing>
     <p:tnLst>
       <p:par>
-        <p:cTn id="1" dur="indefinite" restart="never" nodeType="tmRoot"/>
+        <p:cTn xmlns:p14="http://schemas.microsoft.com/office/powerpoint/2010/main" id="1" dur="indefinite" restart="never" nodeType="tmRoot"/>
       </p:par>
     </p:tnLst>
   </p:timing>
@@ -16178,25 +16132,25 @@
     </p:spTree>
     <p:extLst>
       <p:ext uri="{BB962C8B-B14F-4D97-AF65-F5344CB8AC3E}">
-        <p14:creationId xmlns:p14="http://schemas.microsoft.com/office/powerpoint/2010/main" xmlns="" val="3486681628"/>
+        <p14:creationId xmlns:p14="http://schemas.microsoft.com/office/powerpoint/2010/main" val="3486681628"/>
       </p:ext>
     </p:extLst>
   </p:cSld>
   <p:clrMapOvr>
     <a:masterClrMapping/>
   </p:clrMapOvr>
-  <mc:AlternateContent xmlns:mc="http://schemas.openxmlformats.org/markup-compatibility/2006">
-    <mc:Choice xmlns:p14="http://schemas.microsoft.com/office/powerpoint/2010/main" xmlns="" Requires="p14">
+  <mc:AlternateContent xmlns:mc="http://schemas.openxmlformats.org/markup-compatibility/2006" xmlns:p14="http://schemas.microsoft.com/office/powerpoint/2010/main">
+    <mc:Choice Requires="p14">
       <p:transition spd="slow" p14:dur="2000"/>
     </mc:Choice>
-    <mc:Fallback>
+    <mc:Fallback xmlns="">
       <p:transition spd="slow"/>
     </mc:Fallback>
   </mc:AlternateContent>
   <p:timing>
     <p:tnLst>
       <p:par>
-        <p:cTn id="1" dur="indefinite" restart="never" nodeType="tmRoot"/>
+        <p:cTn xmlns:p14="http://schemas.microsoft.com/office/powerpoint/2010/main" id="1" dur="indefinite" restart="never" nodeType="tmRoot"/>
       </p:par>
     </p:tnLst>
   </p:timing>
@@ -16489,6 +16443,10 @@
           </a:p>
           <a:p>
             <a:pPr lvl="2"/>
+            <a:r>
+              <a:rPr lang="it-IT" dirty="0" smtClean="0"/>
+              <a:t>Manutenibilità</a:t>
+            </a:r>
             <a:endParaRPr lang="it-IT" dirty="0"/>
           </a:p>
         </p:txBody>
@@ -16496,25 +16454,25 @@
     </p:spTree>
     <p:extLst>
       <p:ext uri="{BB962C8B-B14F-4D97-AF65-F5344CB8AC3E}">
-        <p14:creationId xmlns:p14="http://schemas.microsoft.com/office/powerpoint/2010/main" xmlns="" val="2167458548"/>
+        <p14:creationId xmlns:p14="http://schemas.microsoft.com/office/powerpoint/2010/main" val="2167458548"/>
       </p:ext>
     </p:extLst>
   </p:cSld>
   <p:clrMapOvr>
     <a:masterClrMapping/>
   </p:clrMapOvr>
-  <mc:AlternateContent xmlns:mc="http://schemas.openxmlformats.org/markup-compatibility/2006">
-    <mc:Choice xmlns:p14="http://schemas.microsoft.com/office/powerpoint/2010/main" xmlns="" Requires="p14">
+  <mc:AlternateContent xmlns:mc="http://schemas.openxmlformats.org/markup-compatibility/2006" xmlns:p14="http://schemas.microsoft.com/office/powerpoint/2010/main">
+    <mc:Choice Requires="p14">
       <p:transition spd="slow" p14:dur="2000"/>
     </mc:Choice>
-    <mc:Fallback>
+    <mc:Fallback xmlns="">
       <p:transition spd="slow"/>
     </mc:Fallback>
   </mc:AlternateContent>
   <p:timing>
     <p:tnLst>
       <p:par>
-        <p:cTn id="1" dur="indefinite" restart="never" nodeType="tmRoot"/>
+        <p:cTn xmlns:p14="http://schemas.microsoft.com/office/powerpoint/2010/main" id="1" dur="indefinite" restart="never" nodeType="tmRoot"/>
       </p:par>
     </p:tnLst>
   </p:timing>
@@ -16603,25 +16561,25 @@
     </p:spTree>
     <p:extLst>
       <p:ext uri="{BB962C8B-B14F-4D97-AF65-F5344CB8AC3E}">
-        <p14:creationId xmlns:p14="http://schemas.microsoft.com/office/powerpoint/2010/main" xmlns="" val="77984983"/>
+        <p14:creationId xmlns:p14="http://schemas.microsoft.com/office/powerpoint/2010/main" val="77984983"/>
       </p:ext>
     </p:extLst>
   </p:cSld>
   <p:clrMapOvr>
     <a:masterClrMapping/>
   </p:clrMapOvr>
-  <mc:AlternateContent xmlns:mc="http://schemas.openxmlformats.org/markup-compatibility/2006">
-    <mc:Choice xmlns:p14="http://schemas.microsoft.com/office/powerpoint/2010/main" xmlns="" Requires="p14">
+  <mc:AlternateContent xmlns:mc="http://schemas.openxmlformats.org/markup-compatibility/2006" xmlns:p14="http://schemas.microsoft.com/office/powerpoint/2010/main">
+    <mc:Choice Requires="p14">
       <p:transition spd="slow" p14:dur="2000"/>
     </mc:Choice>
-    <mc:Fallback>
+    <mc:Fallback xmlns="">
       <p:transition spd="slow"/>
     </mc:Fallback>
   </mc:AlternateContent>
   <p:timing>
     <p:tnLst>
       <p:par>
-        <p:cTn id="1" dur="indefinite" restart="never" nodeType="tmRoot"/>
+        <p:cTn xmlns:p14="http://schemas.microsoft.com/office/powerpoint/2010/main" id="1" dur="indefinite" restart="never" nodeType="tmRoot"/>
       </p:par>
     </p:tnLst>
   </p:timing>
@@ -16710,25 +16668,25 @@
     </p:spTree>
     <p:extLst>
       <p:ext uri="{BB962C8B-B14F-4D97-AF65-F5344CB8AC3E}">
-        <p14:creationId xmlns:p14="http://schemas.microsoft.com/office/powerpoint/2010/main" xmlns="" val="3690446741"/>
+        <p14:creationId xmlns:p14="http://schemas.microsoft.com/office/powerpoint/2010/main" val="3690446741"/>
       </p:ext>
     </p:extLst>
   </p:cSld>
   <p:clrMapOvr>
     <a:masterClrMapping/>
   </p:clrMapOvr>
-  <mc:AlternateContent xmlns:mc="http://schemas.openxmlformats.org/markup-compatibility/2006">
-    <mc:Choice xmlns:p14="http://schemas.microsoft.com/office/powerpoint/2010/main" xmlns="" Requires="p14">
+  <mc:AlternateContent xmlns:mc="http://schemas.openxmlformats.org/markup-compatibility/2006" xmlns:p14="http://schemas.microsoft.com/office/powerpoint/2010/main">
+    <mc:Choice Requires="p14">
       <p:transition spd="slow" p14:dur="2000"/>
     </mc:Choice>
-    <mc:Fallback>
+    <mc:Fallback xmlns="">
       <p:transition spd="slow"/>
     </mc:Fallback>
   </mc:AlternateContent>
   <p:timing>
     <p:tnLst>
       <p:par>
-        <p:cTn id="1" dur="indefinite" restart="never" nodeType="tmRoot"/>
+        <p:cTn xmlns:p14="http://schemas.microsoft.com/office/powerpoint/2010/main" id="1" dur="indefinite" restart="never" nodeType="tmRoot"/>
       </p:par>
     </p:tnLst>
   </p:timing>
@@ -16949,25 +16907,25 @@
     </p:spTree>
     <p:extLst>
       <p:ext uri="{BB962C8B-B14F-4D97-AF65-F5344CB8AC3E}">
-        <p14:creationId xmlns:p14="http://schemas.microsoft.com/office/powerpoint/2010/main" xmlns="" val="1921668123"/>
+        <p14:creationId xmlns:p14="http://schemas.microsoft.com/office/powerpoint/2010/main" val="1921668123"/>
       </p:ext>
     </p:extLst>
   </p:cSld>
   <p:clrMapOvr>
     <a:masterClrMapping/>
   </p:clrMapOvr>
-  <mc:AlternateContent xmlns:mc="http://schemas.openxmlformats.org/markup-compatibility/2006">
-    <mc:Choice xmlns:p14="http://schemas.microsoft.com/office/powerpoint/2010/main" xmlns="" Requires="p14">
+  <mc:AlternateContent xmlns:mc="http://schemas.openxmlformats.org/markup-compatibility/2006" xmlns:p14="http://schemas.microsoft.com/office/powerpoint/2010/main">
+    <mc:Choice Requires="p14">
       <p:transition spd="slow" p14:dur="2000"/>
     </mc:Choice>
-    <mc:Fallback>
+    <mc:Fallback xmlns="">
       <p:transition spd="slow"/>
     </mc:Fallback>
   </mc:AlternateContent>
   <p:timing>
     <p:tnLst>
       <p:par>
-        <p:cTn id="1" dur="indefinite" restart="never" nodeType="tmRoot"/>
+        <p:cTn xmlns:p14="http://schemas.microsoft.com/office/powerpoint/2010/main" id="1" dur="indefinite" restart="never" nodeType="tmRoot"/>
       </p:par>
     </p:tnLst>
   </p:timing>
@@ -17308,25 +17266,25 @@
     </p:spTree>
     <p:extLst>
       <p:ext uri="{BB962C8B-B14F-4D97-AF65-F5344CB8AC3E}">
-        <p14:creationId xmlns:p14="http://schemas.microsoft.com/office/powerpoint/2010/main" xmlns="" val="1766382090"/>
+        <p14:creationId xmlns:p14="http://schemas.microsoft.com/office/powerpoint/2010/main" val="1766382090"/>
       </p:ext>
     </p:extLst>
   </p:cSld>
   <p:clrMapOvr>
     <a:masterClrMapping/>
   </p:clrMapOvr>
-  <mc:AlternateContent xmlns:mc="http://schemas.openxmlformats.org/markup-compatibility/2006">
-    <mc:Choice xmlns:p14="http://schemas.microsoft.com/office/powerpoint/2010/main" xmlns="" Requires="p14">
+  <mc:AlternateContent xmlns:mc="http://schemas.openxmlformats.org/markup-compatibility/2006" xmlns:p14="http://schemas.microsoft.com/office/powerpoint/2010/main">
+    <mc:Choice Requires="p14">
       <p:transition spd="slow" p14:dur="2000"/>
     </mc:Choice>
-    <mc:Fallback>
+    <mc:Fallback xmlns="">
       <p:transition spd="slow"/>
     </mc:Fallback>
   </mc:AlternateContent>
   <p:timing>
     <p:tnLst>
       <p:par>
-        <p:cTn id="1" dur="indefinite" restart="never" nodeType="tmRoot"/>
+        <p:cTn xmlns:p14="http://schemas.microsoft.com/office/powerpoint/2010/main" id="1" dur="indefinite" restart="never" nodeType="tmRoot"/>
       </p:par>
     </p:tnLst>
   </p:timing>
@@ -17608,25 +17566,25 @@
     </p:spTree>
     <p:extLst>
       <p:ext uri="{BB962C8B-B14F-4D97-AF65-F5344CB8AC3E}">
-        <p14:creationId xmlns:p14="http://schemas.microsoft.com/office/powerpoint/2010/main" xmlns="" val="2809531644"/>
+        <p14:creationId xmlns:p14="http://schemas.microsoft.com/office/powerpoint/2010/main" val="2809531644"/>
       </p:ext>
     </p:extLst>
   </p:cSld>
   <p:clrMapOvr>
     <a:masterClrMapping/>
   </p:clrMapOvr>
-  <mc:AlternateContent xmlns:mc="http://schemas.openxmlformats.org/markup-compatibility/2006">
-    <mc:Choice xmlns:p14="http://schemas.microsoft.com/office/powerpoint/2010/main" xmlns="" Requires="p14">
+  <mc:AlternateContent xmlns:mc="http://schemas.openxmlformats.org/markup-compatibility/2006" xmlns:p14="http://schemas.microsoft.com/office/powerpoint/2010/main">
+    <mc:Choice Requires="p14">
       <p:transition spd="slow" p14:dur="2000"/>
     </mc:Choice>
-    <mc:Fallback>
+    <mc:Fallback xmlns="">
       <p:transition spd="slow"/>
     </mc:Fallback>
   </mc:AlternateContent>
   <p:timing>
     <p:tnLst>
       <p:par>
-        <p:cTn id="1" dur="indefinite" restart="never" nodeType="tmRoot"/>
+        <p:cTn xmlns:p14="http://schemas.microsoft.com/office/powerpoint/2010/main" id="1" dur="indefinite" restart="never" nodeType="tmRoot"/>
       </p:par>
     </p:tnLst>
   </p:timing>
@@ -17770,25 +17728,25 @@
     </p:spTree>
     <p:extLst>
       <p:ext uri="{BB962C8B-B14F-4D97-AF65-F5344CB8AC3E}">
-        <p14:creationId xmlns:p14="http://schemas.microsoft.com/office/powerpoint/2010/main" xmlns="" val="2052235477"/>
+        <p14:creationId xmlns:p14="http://schemas.microsoft.com/office/powerpoint/2010/main" val="2052235477"/>
       </p:ext>
     </p:extLst>
   </p:cSld>
   <p:clrMapOvr>
     <a:masterClrMapping/>
   </p:clrMapOvr>
-  <mc:AlternateContent xmlns:mc="http://schemas.openxmlformats.org/markup-compatibility/2006">
-    <mc:Choice xmlns:p14="http://schemas.microsoft.com/office/powerpoint/2010/main" xmlns="" Requires="p14">
+  <mc:AlternateContent xmlns:mc="http://schemas.openxmlformats.org/markup-compatibility/2006" xmlns:p14="http://schemas.microsoft.com/office/powerpoint/2010/main">
+    <mc:Choice Requires="p14">
       <p:transition spd="slow" p14:dur="2000"/>
     </mc:Choice>
-    <mc:Fallback>
+    <mc:Fallback xmlns="">
       <p:transition spd="slow"/>
     </mc:Fallback>
   </mc:AlternateContent>
   <p:timing>
     <p:tnLst>
       <p:par>
-        <p:cTn id="1" dur="indefinite" restart="never" nodeType="tmRoot"/>
+        <p:cTn xmlns:p14="http://schemas.microsoft.com/office/powerpoint/2010/main" id="1" dur="indefinite" restart="never" nodeType="tmRoot"/>
       </p:par>
     </p:tnLst>
   </p:timing>
@@ -17844,7 +17802,7 @@
     </p:spTree>
     <p:extLst>
       <p:ext uri="{BB962C8B-B14F-4D97-AF65-F5344CB8AC3E}">
-        <p14:creationId xmlns:p14="http://schemas.microsoft.com/office/powerpoint/2010/main" xmlns="" val="1378357901"/>
+        <p14:creationId xmlns:p14="http://schemas.microsoft.com/office/powerpoint/2010/main" val="1378357901"/>
       </p:ext>
     </p:extLst>
   </p:cSld>
@@ -17854,7 +17812,7 @@
   <p:timing>
     <p:tnLst>
       <p:par>
-        <p:cTn id="1" dur="indefinite" restart="never" nodeType="tmRoot"/>
+        <p:cTn xmlns:p14="http://schemas.microsoft.com/office/powerpoint/2010/main" id="1" dur="indefinite" restart="never" nodeType="tmRoot"/>
       </p:par>
     </p:tnLst>
   </p:timing>
@@ -17934,7 +17892,7 @@
           <p:nvPr>
             <p:extLst>
               <p:ext uri="{D42A27DB-BD31-4B8C-83A1-F6EECF244321}">
-                <p14:modId xmlns:p14="http://schemas.microsoft.com/office/powerpoint/2010/main" xmlns="" val="2256308220"/>
+                <p14:modId xmlns:p14="http://schemas.microsoft.com/office/powerpoint/2010/main" val="2256308220"/>
               </p:ext>
             </p:extLst>
           </p:nvPr>
@@ -18519,25 +18477,25 @@
     </p:spTree>
     <p:extLst>
       <p:ext uri="{BB962C8B-B14F-4D97-AF65-F5344CB8AC3E}">
-        <p14:creationId xmlns:p14="http://schemas.microsoft.com/office/powerpoint/2010/main" xmlns="" val="1730443546"/>
+        <p14:creationId xmlns:p14="http://schemas.microsoft.com/office/powerpoint/2010/main" val="1730443546"/>
       </p:ext>
     </p:extLst>
   </p:cSld>
   <p:clrMapOvr>
     <a:masterClrMapping/>
   </p:clrMapOvr>
-  <mc:AlternateContent xmlns:mc="http://schemas.openxmlformats.org/markup-compatibility/2006">
-    <mc:Choice xmlns:p14="http://schemas.microsoft.com/office/powerpoint/2010/main" xmlns="" Requires="p14">
+  <mc:AlternateContent xmlns:mc="http://schemas.openxmlformats.org/markup-compatibility/2006" xmlns:p14="http://schemas.microsoft.com/office/powerpoint/2010/main">
+    <mc:Choice Requires="p14">
       <p:transition spd="slow" p14:dur="2000"/>
     </mc:Choice>
-    <mc:Fallback>
+    <mc:Fallback xmlns="">
       <p:transition spd="slow"/>
     </mc:Fallback>
   </mc:AlternateContent>
   <p:timing>
     <p:tnLst>
       <p:par>
-        <p:cTn id="1" dur="indefinite" restart="never" nodeType="tmRoot"/>
+        <p:cTn xmlns:p14="http://schemas.microsoft.com/office/powerpoint/2010/main" id="1" dur="indefinite" restart="never" nodeType="tmRoot"/>
       </p:par>
     </p:tnLst>
   </p:timing>
@@ -19007,25 +18965,25 @@
     </p:spTree>
     <p:extLst>
       <p:ext uri="{BB962C8B-B14F-4D97-AF65-F5344CB8AC3E}">
-        <p14:creationId xmlns:p14="http://schemas.microsoft.com/office/powerpoint/2010/main" xmlns="" val="1629831378"/>
+        <p14:creationId xmlns:p14="http://schemas.microsoft.com/office/powerpoint/2010/main" val="1629831378"/>
       </p:ext>
     </p:extLst>
   </p:cSld>
   <p:clrMapOvr>
     <a:masterClrMapping/>
   </p:clrMapOvr>
-  <mc:AlternateContent xmlns:mc="http://schemas.openxmlformats.org/markup-compatibility/2006">
-    <mc:Choice xmlns:p14="http://schemas.microsoft.com/office/powerpoint/2010/main" xmlns="" Requires="p14">
+  <mc:AlternateContent xmlns:mc="http://schemas.openxmlformats.org/markup-compatibility/2006" xmlns:p14="http://schemas.microsoft.com/office/powerpoint/2010/main">
+    <mc:Choice Requires="p14">
       <p:transition spd="slow" p14:dur="2000"/>
     </mc:Choice>
-    <mc:Fallback>
+    <mc:Fallback xmlns="">
       <p:transition spd="slow"/>
     </mc:Fallback>
   </mc:AlternateContent>
   <p:timing>
     <p:tnLst>
       <p:par>
-        <p:cTn id="1" dur="indefinite" restart="never" nodeType="tmRoot"/>
+        <p:cTn xmlns:p14="http://schemas.microsoft.com/office/powerpoint/2010/main" id="1" dur="indefinite" restart="never" nodeType="tmRoot"/>
       </p:par>
     </p:tnLst>
   </p:timing>
@@ -19061,7 +19019,7 @@
           <a:blip r:embed="rId2" cstate="print">
             <a:extLst>
               <a:ext uri="{28A0092B-C50C-407E-A947-70E740481C1C}">
-                <a14:useLocalDpi xmlns:a14="http://schemas.microsoft.com/office/drawing/2010/main" xmlns="" val="0"/>
+                <a14:useLocalDpi xmlns:a14="http://schemas.microsoft.com/office/drawing/2010/main" val="0"/>
               </a:ext>
             </a:extLst>
           </a:blip>
@@ -19081,7 +19039,7 @@
           <a:noFill/>
           <a:extLst>
             <a:ext uri="{909E8E84-426E-40dd-AFC4-6F175D3DCCD1}">
-              <a14:hiddenFill xmlns:a14="http://schemas.microsoft.com/office/drawing/2010/main" xmlns="">
+              <a14:hiddenFill xmlns:a14="http://schemas.microsoft.com/office/drawing/2010/main">
                 <a:solidFill>
                   <a:srgbClr val="FFFFFF"/>
                 </a:solidFill>
@@ -19164,25 +19122,25 @@
     </p:spTree>
     <p:extLst>
       <p:ext uri="{BB962C8B-B14F-4D97-AF65-F5344CB8AC3E}">
-        <p14:creationId xmlns:p14="http://schemas.microsoft.com/office/powerpoint/2010/main" xmlns="" val="2367797895"/>
+        <p14:creationId xmlns:p14="http://schemas.microsoft.com/office/powerpoint/2010/main" val="2367797895"/>
       </p:ext>
     </p:extLst>
   </p:cSld>
   <p:clrMapOvr>
     <a:masterClrMapping/>
   </p:clrMapOvr>
-  <mc:AlternateContent xmlns:mc="http://schemas.openxmlformats.org/markup-compatibility/2006">
-    <mc:Choice xmlns:p14="http://schemas.microsoft.com/office/powerpoint/2010/main" xmlns="" Requires="p14">
+  <mc:AlternateContent xmlns:mc="http://schemas.openxmlformats.org/markup-compatibility/2006" xmlns:p14="http://schemas.microsoft.com/office/powerpoint/2010/main">
+    <mc:Choice Requires="p14">
       <p:transition spd="slow" p14:dur="2000"/>
     </mc:Choice>
-    <mc:Fallback>
+    <mc:Fallback xmlns="">
       <p:transition spd="slow"/>
     </mc:Fallback>
   </mc:AlternateContent>
   <p:timing>
     <p:tnLst>
       <p:par>
-        <p:cTn id="1" dur="indefinite" restart="never" nodeType="tmRoot"/>
+        <p:cTn xmlns:p14="http://schemas.microsoft.com/office/powerpoint/2010/main" id="1" dur="indefinite" restart="never" nodeType="tmRoot"/>
       </p:par>
     </p:tnLst>
   </p:timing>
@@ -19552,18 +19510,18 @@
     </p:spTree>
     <p:extLst>
       <p:ext uri="{BB962C8B-B14F-4D97-AF65-F5344CB8AC3E}">
-        <p14:creationId xmlns:p14="http://schemas.microsoft.com/office/powerpoint/2010/main" xmlns="" val="2781102722"/>
+        <p14:creationId xmlns:p14="http://schemas.microsoft.com/office/powerpoint/2010/main" val="2781102722"/>
       </p:ext>
     </p:extLst>
   </p:cSld>
   <p:clrMapOvr>
     <a:masterClrMapping/>
   </p:clrMapOvr>
-  <p:transition spd="slow"/>
+  <p:transition xmlns:p14="http://schemas.microsoft.com/office/powerpoint/2010/main" spd="slow"/>
   <p:timing>
     <p:tnLst>
       <p:par>
-        <p:cTn id="1" dur="indefinite" restart="never" nodeType="tmRoot">
+        <p:cTn xmlns:p14="http://schemas.microsoft.com/office/powerpoint/2010/main" id="1" dur="indefinite" restart="never" nodeType="tmRoot">
           <p:childTnLst>
             <p:seq concurrent="1" nextAc="seek">
               <p:cTn id="2" dur="indefinite" nodeType="mainSeq">
@@ -20165,25 +20123,25 @@
     </p:spTree>
     <p:extLst>
       <p:ext uri="{BB962C8B-B14F-4D97-AF65-F5344CB8AC3E}">
-        <p14:creationId xmlns:p14="http://schemas.microsoft.com/office/powerpoint/2010/main" xmlns="" val="3452883339"/>
+        <p14:creationId xmlns:p14="http://schemas.microsoft.com/office/powerpoint/2010/main" val="3452883339"/>
       </p:ext>
     </p:extLst>
   </p:cSld>
   <p:clrMapOvr>
     <a:masterClrMapping/>
   </p:clrMapOvr>
-  <mc:AlternateContent xmlns:mc="http://schemas.openxmlformats.org/markup-compatibility/2006">
-    <mc:Choice xmlns:p14="http://schemas.microsoft.com/office/powerpoint/2010/main" xmlns="" Requires="p14">
+  <mc:AlternateContent xmlns:mc="http://schemas.openxmlformats.org/markup-compatibility/2006" xmlns:p14="http://schemas.microsoft.com/office/powerpoint/2010/main">
+    <mc:Choice Requires="p14">
       <p:transition spd="slow" p14:dur="2000"/>
     </mc:Choice>
-    <mc:Fallback>
+    <mc:Fallback xmlns="">
       <p:transition spd="slow"/>
     </mc:Fallback>
   </mc:AlternateContent>
   <p:timing>
     <p:tnLst>
       <p:par>
-        <p:cTn id="1" dur="indefinite" restart="never" nodeType="tmRoot">
+        <p:cTn xmlns:p14="http://schemas.microsoft.com/office/powerpoint/2010/main" id="1" dur="indefinite" restart="never" nodeType="tmRoot">
           <p:childTnLst>
             <p:seq concurrent="1" nextAc="seek">
               <p:cTn id="2" dur="indefinite" nodeType="mainSeq">
@@ -21085,25 +21043,25 @@
     </p:spTree>
     <p:extLst>
       <p:ext uri="{BB962C8B-B14F-4D97-AF65-F5344CB8AC3E}">
-        <p14:creationId xmlns:p14="http://schemas.microsoft.com/office/powerpoint/2010/main" xmlns="" val="1827848310"/>
+        <p14:creationId xmlns:p14="http://schemas.microsoft.com/office/powerpoint/2010/main" val="1827848310"/>
       </p:ext>
     </p:extLst>
   </p:cSld>
   <p:clrMapOvr>
     <a:masterClrMapping/>
   </p:clrMapOvr>
-  <mc:AlternateContent xmlns:mc="http://schemas.openxmlformats.org/markup-compatibility/2006">
-    <mc:Choice xmlns:p14="http://schemas.microsoft.com/office/powerpoint/2010/main" xmlns="" Requires="p14">
+  <mc:AlternateContent xmlns:mc="http://schemas.openxmlformats.org/markup-compatibility/2006" xmlns:p14="http://schemas.microsoft.com/office/powerpoint/2010/main">
+    <mc:Choice Requires="p14">
       <p:transition spd="slow" p14:dur="2000"/>
     </mc:Choice>
-    <mc:Fallback>
+    <mc:Fallback xmlns="">
       <p:transition spd="slow"/>
     </mc:Fallback>
   </mc:AlternateContent>
   <p:timing>
     <p:tnLst>
       <p:par>
-        <p:cTn id="1" dur="indefinite" restart="never" nodeType="tmRoot">
+        <p:cTn xmlns:p14="http://schemas.microsoft.com/office/powerpoint/2010/main" id="1" dur="indefinite" restart="never" nodeType="tmRoot">
           <p:childTnLst>
             <p:seq concurrent="1" nextAc="seek">
               <p:cTn id="2" dur="indefinite" nodeType="mainSeq">
@@ -22054,25 +22012,25 @@
     </p:spTree>
     <p:extLst>
       <p:ext uri="{BB962C8B-B14F-4D97-AF65-F5344CB8AC3E}">
-        <p14:creationId xmlns:p14="http://schemas.microsoft.com/office/powerpoint/2010/main" xmlns="" val="2616731691"/>
+        <p14:creationId xmlns:p14="http://schemas.microsoft.com/office/powerpoint/2010/main" val="2616731691"/>
       </p:ext>
     </p:extLst>
   </p:cSld>
   <p:clrMapOvr>
     <a:masterClrMapping/>
   </p:clrMapOvr>
-  <mc:AlternateContent xmlns:mc="http://schemas.openxmlformats.org/markup-compatibility/2006">
-    <mc:Choice xmlns:p14="http://schemas.microsoft.com/office/powerpoint/2010/main" xmlns="" Requires="p14">
+  <mc:AlternateContent xmlns:mc="http://schemas.openxmlformats.org/markup-compatibility/2006" xmlns:p14="http://schemas.microsoft.com/office/powerpoint/2010/main">
+    <mc:Choice Requires="p14">
       <p:transition spd="slow" p14:dur="2000"/>
     </mc:Choice>
-    <mc:Fallback>
+    <mc:Fallback xmlns="">
       <p:transition spd="slow"/>
     </mc:Fallback>
   </mc:AlternateContent>
   <p:timing>
     <p:tnLst>
       <p:par>
-        <p:cTn id="1" dur="indefinite" restart="never" nodeType="tmRoot">
+        <p:cTn xmlns:p14="http://schemas.microsoft.com/office/powerpoint/2010/main" id="1" dur="indefinite" restart="never" nodeType="tmRoot">
           <p:childTnLst>
             <p:seq concurrent="1" nextAc="seek">
               <p:cTn id="2" dur="indefinite" nodeType="mainSeq">
@@ -22121,50 +22079,6 @@
                                         <p:cTn id="7" dur="2000"/>
                                         <p:tgtEl>
                                           <p:spTgt spid="6"/>
-                                        </p:tgtEl>
-                                      </p:cBhvr>
-                                    </p:animEffect>
-                                  </p:childTnLst>
-                                </p:cTn>
-                              </p:par>
-                            </p:childTnLst>
-                          </p:cTn>
-                        </p:par>
-                        <p:par>
-                          <p:cTn id="8" fill="hold">
-                            <p:stCondLst>
-                              <p:cond delay="2000"/>
-                            </p:stCondLst>
-                            <p:childTnLst>
-                              <p:par>
-                                <p:cTn id="9" presetID="10" presetClass="entr" presetSubtype="0" fill="hold" nodeType="afterEffect">
-                                  <p:stCondLst>
-                                    <p:cond delay="0"/>
-                                  </p:stCondLst>
-                                  <p:childTnLst>
-                                    <p:set>
-                                      <p:cBhvr>
-                                        <p:cTn id="10" dur="1" fill="hold">
-                                          <p:stCondLst>
-                                            <p:cond delay="0"/>
-                                          </p:stCondLst>
-                                        </p:cTn>
-                                        <p:tgtEl>
-                                          <p:spTgt spid="1026"/>
-                                        </p:tgtEl>
-                                        <p:attrNameLst>
-                                          <p:attrName>style.visibility</p:attrName>
-                                        </p:attrNameLst>
-                                      </p:cBhvr>
-                                      <p:to>
-                                        <p:strVal val="visible"/>
-                                      </p:to>
-                                    </p:set>
-                                    <p:animEffect transition="in" filter="fade">
-                                      <p:cBhvr>
-                                        <p:cTn id="11" dur="2000"/>
-                                        <p:tgtEl>
-                                          <p:spTgt spid="1026"/>
                                         </p:tgtEl>
                                       </p:cBhvr>
                                     </p:animEffect>
@@ -22540,25 +22454,25 @@
     </p:spTree>
     <p:extLst>
       <p:ext uri="{BB962C8B-B14F-4D97-AF65-F5344CB8AC3E}">
-        <p14:creationId xmlns:p14="http://schemas.microsoft.com/office/powerpoint/2010/main" xmlns="" val="1358147143"/>
+        <p14:creationId xmlns:p14="http://schemas.microsoft.com/office/powerpoint/2010/main" val="1358147143"/>
       </p:ext>
     </p:extLst>
   </p:cSld>
   <p:clrMapOvr>
     <a:masterClrMapping/>
   </p:clrMapOvr>
-  <mc:AlternateContent xmlns:mc="http://schemas.openxmlformats.org/markup-compatibility/2006">
-    <mc:Choice xmlns:p14="http://schemas.microsoft.com/office/powerpoint/2010/main" xmlns="" Requires="p14">
+  <mc:AlternateContent xmlns:mc="http://schemas.openxmlformats.org/markup-compatibility/2006" xmlns:p14="http://schemas.microsoft.com/office/powerpoint/2010/main">
+    <mc:Choice Requires="p14">
       <p:transition spd="slow" p14:dur="2000"/>
     </mc:Choice>
-    <mc:Fallback>
+    <mc:Fallback xmlns="">
       <p:transition spd="slow"/>
     </mc:Fallback>
   </mc:AlternateContent>
   <p:timing>
     <p:tnLst>
       <p:par>
-        <p:cTn id="1" dur="indefinite" restart="never" nodeType="tmRoot"/>
+        <p:cTn xmlns:p14="http://schemas.microsoft.com/office/powerpoint/2010/main" id="1" dur="indefinite" restart="never" nodeType="tmRoot"/>
       </p:par>
     </p:tnLst>
   </p:timing>
@@ -22731,14 +22645,14 @@
       </p:sp>
       <p:pic>
         <p:nvPicPr>
-          <p:cNvPr id="44034" name="Picture 2" descr="http://www.html.ve.it/images/omino_relax.jpg"/>
+          <p:cNvPr id="4098" name="Picture 2" descr="C:\Users\Angelo\Downloads\omino-auto.jpg"/>
           <p:cNvPicPr>
             <a:picLocks noChangeAspect="1" noChangeArrowheads="1"/>
           </p:cNvPicPr>
           <p:nvPr/>
         </p:nvPicPr>
         <p:blipFill>
-          <a:blip r:embed="rId2"/>
+          <a:blip r:embed="rId2" cstate="print"/>
           <a:srcRect/>
           <a:stretch>
             <a:fillRect/>
@@ -22746,8 +22660,8 @@
         </p:blipFill>
         <p:spPr bwMode="auto">
           <a:xfrm>
-            <a:off x="5500694" y="3143246"/>
-            <a:ext cx="2786082" cy="2786084"/>
+            <a:off x="4500372" y="3148385"/>
+            <a:ext cx="4464116" cy="3592983"/>
           </a:xfrm>
           <a:prstGeom prst="rect">
             <a:avLst/>
@@ -22758,25 +22672,25 @@
     </p:spTree>
     <p:extLst>
       <p:ext uri="{BB962C8B-B14F-4D97-AF65-F5344CB8AC3E}">
-        <p14:creationId xmlns:p14="http://schemas.microsoft.com/office/powerpoint/2010/main" xmlns="" val="2912892320"/>
+        <p14:creationId xmlns:p14="http://schemas.microsoft.com/office/powerpoint/2010/main" val="2912892320"/>
       </p:ext>
     </p:extLst>
   </p:cSld>
   <p:clrMapOvr>
     <a:masterClrMapping/>
   </p:clrMapOvr>
-  <mc:AlternateContent xmlns:mc="http://schemas.openxmlformats.org/markup-compatibility/2006">
-    <mc:Choice xmlns:p14="http://schemas.microsoft.com/office/powerpoint/2010/main" xmlns="" Requires="p14">
+  <mc:AlternateContent xmlns:mc="http://schemas.openxmlformats.org/markup-compatibility/2006" xmlns:p14="http://schemas.microsoft.com/office/powerpoint/2010/main">
+    <mc:Choice Requires="p14">
       <p:transition spd="slow" p14:dur="2000"/>
     </mc:Choice>
-    <mc:Fallback>
+    <mc:Fallback xmlns="">
       <p:transition spd="slow"/>
     </mc:Fallback>
   </mc:AlternateContent>
   <p:timing>
     <p:tnLst>
       <p:par>
-        <p:cTn id="1" dur="indefinite" restart="never" nodeType="tmRoot">
+        <p:cTn xmlns:p14="http://schemas.microsoft.com/office/powerpoint/2010/main" id="1" dur="indefinite" restart="never" nodeType="tmRoot">
           <p:childTnLst>
             <p:seq concurrent="1" nextAc="seek">
               <p:cTn id="2" dur="indefinite" nodeType="mainSeq">
@@ -22831,30 +22745,21 @@
                                   </p:childTnLst>
                                 </p:cTn>
                               </p:par>
-                            </p:childTnLst>
-                          </p:cTn>
-                        </p:par>
-                        <p:par>
-                          <p:cTn id="8" fill="hold">
-                            <p:stCondLst>
-                              <p:cond delay="2000"/>
-                            </p:stCondLst>
-                            <p:childTnLst>
                               <p:par>
-                                <p:cTn id="9" presetID="10" presetClass="entr" presetSubtype="0" fill="hold" nodeType="afterEffect">
+                                <p:cTn id="8" presetID="10" presetClass="entr" presetSubtype="0" fill="hold" nodeType="withEffect">
                                   <p:stCondLst>
                                     <p:cond delay="0"/>
                                   </p:stCondLst>
                                   <p:childTnLst>
                                     <p:set>
                                       <p:cBhvr>
-                                        <p:cTn id="10" dur="1" fill="hold">
+                                        <p:cTn id="9" dur="1" fill="hold">
                                           <p:stCondLst>
                                             <p:cond delay="0"/>
                                           </p:stCondLst>
                                         </p:cTn>
                                         <p:tgtEl>
-                                          <p:spTgt spid="44034"/>
+                                          <p:spTgt spid="4098"/>
                                         </p:tgtEl>
                                         <p:attrNameLst>
                                           <p:attrName>style.visibility</p:attrName>
@@ -22866,9 +22771,9 @@
                                     </p:set>
                                     <p:animEffect transition="in" filter="fade">
                                       <p:cBhvr>
-                                        <p:cTn id="11" dur="1000"/>
+                                        <p:cTn id="10" dur="2000"/>
                                         <p:tgtEl>
-                                          <p:spTgt spid="44034"/>
+                                          <p:spTgt spid="4098"/>
                                         </p:tgtEl>
                                       </p:cBhvr>
                                     </p:animEffect>
@@ -23246,25 +23151,25 @@
     </p:spTree>
     <p:extLst>
       <p:ext uri="{BB962C8B-B14F-4D97-AF65-F5344CB8AC3E}">
-        <p14:creationId xmlns:p14="http://schemas.microsoft.com/office/powerpoint/2010/main" xmlns="" val="462729233"/>
+        <p14:creationId xmlns:p14="http://schemas.microsoft.com/office/powerpoint/2010/main" val="462729233"/>
       </p:ext>
     </p:extLst>
   </p:cSld>
   <p:clrMapOvr>
     <a:masterClrMapping/>
   </p:clrMapOvr>
-  <mc:AlternateContent xmlns:mc="http://schemas.openxmlformats.org/markup-compatibility/2006">
-    <mc:Choice xmlns:p14="http://schemas.microsoft.com/office/powerpoint/2010/main" xmlns="" Requires="p14">
+  <mc:AlternateContent xmlns:mc="http://schemas.openxmlformats.org/markup-compatibility/2006" xmlns:p14="http://schemas.microsoft.com/office/powerpoint/2010/main">
+    <mc:Choice Requires="p14">
       <p:transition spd="slow" p14:dur="2000"/>
     </mc:Choice>
-    <mc:Fallback>
+    <mc:Fallback xmlns="">
       <p:transition spd="slow"/>
     </mc:Fallback>
   </mc:AlternateContent>
   <p:timing>
     <p:tnLst>
       <p:par>
-        <p:cTn id="1" dur="indefinite" restart="never" nodeType="tmRoot">
+        <p:cTn xmlns:p14="http://schemas.microsoft.com/office/powerpoint/2010/main" id="1" dur="indefinite" restart="never" nodeType="tmRoot">
           <p:childTnLst>
             <p:seq concurrent="1" nextAc="seek">
               <p:cTn id="2" dur="indefinite" nodeType="mainSeq">
@@ -23911,25 +23816,25 @@
     </p:spTree>
     <p:extLst>
       <p:ext uri="{BB962C8B-B14F-4D97-AF65-F5344CB8AC3E}">
-        <p14:creationId xmlns:p14="http://schemas.microsoft.com/office/powerpoint/2010/main" xmlns="" val="1717101950"/>
+        <p14:creationId xmlns:p14="http://schemas.microsoft.com/office/powerpoint/2010/main" val="1717101950"/>
       </p:ext>
     </p:extLst>
   </p:cSld>
   <p:clrMapOvr>
     <a:masterClrMapping/>
   </p:clrMapOvr>
-  <mc:AlternateContent xmlns:mc="http://schemas.openxmlformats.org/markup-compatibility/2006">
-    <mc:Choice xmlns:p14="http://schemas.microsoft.com/office/powerpoint/2010/main" xmlns="" Requires="p14">
+  <mc:AlternateContent xmlns:mc="http://schemas.openxmlformats.org/markup-compatibility/2006" xmlns:p14="http://schemas.microsoft.com/office/powerpoint/2010/main">
+    <mc:Choice Requires="p14">
       <p:transition spd="slow" p14:dur="2000"/>
     </mc:Choice>
-    <mc:Fallback>
+    <mc:Fallback xmlns="">
       <p:transition spd="slow"/>
     </mc:Fallback>
   </mc:AlternateContent>
   <p:timing>
     <p:tnLst>
       <p:par>
-        <p:cTn id="1" dur="indefinite" restart="never" nodeType="tmRoot">
+        <p:cTn xmlns:p14="http://schemas.microsoft.com/office/powerpoint/2010/main" id="1" dur="indefinite" restart="never" nodeType="tmRoot">
           <p:childTnLst>
             <p:seq concurrent="1" nextAc="seek">
               <p:cTn id="2" dur="indefinite" nodeType="mainSeq">
@@ -24340,25 +24245,25 @@
     </p:spTree>
     <p:extLst>
       <p:ext uri="{BB962C8B-B14F-4D97-AF65-F5344CB8AC3E}">
-        <p14:creationId xmlns:p14="http://schemas.microsoft.com/office/powerpoint/2010/main" xmlns="" val="309719199"/>
+        <p14:creationId xmlns:p14="http://schemas.microsoft.com/office/powerpoint/2010/main" val="309719199"/>
       </p:ext>
     </p:extLst>
   </p:cSld>
   <p:clrMapOvr>
     <a:masterClrMapping/>
   </p:clrMapOvr>
-  <mc:AlternateContent xmlns:mc="http://schemas.openxmlformats.org/markup-compatibility/2006">
-    <mc:Choice xmlns:p14="http://schemas.microsoft.com/office/powerpoint/2010/main" xmlns="" Requires="p14">
+  <mc:AlternateContent xmlns:mc="http://schemas.openxmlformats.org/markup-compatibility/2006" xmlns:p14="http://schemas.microsoft.com/office/powerpoint/2010/main">
+    <mc:Choice Requires="p14">
       <p:transition spd="slow" p14:dur="2000"/>
     </mc:Choice>
-    <mc:Fallback>
+    <mc:Fallback xmlns="">
       <p:transition spd="slow"/>
     </mc:Fallback>
   </mc:AlternateContent>
   <p:timing>
     <p:tnLst>
       <p:par>
-        <p:cTn id="1" dur="indefinite" restart="never" nodeType="tmRoot">
+        <p:cTn xmlns:p14="http://schemas.microsoft.com/office/powerpoint/2010/main" id="1" dur="indefinite" restart="never" nodeType="tmRoot">
           <p:childTnLst>
             <p:seq concurrent="1" nextAc="seek">
               <p:cTn id="2" dur="indefinite" nodeType="mainSeq">
@@ -24882,25 +24787,25 @@
     </p:spTree>
     <p:extLst>
       <p:ext uri="{BB962C8B-B14F-4D97-AF65-F5344CB8AC3E}">
-        <p14:creationId xmlns:p14="http://schemas.microsoft.com/office/powerpoint/2010/main" xmlns="" val="955904447"/>
+        <p14:creationId xmlns:p14="http://schemas.microsoft.com/office/powerpoint/2010/main" val="955904447"/>
       </p:ext>
     </p:extLst>
   </p:cSld>
   <p:clrMapOvr>
     <a:masterClrMapping/>
   </p:clrMapOvr>
-  <mc:AlternateContent xmlns:mc="http://schemas.openxmlformats.org/markup-compatibility/2006">
-    <mc:Choice xmlns:p14="http://schemas.microsoft.com/office/powerpoint/2010/main" xmlns="" Requires="p14">
+  <mc:AlternateContent xmlns:mc="http://schemas.openxmlformats.org/markup-compatibility/2006" xmlns:p14="http://schemas.microsoft.com/office/powerpoint/2010/main">
+    <mc:Choice Requires="p14">
       <p:transition spd="slow" p14:dur="2000"/>
     </mc:Choice>
-    <mc:Fallback>
+    <mc:Fallback xmlns="">
       <p:transition spd="slow"/>
     </mc:Fallback>
   </mc:AlternateContent>
   <p:timing>
     <p:tnLst>
       <p:par>
-        <p:cTn id="1" dur="indefinite" restart="never" nodeType="tmRoot">
+        <p:cTn xmlns:p14="http://schemas.microsoft.com/office/powerpoint/2010/main" id="1" dur="indefinite" restart="never" nodeType="tmRoot">
           <p:childTnLst>
             <p:seq concurrent="1" nextAc="seek">
               <p:cTn id="2" dur="indefinite" nodeType="mainSeq">
@@ -25404,25 +25309,25 @@
     </p:spTree>
     <p:extLst>
       <p:ext uri="{BB962C8B-B14F-4D97-AF65-F5344CB8AC3E}">
-        <p14:creationId xmlns:p14="http://schemas.microsoft.com/office/powerpoint/2010/main" xmlns="" val="1140837011"/>
+        <p14:creationId xmlns:p14="http://schemas.microsoft.com/office/powerpoint/2010/main" val="1140837011"/>
       </p:ext>
     </p:extLst>
   </p:cSld>
   <p:clrMapOvr>
     <a:masterClrMapping/>
   </p:clrMapOvr>
-  <mc:AlternateContent xmlns:mc="http://schemas.openxmlformats.org/markup-compatibility/2006">
-    <mc:Choice xmlns:p14="http://schemas.microsoft.com/office/powerpoint/2010/main" xmlns="" Requires="p14">
+  <mc:AlternateContent xmlns:mc="http://schemas.openxmlformats.org/markup-compatibility/2006" xmlns:p14="http://schemas.microsoft.com/office/powerpoint/2010/main">
+    <mc:Choice Requires="p14">
       <p:transition spd="slow" p14:dur="2000"/>
     </mc:Choice>
-    <mc:Fallback>
+    <mc:Fallback xmlns="">
       <p:transition spd="slow"/>
     </mc:Fallback>
   </mc:AlternateContent>
   <p:timing>
     <p:tnLst>
       <p:par>
-        <p:cTn id="1" dur="indefinite" restart="never" nodeType="tmRoot">
+        <p:cTn xmlns:p14="http://schemas.microsoft.com/office/powerpoint/2010/main" id="1" dur="indefinite" restart="never" nodeType="tmRoot">
           <p:childTnLst>
             <p:seq concurrent="1" nextAc="seek">
               <p:cTn id="2" dur="indefinite" nodeType="mainSeq">
@@ -26031,25 +25936,25 @@
     </p:spTree>
     <p:extLst>
       <p:ext uri="{BB962C8B-B14F-4D97-AF65-F5344CB8AC3E}">
-        <p14:creationId xmlns:p14="http://schemas.microsoft.com/office/powerpoint/2010/main" xmlns="" val="247747513"/>
+        <p14:creationId xmlns:p14="http://schemas.microsoft.com/office/powerpoint/2010/main" val="247747513"/>
       </p:ext>
     </p:extLst>
   </p:cSld>
   <p:clrMapOvr>
     <a:masterClrMapping/>
   </p:clrMapOvr>
-  <mc:AlternateContent xmlns:mc="http://schemas.openxmlformats.org/markup-compatibility/2006">
-    <mc:Choice xmlns:p14="http://schemas.microsoft.com/office/powerpoint/2010/main" xmlns="" Requires="p14">
+  <mc:AlternateContent xmlns:mc="http://schemas.openxmlformats.org/markup-compatibility/2006" xmlns:p14="http://schemas.microsoft.com/office/powerpoint/2010/main">
+    <mc:Choice Requires="p14">
       <p:transition spd="slow" p14:dur="2000"/>
     </mc:Choice>
-    <mc:Fallback>
+    <mc:Fallback xmlns="">
       <p:transition spd="slow"/>
     </mc:Fallback>
   </mc:AlternateContent>
   <p:timing>
     <p:tnLst>
       <p:par>
-        <p:cTn id="1" dur="indefinite" restart="never" nodeType="tmRoot">
+        <p:cTn xmlns:p14="http://schemas.microsoft.com/office/powerpoint/2010/main" id="1" dur="indefinite" restart="never" nodeType="tmRoot">
           <p:childTnLst>
             <p:seq concurrent="1" nextAc="seek">
               <p:cTn id="2" dur="indefinite" nodeType="mainSeq">
@@ -26729,25 +26634,25 @@
     </p:spTree>
     <p:extLst>
       <p:ext uri="{BB962C8B-B14F-4D97-AF65-F5344CB8AC3E}">
-        <p14:creationId xmlns:p14="http://schemas.microsoft.com/office/powerpoint/2010/main" xmlns="" val="1776831606"/>
+        <p14:creationId xmlns:p14="http://schemas.microsoft.com/office/powerpoint/2010/main" val="1776831606"/>
       </p:ext>
     </p:extLst>
   </p:cSld>
   <p:clrMapOvr>
     <a:masterClrMapping/>
   </p:clrMapOvr>
-  <mc:AlternateContent xmlns:mc="http://schemas.openxmlformats.org/markup-compatibility/2006">
-    <mc:Choice xmlns:p14="http://schemas.microsoft.com/office/powerpoint/2010/main" xmlns="" Requires="p14">
+  <mc:AlternateContent xmlns:mc="http://schemas.openxmlformats.org/markup-compatibility/2006" xmlns:p14="http://schemas.microsoft.com/office/powerpoint/2010/main">
+    <mc:Choice Requires="p14">
       <p:transition spd="slow" p14:dur="2000"/>
     </mc:Choice>
-    <mc:Fallback>
+    <mc:Fallback xmlns="">
       <p:transition spd="slow"/>
     </mc:Fallback>
   </mc:AlternateContent>
   <p:timing>
     <p:tnLst>
       <p:par>
-        <p:cTn id="1" dur="indefinite" restart="never" nodeType="tmRoot">
+        <p:cTn xmlns:p14="http://schemas.microsoft.com/office/powerpoint/2010/main" id="1" dur="indefinite" restart="never" nodeType="tmRoot">
           <p:childTnLst>
             <p:seq concurrent="1" nextAc="seek">
               <p:cTn id="2" dur="indefinite" nodeType="mainSeq">
@@ -27087,7 +26992,7 @@
           <a:blip r:embed="rId2" cstate="print">
             <a:extLst>
               <a:ext uri="{28A0092B-C50C-407E-A947-70E740481C1C}">
-                <a14:useLocalDpi xmlns:a14="http://schemas.microsoft.com/office/drawing/2010/main" xmlns="" val="0"/>
+                <a14:useLocalDpi xmlns:a14="http://schemas.microsoft.com/office/drawing/2010/main" val="0"/>
               </a:ext>
             </a:extLst>
           </a:blip>
@@ -27107,7 +27012,7 @@
           <a:noFill/>
           <a:extLst>
             <a:ext uri="{909E8E84-426E-40dd-AFC4-6F175D3DCCD1}">
-              <a14:hiddenFill xmlns:a14="http://schemas.microsoft.com/office/drawing/2010/main" xmlns="">
+              <a14:hiddenFill xmlns:a14="http://schemas.microsoft.com/office/drawing/2010/main">
                 <a:solidFill>
                   <a:srgbClr val="FFFFFF"/>
                 </a:solidFill>
@@ -27190,25 +27095,25 @@
     </p:spTree>
     <p:extLst>
       <p:ext uri="{BB962C8B-B14F-4D97-AF65-F5344CB8AC3E}">
-        <p14:creationId xmlns:p14="http://schemas.microsoft.com/office/powerpoint/2010/main" xmlns="" val="2717568001"/>
+        <p14:creationId xmlns:p14="http://schemas.microsoft.com/office/powerpoint/2010/main" val="2717568001"/>
       </p:ext>
     </p:extLst>
   </p:cSld>
   <p:clrMapOvr>
     <a:masterClrMapping/>
   </p:clrMapOvr>
-  <mc:AlternateContent xmlns:mc="http://schemas.openxmlformats.org/markup-compatibility/2006">
-    <mc:Choice xmlns:p14="http://schemas.microsoft.com/office/powerpoint/2010/main" xmlns="" Requires="p14">
+  <mc:AlternateContent xmlns:mc="http://schemas.openxmlformats.org/markup-compatibility/2006" xmlns:p14="http://schemas.microsoft.com/office/powerpoint/2010/main">
+    <mc:Choice Requires="p14">
       <p:transition spd="slow" p14:dur="2000"/>
     </mc:Choice>
-    <mc:Fallback>
+    <mc:Fallback xmlns="">
       <p:transition spd="slow"/>
     </mc:Fallback>
   </mc:AlternateContent>
   <p:timing>
     <p:tnLst>
       <p:par>
-        <p:cTn id="1" dur="indefinite" restart="never" nodeType="tmRoot"/>
+        <p:cTn xmlns:p14="http://schemas.microsoft.com/office/powerpoint/2010/main" id="1" dur="indefinite" restart="never" nodeType="tmRoot"/>
       </p:par>
     </p:tnLst>
   </p:timing>
@@ -27493,25 +27398,25 @@
     </p:spTree>
     <p:extLst>
       <p:ext uri="{BB962C8B-B14F-4D97-AF65-F5344CB8AC3E}">
-        <p14:creationId xmlns:p14="http://schemas.microsoft.com/office/powerpoint/2010/main" xmlns="" val="3266999169"/>
+        <p14:creationId xmlns:p14="http://schemas.microsoft.com/office/powerpoint/2010/main" val="3266999169"/>
       </p:ext>
     </p:extLst>
   </p:cSld>
   <p:clrMapOvr>
     <a:masterClrMapping/>
   </p:clrMapOvr>
-  <mc:AlternateContent xmlns:mc="http://schemas.openxmlformats.org/markup-compatibility/2006">
-    <mc:Choice xmlns:p14="http://schemas.microsoft.com/office/powerpoint/2010/main" xmlns="" Requires="p14">
+  <mc:AlternateContent xmlns:mc="http://schemas.openxmlformats.org/markup-compatibility/2006" xmlns:p14="http://schemas.microsoft.com/office/powerpoint/2010/main">
+    <mc:Choice Requires="p14">
       <p:transition spd="slow" p14:dur="2000"/>
     </mc:Choice>
-    <mc:Fallback>
+    <mc:Fallback xmlns="">
       <p:transition spd="slow"/>
     </mc:Fallback>
   </mc:AlternateContent>
   <p:timing>
     <p:tnLst>
       <p:par>
-        <p:cTn id="1" dur="indefinite" restart="never" nodeType="tmRoot"/>
+        <p:cTn xmlns:p14="http://schemas.microsoft.com/office/powerpoint/2010/main" id="1" dur="indefinite" restart="never" nodeType="tmRoot"/>
       </p:par>
     </p:tnLst>
   </p:timing>
@@ -27852,25 +27757,25 @@
     </p:spTree>
     <p:extLst>
       <p:ext uri="{BB962C8B-B14F-4D97-AF65-F5344CB8AC3E}">
-        <p14:creationId xmlns:p14="http://schemas.microsoft.com/office/powerpoint/2010/main" xmlns="" val="396334508"/>
+        <p14:creationId xmlns:p14="http://schemas.microsoft.com/office/powerpoint/2010/main" val="396334508"/>
       </p:ext>
     </p:extLst>
   </p:cSld>
   <p:clrMapOvr>
     <a:masterClrMapping/>
   </p:clrMapOvr>
-  <mc:AlternateContent xmlns:mc="http://schemas.openxmlformats.org/markup-compatibility/2006">
-    <mc:Choice xmlns:p14="http://schemas.microsoft.com/office/powerpoint/2010/main" xmlns="" Requires="p14">
+  <mc:AlternateContent xmlns:mc="http://schemas.openxmlformats.org/markup-compatibility/2006" xmlns:p14="http://schemas.microsoft.com/office/powerpoint/2010/main">
+    <mc:Choice Requires="p14">
       <p:transition spd="slow" p14:dur="2000"/>
     </mc:Choice>
-    <mc:Fallback>
+    <mc:Fallback xmlns="">
       <p:transition spd="slow"/>
     </mc:Fallback>
   </mc:AlternateContent>
   <p:timing>
     <p:tnLst>
       <p:par>
-        <p:cTn id="1" dur="indefinite" restart="never" nodeType="tmRoot"/>
+        <p:cTn xmlns:p14="http://schemas.microsoft.com/office/powerpoint/2010/main" id="1" dur="indefinite" restart="never" nodeType="tmRoot"/>
       </p:par>
     </p:tnLst>
   </p:timing>
@@ -28205,25 +28110,25 @@
     </p:spTree>
     <p:extLst>
       <p:ext uri="{BB962C8B-B14F-4D97-AF65-F5344CB8AC3E}">
-        <p14:creationId xmlns:p14="http://schemas.microsoft.com/office/powerpoint/2010/main" xmlns="" val="1737882227"/>
+        <p14:creationId xmlns:p14="http://schemas.microsoft.com/office/powerpoint/2010/main" val="1737882227"/>
       </p:ext>
     </p:extLst>
   </p:cSld>
   <p:clrMapOvr>
     <a:masterClrMapping/>
   </p:clrMapOvr>
-  <mc:AlternateContent xmlns:mc="http://schemas.openxmlformats.org/markup-compatibility/2006">
-    <mc:Choice xmlns:p14="http://schemas.microsoft.com/office/powerpoint/2010/main" xmlns="" Requires="p14">
+  <mc:AlternateContent xmlns:mc="http://schemas.openxmlformats.org/markup-compatibility/2006" xmlns:p14="http://schemas.microsoft.com/office/powerpoint/2010/main">
+    <mc:Choice Requires="p14">
       <p:transition spd="slow" p14:dur="2000"/>
     </mc:Choice>
-    <mc:Fallback>
+    <mc:Fallback xmlns="">
       <p:transition spd="slow"/>
     </mc:Fallback>
   </mc:AlternateContent>
   <p:timing>
     <p:tnLst>
       <p:par>
-        <p:cTn id="1" dur="indefinite" restart="never" nodeType="tmRoot"/>
+        <p:cTn xmlns:p14="http://schemas.microsoft.com/office/powerpoint/2010/main" id="1" dur="indefinite" restart="never" nodeType="tmRoot"/>
       </p:par>
     </p:tnLst>
   </p:timing>
@@ -28571,25 +28476,25 @@
     </p:spTree>
     <p:extLst>
       <p:ext uri="{BB962C8B-B14F-4D97-AF65-F5344CB8AC3E}">
-        <p14:creationId xmlns:p14="http://schemas.microsoft.com/office/powerpoint/2010/main" xmlns="" val="3034068148"/>
+        <p14:creationId xmlns:p14="http://schemas.microsoft.com/office/powerpoint/2010/main" val="3034068148"/>
       </p:ext>
     </p:extLst>
   </p:cSld>
   <p:clrMapOvr>
     <a:masterClrMapping/>
   </p:clrMapOvr>
-  <mc:AlternateContent xmlns:mc="http://schemas.openxmlformats.org/markup-compatibility/2006">
-    <mc:Choice xmlns:p14="http://schemas.microsoft.com/office/powerpoint/2010/main" xmlns="" Requires="p14">
+  <mc:AlternateContent xmlns:mc="http://schemas.openxmlformats.org/markup-compatibility/2006" xmlns:p14="http://schemas.microsoft.com/office/powerpoint/2010/main">
+    <mc:Choice Requires="p14">
       <p:transition spd="slow" p14:dur="2000"/>
     </mc:Choice>
-    <mc:Fallback>
+    <mc:Fallback xmlns="">
       <p:transition spd="slow"/>
     </mc:Fallback>
   </mc:AlternateContent>
   <p:timing>
     <p:tnLst>
       <p:par>
-        <p:cTn id="1" dur="indefinite" restart="never" nodeType="tmRoot"/>
+        <p:cTn xmlns:p14="http://schemas.microsoft.com/office/powerpoint/2010/main" id="1" dur="indefinite" restart="never" nodeType="tmRoot"/>
       </p:par>
     </p:tnLst>
   </p:timing>
@@ -28909,25 +28814,25 @@
     </p:spTree>
     <p:extLst>
       <p:ext uri="{BB962C8B-B14F-4D97-AF65-F5344CB8AC3E}">
-        <p14:creationId xmlns:p14="http://schemas.microsoft.com/office/powerpoint/2010/main" xmlns="" val="3646886653"/>
+        <p14:creationId xmlns:p14="http://schemas.microsoft.com/office/powerpoint/2010/main" val="3646886653"/>
       </p:ext>
     </p:extLst>
   </p:cSld>
   <p:clrMapOvr>
     <a:masterClrMapping/>
   </p:clrMapOvr>
-  <mc:AlternateContent xmlns:mc="http://schemas.openxmlformats.org/markup-compatibility/2006">
-    <mc:Choice xmlns:p14="http://schemas.microsoft.com/office/powerpoint/2010/main" xmlns="" Requires="p14">
+  <mc:AlternateContent xmlns:mc="http://schemas.openxmlformats.org/markup-compatibility/2006" xmlns:p14="http://schemas.microsoft.com/office/powerpoint/2010/main">
+    <mc:Choice Requires="p14">
       <p:transition spd="slow" p14:dur="2000"/>
     </mc:Choice>
-    <mc:Fallback>
+    <mc:Fallback xmlns="">
       <p:transition spd="slow"/>
     </mc:Fallback>
   </mc:AlternateContent>
   <p:timing>
     <p:tnLst>
       <p:par>
-        <p:cTn id="1" dur="indefinite" restart="never" nodeType="tmRoot"/>
+        <p:cTn xmlns:p14="http://schemas.microsoft.com/office/powerpoint/2010/main" id="1" dur="indefinite" restart="never" nodeType="tmRoot"/>
       </p:par>
     </p:tnLst>
   </p:timing>
@@ -29292,25 +29197,25 @@
     </p:spTree>
     <p:extLst>
       <p:ext uri="{BB962C8B-B14F-4D97-AF65-F5344CB8AC3E}">
-        <p14:creationId xmlns:p14="http://schemas.microsoft.com/office/powerpoint/2010/main" xmlns="" val="520298717"/>
+        <p14:creationId xmlns:p14="http://schemas.microsoft.com/office/powerpoint/2010/main" val="520298717"/>
       </p:ext>
     </p:extLst>
   </p:cSld>
   <p:clrMapOvr>
     <a:masterClrMapping/>
   </p:clrMapOvr>
-  <mc:AlternateContent xmlns:mc="http://schemas.openxmlformats.org/markup-compatibility/2006">
-    <mc:Choice xmlns:p14="http://schemas.microsoft.com/office/powerpoint/2010/main" xmlns="" Requires="p14">
+  <mc:AlternateContent xmlns:mc="http://schemas.openxmlformats.org/markup-compatibility/2006" xmlns:p14="http://schemas.microsoft.com/office/powerpoint/2010/main">
+    <mc:Choice Requires="p14">
       <p:transition spd="slow" p14:dur="2000"/>
     </mc:Choice>
-    <mc:Fallback>
+    <mc:Fallback xmlns="">
       <p:transition spd="slow"/>
     </mc:Fallback>
   </mc:AlternateContent>
   <p:timing>
     <p:tnLst>
       <p:par>
-        <p:cTn id="1" dur="indefinite" restart="never" nodeType="tmRoot"/>
+        <p:cTn xmlns:p14="http://schemas.microsoft.com/office/powerpoint/2010/main" id="1" dur="indefinite" restart="never" nodeType="tmRoot"/>
       </p:par>
     </p:tnLst>
   </p:timing>
@@ -29602,25 +29507,25 @@
     </p:spTree>
     <p:extLst>
       <p:ext uri="{BB962C8B-B14F-4D97-AF65-F5344CB8AC3E}">
-        <p14:creationId xmlns:p14="http://schemas.microsoft.com/office/powerpoint/2010/main" xmlns="" val="2203748189"/>
+        <p14:creationId xmlns:p14="http://schemas.microsoft.com/office/powerpoint/2010/main" val="2203748189"/>
       </p:ext>
     </p:extLst>
   </p:cSld>
   <p:clrMapOvr>
     <a:masterClrMapping/>
   </p:clrMapOvr>
-  <mc:AlternateContent xmlns:mc="http://schemas.openxmlformats.org/markup-compatibility/2006">
-    <mc:Choice xmlns:p14="http://schemas.microsoft.com/office/powerpoint/2010/main" xmlns="" Requires="p14">
+  <mc:AlternateContent xmlns:mc="http://schemas.openxmlformats.org/markup-compatibility/2006" xmlns:p14="http://schemas.microsoft.com/office/powerpoint/2010/main">
+    <mc:Choice Requires="p14">
       <p:transition spd="slow" p14:dur="2000"/>
     </mc:Choice>
-    <mc:Fallback>
+    <mc:Fallback xmlns="">
       <p:transition spd="slow"/>
     </mc:Fallback>
   </mc:AlternateContent>
   <p:timing>
     <p:tnLst>
       <p:par>
-        <p:cTn id="1" dur="indefinite" restart="never" nodeType="tmRoot"/>
+        <p:cTn xmlns:p14="http://schemas.microsoft.com/office/powerpoint/2010/main" id="1" dur="indefinite" restart="never" nodeType="tmRoot"/>
       </p:par>
     </p:tnLst>
   </p:timing>
@@ -29933,25 +29838,25 @@
     </p:spTree>
     <p:extLst>
       <p:ext uri="{BB962C8B-B14F-4D97-AF65-F5344CB8AC3E}">
-        <p14:creationId xmlns:p14="http://schemas.microsoft.com/office/powerpoint/2010/main" xmlns="" val="1130254901"/>
+        <p14:creationId xmlns:p14="http://schemas.microsoft.com/office/powerpoint/2010/main" val="1130254901"/>
       </p:ext>
     </p:extLst>
   </p:cSld>
   <p:clrMapOvr>
     <a:masterClrMapping/>
   </p:clrMapOvr>
-  <mc:AlternateContent xmlns:mc="http://schemas.openxmlformats.org/markup-compatibility/2006">
-    <mc:Choice xmlns:p14="http://schemas.microsoft.com/office/powerpoint/2010/main" xmlns="" Requires="p14">
+  <mc:AlternateContent xmlns:mc="http://schemas.openxmlformats.org/markup-compatibility/2006" xmlns:p14="http://schemas.microsoft.com/office/powerpoint/2010/main">
+    <mc:Choice Requires="p14">
       <p:transition spd="slow" p14:dur="2000"/>
     </mc:Choice>
-    <mc:Fallback>
+    <mc:Fallback xmlns="">
       <p:transition spd="slow"/>
     </mc:Fallback>
   </mc:AlternateContent>
   <p:timing>
     <p:tnLst>
       <p:par>
-        <p:cTn id="1" dur="indefinite" restart="never" nodeType="tmRoot"/>
+        <p:cTn xmlns:p14="http://schemas.microsoft.com/office/powerpoint/2010/main" id="1" dur="indefinite" restart="never" nodeType="tmRoot"/>
       </p:par>
     </p:tnLst>
   </p:timing>
@@ -30279,25 +30184,25 @@
     </p:spTree>
     <p:extLst>
       <p:ext uri="{BB962C8B-B14F-4D97-AF65-F5344CB8AC3E}">
-        <p14:creationId xmlns:p14="http://schemas.microsoft.com/office/powerpoint/2010/main" xmlns="" val="3734576715"/>
+        <p14:creationId xmlns:p14="http://schemas.microsoft.com/office/powerpoint/2010/main" val="3734576715"/>
       </p:ext>
     </p:extLst>
   </p:cSld>
   <p:clrMapOvr>
     <a:masterClrMapping/>
   </p:clrMapOvr>
-  <mc:AlternateContent xmlns:mc="http://schemas.openxmlformats.org/markup-compatibility/2006">
-    <mc:Choice xmlns:p14="http://schemas.microsoft.com/office/powerpoint/2010/main" xmlns="" Requires="p14">
+  <mc:AlternateContent xmlns:mc="http://schemas.openxmlformats.org/markup-compatibility/2006" xmlns:p14="http://schemas.microsoft.com/office/powerpoint/2010/main">
+    <mc:Choice Requires="p14">
       <p:transition spd="slow" p14:dur="2000"/>
     </mc:Choice>
-    <mc:Fallback>
+    <mc:Fallback xmlns="">
       <p:transition spd="slow"/>
     </mc:Fallback>
   </mc:AlternateContent>
   <p:timing>
     <p:tnLst>
       <p:par>
-        <p:cTn id="1" dur="indefinite" restart="never" nodeType="tmRoot"/>
+        <p:cTn xmlns:p14="http://schemas.microsoft.com/office/powerpoint/2010/main" id="1" dur="indefinite" restart="never" nodeType="tmRoot"/>
       </p:par>
     </p:tnLst>
   </p:timing>
@@ -30592,25 +30497,25 @@
     </p:spTree>
     <p:extLst>
       <p:ext uri="{BB962C8B-B14F-4D97-AF65-F5344CB8AC3E}">
-        <p14:creationId xmlns:p14="http://schemas.microsoft.com/office/powerpoint/2010/main" xmlns="" val="2632131054"/>
+        <p14:creationId xmlns:p14="http://schemas.microsoft.com/office/powerpoint/2010/main" val="2632131054"/>
       </p:ext>
     </p:extLst>
   </p:cSld>
   <p:clrMapOvr>
     <a:masterClrMapping/>
   </p:clrMapOvr>
-  <mc:AlternateContent xmlns:mc="http://schemas.openxmlformats.org/markup-compatibility/2006">
-    <mc:Choice xmlns:p14="http://schemas.microsoft.com/office/powerpoint/2010/main" xmlns="" Requires="p14">
+  <mc:AlternateContent xmlns:mc="http://schemas.openxmlformats.org/markup-compatibility/2006" xmlns:p14="http://schemas.microsoft.com/office/powerpoint/2010/main">
+    <mc:Choice Requires="p14">
       <p:transition spd="slow" p14:dur="2000"/>
     </mc:Choice>
-    <mc:Fallback>
+    <mc:Fallback xmlns="">
       <p:transition spd="slow"/>
     </mc:Fallback>
   </mc:AlternateContent>
   <p:timing>
     <p:tnLst>
       <p:par>
-        <p:cTn id="1" dur="indefinite" restart="never" nodeType="tmRoot"/>
+        <p:cTn xmlns:p14="http://schemas.microsoft.com/office/powerpoint/2010/main" id="1" dur="indefinite" restart="never" nodeType="tmRoot"/>
       </p:par>
     </p:tnLst>
   </p:timing>
@@ -30921,25 +30826,25 @@
     </p:spTree>
     <p:extLst>
       <p:ext uri="{BB962C8B-B14F-4D97-AF65-F5344CB8AC3E}">
-        <p14:creationId xmlns:p14="http://schemas.microsoft.com/office/powerpoint/2010/main" xmlns="" val="2983282113"/>
+        <p14:creationId xmlns:p14="http://schemas.microsoft.com/office/powerpoint/2010/main" val="2983282113"/>
       </p:ext>
     </p:extLst>
   </p:cSld>
   <p:clrMapOvr>
     <a:masterClrMapping/>
   </p:clrMapOvr>
-  <mc:AlternateContent xmlns:mc="http://schemas.openxmlformats.org/markup-compatibility/2006">
-    <mc:Choice xmlns:p14="http://schemas.microsoft.com/office/powerpoint/2010/main" xmlns="" Requires="p14">
+  <mc:AlternateContent xmlns:mc="http://schemas.openxmlformats.org/markup-compatibility/2006" xmlns:p14="http://schemas.microsoft.com/office/powerpoint/2010/main">
+    <mc:Choice Requires="p14">
       <p:transition spd="slow" p14:dur="2000"/>
     </mc:Choice>
-    <mc:Fallback>
+    <mc:Fallback xmlns="">
       <p:transition spd="slow"/>
     </mc:Fallback>
   </mc:AlternateContent>
   <p:timing>
     <p:tnLst>
       <p:par>
-        <p:cTn id="1" dur="indefinite" restart="never" nodeType="tmRoot"/>
+        <p:cTn xmlns:p14="http://schemas.microsoft.com/office/powerpoint/2010/main" id="1" dur="indefinite" restart="never" nodeType="tmRoot"/>
       </p:par>
     </p:tnLst>
   </p:timing>
@@ -31296,25 +31201,25 @@
     </p:spTree>
     <p:extLst>
       <p:ext uri="{BB962C8B-B14F-4D97-AF65-F5344CB8AC3E}">
-        <p14:creationId xmlns:p14="http://schemas.microsoft.com/office/powerpoint/2010/main" xmlns="" val="4266361740"/>
+        <p14:creationId xmlns:p14="http://schemas.microsoft.com/office/powerpoint/2010/main" val="4266361740"/>
       </p:ext>
     </p:extLst>
   </p:cSld>
   <p:clrMapOvr>
     <a:masterClrMapping/>
   </p:clrMapOvr>
-  <mc:AlternateContent xmlns:mc="http://schemas.openxmlformats.org/markup-compatibility/2006">
-    <mc:Choice xmlns:p14="http://schemas.microsoft.com/office/powerpoint/2010/main" xmlns="" Requires="p14">
+  <mc:AlternateContent xmlns:mc="http://schemas.openxmlformats.org/markup-compatibility/2006" xmlns:p14="http://schemas.microsoft.com/office/powerpoint/2010/main">
+    <mc:Choice Requires="p14">
       <p:transition spd="slow" p14:dur="2000"/>
     </mc:Choice>
-    <mc:Fallback>
+    <mc:Fallback xmlns="">
       <p:transition spd="slow"/>
     </mc:Fallback>
   </mc:AlternateContent>
   <p:timing>
     <p:tnLst>
       <p:par>
-        <p:cTn id="1" dur="indefinite" restart="never" nodeType="tmRoot"/>
+        <p:cTn xmlns:p14="http://schemas.microsoft.com/office/powerpoint/2010/main" id="1" dur="indefinite" restart="never" nodeType="tmRoot"/>
       </p:par>
     </p:tnLst>
   </p:timing>
@@ -31654,25 +31559,25 @@
     </p:spTree>
     <p:extLst>
       <p:ext uri="{BB962C8B-B14F-4D97-AF65-F5344CB8AC3E}">
-        <p14:creationId xmlns:p14="http://schemas.microsoft.com/office/powerpoint/2010/main" xmlns="" val="3678400164"/>
+        <p14:creationId xmlns:p14="http://schemas.microsoft.com/office/powerpoint/2010/main" val="3678400164"/>
       </p:ext>
     </p:extLst>
   </p:cSld>
   <p:clrMapOvr>
     <a:masterClrMapping/>
   </p:clrMapOvr>
-  <mc:AlternateContent xmlns:mc="http://schemas.openxmlformats.org/markup-compatibility/2006">
-    <mc:Choice xmlns:p14="http://schemas.microsoft.com/office/powerpoint/2010/main" xmlns="" Requires="p14">
+  <mc:AlternateContent xmlns:mc="http://schemas.openxmlformats.org/markup-compatibility/2006" xmlns:p14="http://schemas.microsoft.com/office/powerpoint/2010/main">
+    <mc:Choice Requires="p14">
       <p:transition spd="slow" p14:dur="2000"/>
     </mc:Choice>
-    <mc:Fallback>
+    <mc:Fallback xmlns="">
       <p:transition spd="slow"/>
     </mc:Fallback>
   </mc:AlternateContent>
   <p:timing>
     <p:tnLst>
       <p:par>
-        <p:cTn id="1" dur="indefinite" restart="never" nodeType="tmRoot"/>
+        <p:cTn xmlns:p14="http://schemas.microsoft.com/office/powerpoint/2010/main" id="1" dur="indefinite" restart="never" nodeType="tmRoot"/>
       </p:par>
     </p:tnLst>
   </p:timing>
@@ -31992,25 +31897,25 @@
     </p:spTree>
     <p:extLst>
       <p:ext uri="{BB962C8B-B14F-4D97-AF65-F5344CB8AC3E}">
-        <p14:creationId xmlns:p14="http://schemas.microsoft.com/office/powerpoint/2010/main" xmlns="" val="3326293041"/>
+        <p14:creationId xmlns:p14="http://schemas.microsoft.com/office/powerpoint/2010/main" val="3326293041"/>
       </p:ext>
     </p:extLst>
   </p:cSld>
   <p:clrMapOvr>
     <a:masterClrMapping/>
   </p:clrMapOvr>
-  <mc:AlternateContent xmlns:mc="http://schemas.openxmlformats.org/markup-compatibility/2006">
-    <mc:Choice xmlns:p14="http://schemas.microsoft.com/office/powerpoint/2010/main" xmlns="" Requires="p14">
+  <mc:AlternateContent xmlns:mc="http://schemas.openxmlformats.org/markup-compatibility/2006" xmlns:p14="http://schemas.microsoft.com/office/powerpoint/2010/main">
+    <mc:Choice Requires="p14">
       <p:transition spd="slow" p14:dur="2000"/>
     </mc:Choice>
-    <mc:Fallback>
+    <mc:Fallback xmlns="">
       <p:transition spd="slow"/>
     </mc:Fallback>
   </mc:AlternateContent>
   <p:timing>
     <p:tnLst>
       <p:par>
-        <p:cTn id="1" dur="indefinite" restart="never" nodeType="tmRoot"/>
+        <p:cTn xmlns:p14="http://schemas.microsoft.com/office/powerpoint/2010/main" id="1" dur="indefinite" restart="never" nodeType="tmRoot"/>
       </p:par>
     </p:tnLst>
   </p:timing>
@@ -32338,25 +32243,25 @@
     </p:spTree>
     <p:extLst>
       <p:ext uri="{BB962C8B-B14F-4D97-AF65-F5344CB8AC3E}">
-        <p14:creationId xmlns:p14="http://schemas.microsoft.com/office/powerpoint/2010/main" xmlns="" val="3052723909"/>
+        <p14:creationId xmlns:p14="http://schemas.microsoft.com/office/powerpoint/2010/main" val="3052723909"/>
       </p:ext>
     </p:extLst>
   </p:cSld>
   <p:clrMapOvr>
     <a:masterClrMapping/>
   </p:clrMapOvr>
-  <mc:AlternateContent xmlns:mc="http://schemas.openxmlformats.org/markup-compatibility/2006">
-    <mc:Choice xmlns:p14="http://schemas.microsoft.com/office/powerpoint/2010/main" xmlns="" Requires="p14">
+  <mc:AlternateContent xmlns:mc="http://schemas.openxmlformats.org/markup-compatibility/2006" xmlns:p14="http://schemas.microsoft.com/office/powerpoint/2010/main">
+    <mc:Choice Requires="p14">
       <p:transition spd="slow" p14:dur="2000"/>
     </mc:Choice>
-    <mc:Fallback>
+    <mc:Fallback xmlns="">
       <p:transition spd="slow"/>
     </mc:Fallback>
   </mc:AlternateContent>
   <p:timing>
     <p:tnLst>
       <p:par>
-        <p:cTn id="1" dur="indefinite" restart="never" nodeType="tmRoot"/>
+        <p:cTn xmlns:p14="http://schemas.microsoft.com/office/powerpoint/2010/main" id="1" dur="indefinite" restart="never" nodeType="tmRoot"/>
       </p:par>
     </p:tnLst>
   </p:timing>
@@ -32474,25 +32379,25 @@
     </p:spTree>
     <p:extLst>
       <p:ext uri="{BB962C8B-B14F-4D97-AF65-F5344CB8AC3E}">
-        <p14:creationId xmlns:p14="http://schemas.microsoft.com/office/powerpoint/2010/main" xmlns="" val="1576574823"/>
+        <p14:creationId xmlns:p14="http://schemas.microsoft.com/office/powerpoint/2010/main" val="1576574823"/>
       </p:ext>
     </p:extLst>
   </p:cSld>
   <p:clrMapOvr>
     <a:masterClrMapping/>
   </p:clrMapOvr>
-  <mc:AlternateContent xmlns:mc="http://schemas.openxmlformats.org/markup-compatibility/2006">
-    <mc:Choice xmlns:p14="http://schemas.microsoft.com/office/powerpoint/2010/main" xmlns="" Requires="p14">
+  <mc:AlternateContent xmlns:mc="http://schemas.openxmlformats.org/markup-compatibility/2006" xmlns:p14="http://schemas.microsoft.com/office/powerpoint/2010/main">
+    <mc:Choice Requires="p14">
       <p:transition spd="slow" p14:dur="2000"/>
     </mc:Choice>
-    <mc:Fallback>
+    <mc:Fallback xmlns="">
       <p:transition spd="slow"/>
     </mc:Fallback>
   </mc:AlternateContent>
   <p:timing>
     <p:tnLst>
       <p:par>
-        <p:cTn id="1" dur="indefinite" restart="never" nodeType="tmRoot"/>
+        <p:cTn xmlns:p14="http://schemas.microsoft.com/office/powerpoint/2010/main" id="1" dur="indefinite" restart="never" nodeType="tmRoot"/>
       </p:par>
     </p:tnLst>
   </p:timing>
@@ -32772,25 +32677,25 @@
     </p:spTree>
     <p:extLst>
       <p:ext uri="{BB962C8B-B14F-4D97-AF65-F5344CB8AC3E}">
-        <p14:creationId xmlns:p14="http://schemas.microsoft.com/office/powerpoint/2010/main" xmlns="" val="3303920882"/>
+        <p14:creationId xmlns:p14="http://schemas.microsoft.com/office/powerpoint/2010/main" val="3303920882"/>
       </p:ext>
     </p:extLst>
   </p:cSld>
   <p:clrMapOvr>
     <a:masterClrMapping/>
   </p:clrMapOvr>
-  <mc:AlternateContent xmlns:mc="http://schemas.openxmlformats.org/markup-compatibility/2006">
-    <mc:Choice xmlns:p14="http://schemas.microsoft.com/office/powerpoint/2010/main" xmlns="" Requires="p14">
+  <mc:AlternateContent xmlns:mc="http://schemas.openxmlformats.org/markup-compatibility/2006" xmlns:p14="http://schemas.microsoft.com/office/powerpoint/2010/main">
+    <mc:Choice Requires="p14">
       <p:transition spd="slow" p14:dur="2000"/>
     </mc:Choice>
-    <mc:Fallback>
+    <mc:Fallback xmlns="">
       <p:transition spd="slow"/>
     </mc:Fallback>
   </mc:AlternateContent>
   <p:timing>
     <p:tnLst>
       <p:par>
-        <p:cTn id="1" dur="indefinite" restart="never" nodeType="tmRoot"/>
+        <p:cTn xmlns:p14="http://schemas.microsoft.com/office/powerpoint/2010/main" id="1" dur="indefinite" restart="never" nodeType="tmRoot"/>
       </p:par>
     </p:tnLst>
   </p:timing>
@@ -33075,7 +32980,7 @@
   <p:timing>
     <p:tnLst>
       <p:par>
-        <p:cTn id="1" dur="indefinite" restart="never" nodeType="tmRoot">
+        <p:cTn xmlns:p14="http://schemas.microsoft.com/office/powerpoint/2010/main" id="1" dur="indefinite" restart="never" nodeType="tmRoot">
           <p:childTnLst>
             <p:seq>
               <p:cTn id="2" nodeType="mainSeq"/>
@@ -33412,7 +33317,7 @@
   <p:timing>
     <p:tnLst>
       <p:par>
-        <p:cTn id="1" dur="indefinite" restart="never" nodeType="tmRoot">
+        <p:cTn xmlns:p14="http://schemas.microsoft.com/office/powerpoint/2010/main" id="1" dur="indefinite" restart="never" nodeType="tmRoot">
           <p:childTnLst>
             <p:seq>
               <p:cTn id="2" nodeType="mainSeq"/>
@@ -33756,7 +33661,7 @@
   <p:timing>
     <p:tnLst>
       <p:par>
-        <p:cTn id="1" dur="indefinite" restart="never" nodeType="tmRoot">
+        <p:cTn xmlns:p14="http://schemas.microsoft.com/office/powerpoint/2010/main" id="1" dur="indefinite" restart="never" nodeType="tmRoot">
           <p:childTnLst>
             <p:seq>
               <p:cTn id="2" nodeType="mainSeq"/>
@@ -34125,7 +34030,7 @@
   <p:timing>
     <p:tnLst>
       <p:par>
-        <p:cTn id="1" dur="indefinite" restart="never" nodeType="tmRoot">
+        <p:cTn xmlns:p14="http://schemas.microsoft.com/office/powerpoint/2010/main" id="1" dur="indefinite" restart="never" nodeType="tmRoot">
           <p:childTnLst>
             <p:seq>
               <p:cTn id="2" nodeType="mainSeq"/>
@@ -34379,7 +34284,7 @@
   <p:timing>
     <p:tnLst>
       <p:par>
-        <p:cTn id="1" dur="indefinite" restart="never" nodeType="tmRoot">
+        <p:cTn xmlns:p14="http://schemas.microsoft.com/office/powerpoint/2010/main" id="1" dur="indefinite" restart="never" nodeType="tmRoot">
           <p:childTnLst>
             <p:seq>
               <p:cTn id="2" nodeType="mainSeq"/>
@@ -34625,7 +34530,7 @@
   <p:timing>
     <p:tnLst>
       <p:par>
-        <p:cTn id="1" dur="indefinite" restart="never" nodeType="tmRoot">
+        <p:cTn xmlns:p14="http://schemas.microsoft.com/office/powerpoint/2010/main" id="1" dur="indefinite" restart="never" nodeType="tmRoot">
           <p:childTnLst>
             <p:seq>
               <p:cTn id="2" nodeType="mainSeq"/>
@@ -34990,25 +34895,25 @@
     </p:spTree>
     <p:extLst>
       <p:ext uri="{BB962C8B-B14F-4D97-AF65-F5344CB8AC3E}">
-        <p14:creationId xmlns:p14="http://schemas.microsoft.com/office/powerpoint/2010/main" xmlns="" val="2978215168"/>
+        <p14:creationId xmlns:p14="http://schemas.microsoft.com/office/powerpoint/2010/main" val="2978215168"/>
       </p:ext>
     </p:extLst>
   </p:cSld>
   <p:clrMapOvr>
     <a:masterClrMapping/>
   </p:clrMapOvr>
-  <mc:AlternateContent xmlns:mc="http://schemas.openxmlformats.org/markup-compatibility/2006">
-    <mc:Choice xmlns:p14="http://schemas.microsoft.com/office/powerpoint/2010/main" xmlns="" Requires="p14">
+  <mc:AlternateContent xmlns:mc="http://schemas.openxmlformats.org/markup-compatibility/2006" xmlns:p14="http://schemas.microsoft.com/office/powerpoint/2010/main">
+    <mc:Choice Requires="p14">
       <p:transition spd="slow" p14:dur="2000"/>
     </mc:Choice>
-    <mc:Fallback>
+    <mc:Fallback xmlns="">
       <p:transition spd="slow"/>
     </mc:Fallback>
   </mc:AlternateContent>
   <p:timing>
     <p:tnLst>
       <p:par>
-        <p:cTn id="1" dur="indefinite" restart="never" nodeType="tmRoot"/>
+        <p:cTn xmlns:p14="http://schemas.microsoft.com/office/powerpoint/2010/main" id="1" dur="indefinite" restart="never" nodeType="tmRoot"/>
       </p:par>
     </p:tnLst>
   </p:timing>
@@ -35234,7 +35139,7 @@
   <p:timing>
     <p:tnLst>
       <p:par>
-        <p:cTn id="1" dur="indefinite" restart="never" nodeType="tmRoot">
+        <p:cTn xmlns:p14="http://schemas.microsoft.com/office/powerpoint/2010/main" id="1" dur="indefinite" restart="never" nodeType="tmRoot">
           <p:childTnLst>
             <p:seq>
               <p:cTn id="2" nodeType="mainSeq"/>
@@ -35526,7 +35431,7 @@
   <p:timing>
     <p:tnLst>
       <p:par>
-        <p:cTn id="1" dur="indefinite" restart="never" nodeType="tmRoot">
+        <p:cTn xmlns:p14="http://schemas.microsoft.com/office/powerpoint/2010/main" id="1" dur="indefinite" restart="never" nodeType="tmRoot">
           <p:childTnLst>
             <p:seq>
               <p:cTn id="2" nodeType="mainSeq"/>
@@ -35785,7 +35690,7 @@
   <p:timing>
     <p:tnLst>
       <p:par>
-        <p:cTn id="1" dur="indefinite" restart="never" nodeType="tmRoot">
+        <p:cTn xmlns:p14="http://schemas.microsoft.com/office/powerpoint/2010/main" id="1" dur="indefinite" restart="never" nodeType="tmRoot">
           <p:childTnLst>
             <p:seq>
               <p:cTn id="2" nodeType="mainSeq"/>
@@ -36011,7 +35916,7 @@
   <p:timing>
     <p:tnLst>
       <p:par>
-        <p:cTn id="1" dur="indefinite" restart="never" nodeType="tmRoot">
+        <p:cTn xmlns:p14="http://schemas.microsoft.com/office/powerpoint/2010/main" id="1" dur="indefinite" restart="never" nodeType="tmRoot">
           <p:childTnLst>
             <p:seq>
               <p:cTn id="2" nodeType="mainSeq"/>
@@ -36255,7 +36160,7 @@
   <p:timing>
     <p:tnLst>
       <p:par>
-        <p:cTn id="1" dur="indefinite" restart="never" nodeType="tmRoot">
+        <p:cTn xmlns:p14="http://schemas.microsoft.com/office/powerpoint/2010/main" id="1" dur="indefinite" restart="never" nodeType="tmRoot">
           <p:childTnLst>
             <p:seq>
               <p:cTn id="2" nodeType="mainSeq"/>
@@ -36521,7 +36426,7 @@
   <p:timing>
     <p:tnLst>
       <p:par>
-        <p:cTn id="1" dur="indefinite" restart="never" nodeType="tmRoot">
+        <p:cTn xmlns:p14="http://schemas.microsoft.com/office/powerpoint/2010/main" id="1" dur="indefinite" restart="never" nodeType="tmRoot">
           <p:childTnLst>
             <p:seq>
               <p:cTn id="2" nodeType="mainSeq"/>
@@ -36792,7 +36697,7 @@
   <p:timing>
     <p:tnLst>
       <p:par>
-        <p:cTn id="1" dur="indefinite" restart="never" nodeType="tmRoot">
+        <p:cTn xmlns:p14="http://schemas.microsoft.com/office/powerpoint/2010/main" id="1" dur="indefinite" restart="never" nodeType="tmRoot">
           <p:childTnLst>
             <p:seq>
               <p:cTn id="2" nodeType="mainSeq"/>
@@ -37050,7 +36955,7 @@
   <p:timing>
     <p:tnLst>
       <p:par>
-        <p:cTn id="1" dur="indefinite" restart="never" nodeType="tmRoot">
+        <p:cTn xmlns:p14="http://schemas.microsoft.com/office/powerpoint/2010/main" id="1" dur="indefinite" restart="never" nodeType="tmRoot">
           <p:childTnLst>
             <p:seq>
               <p:cTn id="2" nodeType="mainSeq"/>
@@ -37106,7 +37011,7 @@
           <a:blip r:embed="rId2" cstate="print">
             <a:extLst>
               <a:ext uri="{28A0092B-C50C-407E-A947-70E740481C1C}">
-                <a14:useLocalDpi xmlns:a14="http://schemas.microsoft.com/office/drawing/2010/main" xmlns="" val="0"/>
+                <a14:useLocalDpi xmlns:a14="http://schemas.microsoft.com/office/drawing/2010/main" val="0"/>
               </a:ext>
             </a:extLst>
           </a:blip>
@@ -37126,7 +37031,7 @@
           <a:noFill/>
           <a:extLst>
             <a:ext uri="{909E8E84-426E-40dd-AFC4-6F175D3DCCD1}">
-              <a14:hiddenFill xmlns:a14="http://schemas.microsoft.com/office/drawing/2010/main" xmlns="">
+              <a14:hiddenFill xmlns:a14="http://schemas.microsoft.com/office/drawing/2010/main">
                 <a:solidFill>
                   <a:srgbClr val="FFFFFF"/>
                 </a:solidFill>
@@ -37209,25 +37114,25 @@
     </p:spTree>
     <p:extLst>
       <p:ext uri="{BB962C8B-B14F-4D97-AF65-F5344CB8AC3E}">
-        <p14:creationId xmlns:p14="http://schemas.microsoft.com/office/powerpoint/2010/main" xmlns="" val="2252746867"/>
+        <p14:creationId xmlns:p14="http://schemas.microsoft.com/office/powerpoint/2010/main" val="2252746867"/>
       </p:ext>
     </p:extLst>
   </p:cSld>
   <p:clrMapOvr>
     <a:masterClrMapping/>
   </p:clrMapOvr>
-  <mc:AlternateContent xmlns:mc="http://schemas.openxmlformats.org/markup-compatibility/2006">
-    <mc:Choice xmlns:p14="http://schemas.microsoft.com/office/powerpoint/2010/main" xmlns="" Requires="p14">
+  <mc:AlternateContent xmlns:mc="http://schemas.openxmlformats.org/markup-compatibility/2006" xmlns:p14="http://schemas.microsoft.com/office/powerpoint/2010/main">
+    <mc:Choice Requires="p14">
       <p:transition spd="slow" p14:dur="2000"/>
     </mc:Choice>
-    <mc:Fallback>
+    <mc:Fallback xmlns="">
       <p:transition spd="slow"/>
     </mc:Fallback>
   </mc:AlternateContent>
   <p:timing>
     <p:tnLst>
       <p:par>
-        <p:cTn id="1" dur="indefinite" restart="never" nodeType="tmRoot"/>
+        <p:cTn xmlns:p14="http://schemas.microsoft.com/office/powerpoint/2010/main" id="1" dur="indefinite" restart="never" nodeType="tmRoot"/>
       </p:par>
     </p:tnLst>
   </p:timing>
@@ -37584,25 +37489,25 @@
     </p:spTree>
     <p:extLst>
       <p:ext uri="{BB962C8B-B14F-4D97-AF65-F5344CB8AC3E}">
-        <p14:creationId xmlns:p14="http://schemas.microsoft.com/office/powerpoint/2010/main" xmlns="" val="3564990699"/>
+        <p14:creationId xmlns:p14="http://schemas.microsoft.com/office/powerpoint/2010/main" val="3564990699"/>
       </p:ext>
     </p:extLst>
   </p:cSld>
   <p:clrMapOvr>
     <a:masterClrMapping/>
   </p:clrMapOvr>
-  <mc:AlternateContent xmlns:mc="http://schemas.openxmlformats.org/markup-compatibility/2006">
-    <mc:Choice xmlns:p14="http://schemas.microsoft.com/office/powerpoint/2010/main" xmlns="" Requires="p14">
+  <mc:AlternateContent xmlns:mc="http://schemas.openxmlformats.org/markup-compatibility/2006" xmlns:p14="http://schemas.microsoft.com/office/powerpoint/2010/main">
+    <mc:Choice Requires="p14">
       <p:transition spd="slow" p14:dur="2000"/>
     </mc:Choice>
-    <mc:Fallback>
+    <mc:Fallback xmlns="">
       <p:transition spd="slow"/>
     </mc:Fallback>
   </mc:AlternateContent>
   <p:timing>
     <p:tnLst>
       <p:par>
-        <p:cTn id="1" dur="indefinite" restart="never" nodeType="tmRoot"/>
+        <p:cTn xmlns:p14="http://schemas.microsoft.com/office/powerpoint/2010/main" id="1" dur="indefinite" restart="never" nodeType="tmRoot"/>
       </p:par>
     </p:tnLst>
   </p:timing>

</xml_diff>